<commit_message>
Fixed Unit and motor frames Worked on initialization and destruction Updated doxygen
</commit_message>
<xml_diff>
--- a/Sketches.pptx
+++ b/Sketches.pptx
@@ -6,8 +6,8 @@
   </p:sldMasterIdLst>
   <p:sldIdLst>
     <p:sldId id="256" r:id="rId2"/>
-    <p:sldId id="257" r:id="rId3"/>
-    <p:sldId id="258" r:id="rId4"/>
+    <p:sldId id="258" r:id="rId3"/>
+    <p:sldId id="257" r:id="rId4"/>
   </p:sldIdLst>
   <p:sldSz cx="12192000" cy="6858000"/>
   <p:notesSz cx="6858000" cy="9144000"/>
@@ -3103,6 +3103,594 @@
 </file>
 
 <file path=ppt/diagrams/data1.xml><?xml version="1.0" encoding="utf-8"?>
+<dgm:dataModel xmlns:dgm="http://schemas.openxmlformats.org/drawingml/2006/diagram" xmlns:a="http://schemas.openxmlformats.org/drawingml/2006/main">
+  <dgm:ptLst>
+    <dgm:pt modelId="{C27691A8-FCE4-4FEB-A451-4A5EA187EB67}" type="doc">
+      <dgm:prSet loTypeId="urn:microsoft.com/office/officeart/2005/8/layout/orgChart1" loCatId="hierarchy" qsTypeId="urn:microsoft.com/office/officeart/2005/8/quickstyle/simple1" qsCatId="simple" csTypeId="urn:microsoft.com/office/officeart/2005/8/colors/accent1_2" csCatId="accent1" phldr="1"/>
+      <dgm:spPr/>
+      <dgm:t>
+        <a:bodyPr/>
+        <a:lstStyle/>
+        <a:p>
+          <a:endParaRPr lang="en-US"/>
+        </a:p>
+      </dgm:t>
+    </dgm:pt>
+    <dgm:pt modelId="{B0ADAF9C-6C30-4E23-8508-4FA7AD2A7848}">
+      <dgm:prSet phldrT="[Text]"/>
+      <dgm:spPr/>
+      <dgm:t>
+        <a:bodyPr/>
+        <a:lstStyle/>
+        <a:p>
+          <a:r>
+            <a:rPr lang="en-US" dirty="0" err="1" smtClean="0"/>
+            <a:t>ArrayBot</a:t>
+          </a:r>
+          <a:r>
+            <a:rPr lang="en-US" dirty="0" smtClean="0"/>
+            <a:t> C++ API </a:t>
+          </a:r>
+          <a:endParaRPr lang="en-US" dirty="0"/>
+        </a:p>
+      </dgm:t>
+    </dgm:pt>
+    <dgm:pt modelId="{34ADD3B4-ED4D-4D20-96EA-801281A31C07}" type="parTrans" cxnId="{0309876D-1A7E-45E7-BE79-2B8FC2C2D90C}">
+      <dgm:prSet/>
+      <dgm:spPr/>
+      <dgm:t>
+        <a:bodyPr/>
+        <a:lstStyle/>
+        <a:p>
+          <a:endParaRPr lang="en-US"/>
+        </a:p>
+      </dgm:t>
+    </dgm:pt>
+    <dgm:pt modelId="{FF02142E-1F08-4564-94A8-C41EBE3A20CF}" type="sibTrans" cxnId="{0309876D-1A7E-45E7-BE79-2B8FC2C2D90C}">
+      <dgm:prSet/>
+      <dgm:spPr/>
+      <dgm:t>
+        <a:bodyPr/>
+        <a:lstStyle/>
+        <a:p>
+          <a:endParaRPr lang="en-US"/>
+        </a:p>
+      </dgm:t>
+    </dgm:pt>
+    <dgm:pt modelId="{8A966797-98B1-4E01-95D7-DB1428427F69}">
+      <dgm:prSet phldrT="[Text]"/>
+      <dgm:spPr/>
+      <dgm:t>
+        <a:bodyPr/>
+        <a:lstStyle/>
+        <a:p>
+          <a:r>
+            <a:rPr lang="en-US" dirty="0" err="1" smtClean="0"/>
+            <a:t>ThorLabs</a:t>
+          </a:r>
+          <a:r>
+            <a:rPr lang="en-US" dirty="0" smtClean="0"/>
+            <a:t> C – API</a:t>
+          </a:r>
+          <a:endParaRPr lang="en-US" dirty="0"/>
+        </a:p>
+      </dgm:t>
+    </dgm:pt>
+    <dgm:pt modelId="{E66AF807-E90C-462F-8417-C2A56E687749}" type="parTrans" cxnId="{0D963521-8D90-4E7C-BF39-3F4838EF47F4}">
+      <dgm:prSet/>
+      <dgm:spPr/>
+      <dgm:t>
+        <a:bodyPr/>
+        <a:lstStyle/>
+        <a:p>
+          <a:endParaRPr lang="en-US"/>
+        </a:p>
+      </dgm:t>
+    </dgm:pt>
+    <dgm:pt modelId="{DC81EB2D-702A-409F-81AB-F490B1369376}" type="sibTrans" cxnId="{0D963521-8D90-4E7C-BF39-3F4838EF47F4}">
+      <dgm:prSet/>
+      <dgm:spPr/>
+      <dgm:t>
+        <a:bodyPr/>
+        <a:lstStyle/>
+        <a:p>
+          <a:endParaRPr lang="en-US"/>
+        </a:p>
+      </dgm:t>
+    </dgm:pt>
+    <dgm:pt modelId="{3C63B6D8-03B6-446F-92B2-40BEE7EA3DA6}">
+      <dgm:prSet phldrT="[Text]"/>
+      <dgm:spPr/>
+      <dgm:t>
+        <a:bodyPr/>
+        <a:lstStyle/>
+        <a:p>
+          <a:r>
+            <a:rPr lang="en-US" dirty="0" err="1" smtClean="0"/>
+            <a:t>ThirdParty</a:t>
+          </a:r>
+          <a:r>
+            <a:rPr lang="en-US" dirty="0" smtClean="0"/>
+            <a:t> API’s</a:t>
+          </a:r>
+          <a:endParaRPr lang="en-US" dirty="0"/>
+        </a:p>
+      </dgm:t>
+    </dgm:pt>
+    <dgm:pt modelId="{1B146C1E-74BE-4F8D-827B-AF978D01F3BD}" type="parTrans" cxnId="{7F723C5C-1D77-427D-A4FD-119B477564DB}">
+      <dgm:prSet/>
+      <dgm:spPr/>
+      <dgm:t>
+        <a:bodyPr/>
+        <a:lstStyle/>
+        <a:p>
+          <a:endParaRPr lang="en-US"/>
+        </a:p>
+      </dgm:t>
+    </dgm:pt>
+    <dgm:pt modelId="{E7A2B69A-CA81-4761-B221-CA8D05E706EA}" type="sibTrans" cxnId="{7F723C5C-1D77-427D-A4FD-119B477564DB}">
+      <dgm:prSet/>
+      <dgm:spPr/>
+      <dgm:t>
+        <a:bodyPr/>
+        <a:lstStyle/>
+        <a:p>
+          <a:endParaRPr lang="en-US"/>
+        </a:p>
+      </dgm:t>
+    </dgm:pt>
+    <dgm:pt modelId="{3326A2DC-08EA-4603-9C9B-32AA62F5C864}">
+      <dgm:prSet phldrT="[Text]"/>
+      <dgm:spPr/>
+      <dgm:t>
+        <a:bodyPr/>
+        <a:lstStyle/>
+        <a:p>
+          <a:r>
+            <a:rPr lang="en-US" dirty="0" err="1" smtClean="0"/>
+            <a:t>Poco</a:t>
+          </a:r>
+          <a:r>
+            <a:rPr lang="en-US" dirty="0" smtClean="0"/>
+            <a:t> (Threads, </a:t>
+          </a:r>
+          <a:r>
+            <a:rPr lang="en-US" dirty="0" err="1" smtClean="0"/>
+            <a:t>TimeStamps</a:t>
+          </a:r>
+          <a:r>
+            <a:rPr lang="en-US" dirty="0" smtClean="0"/>
+            <a:t>)</a:t>
+          </a:r>
+          <a:endParaRPr lang="en-US" dirty="0"/>
+        </a:p>
+      </dgm:t>
+    </dgm:pt>
+    <dgm:pt modelId="{4B85568B-08F2-447E-8ACD-859B07B0C2FE}" type="parTrans" cxnId="{42EE8868-A611-41B2-B3B2-AD15465BA30E}">
+      <dgm:prSet/>
+      <dgm:spPr/>
+      <dgm:t>
+        <a:bodyPr/>
+        <a:lstStyle/>
+        <a:p>
+          <a:endParaRPr lang="en-US"/>
+        </a:p>
+      </dgm:t>
+    </dgm:pt>
+    <dgm:pt modelId="{3402F55D-CE79-4CF6-845C-3CC03ECD6E58}" type="sibTrans" cxnId="{42EE8868-A611-41B2-B3B2-AD15465BA30E}">
+      <dgm:prSet/>
+      <dgm:spPr/>
+      <dgm:t>
+        <a:bodyPr/>
+        <a:lstStyle/>
+        <a:p>
+          <a:endParaRPr lang="en-US"/>
+        </a:p>
+      </dgm:t>
+    </dgm:pt>
+    <dgm:pt modelId="{CF1C50AA-41C3-4932-BDF5-F4650C8B1E71}">
+      <dgm:prSet phldrT="[Text]"/>
+      <dgm:spPr/>
+      <dgm:t>
+        <a:bodyPr/>
+        <a:lstStyle/>
+        <a:p>
+          <a:r>
+            <a:rPr lang="en-US" dirty="0" err="1" smtClean="0"/>
+            <a:t>TkLibs</a:t>
+          </a:r>
+          <a:r>
+            <a:rPr lang="en-US" dirty="0" smtClean="0"/>
+            <a:t> (Various utilities, sockets, properties)</a:t>
+          </a:r>
+          <a:endParaRPr lang="en-US" dirty="0"/>
+        </a:p>
+      </dgm:t>
+    </dgm:pt>
+    <dgm:pt modelId="{1EC6A4E2-2B61-426A-A8C9-EA292C8D7D97}" type="parTrans" cxnId="{68185268-6B24-4AAF-93BE-5395A88A5FB0}">
+      <dgm:prSet/>
+      <dgm:spPr/>
+      <dgm:t>
+        <a:bodyPr/>
+        <a:lstStyle/>
+        <a:p>
+          <a:endParaRPr lang="en-US"/>
+        </a:p>
+      </dgm:t>
+    </dgm:pt>
+    <dgm:pt modelId="{471064F5-EE27-47A4-8DC6-0518BBC39794}" type="sibTrans" cxnId="{68185268-6B24-4AAF-93BE-5395A88A5FB0}">
+      <dgm:prSet/>
+      <dgm:spPr/>
+      <dgm:t>
+        <a:bodyPr/>
+        <a:lstStyle/>
+        <a:p>
+          <a:endParaRPr lang="en-US"/>
+        </a:p>
+      </dgm:t>
+    </dgm:pt>
+    <dgm:pt modelId="{E3C94D6B-9473-4B75-B2D6-600D5819A349}" type="pres">
+      <dgm:prSet presAssocID="{C27691A8-FCE4-4FEB-A451-4A5EA187EB67}" presName="hierChild1" presStyleCnt="0">
+        <dgm:presLayoutVars>
+          <dgm:orgChart val="1"/>
+          <dgm:chPref val="1"/>
+          <dgm:dir/>
+          <dgm:animOne val="branch"/>
+          <dgm:animLvl val="lvl"/>
+          <dgm:resizeHandles/>
+        </dgm:presLayoutVars>
+      </dgm:prSet>
+      <dgm:spPr/>
+      <dgm:t>
+        <a:bodyPr/>
+        <a:lstStyle/>
+        <a:p>
+          <a:endParaRPr lang="en-US"/>
+        </a:p>
+      </dgm:t>
+    </dgm:pt>
+    <dgm:pt modelId="{08E0B425-84D9-4291-AC34-5D71EDD8778C}" type="pres">
+      <dgm:prSet presAssocID="{B0ADAF9C-6C30-4E23-8508-4FA7AD2A7848}" presName="hierRoot1" presStyleCnt="0">
+        <dgm:presLayoutVars>
+          <dgm:hierBranch val="init"/>
+        </dgm:presLayoutVars>
+      </dgm:prSet>
+      <dgm:spPr/>
+    </dgm:pt>
+    <dgm:pt modelId="{AB18ECB2-E9F2-4093-A36A-92DDF935F27E}" type="pres">
+      <dgm:prSet presAssocID="{B0ADAF9C-6C30-4E23-8508-4FA7AD2A7848}" presName="rootComposite1" presStyleCnt="0"/>
+      <dgm:spPr/>
+    </dgm:pt>
+    <dgm:pt modelId="{DA1DF513-0211-4E50-AC19-D95364F9EEAD}" type="pres">
+      <dgm:prSet presAssocID="{B0ADAF9C-6C30-4E23-8508-4FA7AD2A7848}" presName="rootText1" presStyleLbl="node0" presStyleIdx="0" presStyleCnt="1">
+        <dgm:presLayoutVars>
+          <dgm:chPref val="3"/>
+        </dgm:presLayoutVars>
+      </dgm:prSet>
+      <dgm:spPr/>
+      <dgm:t>
+        <a:bodyPr/>
+        <a:lstStyle/>
+        <a:p>
+          <a:endParaRPr lang="en-US"/>
+        </a:p>
+      </dgm:t>
+    </dgm:pt>
+    <dgm:pt modelId="{E4DDD033-2C5D-416D-904F-10A129269413}" type="pres">
+      <dgm:prSet presAssocID="{B0ADAF9C-6C30-4E23-8508-4FA7AD2A7848}" presName="rootConnector1" presStyleLbl="node1" presStyleIdx="0" presStyleCnt="0"/>
+      <dgm:spPr/>
+      <dgm:t>
+        <a:bodyPr/>
+        <a:lstStyle/>
+        <a:p>
+          <a:endParaRPr lang="en-US"/>
+        </a:p>
+      </dgm:t>
+    </dgm:pt>
+    <dgm:pt modelId="{FE393823-B80C-40E6-9303-CE99527CA84B}" type="pres">
+      <dgm:prSet presAssocID="{B0ADAF9C-6C30-4E23-8508-4FA7AD2A7848}" presName="hierChild2" presStyleCnt="0"/>
+      <dgm:spPr/>
+    </dgm:pt>
+    <dgm:pt modelId="{8800A970-562A-4D8F-A6DF-A5487E7E711D}" type="pres">
+      <dgm:prSet presAssocID="{E66AF807-E90C-462F-8417-C2A56E687749}" presName="Name37" presStyleLbl="parChTrans1D2" presStyleIdx="0" presStyleCnt="2"/>
+      <dgm:spPr/>
+      <dgm:t>
+        <a:bodyPr/>
+        <a:lstStyle/>
+        <a:p>
+          <a:endParaRPr lang="en-US"/>
+        </a:p>
+      </dgm:t>
+    </dgm:pt>
+    <dgm:pt modelId="{4A5E1E19-7174-45E1-8910-4705C3A7FF95}" type="pres">
+      <dgm:prSet presAssocID="{8A966797-98B1-4E01-95D7-DB1428427F69}" presName="hierRoot2" presStyleCnt="0">
+        <dgm:presLayoutVars>
+          <dgm:hierBranch val="init"/>
+        </dgm:presLayoutVars>
+      </dgm:prSet>
+      <dgm:spPr/>
+    </dgm:pt>
+    <dgm:pt modelId="{3F065280-ABBD-4FA1-8DED-07F5B0E3E141}" type="pres">
+      <dgm:prSet presAssocID="{8A966797-98B1-4E01-95D7-DB1428427F69}" presName="rootComposite" presStyleCnt="0"/>
+      <dgm:spPr/>
+    </dgm:pt>
+    <dgm:pt modelId="{F080FFD0-E628-4673-8797-4006B01CAA2F}" type="pres">
+      <dgm:prSet presAssocID="{8A966797-98B1-4E01-95D7-DB1428427F69}" presName="rootText" presStyleLbl="node2" presStyleIdx="0" presStyleCnt="2">
+        <dgm:presLayoutVars>
+          <dgm:chPref val="3"/>
+        </dgm:presLayoutVars>
+      </dgm:prSet>
+      <dgm:spPr/>
+      <dgm:t>
+        <a:bodyPr/>
+        <a:lstStyle/>
+        <a:p>
+          <a:endParaRPr lang="en-US"/>
+        </a:p>
+      </dgm:t>
+    </dgm:pt>
+    <dgm:pt modelId="{ED6C467A-0E9B-4151-BB54-B53CF409BE13}" type="pres">
+      <dgm:prSet presAssocID="{8A966797-98B1-4E01-95D7-DB1428427F69}" presName="rootConnector" presStyleLbl="node2" presStyleIdx="0" presStyleCnt="2"/>
+      <dgm:spPr/>
+      <dgm:t>
+        <a:bodyPr/>
+        <a:lstStyle/>
+        <a:p>
+          <a:endParaRPr lang="en-US"/>
+        </a:p>
+      </dgm:t>
+    </dgm:pt>
+    <dgm:pt modelId="{644E2427-0440-481B-A5A7-9D16DD1BE7D8}" type="pres">
+      <dgm:prSet presAssocID="{8A966797-98B1-4E01-95D7-DB1428427F69}" presName="hierChild4" presStyleCnt="0"/>
+      <dgm:spPr/>
+    </dgm:pt>
+    <dgm:pt modelId="{6E94FF00-C1AD-4A26-8260-C1F62D8BA54B}" type="pres">
+      <dgm:prSet presAssocID="{8A966797-98B1-4E01-95D7-DB1428427F69}" presName="hierChild5" presStyleCnt="0"/>
+      <dgm:spPr/>
+    </dgm:pt>
+    <dgm:pt modelId="{04D282F3-260E-4A5A-BE00-49DCD89279A9}" type="pres">
+      <dgm:prSet presAssocID="{1B146C1E-74BE-4F8D-827B-AF978D01F3BD}" presName="Name37" presStyleLbl="parChTrans1D2" presStyleIdx="1" presStyleCnt="2"/>
+      <dgm:spPr/>
+      <dgm:t>
+        <a:bodyPr/>
+        <a:lstStyle/>
+        <a:p>
+          <a:endParaRPr lang="en-US"/>
+        </a:p>
+      </dgm:t>
+    </dgm:pt>
+    <dgm:pt modelId="{D38ACC22-54FF-4127-8AB7-D1697E34B100}" type="pres">
+      <dgm:prSet presAssocID="{3C63B6D8-03B6-446F-92B2-40BEE7EA3DA6}" presName="hierRoot2" presStyleCnt="0">
+        <dgm:presLayoutVars>
+          <dgm:hierBranch val="init"/>
+        </dgm:presLayoutVars>
+      </dgm:prSet>
+      <dgm:spPr/>
+    </dgm:pt>
+    <dgm:pt modelId="{18589B92-1FDE-402A-8A04-6867194F5349}" type="pres">
+      <dgm:prSet presAssocID="{3C63B6D8-03B6-446F-92B2-40BEE7EA3DA6}" presName="rootComposite" presStyleCnt="0"/>
+      <dgm:spPr/>
+    </dgm:pt>
+    <dgm:pt modelId="{0645EB98-586A-4DCD-B836-3E3EEE58E52E}" type="pres">
+      <dgm:prSet presAssocID="{3C63B6D8-03B6-446F-92B2-40BEE7EA3DA6}" presName="rootText" presStyleLbl="node2" presStyleIdx="1" presStyleCnt="2">
+        <dgm:presLayoutVars>
+          <dgm:chPref val="3"/>
+        </dgm:presLayoutVars>
+      </dgm:prSet>
+      <dgm:spPr/>
+      <dgm:t>
+        <a:bodyPr/>
+        <a:lstStyle/>
+        <a:p>
+          <a:endParaRPr lang="en-US"/>
+        </a:p>
+      </dgm:t>
+    </dgm:pt>
+    <dgm:pt modelId="{44FE198B-48EF-4841-A19B-095E78FB73F6}" type="pres">
+      <dgm:prSet presAssocID="{3C63B6D8-03B6-446F-92B2-40BEE7EA3DA6}" presName="rootConnector" presStyleLbl="node2" presStyleIdx="1" presStyleCnt="2"/>
+      <dgm:spPr/>
+      <dgm:t>
+        <a:bodyPr/>
+        <a:lstStyle/>
+        <a:p>
+          <a:endParaRPr lang="en-US"/>
+        </a:p>
+      </dgm:t>
+    </dgm:pt>
+    <dgm:pt modelId="{37113379-99D0-46B3-AD8E-24FA6BA30D66}" type="pres">
+      <dgm:prSet presAssocID="{3C63B6D8-03B6-446F-92B2-40BEE7EA3DA6}" presName="hierChild4" presStyleCnt="0"/>
+      <dgm:spPr/>
+    </dgm:pt>
+    <dgm:pt modelId="{5639C658-2BD7-4A83-BD78-4E05F0E6AB33}" type="pres">
+      <dgm:prSet presAssocID="{4B85568B-08F2-447E-8ACD-859B07B0C2FE}" presName="Name37" presStyleLbl="parChTrans1D3" presStyleIdx="0" presStyleCnt="2"/>
+      <dgm:spPr/>
+      <dgm:t>
+        <a:bodyPr/>
+        <a:lstStyle/>
+        <a:p>
+          <a:endParaRPr lang="en-US"/>
+        </a:p>
+      </dgm:t>
+    </dgm:pt>
+    <dgm:pt modelId="{47FBFDAB-336C-4696-8DA1-F56DCA277A6E}" type="pres">
+      <dgm:prSet presAssocID="{3326A2DC-08EA-4603-9C9B-32AA62F5C864}" presName="hierRoot2" presStyleCnt="0">
+        <dgm:presLayoutVars>
+          <dgm:hierBranch val="init"/>
+        </dgm:presLayoutVars>
+      </dgm:prSet>
+      <dgm:spPr/>
+    </dgm:pt>
+    <dgm:pt modelId="{2733A5F7-E481-4414-AB9D-6063F874AB1D}" type="pres">
+      <dgm:prSet presAssocID="{3326A2DC-08EA-4603-9C9B-32AA62F5C864}" presName="rootComposite" presStyleCnt="0"/>
+      <dgm:spPr/>
+    </dgm:pt>
+    <dgm:pt modelId="{BC33716E-EF27-4F7C-BDAB-71B2ABEC9DF0}" type="pres">
+      <dgm:prSet presAssocID="{3326A2DC-08EA-4603-9C9B-32AA62F5C864}" presName="rootText" presStyleLbl="node3" presStyleIdx="0" presStyleCnt="2">
+        <dgm:presLayoutVars>
+          <dgm:chPref val="3"/>
+        </dgm:presLayoutVars>
+      </dgm:prSet>
+      <dgm:spPr/>
+      <dgm:t>
+        <a:bodyPr/>
+        <a:lstStyle/>
+        <a:p>
+          <a:endParaRPr lang="en-US"/>
+        </a:p>
+      </dgm:t>
+    </dgm:pt>
+    <dgm:pt modelId="{27FBED91-B74B-416F-ADA1-C8C6806F0406}" type="pres">
+      <dgm:prSet presAssocID="{3326A2DC-08EA-4603-9C9B-32AA62F5C864}" presName="rootConnector" presStyleLbl="node3" presStyleIdx="0" presStyleCnt="2"/>
+      <dgm:spPr/>
+      <dgm:t>
+        <a:bodyPr/>
+        <a:lstStyle/>
+        <a:p>
+          <a:endParaRPr lang="en-US"/>
+        </a:p>
+      </dgm:t>
+    </dgm:pt>
+    <dgm:pt modelId="{57FCB84A-2BCE-4416-AD48-4EF35348E875}" type="pres">
+      <dgm:prSet presAssocID="{3326A2DC-08EA-4603-9C9B-32AA62F5C864}" presName="hierChild4" presStyleCnt="0"/>
+      <dgm:spPr/>
+    </dgm:pt>
+    <dgm:pt modelId="{7744116D-A8FC-40ED-87A3-3B586CAA8D1D}" type="pres">
+      <dgm:prSet presAssocID="{3326A2DC-08EA-4603-9C9B-32AA62F5C864}" presName="hierChild5" presStyleCnt="0"/>
+      <dgm:spPr/>
+    </dgm:pt>
+    <dgm:pt modelId="{F672C2DB-56F9-4B57-BEC3-70464139E944}" type="pres">
+      <dgm:prSet presAssocID="{1EC6A4E2-2B61-426A-A8C9-EA292C8D7D97}" presName="Name37" presStyleLbl="parChTrans1D3" presStyleIdx="1" presStyleCnt="2"/>
+      <dgm:spPr/>
+      <dgm:t>
+        <a:bodyPr/>
+        <a:lstStyle/>
+        <a:p>
+          <a:endParaRPr lang="en-US"/>
+        </a:p>
+      </dgm:t>
+    </dgm:pt>
+    <dgm:pt modelId="{5F61C70F-6CD1-4E4D-8873-A73566BBD418}" type="pres">
+      <dgm:prSet presAssocID="{CF1C50AA-41C3-4932-BDF5-F4650C8B1E71}" presName="hierRoot2" presStyleCnt="0">
+        <dgm:presLayoutVars>
+          <dgm:hierBranch val="init"/>
+        </dgm:presLayoutVars>
+      </dgm:prSet>
+      <dgm:spPr/>
+    </dgm:pt>
+    <dgm:pt modelId="{86FFEEF0-86BF-47B6-A0E7-9E4935DD8227}" type="pres">
+      <dgm:prSet presAssocID="{CF1C50AA-41C3-4932-BDF5-F4650C8B1E71}" presName="rootComposite" presStyleCnt="0"/>
+      <dgm:spPr/>
+    </dgm:pt>
+    <dgm:pt modelId="{39D95C32-42CA-456A-A0FA-ACA16DD34769}" type="pres">
+      <dgm:prSet presAssocID="{CF1C50AA-41C3-4932-BDF5-F4650C8B1E71}" presName="rootText" presStyleLbl="node3" presStyleIdx="1" presStyleCnt="2">
+        <dgm:presLayoutVars>
+          <dgm:chPref val="3"/>
+        </dgm:presLayoutVars>
+      </dgm:prSet>
+      <dgm:spPr/>
+      <dgm:t>
+        <a:bodyPr/>
+        <a:lstStyle/>
+        <a:p>
+          <a:endParaRPr lang="en-US"/>
+        </a:p>
+      </dgm:t>
+    </dgm:pt>
+    <dgm:pt modelId="{C573AA09-49C0-40F9-984B-0E4CA2EDB9D5}" type="pres">
+      <dgm:prSet presAssocID="{CF1C50AA-41C3-4932-BDF5-F4650C8B1E71}" presName="rootConnector" presStyleLbl="node3" presStyleIdx="1" presStyleCnt="2"/>
+      <dgm:spPr/>
+      <dgm:t>
+        <a:bodyPr/>
+        <a:lstStyle/>
+        <a:p>
+          <a:endParaRPr lang="en-US"/>
+        </a:p>
+      </dgm:t>
+    </dgm:pt>
+    <dgm:pt modelId="{0C4B4591-E654-4E0F-BE0D-E824EADE6C91}" type="pres">
+      <dgm:prSet presAssocID="{CF1C50AA-41C3-4932-BDF5-F4650C8B1E71}" presName="hierChild4" presStyleCnt="0"/>
+      <dgm:spPr/>
+    </dgm:pt>
+    <dgm:pt modelId="{55EC3252-659C-4C99-905C-02BEA301973B}" type="pres">
+      <dgm:prSet presAssocID="{CF1C50AA-41C3-4932-BDF5-F4650C8B1E71}" presName="hierChild5" presStyleCnt="0"/>
+      <dgm:spPr/>
+    </dgm:pt>
+    <dgm:pt modelId="{E5A5AA47-C69D-41A1-BC30-1DE9BEA08BE0}" type="pres">
+      <dgm:prSet presAssocID="{3C63B6D8-03B6-446F-92B2-40BEE7EA3DA6}" presName="hierChild5" presStyleCnt="0"/>
+      <dgm:spPr/>
+    </dgm:pt>
+    <dgm:pt modelId="{513ADA36-CAE2-4A0C-8E47-BCE657E512EE}" type="pres">
+      <dgm:prSet presAssocID="{B0ADAF9C-6C30-4E23-8508-4FA7AD2A7848}" presName="hierChild3" presStyleCnt="0"/>
+      <dgm:spPr/>
+    </dgm:pt>
+  </dgm:ptLst>
+  <dgm:cxnLst>
+    <dgm:cxn modelId="{68185268-6B24-4AAF-93BE-5395A88A5FB0}" srcId="{3C63B6D8-03B6-446F-92B2-40BEE7EA3DA6}" destId="{CF1C50AA-41C3-4932-BDF5-F4650C8B1E71}" srcOrd="1" destOrd="0" parTransId="{1EC6A4E2-2B61-426A-A8C9-EA292C8D7D97}" sibTransId="{471064F5-EE27-47A4-8DC6-0518BBC39794}"/>
+    <dgm:cxn modelId="{0309876D-1A7E-45E7-BE79-2B8FC2C2D90C}" srcId="{C27691A8-FCE4-4FEB-A451-4A5EA187EB67}" destId="{B0ADAF9C-6C30-4E23-8508-4FA7AD2A7848}" srcOrd="0" destOrd="0" parTransId="{34ADD3B4-ED4D-4D20-96EA-801281A31C07}" sibTransId="{FF02142E-1F08-4564-94A8-C41EBE3A20CF}"/>
+    <dgm:cxn modelId="{3B1DB8ED-0F27-4DC0-9769-41F056669BF6}" type="presOf" srcId="{1B146C1E-74BE-4F8D-827B-AF978D01F3BD}" destId="{04D282F3-260E-4A5A-BE00-49DCD89279A9}" srcOrd="0" destOrd="0" presId="urn:microsoft.com/office/officeart/2005/8/layout/orgChart1"/>
+    <dgm:cxn modelId="{7F723C5C-1D77-427D-A4FD-119B477564DB}" srcId="{B0ADAF9C-6C30-4E23-8508-4FA7AD2A7848}" destId="{3C63B6D8-03B6-446F-92B2-40BEE7EA3DA6}" srcOrd="1" destOrd="0" parTransId="{1B146C1E-74BE-4F8D-827B-AF978D01F3BD}" sibTransId="{E7A2B69A-CA81-4761-B221-CA8D05E706EA}"/>
+    <dgm:cxn modelId="{E6B76AF3-549F-4FDB-911A-3FBC9D4535D8}" type="presOf" srcId="{C27691A8-FCE4-4FEB-A451-4A5EA187EB67}" destId="{E3C94D6B-9473-4B75-B2D6-600D5819A349}" srcOrd="0" destOrd="0" presId="urn:microsoft.com/office/officeart/2005/8/layout/orgChart1"/>
+    <dgm:cxn modelId="{336DB0AA-E6CF-458B-ABEA-DAFB17A4E722}" type="presOf" srcId="{1EC6A4E2-2B61-426A-A8C9-EA292C8D7D97}" destId="{F672C2DB-56F9-4B57-BEC3-70464139E944}" srcOrd="0" destOrd="0" presId="urn:microsoft.com/office/officeart/2005/8/layout/orgChart1"/>
+    <dgm:cxn modelId="{08F18BA8-3F79-457B-A6A7-F98377083B62}" type="presOf" srcId="{CF1C50AA-41C3-4932-BDF5-F4650C8B1E71}" destId="{39D95C32-42CA-456A-A0FA-ACA16DD34769}" srcOrd="0" destOrd="0" presId="urn:microsoft.com/office/officeart/2005/8/layout/orgChart1"/>
+    <dgm:cxn modelId="{6C6E6177-10B9-4F1A-AB2C-B5C0F41D661A}" type="presOf" srcId="{8A966797-98B1-4E01-95D7-DB1428427F69}" destId="{F080FFD0-E628-4673-8797-4006B01CAA2F}" srcOrd="0" destOrd="0" presId="urn:microsoft.com/office/officeart/2005/8/layout/orgChart1"/>
+    <dgm:cxn modelId="{68DB1FF2-D15A-4897-8CFC-0DA7C2AF8BF2}" type="presOf" srcId="{4B85568B-08F2-447E-8ACD-859B07B0C2FE}" destId="{5639C658-2BD7-4A83-BD78-4E05F0E6AB33}" srcOrd="0" destOrd="0" presId="urn:microsoft.com/office/officeart/2005/8/layout/orgChart1"/>
+    <dgm:cxn modelId="{21BE1FBB-4699-4FC9-BA01-E0C0B89CE602}" type="presOf" srcId="{3326A2DC-08EA-4603-9C9B-32AA62F5C864}" destId="{BC33716E-EF27-4F7C-BDAB-71B2ABEC9DF0}" srcOrd="0" destOrd="0" presId="urn:microsoft.com/office/officeart/2005/8/layout/orgChart1"/>
+    <dgm:cxn modelId="{058E2C32-BF11-4C0A-B666-4600B6E936E6}" type="presOf" srcId="{3C63B6D8-03B6-446F-92B2-40BEE7EA3DA6}" destId="{0645EB98-586A-4DCD-B836-3E3EEE58E52E}" srcOrd="0" destOrd="0" presId="urn:microsoft.com/office/officeart/2005/8/layout/orgChart1"/>
+    <dgm:cxn modelId="{0D963521-8D90-4E7C-BF39-3F4838EF47F4}" srcId="{B0ADAF9C-6C30-4E23-8508-4FA7AD2A7848}" destId="{8A966797-98B1-4E01-95D7-DB1428427F69}" srcOrd="0" destOrd="0" parTransId="{E66AF807-E90C-462F-8417-C2A56E687749}" sibTransId="{DC81EB2D-702A-409F-81AB-F490B1369376}"/>
+    <dgm:cxn modelId="{36EEE7FA-AA02-4817-A221-01F5326BAABE}" type="presOf" srcId="{CF1C50AA-41C3-4932-BDF5-F4650C8B1E71}" destId="{C573AA09-49C0-40F9-984B-0E4CA2EDB9D5}" srcOrd="1" destOrd="0" presId="urn:microsoft.com/office/officeart/2005/8/layout/orgChart1"/>
+    <dgm:cxn modelId="{E61CC3F6-6627-4B90-BC36-23E6E76B102F}" type="presOf" srcId="{3326A2DC-08EA-4603-9C9B-32AA62F5C864}" destId="{27FBED91-B74B-416F-ADA1-C8C6806F0406}" srcOrd="1" destOrd="0" presId="urn:microsoft.com/office/officeart/2005/8/layout/orgChart1"/>
+    <dgm:cxn modelId="{6CFC55ED-A8ED-4DB5-AEFA-D44F88C1C047}" type="presOf" srcId="{E66AF807-E90C-462F-8417-C2A56E687749}" destId="{8800A970-562A-4D8F-A6DF-A5487E7E711D}" srcOrd="0" destOrd="0" presId="urn:microsoft.com/office/officeart/2005/8/layout/orgChart1"/>
+    <dgm:cxn modelId="{E54F1FFA-E9FB-4B79-B525-3F65E1BA0E04}" type="presOf" srcId="{3C63B6D8-03B6-446F-92B2-40BEE7EA3DA6}" destId="{44FE198B-48EF-4841-A19B-095E78FB73F6}" srcOrd="1" destOrd="0" presId="urn:microsoft.com/office/officeart/2005/8/layout/orgChart1"/>
+    <dgm:cxn modelId="{E34B821E-9029-483E-9AC8-7C87D4CDD006}" type="presOf" srcId="{8A966797-98B1-4E01-95D7-DB1428427F69}" destId="{ED6C467A-0E9B-4151-BB54-B53CF409BE13}" srcOrd="1" destOrd="0" presId="urn:microsoft.com/office/officeart/2005/8/layout/orgChart1"/>
+    <dgm:cxn modelId="{9EFE1485-5344-4FC6-BCD2-B87E4EEBBE82}" type="presOf" srcId="{B0ADAF9C-6C30-4E23-8508-4FA7AD2A7848}" destId="{E4DDD033-2C5D-416D-904F-10A129269413}" srcOrd="1" destOrd="0" presId="urn:microsoft.com/office/officeart/2005/8/layout/orgChart1"/>
+    <dgm:cxn modelId="{42EE8868-A611-41B2-B3B2-AD15465BA30E}" srcId="{3C63B6D8-03B6-446F-92B2-40BEE7EA3DA6}" destId="{3326A2DC-08EA-4603-9C9B-32AA62F5C864}" srcOrd="0" destOrd="0" parTransId="{4B85568B-08F2-447E-8ACD-859B07B0C2FE}" sibTransId="{3402F55D-CE79-4CF6-845C-3CC03ECD6E58}"/>
+    <dgm:cxn modelId="{ED848360-D7CA-4732-AC55-4614543D1AA2}" type="presOf" srcId="{B0ADAF9C-6C30-4E23-8508-4FA7AD2A7848}" destId="{DA1DF513-0211-4E50-AC19-D95364F9EEAD}" srcOrd="0" destOrd="0" presId="urn:microsoft.com/office/officeart/2005/8/layout/orgChart1"/>
+    <dgm:cxn modelId="{11ADC771-45AB-4D7E-848D-277DAC0F1524}" type="presParOf" srcId="{E3C94D6B-9473-4B75-B2D6-600D5819A349}" destId="{08E0B425-84D9-4291-AC34-5D71EDD8778C}" srcOrd="0" destOrd="0" presId="urn:microsoft.com/office/officeart/2005/8/layout/orgChart1"/>
+    <dgm:cxn modelId="{0D406673-B579-498B-9718-3837F153AF41}" type="presParOf" srcId="{08E0B425-84D9-4291-AC34-5D71EDD8778C}" destId="{AB18ECB2-E9F2-4093-A36A-92DDF935F27E}" srcOrd="0" destOrd="0" presId="urn:microsoft.com/office/officeart/2005/8/layout/orgChart1"/>
+    <dgm:cxn modelId="{521AAF7D-FC1B-4410-98EA-3F897C1042C6}" type="presParOf" srcId="{AB18ECB2-E9F2-4093-A36A-92DDF935F27E}" destId="{DA1DF513-0211-4E50-AC19-D95364F9EEAD}" srcOrd="0" destOrd="0" presId="urn:microsoft.com/office/officeart/2005/8/layout/orgChart1"/>
+    <dgm:cxn modelId="{7917DDA4-2E45-4ABA-85CF-0602480C787B}" type="presParOf" srcId="{AB18ECB2-E9F2-4093-A36A-92DDF935F27E}" destId="{E4DDD033-2C5D-416D-904F-10A129269413}" srcOrd="1" destOrd="0" presId="urn:microsoft.com/office/officeart/2005/8/layout/orgChart1"/>
+    <dgm:cxn modelId="{5E9C9BFE-B728-4F07-8FAC-B0B3F43BFAA0}" type="presParOf" srcId="{08E0B425-84D9-4291-AC34-5D71EDD8778C}" destId="{FE393823-B80C-40E6-9303-CE99527CA84B}" srcOrd="1" destOrd="0" presId="urn:microsoft.com/office/officeart/2005/8/layout/orgChart1"/>
+    <dgm:cxn modelId="{0EBCF60A-93ED-46D6-A369-60667E62DC53}" type="presParOf" srcId="{FE393823-B80C-40E6-9303-CE99527CA84B}" destId="{8800A970-562A-4D8F-A6DF-A5487E7E711D}" srcOrd="0" destOrd="0" presId="urn:microsoft.com/office/officeart/2005/8/layout/orgChart1"/>
+    <dgm:cxn modelId="{14A56794-A8DE-4A9D-8A0E-74E837959D6C}" type="presParOf" srcId="{FE393823-B80C-40E6-9303-CE99527CA84B}" destId="{4A5E1E19-7174-45E1-8910-4705C3A7FF95}" srcOrd="1" destOrd="0" presId="urn:microsoft.com/office/officeart/2005/8/layout/orgChart1"/>
+    <dgm:cxn modelId="{E8827F38-CA68-4195-94EB-69BF01217DD0}" type="presParOf" srcId="{4A5E1E19-7174-45E1-8910-4705C3A7FF95}" destId="{3F065280-ABBD-4FA1-8DED-07F5B0E3E141}" srcOrd="0" destOrd="0" presId="urn:microsoft.com/office/officeart/2005/8/layout/orgChart1"/>
+    <dgm:cxn modelId="{243DEFE7-F193-4640-A272-8561E86B1771}" type="presParOf" srcId="{3F065280-ABBD-4FA1-8DED-07F5B0E3E141}" destId="{F080FFD0-E628-4673-8797-4006B01CAA2F}" srcOrd="0" destOrd="0" presId="urn:microsoft.com/office/officeart/2005/8/layout/orgChart1"/>
+    <dgm:cxn modelId="{82E3356B-4392-4FD7-BBDA-454869DB5B96}" type="presParOf" srcId="{3F065280-ABBD-4FA1-8DED-07F5B0E3E141}" destId="{ED6C467A-0E9B-4151-BB54-B53CF409BE13}" srcOrd="1" destOrd="0" presId="urn:microsoft.com/office/officeart/2005/8/layout/orgChart1"/>
+    <dgm:cxn modelId="{CA2E32F3-FAFB-4416-9921-CE2FB5E689B1}" type="presParOf" srcId="{4A5E1E19-7174-45E1-8910-4705C3A7FF95}" destId="{644E2427-0440-481B-A5A7-9D16DD1BE7D8}" srcOrd="1" destOrd="0" presId="urn:microsoft.com/office/officeart/2005/8/layout/orgChart1"/>
+    <dgm:cxn modelId="{5DEF3056-2FC1-42A1-960F-4A62FC78568C}" type="presParOf" srcId="{4A5E1E19-7174-45E1-8910-4705C3A7FF95}" destId="{6E94FF00-C1AD-4A26-8260-C1F62D8BA54B}" srcOrd="2" destOrd="0" presId="urn:microsoft.com/office/officeart/2005/8/layout/orgChart1"/>
+    <dgm:cxn modelId="{EB66CC2C-17D7-4558-8241-F0CCCCA0BF71}" type="presParOf" srcId="{FE393823-B80C-40E6-9303-CE99527CA84B}" destId="{04D282F3-260E-4A5A-BE00-49DCD89279A9}" srcOrd="2" destOrd="0" presId="urn:microsoft.com/office/officeart/2005/8/layout/orgChart1"/>
+    <dgm:cxn modelId="{4DBF75BA-D4F0-403C-9A32-4F81E0BF7F59}" type="presParOf" srcId="{FE393823-B80C-40E6-9303-CE99527CA84B}" destId="{D38ACC22-54FF-4127-8AB7-D1697E34B100}" srcOrd="3" destOrd="0" presId="urn:microsoft.com/office/officeart/2005/8/layout/orgChart1"/>
+    <dgm:cxn modelId="{3E171E9E-EE5E-4DB9-9812-52C90078D9E7}" type="presParOf" srcId="{D38ACC22-54FF-4127-8AB7-D1697E34B100}" destId="{18589B92-1FDE-402A-8A04-6867194F5349}" srcOrd="0" destOrd="0" presId="urn:microsoft.com/office/officeart/2005/8/layout/orgChart1"/>
+    <dgm:cxn modelId="{727FCEAF-43FD-4CFC-BE41-ACD577CEE7FB}" type="presParOf" srcId="{18589B92-1FDE-402A-8A04-6867194F5349}" destId="{0645EB98-586A-4DCD-B836-3E3EEE58E52E}" srcOrd="0" destOrd="0" presId="urn:microsoft.com/office/officeart/2005/8/layout/orgChart1"/>
+    <dgm:cxn modelId="{29EB09C1-FCCE-4A8C-9426-7EC7F5DFD365}" type="presParOf" srcId="{18589B92-1FDE-402A-8A04-6867194F5349}" destId="{44FE198B-48EF-4841-A19B-095E78FB73F6}" srcOrd="1" destOrd="0" presId="urn:microsoft.com/office/officeart/2005/8/layout/orgChart1"/>
+    <dgm:cxn modelId="{F5EB8116-900E-4625-888E-4E9CB27CDBE3}" type="presParOf" srcId="{D38ACC22-54FF-4127-8AB7-D1697E34B100}" destId="{37113379-99D0-46B3-AD8E-24FA6BA30D66}" srcOrd="1" destOrd="0" presId="urn:microsoft.com/office/officeart/2005/8/layout/orgChart1"/>
+    <dgm:cxn modelId="{9C67DD28-234E-453A-9C51-4B2CE94091ED}" type="presParOf" srcId="{37113379-99D0-46B3-AD8E-24FA6BA30D66}" destId="{5639C658-2BD7-4A83-BD78-4E05F0E6AB33}" srcOrd="0" destOrd="0" presId="urn:microsoft.com/office/officeart/2005/8/layout/orgChart1"/>
+    <dgm:cxn modelId="{6440BB8A-EFF0-4578-A778-6C47F16CEDC1}" type="presParOf" srcId="{37113379-99D0-46B3-AD8E-24FA6BA30D66}" destId="{47FBFDAB-336C-4696-8DA1-F56DCA277A6E}" srcOrd="1" destOrd="0" presId="urn:microsoft.com/office/officeart/2005/8/layout/orgChart1"/>
+    <dgm:cxn modelId="{770926D4-99B7-4B10-9BEF-1F14DCABA584}" type="presParOf" srcId="{47FBFDAB-336C-4696-8DA1-F56DCA277A6E}" destId="{2733A5F7-E481-4414-AB9D-6063F874AB1D}" srcOrd="0" destOrd="0" presId="urn:microsoft.com/office/officeart/2005/8/layout/orgChart1"/>
+    <dgm:cxn modelId="{C5FD2D4F-8AC6-477B-A830-03B6715C2867}" type="presParOf" srcId="{2733A5F7-E481-4414-AB9D-6063F874AB1D}" destId="{BC33716E-EF27-4F7C-BDAB-71B2ABEC9DF0}" srcOrd="0" destOrd="0" presId="urn:microsoft.com/office/officeart/2005/8/layout/orgChart1"/>
+    <dgm:cxn modelId="{D950A65B-E8E2-4C1B-A3D6-CE48728C542F}" type="presParOf" srcId="{2733A5F7-E481-4414-AB9D-6063F874AB1D}" destId="{27FBED91-B74B-416F-ADA1-C8C6806F0406}" srcOrd="1" destOrd="0" presId="urn:microsoft.com/office/officeart/2005/8/layout/orgChart1"/>
+    <dgm:cxn modelId="{43B349A0-BC76-4681-ACE9-A3B1240E4C41}" type="presParOf" srcId="{47FBFDAB-336C-4696-8DA1-F56DCA277A6E}" destId="{57FCB84A-2BCE-4416-AD48-4EF35348E875}" srcOrd="1" destOrd="0" presId="urn:microsoft.com/office/officeart/2005/8/layout/orgChart1"/>
+    <dgm:cxn modelId="{7C90BD87-36AD-4583-88A2-84F5A4CB2FF1}" type="presParOf" srcId="{47FBFDAB-336C-4696-8DA1-F56DCA277A6E}" destId="{7744116D-A8FC-40ED-87A3-3B586CAA8D1D}" srcOrd="2" destOrd="0" presId="urn:microsoft.com/office/officeart/2005/8/layout/orgChart1"/>
+    <dgm:cxn modelId="{9537F61B-A61D-4186-8911-A73AE1A464A8}" type="presParOf" srcId="{37113379-99D0-46B3-AD8E-24FA6BA30D66}" destId="{F672C2DB-56F9-4B57-BEC3-70464139E944}" srcOrd="2" destOrd="0" presId="urn:microsoft.com/office/officeart/2005/8/layout/orgChart1"/>
+    <dgm:cxn modelId="{7BDEE341-CBC2-431D-818A-61757B6D2D84}" type="presParOf" srcId="{37113379-99D0-46B3-AD8E-24FA6BA30D66}" destId="{5F61C70F-6CD1-4E4D-8873-A73566BBD418}" srcOrd="3" destOrd="0" presId="urn:microsoft.com/office/officeart/2005/8/layout/orgChart1"/>
+    <dgm:cxn modelId="{5189CA86-7BDE-4A01-B3B0-ED6C0E43722D}" type="presParOf" srcId="{5F61C70F-6CD1-4E4D-8873-A73566BBD418}" destId="{86FFEEF0-86BF-47B6-A0E7-9E4935DD8227}" srcOrd="0" destOrd="0" presId="urn:microsoft.com/office/officeart/2005/8/layout/orgChart1"/>
+    <dgm:cxn modelId="{72DDE198-B557-469F-B71F-CF661D54BB87}" type="presParOf" srcId="{86FFEEF0-86BF-47B6-A0E7-9E4935DD8227}" destId="{39D95C32-42CA-456A-A0FA-ACA16DD34769}" srcOrd="0" destOrd="0" presId="urn:microsoft.com/office/officeart/2005/8/layout/orgChart1"/>
+    <dgm:cxn modelId="{D4FDA357-AEC7-4E37-AB74-B2086C30EE64}" type="presParOf" srcId="{86FFEEF0-86BF-47B6-A0E7-9E4935DD8227}" destId="{C573AA09-49C0-40F9-984B-0E4CA2EDB9D5}" srcOrd="1" destOrd="0" presId="urn:microsoft.com/office/officeart/2005/8/layout/orgChart1"/>
+    <dgm:cxn modelId="{361D4D1C-89F1-4C1E-BE03-935E4DDDE015}" type="presParOf" srcId="{5F61C70F-6CD1-4E4D-8873-A73566BBD418}" destId="{0C4B4591-E654-4E0F-BE0D-E824EADE6C91}" srcOrd="1" destOrd="0" presId="urn:microsoft.com/office/officeart/2005/8/layout/orgChart1"/>
+    <dgm:cxn modelId="{5B5AFC05-F06F-4685-B229-D54771662480}" type="presParOf" srcId="{5F61C70F-6CD1-4E4D-8873-A73566BBD418}" destId="{55EC3252-659C-4C99-905C-02BEA301973B}" srcOrd="2" destOrd="0" presId="urn:microsoft.com/office/officeart/2005/8/layout/orgChart1"/>
+    <dgm:cxn modelId="{F80BB52D-8E1C-4AEF-AF15-1DA7F19B6C74}" type="presParOf" srcId="{D38ACC22-54FF-4127-8AB7-D1697E34B100}" destId="{E5A5AA47-C69D-41A1-BC30-1DE9BEA08BE0}" srcOrd="2" destOrd="0" presId="urn:microsoft.com/office/officeart/2005/8/layout/orgChart1"/>
+    <dgm:cxn modelId="{14A27332-07F4-4E0B-A424-720AD8CFD356}" type="presParOf" srcId="{08E0B425-84D9-4291-AC34-5D71EDD8778C}" destId="{513ADA36-CAE2-4A0C-8E47-BCE657E512EE}" srcOrd="2" destOrd="0" presId="urn:microsoft.com/office/officeart/2005/8/layout/orgChart1"/>
+  </dgm:cxnLst>
+  <dgm:bg/>
+  <dgm:whole/>
+  <dgm:extLst>
+    <a:ext uri="http://schemas.microsoft.com/office/drawing/2008/diagram">
+      <dsp:dataModelExt xmlns:dsp="http://schemas.microsoft.com/office/drawing/2008/diagram" relId="rId6" minVer="http://schemas.openxmlformats.org/drawingml/2006/diagram"/>
+    </a:ext>
+  </dgm:extLst>
+</dgm:dataModel>
+</file>
+
+<file path=ppt/diagrams/data2.xml><?xml version="1.0" encoding="utf-8"?>
 <dgm:dataModel xmlns:dgm="http://schemas.openxmlformats.org/drawingml/2006/diagram" xmlns:a="http://schemas.openxmlformats.org/drawingml/2006/main">
   <dgm:ptLst>
     <dgm:pt modelId="{2A27AED6-97A3-43BB-B9F0-6F1262D8FA81}" type="doc">
@@ -3536,6 +4124,13 @@
         </dgm:presLayoutVars>
       </dgm:prSet>
       <dgm:spPr/>
+      <dgm:t>
+        <a:bodyPr/>
+        <a:lstStyle/>
+        <a:p>
+          <a:endParaRPr lang="en-US"/>
+        </a:p>
+      </dgm:t>
     </dgm:pt>
     <dgm:pt modelId="{56FE18F5-B583-4141-8061-BC3E86E3CF93}" type="pres">
       <dgm:prSet presAssocID="{CF5C43D8-C84E-46E1-85CE-3EC88A01A91B}" presName="parentLin" presStyleCnt="0"/>
@@ -3544,6 +4139,13 @@
     <dgm:pt modelId="{0E7EB5B0-3EC6-4268-9FC4-1A506436F450}" type="pres">
       <dgm:prSet presAssocID="{CF5C43D8-C84E-46E1-85CE-3EC88A01A91B}" presName="parentLeftMargin" presStyleLbl="node1" presStyleIdx="0" presStyleCnt="1"/>
       <dgm:spPr/>
+      <dgm:t>
+        <a:bodyPr/>
+        <a:lstStyle/>
+        <a:p>
+          <a:endParaRPr lang="en-US"/>
+        </a:p>
+      </dgm:t>
     </dgm:pt>
     <dgm:pt modelId="{82C996F2-0ACD-4DD0-BE97-B8AED07A97C6}" type="pres">
       <dgm:prSet presAssocID="{CF5C43D8-C84E-46E1-85CE-3EC88A01A91B}" presName="parentText" presStyleLbl="node1" presStyleIdx="0" presStyleCnt="1" custScaleY="214969">
@@ -3553,6 +4155,13 @@
         </dgm:presLayoutVars>
       </dgm:prSet>
       <dgm:spPr/>
+      <dgm:t>
+        <a:bodyPr/>
+        <a:lstStyle/>
+        <a:p>
+          <a:endParaRPr lang="en-US"/>
+        </a:p>
+      </dgm:t>
     </dgm:pt>
     <dgm:pt modelId="{985CDC74-3DF2-47C7-9DED-DED128CDDDBF}" type="pres">
       <dgm:prSet presAssocID="{CF5C43D8-C84E-46E1-85CE-3EC88A01A91B}" presName="negativeSpace" presStyleCnt="0"/>
@@ -3575,30 +4184,30 @@
     </dgm:pt>
   </dgm:ptLst>
   <dgm:cxnLst>
+    <dgm:cxn modelId="{1802F87A-7185-47A6-BB33-BF0C9A023412}" type="presOf" srcId="{D81C0833-85BB-4271-A199-4C93BC5127E1}" destId="{3B84BF06-5215-4FCB-A48A-56981FC939CD}" srcOrd="0" destOrd="1" presId="urn:microsoft.com/office/officeart/2005/8/layout/list1"/>
+    <dgm:cxn modelId="{F35ADD08-91FA-4FDD-ACFA-1B9C58FF015E}" srcId="{6FA4DFF2-6413-4965-8784-FB891A72171D}" destId="{0783DD29-89F7-420B-94EE-E555D8C0FAE0}" srcOrd="0" destOrd="0" parTransId="{4B6A18F8-DB7B-492B-9619-A93BCBA49A13}" sibTransId="{51A238AB-146E-4BED-B409-57EAA3204FA2}"/>
+    <dgm:cxn modelId="{759AC31B-3A8F-4C77-802F-677D6FCEC4FB}" type="presOf" srcId="{CF5C43D8-C84E-46E1-85CE-3EC88A01A91B}" destId="{82C996F2-0ACD-4DD0-BE97-B8AED07A97C6}" srcOrd="1" destOrd="0" presId="urn:microsoft.com/office/officeart/2005/8/layout/list1"/>
+    <dgm:cxn modelId="{003CB52B-0328-4FEF-A1B2-BA35C6F261DE}" type="presOf" srcId="{A6034635-CE9C-4F1F-B17D-A149A117144B}" destId="{3B84BF06-5215-4FCB-A48A-56981FC939CD}" srcOrd="0" destOrd="4" presId="urn:microsoft.com/office/officeart/2005/8/layout/list1"/>
+    <dgm:cxn modelId="{2E521405-B416-4C3B-A38F-CC69B8D2CF01}" srcId="{4A764DE4-D219-4C4E-9F0B-70D95E9E64BC}" destId="{D81C0833-85BB-4271-A199-4C93BC5127E1}" srcOrd="0" destOrd="0" parTransId="{852247AB-7065-4DEE-B734-76D147AB895F}" sibTransId="{DCF2DB0E-114C-4212-9A41-A85071ABC172}"/>
+    <dgm:cxn modelId="{277DACA7-5D34-4ABE-A1E4-D0EAA6E8BC7A}" type="presOf" srcId="{4A764DE4-D219-4C4E-9F0B-70D95E9E64BC}" destId="{3B84BF06-5215-4FCB-A48A-56981FC939CD}" srcOrd="0" destOrd="0" presId="urn:microsoft.com/office/officeart/2005/8/layout/list1"/>
+    <dgm:cxn modelId="{51D37F1B-0EE5-44F7-842B-C3AADA1A8972}" type="presOf" srcId="{54CCB61D-F2EE-4314-BC9D-ABC5E501DB91}" destId="{3B84BF06-5215-4FCB-A48A-56981FC939CD}" srcOrd="0" destOrd="6" presId="urn:microsoft.com/office/officeart/2005/8/layout/list1"/>
+    <dgm:cxn modelId="{2CD54A07-8BCD-47E8-BC7E-E17878B20D9D}" srcId="{09DA4C2E-DF79-475B-8C7F-6D5FB9BA57CE}" destId="{5F1FA8A2-A2C6-43A8-B147-7BB65F4BB03A}" srcOrd="0" destOrd="0" parTransId="{922EEC0C-9BD7-41F9-975C-43ADD6B4C3B7}" sibTransId="{BB53B1B1-F030-4BAE-995A-9888A22ACE61}"/>
+    <dgm:cxn modelId="{3486D8CA-E5DB-4B7D-AFC6-71B28B84FD36}" srcId="{CF5C43D8-C84E-46E1-85CE-3EC88A01A91B}" destId="{54CCB61D-F2EE-4314-BC9D-ABC5E501DB91}" srcOrd="4" destOrd="0" parTransId="{19517F10-0496-4F36-B7BA-4CF0FA66692B}" sibTransId="{D52BAEBE-9257-47D0-8100-4C00C79359E4}"/>
+    <dgm:cxn modelId="{745CE406-5128-458B-B2D5-CF14E1931C88}" srcId="{CF5C43D8-C84E-46E1-85CE-3EC88A01A91B}" destId="{6FA4DFF2-6413-4965-8784-FB891A72171D}" srcOrd="5" destOrd="0" parTransId="{08110C5B-EF1A-4423-95DA-82457F8D7C94}" sibTransId="{0B6F363B-44DD-45D2-93A6-568ABCBBA118}"/>
+    <dgm:cxn modelId="{C13A67D0-556E-4BF9-AAE0-683CB2BC09C4}" srcId="{CF5C43D8-C84E-46E1-85CE-3EC88A01A91B}" destId="{A6034635-CE9C-4F1F-B17D-A149A117144B}" srcOrd="2" destOrd="0" parTransId="{B06A5FF7-01E4-402B-AFBF-088E8CB44DBE}" sibTransId="{CB5B2CBD-CDA9-4592-897A-3C7B311BE66F}"/>
+    <dgm:cxn modelId="{D727FC75-3B89-4C7F-BF47-577F309B56F2}" type="presOf" srcId="{3A9783CA-6553-4A0B-868B-FDBA984A1B11}" destId="{3B84BF06-5215-4FCB-A48A-56981FC939CD}" srcOrd="0" destOrd="5" presId="urn:microsoft.com/office/officeart/2005/8/layout/list1"/>
+    <dgm:cxn modelId="{E3F7167D-D3E0-4C40-ACBA-EAFAD0C5679D}" type="presOf" srcId="{4634B951-9E5C-4417-841F-7CB6DC619A35}" destId="{3B84BF06-5215-4FCB-A48A-56981FC939CD}" srcOrd="0" destOrd="9" presId="urn:microsoft.com/office/officeart/2005/8/layout/list1"/>
+    <dgm:cxn modelId="{C8E73D34-570D-4FD8-80A6-C9E4056A60D3}" type="presOf" srcId="{5F1FA8A2-A2C6-43A8-B147-7BB65F4BB03A}" destId="{3B84BF06-5215-4FCB-A48A-56981FC939CD}" srcOrd="0" destOrd="3" presId="urn:microsoft.com/office/officeart/2005/8/layout/list1"/>
+    <dgm:cxn modelId="{D636C8A2-632E-4D68-814B-8D3E67ACA27B}" type="presOf" srcId="{09DA4C2E-DF79-475B-8C7F-6D5FB9BA57CE}" destId="{3B84BF06-5215-4FCB-A48A-56981FC939CD}" srcOrd="0" destOrd="2" presId="urn:microsoft.com/office/officeart/2005/8/layout/list1"/>
+    <dgm:cxn modelId="{F6F4266C-B814-45FC-80AE-371CF8DFB092}" srcId="{CF5C43D8-C84E-46E1-85CE-3EC88A01A91B}" destId="{4A764DE4-D219-4C4E-9F0B-70D95E9E64BC}" srcOrd="0" destOrd="0" parTransId="{76BF6AC2-F473-4258-8B91-A02C9A17CFEE}" sibTransId="{9CED1E82-486C-4DC1-8214-493A56E01658}"/>
+    <dgm:cxn modelId="{08F1F8E3-28EE-47BE-B9F4-A23FAA919285}" type="presOf" srcId="{CF5C43D8-C84E-46E1-85CE-3EC88A01A91B}" destId="{0E7EB5B0-3EC6-4268-9FC4-1A506436F450}" srcOrd="0" destOrd="0" presId="urn:microsoft.com/office/officeart/2005/8/layout/list1"/>
     <dgm:cxn modelId="{448020AA-DDD0-4DC9-8FD7-01C0C861B625}" type="presOf" srcId="{0783DD29-89F7-420B-94EE-E555D8C0FAE0}" destId="{3B84BF06-5215-4FCB-A48A-56981FC939CD}" srcOrd="0" destOrd="8" presId="urn:microsoft.com/office/officeart/2005/8/layout/list1"/>
-    <dgm:cxn modelId="{218E6468-C457-431C-89A1-54F9CA329962}" type="presOf" srcId="{6FA4DFF2-6413-4965-8784-FB891A72171D}" destId="{3B84BF06-5215-4FCB-A48A-56981FC939CD}" srcOrd="0" destOrd="7" presId="urn:microsoft.com/office/officeart/2005/8/layout/list1"/>
-    <dgm:cxn modelId="{D636C8A2-632E-4D68-814B-8D3E67ACA27B}" type="presOf" srcId="{09DA4C2E-DF79-475B-8C7F-6D5FB9BA57CE}" destId="{3B84BF06-5215-4FCB-A48A-56981FC939CD}" srcOrd="0" destOrd="2" presId="urn:microsoft.com/office/officeart/2005/8/layout/list1"/>
-    <dgm:cxn modelId="{1802F87A-7185-47A6-BB33-BF0C9A023412}" type="presOf" srcId="{D81C0833-85BB-4271-A199-4C93BC5127E1}" destId="{3B84BF06-5215-4FCB-A48A-56981FC939CD}" srcOrd="0" destOrd="1" presId="urn:microsoft.com/office/officeart/2005/8/layout/list1"/>
-    <dgm:cxn modelId="{51D37F1B-0EE5-44F7-842B-C3AADA1A8972}" type="presOf" srcId="{54CCB61D-F2EE-4314-BC9D-ABC5E501DB91}" destId="{3B84BF06-5215-4FCB-A48A-56981FC939CD}" srcOrd="0" destOrd="6" presId="urn:microsoft.com/office/officeart/2005/8/layout/list1"/>
-    <dgm:cxn modelId="{2E521405-B416-4C3B-A38F-CC69B8D2CF01}" srcId="{4A764DE4-D219-4C4E-9F0B-70D95E9E64BC}" destId="{D81C0833-85BB-4271-A199-4C93BC5127E1}" srcOrd="0" destOrd="0" parTransId="{852247AB-7065-4DEE-B734-76D147AB895F}" sibTransId="{DCF2DB0E-114C-4212-9A41-A85071ABC172}"/>
-    <dgm:cxn modelId="{C13A67D0-556E-4BF9-AAE0-683CB2BC09C4}" srcId="{CF5C43D8-C84E-46E1-85CE-3EC88A01A91B}" destId="{A6034635-CE9C-4F1F-B17D-A149A117144B}" srcOrd="2" destOrd="0" parTransId="{B06A5FF7-01E4-402B-AFBF-088E8CB44DBE}" sibTransId="{CB5B2CBD-CDA9-4592-897A-3C7B311BE66F}"/>
-    <dgm:cxn modelId="{08F1F8E3-28EE-47BE-B9F4-A23FAA919285}" type="presOf" srcId="{CF5C43D8-C84E-46E1-85CE-3EC88A01A91B}" destId="{0E7EB5B0-3EC6-4268-9FC4-1A506436F450}" srcOrd="0" destOrd="0" presId="urn:microsoft.com/office/officeart/2005/8/layout/list1"/>
-    <dgm:cxn modelId="{745CE406-5128-458B-B2D5-CF14E1931C88}" srcId="{CF5C43D8-C84E-46E1-85CE-3EC88A01A91B}" destId="{6FA4DFF2-6413-4965-8784-FB891A72171D}" srcOrd="5" destOrd="0" parTransId="{08110C5B-EF1A-4423-95DA-82457F8D7C94}" sibTransId="{0B6F363B-44DD-45D2-93A6-568ABCBBA118}"/>
-    <dgm:cxn modelId="{759AC31B-3A8F-4C77-802F-677D6FCEC4FB}" type="presOf" srcId="{CF5C43D8-C84E-46E1-85CE-3EC88A01A91B}" destId="{82C996F2-0ACD-4DD0-BE97-B8AED07A97C6}" srcOrd="1" destOrd="0" presId="urn:microsoft.com/office/officeart/2005/8/layout/list1"/>
-    <dgm:cxn modelId="{D40BCD51-D1DB-4599-B358-CE73458D0091}" srcId="{CF5C43D8-C84E-46E1-85CE-3EC88A01A91B}" destId="{3A9783CA-6553-4A0B-868B-FDBA984A1B11}" srcOrd="3" destOrd="0" parTransId="{AC339997-551B-4295-AAA9-50BE77963231}" sibTransId="{ECF35FC9-944B-40FB-BF4C-6664CA5E3638}"/>
-    <dgm:cxn modelId="{277DACA7-5D34-4ABE-A1E4-D0EAA6E8BC7A}" type="presOf" srcId="{4A764DE4-D219-4C4E-9F0B-70D95E9E64BC}" destId="{3B84BF06-5215-4FCB-A48A-56981FC939CD}" srcOrd="0" destOrd="0" presId="urn:microsoft.com/office/officeart/2005/8/layout/list1"/>
-    <dgm:cxn modelId="{28CE5BEC-EE9B-49C6-BDB0-84CBCDA23BE8}" srcId="{2A27AED6-97A3-43BB-B9F0-6F1262D8FA81}" destId="{CF5C43D8-C84E-46E1-85CE-3EC88A01A91B}" srcOrd="0" destOrd="0" parTransId="{24DDF71A-7FBB-465A-A0DB-909956D3AEA2}" sibTransId="{31E8CDE7-93B9-441C-862D-B8C8D4C6901C}"/>
     <dgm:cxn modelId="{8B34AFFF-F81A-49B7-A643-DD7C53BB8892}" type="presOf" srcId="{2A27AED6-97A3-43BB-B9F0-6F1262D8FA81}" destId="{849A44E8-8868-4543-A367-720B1C71A282}" srcOrd="0" destOrd="0" presId="urn:microsoft.com/office/officeart/2005/8/layout/list1"/>
     <dgm:cxn modelId="{4ACF83E9-ACE8-4567-A1E0-B2191838196C}" srcId="{CF5C43D8-C84E-46E1-85CE-3EC88A01A91B}" destId="{4634B951-9E5C-4417-841F-7CB6DC619A35}" srcOrd="6" destOrd="0" parTransId="{0988401F-B765-4FB9-B9AC-99E45DF05846}" sibTransId="{A67AF27D-1EED-4048-94CA-DC57ABC3DB32}"/>
-    <dgm:cxn modelId="{3486D8CA-E5DB-4B7D-AFC6-71B28B84FD36}" srcId="{CF5C43D8-C84E-46E1-85CE-3EC88A01A91B}" destId="{54CCB61D-F2EE-4314-BC9D-ABC5E501DB91}" srcOrd="4" destOrd="0" parTransId="{19517F10-0496-4F36-B7BA-4CF0FA66692B}" sibTransId="{D52BAEBE-9257-47D0-8100-4C00C79359E4}"/>
-    <dgm:cxn modelId="{C8E73D34-570D-4FD8-80A6-C9E4056A60D3}" type="presOf" srcId="{5F1FA8A2-A2C6-43A8-B147-7BB65F4BB03A}" destId="{3B84BF06-5215-4FCB-A48A-56981FC939CD}" srcOrd="0" destOrd="3" presId="urn:microsoft.com/office/officeart/2005/8/layout/list1"/>
-    <dgm:cxn modelId="{D727FC75-3B89-4C7F-BF47-577F309B56F2}" type="presOf" srcId="{3A9783CA-6553-4A0B-868B-FDBA984A1B11}" destId="{3B84BF06-5215-4FCB-A48A-56981FC939CD}" srcOrd="0" destOrd="5" presId="urn:microsoft.com/office/officeart/2005/8/layout/list1"/>
-    <dgm:cxn modelId="{F35ADD08-91FA-4FDD-ACFA-1B9C58FF015E}" srcId="{6FA4DFF2-6413-4965-8784-FB891A72171D}" destId="{0783DD29-89F7-420B-94EE-E555D8C0FAE0}" srcOrd="0" destOrd="0" parTransId="{4B6A18F8-DB7B-492B-9619-A93BCBA49A13}" sibTransId="{51A238AB-146E-4BED-B409-57EAA3204FA2}"/>
-    <dgm:cxn modelId="{003CB52B-0328-4FEF-A1B2-BA35C6F261DE}" type="presOf" srcId="{A6034635-CE9C-4F1F-B17D-A149A117144B}" destId="{3B84BF06-5215-4FCB-A48A-56981FC939CD}" srcOrd="0" destOrd="4" presId="urn:microsoft.com/office/officeart/2005/8/layout/list1"/>
-    <dgm:cxn modelId="{E3F7167D-D3E0-4C40-ACBA-EAFAD0C5679D}" type="presOf" srcId="{4634B951-9E5C-4417-841F-7CB6DC619A35}" destId="{3B84BF06-5215-4FCB-A48A-56981FC939CD}" srcOrd="0" destOrd="9" presId="urn:microsoft.com/office/officeart/2005/8/layout/list1"/>
-    <dgm:cxn modelId="{F6F4266C-B814-45FC-80AE-371CF8DFB092}" srcId="{CF5C43D8-C84E-46E1-85CE-3EC88A01A91B}" destId="{4A764DE4-D219-4C4E-9F0B-70D95E9E64BC}" srcOrd="0" destOrd="0" parTransId="{76BF6AC2-F473-4258-8B91-A02C9A17CFEE}" sibTransId="{9CED1E82-486C-4DC1-8214-493A56E01658}"/>
-    <dgm:cxn modelId="{2CD54A07-8BCD-47E8-BC7E-E17878B20D9D}" srcId="{09DA4C2E-DF79-475B-8C7F-6D5FB9BA57CE}" destId="{5F1FA8A2-A2C6-43A8-B147-7BB65F4BB03A}" srcOrd="0" destOrd="0" parTransId="{922EEC0C-9BD7-41F9-975C-43ADD6B4C3B7}" sibTransId="{BB53B1B1-F030-4BAE-995A-9888A22ACE61}"/>
+    <dgm:cxn modelId="{218E6468-C457-431C-89A1-54F9CA329962}" type="presOf" srcId="{6FA4DFF2-6413-4965-8784-FB891A72171D}" destId="{3B84BF06-5215-4FCB-A48A-56981FC939CD}" srcOrd="0" destOrd="7" presId="urn:microsoft.com/office/officeart/2005/8/layout/list1"/>
+    <dgm:cxn modelId="{D40BCD51-D1DB-4599-B358-CE73458D0091}" srcId="{CF5C43D8-C84E-46E1-85CE-3EC88A01A91B}" destId="{3A9783CA-6553-4A0B-868B-FDBA984A1B11}" srcOrd="3" destOrd="0" parTransId="{AC339997-551B-4295-AAA9-50BE77963231}" sibTransId="{ECF35FC9-944B-40FB-BF4C-6664CA5E3638}"/>
     <dgm:cxn modelId="{88682F21-E3F3-4DA4-AD34-EF3C5D077585}" srcId="{CF5C43D8-C84E-46E1-85CE-3EC88A01A91B}" destId="{09DA4C2E-DF79-475B-8C7F-6D5FB9BA57CE}" srcOrd="1" destOrd="0" parTransId="{58498386-2DA0-4013-BA53-18BA7C357657}" sibTransId="{72A43FD2-8879-4E36-BEA7-793094291DAC}"/>
+    <dgm:cxn modelId="{28CE5BEC-EE9B-49C6-BDB0-84CBCDA23BE8}" srcId="{2A27AED6-97A3-43BB-B9F0-6F1262D8FA81}" destId="{CF5C43D8-C84E-46E1-85CE-3EC88A01A91B}" srcOrd="0" destOrd="0" parTransId="{24DDF71A-7FBB-465A-A0DB-909956D3AEA2}" sibTransId="{31E8CDE7-93B9-441C-862D-B8C8D4C6901C}"/>
     <dgm:cxn modelId="{7B9DA1EB-D061-4278-894D-6A19448958CB}" type="presParOf" srcId="{849A44E8-8868-4543-A367-720B1C71A282}" destId="{56FE18F5-B583-4141-8061-BC3E86E3CF93}" srcOrd="0" destOrd="0" presId="urn:microsoft.com/office/officeart/2005/8/layout/list1"/>
     <dgm:cxn modelId="{7250B4F4-6544-4AC6-9B38-A08E8F14A873}" type="presParOf" srcId="{56FE18F5-B583-4141-8061-BC3E86E3CF93}" destId="{0E7EB5B0-3EC6-4268-9FC4-1A506436F450}" srcOrd="0" destOrd="0" presId="urn:microsoft.com/office/officeart/2005/8/layout/list1"/>
     <dgm:cxn modelId="{A4C48E23-BA80-4EBC-AB78-5BA08E14F27C}" type="presParOf" srcId="{56FE18F5-B583-4141-8061-BC3E86E3CF93}" destId="{82C996F2-0ACD-4DD0-BE97-B8AED07A97C6}" srcOrd="1" destOrd="0" presId="urn:microsoft.com/office/officeart/2005/8/layout/list1"/>
@@ -3615,7 +4224,7 @@
 </dgm:dataModel>
 </file>
 
-<file path=ppt/diagrams/data2.xml><?xml version="1.0" encoding="utf-8"?>
+<file path=ppt/diagrams/data3.xml><?xml version="1.0" encoding="utf-8"?>
 <dgm:dataModel xmlns:dgm="http://schemas.openxmlformats.org/drawingml/2006/diagram" xmlns:a="http://schemas.openxmlformats.org/drawingml/2006/main">
   <dgm:ptLst>
     <dgm:pt modelId="{485D5B1D-903C-413B-B0AD-6B3FB26B0803}" type="doc">
@@ -3896,6 +4505,13 @@
         </dgm:presLayoutVars>
       </dgm:prSet>
       <dgm:spPr/>
+      <dgm:t>
+        <a:bodyPr/>
+        <a:lstStyle/>
+        <a:p>
+          <a:endParaRPr lang="en-US"/>
+        </a:p>
+      </dgm:t>
     </dgm:pt>
     <dgm:pt modelId="{FA496A43-5010-4464-87EC-8438CE2FD638}" type="pres">
       <dgm:prSet presAssocID="{56DFEC99-1BE3-4649-B163-64032183DA9B}" presName="parentLin" presStyleCnt="0"/>
@@ -3904,6 +4520,13 @@
     <dgm:pt modelId="{4A8D3081-7512-4D70-A185-0C05CB422303}" type="pres">
       <dgm:prSet presAssocID="{56DFEC99-1BE3-4649-B163-64032183DA9B}" presName="parentLeftMargin" presStyleLbl="node1" presStyleIdx="0" presStyleCnt="1"/>
       <dgm:spPr/>
+      <dgm:t>
+        <a:bodyPr/>
+        <a:lstStyle/>
+        <a:p>
+          <a:endParaRPr lang="en-US"/>
+        </a:p>
+      </dgm:t>
     </dgm:pt>
     <dgm:pt modelId="{1101DBBA-AC85-4020-A333-5D67476C6769}" type="pres">
       <dgm:prSet presAssocID="{56DFEC99-1BE3-4649-B163-64032183DA9B}" presName="parentText" presStyleLbl="node1" presStyleIdx="0" presStyleCnt="1">
@@ -3942,22 +4565,22 @@
     </dgm:pt>
   </dgm:ptLst>
   <dgm:cxnLst>
+    <dgm:cxn modelId="{F9534221-0DC0-46A0-851C-22886AEB0B69}" srcId="{485D5B1D-903C-413B-B0AD-6B3FB26B0803}" destId="{56DFEC99-1BE3-4649-B163-64032183DA9B}" srcOrd="0" destOrd="0" parTransId="{31890155-98BB-40A0-A2A6-9135329860BB}" sibTransId="{BB38674E-7D42-4EB1-B1C0-252C2D96233E}"/>
+    <dgm:cxn modelId="{A15EA657-CFC5-4192-BEBD-E4BD847E3087}" type="presOf" srcId="{84F02983-B676-4F41-9E92-31E6851AF82A}" destId="{824034AE-157F-469F-915C-EC6DAE34225C}" srcOrd="0" destOrd="2" presId="urn:microsoft.com/office/officeart/2005/8/layout/list1"/>
+    <dgm:cxn modelId="{3DCB7A61-2B57-4357-AE8F-80C83C0556C3}" srcId="{56DFEC99-1BE3-4649-B163-64032183DA9B}" destId="{E55849B5-8402-4CE8-9DC2-4096A7F3E7D3}" srcOrd="1" destOrd="0" parTransId="{0D246EA7-4B2A-4C00-B833-67BA94E8C476}" sibTransId="{2AC7694E-F392-4725-882C-6CE87C5D9A12}"/>
+    <dgm:cxn modelId="{43812563-193A-43E7-9498-9A06D836F63E}" type="presOf" srcId="{3974BF4E-238F-460A-ADF2-802AC3F1E923}" destId="{824034AE-157F-469F-915C-EC6DAE34225C}" srcOrd="0" destOrd="0" presId="urn:microsoft.com/office/officeart/2005/8/layout/list1"/>
+    <dgm:cxn modelId="{08DABE8F-334B-4CC3-9891-57EC1AEBE56D}" srcId="{56DFEC99-1BE3-4649-B163-64032183DA9B}" destId="{5402BA1F-3173-4A11-A40D-9B0767E5B60E}" srcOrd="5" destOrd="0" parTransId="{34D69107-8487-47F5-8022-B9262B6F3231}" sibTransId="{E5A04D88-199E-43AC-9972-921ED82F1F7E}"/>
+    <dgm:cxn modelId="{84744BEF-0148-4C86-B8A1-661AB3627F12}" type="presOf" srcId="{485D5B1D-903C-413B-B0AD-6B3FB26B0803}" destId="{6B8D3ABC-BB23-4FCF-A6E2-0739D23C1D2C}" srcOrd="0" destOrd="0" presId="urn:microsoft.com/office/officeart/2005/8/layout/list1"/>
+    <dgm:cxn modelId="{81579386-8254-4237-9DEB-1551B54335CB}" type="presOf" srcId="{E55849B5-8402-4CE8-9DC2-4096A7F3E7D3}" destId="{824034AE-157F-469F-915C-EC6DAE34225C}" srcOrd="0" destOrd="1" presId="urn:microsoft.com/office/officeart/2005/8/layout/list1"/>
+    <dgm:cxn modelId="{BBEEDB62-8A5F-4F53-99D0-A4E688799C95}" srcId="{56DFEC99-1BE3-4649-B163-64032183DA9B}" destId="{5FD61399-32F3-4AA9-B275-885E7B84ADBC}" srcOrd="3" destOrd="0" parTransId="{59835DC4-5628-4F97-805B-85707ACC04D6}" sibTransId="{B936123E-46AE-4F83-B4CD-6DBDE8D1F27B}"/>
+    <dgm:cxn modelId="{D8CA8D3F-CD4A-4582-A880-B3CB9256424F}" srcId="{56DFEC99-1BE3-4649-B163-64032183DA9B}" destId="{84F02983-B676-4F41-9E92-31E6851AF82A}" srcOrd="2" destOrd="0" parTransId="{8C505D30-36EC-40F9-9516-2107B670BD71}" sibTransId="{7F4FEF53-225F-4A02-882E-F000CF354019}"/>
+    <dgm:cxn modelId="{44B9BA1B-EC08-4678-A918-82D0B743DCE5}" type="presOf" srcId="{5FD61399-32F3-4AA9-B275-885E7B84ADBC}" destId="{824034AE-157F-469F-915C-EC6DAE34225C}" srcOrd="0" destOrd="3" presId="urn:microsoft.com/office/officeart/2005/8/layout/list1"/>
+    <dgm:cxn modelId="{91AA411F-63E6-4E10-9D3C-D9740C60D666}" type="presOf" srcId="{56DFEC99-1BE3-4649-B163-64032183DA9B}" destId="{4A8D3081-7512-4D70-A185-0C05CB422303}" srcOrd="0" destOrd="0" presId="urn:microsoft.com/office/officeart/2005/8/layout/list1"/>
     <dgm:cxn modelId="{5D5C9110-0093-4816-B9EA-88394F08D2C8}" srcId="{56DFEC99-1BE3-4649-B163-64032183DA9B}" destId="{C02EDE8A-5370-41C8-BB28-E48CF549464C}" srcOrd="4" destOrd="0" parTransId="{E83E927A-73FE-4B42-A181-FA75A2082572}" sibTransId="{21E55F8C-70B9-41E6-BB0B-FFE9FF6B37E7}"/>
-    <dgm:cxn modelId="{F9534221-0DC0-46A0-851C-22886AEB0B69}" srcId="{485D5B1D-903C-413B-B0AD-6B3FB26B0803}" destId="{56DFEC99-1BE3-4649-B163-64032183DA9B}" srcOrd="0" destOrd="0" parTransId="{31890155-98BB-40A0-A2A6-9135329860BB}" sibTransId="{BB38674E-7D42-4EB1-B1C0-252C2D96233E}"/>
-    <dgm:cxn modelId="{44B9BA1B-EC08-4678-A918-82D0B743DCE5}" type="presOf" srcId="{5FD61399-32F3-4AA9-B275-885E7B84ADBC}" destId="{824034AE-157F-469F-915C-EC6DAE34225C}" srcOrd="0" destOrd="3" presId="urn:microsoft.com/office/officeart/2005/8/layout/list1"/>
-    <dgm:cxn modelId="{81579386-8254-4237-9DEB-1551B54335CB}" type="presOf" srcId="{E55849B5-8402-4CE8-9DC2-4096A7F3E7D3}" destId="{824034AE-157F-469F-915C-EC6DAE34225C}" srcOrd="0" destOrd="1" presId="urn:microsoft.com/office/officeart/2005/8/layout/list1"/>
-    <dgm:cxn modelId="{84744BEF-0148-4C86-B8A1-661AB3627F12}" type="presOf" srcId="{485D5B1D-903C-413B-B0AD-6B3FB26B0803}" destId="{6B8D3ABC-BB23-4FCF-A6E2-0739D23C1D2C}" srcOrd="0" destOrd="0" presId="urn:microsoft.com/office/officeart/2005/8/layout/list1"/>
-    <dgm:cxn modelId="{3DCB7A61-2B57-4357-AE8F-80C83C0556C3}" srcId="{56DFEC99-1BE3-4649-B163-64032183DA9B}" destId="{E55849B5-8402-4CE8-9DC2-4096A7F3E7D3}" srcOrd="1" destOrd="0" parTransId="{0D246EA7-4B2A-4C00-B833-67BA94E8C476}" sibTransId="{2AC7694E-F392-4725-882C-6CE87C5D9A12}"/>
-    <dgm:cxn modelId="{91AA411F-63E6-4E10-9D3C-D9740C60D666}" type="presOf" srcId="{56DFEC99-1BE3-4649-B163-64032183DA9B}" destId="{4A8D3081-7512-4D70-A185-0C05CB422303}" srcOrd="0" destOrd="0" presId="urn:microsoft.com/office/officeart/2005/8/layout/list1"/>
-    <dgm:cxn modelId="{43812563-193A-43E7-9498-9A06D836F63E}" type="presOf" srcId="{3974BF4E-238F-460A-ADF2-802AC3F1E923}" destId="{824034AE-157F-469F-915C-EC6DAE34225C}" srcOrd="0" destOrd="0" presId="urn:microsoft.com/office/officeart/2005/8/layout/list1"/>
-    <dgm:cxn modelId="{A15EA657-CFC5-4192-BEBD-E4BD847E3087}" type="presOf" srcId="{84F02983-B676-4F41-9E92-31E6851AF82A}" destId="{824034AE-157F-469F-915C-EC6DAE34225C}" srcOrd="0" destOrd="2" presId="urn:microsoft.com/office/officeart/2005/8/layout/list1"/>
     <dgm:cxn modelId="{FF4F1785-0CCD-4289-BAEB-5BE056128CA8}" type="presOf" srcId="{C02EDE8A-5370-41C8-BB28-E48CF549464C}" destId="{824034AE-157F-469F-915C-EC6DAE34225C}" srcOrd="0" destOrd="4" presId="urn:microsoft.com/office/officeart/2005/8/layout/list1"/>
-    <dgm:cxn modelId="{08DABE8F-334B-4CC3-9891-57EC1AEBE56D}" srcId="{56DFEC99-1BE3-4649-B163-64032183DA9B}" destId="{5402BA1F-3173-4A11-A40D-9B0767E5B60E}" srcOrd="5" destOrd="0" parTransId="{34D69107-8487-47F5-8022-B9262B6F3231}" sibTransId="{E5A04D88-199E-43AC-9972-921ED82F1F7E}"/>
+    <dgm:cxn modelId="{D7858D5B-5628-4511-A05B-4A067F036495}" type="presOf" srcId="{56DFEC99-1BE3-4649-B163-64032183DA9B}" destId="{1101DBBA-AC85-4020-A333-5D67476C6769}" srcOrd="1" destOrd="0" presId="urn:microsoft.com/office/officeart/2005/8/layout/list1"/>
+    <dgm:cxn modelId="{1EA972B1-FA89-40DF-8CA2-628DCA924A8D}" type="presOf" srcId="{5402BA1F-3173-4A11-A40D-9B0767E5B60E}" destId="{824034AE-157F-469F-915C-EC6DAE34225C}" srcOrd="0" destOrd="5" presId="urn:microsoft.com/office/officeart/2005/8/layout/list1"/>
     <dgm:cxn modelId="{17E34F4E-5666-4DF5-B30D-FBFA1A10065F}" srcId="{56DFEC99-1BE3-4649-B163-64032183DA9B}" destId="{3974BF4E-238F-460A-ADF2-802AC3F1E923}" srcOrd="0" destOrd="0" parTransId="{C1F1B64C-635F-4661-98D1-F487EFA0D7E2}" sibTransId="{399AA4D4-4283-4FFA-8201-4EE726FC67E7}"/>
-    <dgm:cxn modelId="{D7858D5B-5628-4511-A05B-4A067F036495}" type="presOf" srcId="{56DFEC99-1BE3-4649-B163-64032183DA9B}" destId="{1101DBBA-AC85-4020-A333-5D67476C6769}" srcOrd="1" destOrd="0" presId="urn:microsoft.com/office/officeart/2005/8/layout/list1"/>
-    <dgm:cxn modelId="{BBEEDB62-8A5F-4F53-99D0-A4E688799C95}" srcId="{56DFEC99-1BE3-4649-B163-64032183DA9B}" destId="{5FD61399-32F3-4AA9-B275-885E7B84ADBC}" srcOrd="3" destOrd="0" parTransId="{59835DC4-5628-4F97-805B-85707ACC04D6}" sibTransId="{B936123E-46AE-4F83-B4CD-6DBDE8D1F27B}"/>
-    <dgm:cxn modelId="{1EA972B1-FA89-40DF-8CA2-628DCA924A8D}" type="presOf" srcId="{5402BA1F-3173-4A11-A40D-9B0767E5B60E}" destId="{824034AE-157F-469F-915C-EC6DAE34225C}" srcOrd="0" destOrd="5" presId="urn:microsoft.com/office/officeart/2005/8/layout/list1"/>
-    <dgm:cxn modelId="{D8CA8D3F-CD4A-4582-A880-B3CB9256424F}" srcId="{56DFEC99-1BE3-4649-B163-64032183DA9B}" destId="{84F02983-B676-4F41-9E92-31E6851AF82A}" srcOrd="2" destOrd="0" parTransId="{8C505D30-36EC-40F9-9516-2107B670BD71}" sibTransId="{7F4FEF53-225F-4A02-882E-F000CF354019}"/>
     <dgm:cxn modelId="{FCFDFE21-4AE9-4682-9FFF-6181A4CE0B18}" type="presParOf" srcId="{6B8D3ABC-BB23-4FCF-A6E2-0739D23C1D2C}" destId="{FA496A43-5010-4464-87EC-8438CE2FD638}" srcOrd="0" destOrd="0" presId="urn:microsoft.com/office/officeart/2005/8/layout/list1"/>
     <dgm:cxn modelId="{6E09B4A8-7E40-4DAD-8ECE-3EE77641DD2A}" type="presParOf" srcId="{FA496A43-5010-4464-87EC-8438CE2FD638}" destId="{4A8D3081-7512-4D70-A185-0C05CB422303}" srcOrd="0" destOrd="0" presId="urn:microsoft.com/office/officeart/2005/8/layout/list1"/>
     <dgm:cxn modelId="{02C2BD30-DA26-4C47-B830-907E6A461BA8}" type="presParOf" srcId="{FA496A43-5010-4464-87EC-8438CE2FD638}" destId="{1101DBBA-AC85-4020-A333-5D67476C6769}" srcOrd="1" destOrd="0" presId="urn:microsoft.com/office/officeart/2005/8/layout/list1"/>
@@ -3974,7 +4597,7 @@
 </dgm:dataModel>
 </file>
 
-<file path=ppt/diagrams/data3.xml><?xml version="1.0" encoding="utf-8"?>
+<file path=ppt/diagrams/data4.xml><?xml version="1.0" encoding="utf-8"?>
 <dgm:dataModel xmlns:dgm="http://schemas.openxmlformats.org/drawingml/2006/diagram" xmlns:a="http://schemas.openxmlformats.org/drawingml/2006/main">
   <dgm:ptLst>
     <dgm:pt modelId="{485D5B1D-903C-413B-B0AD-6B3FB26B0803}" type="doc">
@@ -4326,6 +4949,13 @@
         </dgm:presLayoutVars>
       </dgm:prSet>
       <dgm:spPr/>
+      <dgm:t>
+        <a:bodyPr/>
+        <a:lstStyle/>
+        <a:p>
+          <a:endParaRPr lang="en-US"/>
+        </a:p>
+      </dgm:t>
     </dgm:pt>
     <dgm:pt modelId="{FA496A43-5010-4464-87EC-8438CE2FD638}" type="pres">
       <dgm:prSet presAssocID="{56DFEC99-1BE3-4649-B163-64032183DA9B}" presName="parentLin" presStyleCnt="0"/>
@@ -4334,6 +4964,13 @@
     <dgm:pt modelId="{4A8D3081-7512-4D70-A185-0C05CB422303}" type="pres">
       <dgm:prSet presAssocID="{56DFEC99-1BE3-4649-B163-64032183DA9B}" presName="parentLeftMargin" presStyleLbl="node1" presStyleIdx="0" presStyleCnt="1"/>
       <dgm:spPr/>
+      <dgm:t>
+        <a:bodyPr/>
+        <a:lstStyle/>
+        <a:p>
+          <a:endParaRPr lang="en-US"/>
+        </a:p>
+      </dgm:t>
     </dgm:pt>
     <dgm:pt modelId="{1101DBBA-AC85-4020-A333-5D67476C6769}" type="pres">
       <dgm:prSet presAssocID="{56DFEC99-1BE3-4649-B163-64032183DA9B}" presName="parentText" presStyleLbl="node1" presStyleIdx="0" presStyleCnt="1" custScaleY="730200">
@@ -4372,26 +5009,26 @@
     </dgm:pt>
   </dgm:ptLst>
   <dgm:cxnLst>
+    <dgm:cxn modelId="{E26712E7-7791-4832-943D-5A39F11F261F}" type="presOf" srcId="{485D5B1D-903C-413B-B0AD-6B3FB26B0803}" destId="{6B8D3ABC-BB23-4FCF-A6E2-0739D23C1D2C}" srcOrd="0" destOrd="0" presId="urn:microsoft.com/office/officeart/2005/8/layout/list1"/>
+    <dgm:cxn modelId="{F9534221-0DC0-46A0-851C-22886AEB0B69}" srcId="{485D5B1D-903C-413B-B0AD-6B3FB26B0803}" destId="{56DFEC99-1BE3-4649-B163-64032183DA9B}" srcOrd="0" destOrd="0" parTransId="{31890155-98BB-40A0-A2A6-9135329860BB}" sibTransId="{BB38674E-7D42-4EB1-B1C0-252C2D96233E}"/>
+    <dgm:cxn modelId="{639206B6-1007-4EBE-A9E6-6F63D4F5701F}" srcId="{56DFEC99-1BE3-4649-B163-64032183DA9B}" destId="{F1D326BD-323A-462E-916A-CAE1A338A5AA}" srcOrd="7" destOrd="0" parTransId="{E58752A9-2A93-4DA6-A81E-C9B030FF80FA}" sibTransId="{51258105-F9C2-40D9-8D83-CDC5204DC392}"/>
+    <dgm:cxn modelId="{790CD76D-DF0E-4707-B837-549BE52FE2C9}" srcId="{56DFEC99-1BE3-4649-B163-64032183DA9B}" destId="{5342364F-03C9-40EA-B947-0A1E8FF2DFFD}" srcOrd="4" destOrd="0" parTransId="{78F65C66-BE3D-4C5B-A580-5C4D26C33DC7}" sibTransId="{D035AAD7-5B76-412E-B5EA-90275420FCEC}"/>
+    <dgm:cxn modelId="{4A7EF1BE-B6D9-4831-B3CC-19D4D7C900E9}" srcId="{56DFEC99-1BE3-4649-B163-64032183DA9B}" destId="{E6193717-8EEB-4DE5-9D88-E5529EA98A44}" srcOrd="6" destOrd="0" parTransId="{653A93FE-F856-4B5C-BD38-7EF8462BC8B9}" sibTransId="{53EC580D-C97D-40BF-A5DF-D99DB4F3CC89}"/>
+    <dgm:cxn modelId="{EE3DF911-3B46-4416-9BC6-402B4C4ED425}" type="presOf" srcId="{E6193717-8EEB-4DE5-9D88-E5529EA98A44}" destId="{824034AE-157F-469F-915C-EC6DAE34225C}" srcOrd="0" destOrd="6" presId="urn:microsoft.com/office/officeart/2005/8/layout/list1"/>
+    <dgm:cxn modelId="{C4D2F3F0-2E34-40E9-AC18-F80A11DA656C}" type="presOf" srcId="{29EDB42D-8DAB-449B-B2FA-2C215A55F5A7}" destId="{824034AE-157F-469F-915C-EC6DAE34225C}" srcOrd="0" destOrd="1" presId="urn:microsoft.com/office/officeart/2005/8/layout/list1"/>
     <dgm:cxn modelId="{DFDCFD37-4118-4C80-821E-ED21B27F0844}" type="presOf" srcId="{1242562C-204B-42C8-ABA3-71B984A7B80A}" destId="{824034AE-157F-469F-915C-EC6DAE34225C}" srcOrd="0" destOrd="2" presId="urn:microsoft.com/office/officeart/2005/8/layout/list1"/>
+    <dgm:cxn modelId="{CE75C4DE-D18F-4171-921D-6D454CC6E360}" srcId="{56DFEC99-1BE3-4649-B163-64032183DA9B}" destId="{29EDB42D-8DAB-449B-B2FA-2C215A55F5A7}" srcOrd="1" destOrd="0" parTransId="{75F1861D-17ED-4B4D-9DBB-A7329D2F7A8E}" sibTransId="{1E8A200F-29E6-44CD-993A-0244584F7C40}"/>
     <dgm:cxn modelId="{BB2BE5B1-1235-4F38-98D8-93ED53BEF108}" srcId="{56DFEC99-1BE3-4649-B163-64032183DA9B}" destId="{B77DD61F-508C-4C9F-9801-165F04FF833E}" srcOrd="3" destOrd="0" parTransId="{C6DB83C5-C4E1-453E-9B86-FD1A70464FDF}" sibTransId="{FC4836F9-CC7F-4B52-83ED-B6DF15D3916A}"/>
+    <dgm:cxn modelId="{987B5A9F-4DBC-469C-A200-7D071B49D629}" srcId="{56DFEC99-1BE3-4649-B163-64032183DA9B}" destId="{1242562C-204B-42C8-ABA3-71B984A7B80A}" srcOrd="2" destOrd="0" parTransId="{75DA7DCC-A661-4C3C-9986-E4BC1EA843E1}" sibTransId="{509D950F-078B-4142-A195-AFFA2AE2A4B2}"/>
+    <dgm:cxn modelId="{E9A1D600-2D5C-4980-85C3-AC8CEB930AF0}" type="presOf" srcId="{56DFEC99-1BE3-4649-B163-64032183DA9B}" destId="{4A8D3081-7512-4D70-A185-0C05CB422303}" srcOrd="0" destOrd="0" presId="urn:microsoft.com/office/officeart/2005/8/layout/list1"/>
+    <dgm:cxn modelId="{640BEF3B-8744-45F5-AD9C-CA50A98D5D9E}" type="presOf" srcId="{B77DD61F-508C-4C9F-9801-165F04FF833E}" destId="{824034AE-157F-469F-915C-EC6DAE34225C}" srcOrd="0" destOrd="3" presId="urn:microsoft.com/office/officeart/2005/8/layout/list1"/>
+    <dgm:cxn modelId="{401B848C-C899-4ED9-A821-CD60D4F4FF46}" type="presOf" srcId="{A1A12EA5-71A7-4711-B9AC-168808FAB365}" destId="{824034AE-157F-469F-915C-EC6DAE34225C}" srcOrd="0" destOrd="0" presId="urn:microsoft.com/office/officeart/2005/8/layout/list1"/>
+    <dgm:cxn modelId="{689ED813-078C-4E25-B357-99A14C62A75C}" type="presOf" srcId="{B9A408EB-46D1-4286-9978-16F4B141D682}" destId="{824034AE-157F-469F-915C-EC6DAE34225C}" srcOrd="0" destOrd="5" presId="urn:microsoft.com/office/officeart/2005/8/layout/list1"/>
     <dgm:cxn modelId="{56994F8B-612A-4A0A-866B-5DF24D70544F}" srcId="{56DFEC99-1BE3-4649-B163-64032183DA9B}" destId="{B9A408EB-46D1-4286-9978-16F4B141D682}" srcOrd="5" destOrd="0" parTransId="{08351E79-3A68-4ABB-9E92-039EBE587875}" sibTransId="{FC5FA0A2-C123-44AF-9ADA-5554B9CA3CCF}"/>
-    <dgm:cxn modelId="{E26712E7-7791-4832-943D-5A39F11F261F}" type="presOf" srcId="{485D5B1D-903C-413B-B0AD-6B3FB26B0803}" destId="{6B8D3ABC-BB23-4FCF-A6E2-0739D23C1D2C}" srcOrd="0" destOrd="0" presId="urn:microsoft.com/office/officeart/2005/8/layout/list1"/>
-    <dgm:cxn modelId="{401B848C-C899-4ED9-A821-CD60D4F4FF46}" type="presOf" srcId="{A1A12EA5-71A7-4711-B9AC-168808FAB365}" destId="{824034AE-157F-469F-915C-EC6DAE34225C}" srcOrd="0" destOrd="0" presId="urn:microsoft.com/office/officeart/2005/8/layout/list1"/>
-    <dgm:cxn modelId="{CE75C4DE-D18F-4171-921D-6D454CC6E360}" srcId="{56DFEC99-1BE3-4649-B163-64032183DA9B}" destId="{29EDB42D-8DAB-449B-B2FA-2C215A55F5A7}" srcOrd="1" destOrd="0" parTransId="{75F1861D-17ED-4B4D-9DBB-A7329D2F7A8E}" sibTransId="{1E8A200F-29E6-44CD-993A-0244584F7C40}"/>
+    <dgm:cxn modelId="{34C9358C-A3BB-41D5-A02E-CD8F52673EA1}" type="presOf" srcId="{F1D326BD-323A-462E-916A-CAE1A338A5AA}" destId="{824034AE-157F-469F-915C-EC6DAE34225C}" srcOrd="0" destOrd="7" presId="urn:microsoft.com/office/officeart/2005/8/layout/list1"/>
+    <dgm:cxn modelId="{58593818-384C-4AA9-8792-E7E2A80E97EA}" type="presOf" srcId="{56DFEC99-1BE3-4649-B163-64032183DA9B}" destId="{1101DBBA-AC85-4020-A333-5D67476C6769}" srcOrd="1" destOrd="0" presId="urn:microsoft.com/office/officeart/2005/8/layout/list1"/>
     <dgm:cxn modelId="{C07BA3CD-A6FA-4340-A4A4-4C2927E6562A}" srcId="{56DFEC99-1BE3-4649-B163-64032183DA9B}" destId="{A1A12EA5-71A7-4711-B9AC-168808FAB365}" srcOrd="0" destOrd="0" parTransId="{7851C9E8-E486-41E2-94FF-69DD1170B979}" sibTransId="{45245E4F-53B5-4828-B91D-A5360C927A60}"/>
-    <dgm:cxn modelId="{C4D2F3F0-2E34-40E9-AC18-F80A11DA656C}" type="presOf" srcId="{29EDB42D-8DAB-449B-B2FA-2C215A55F5A7}" destId="{824034AE-157F-469F-915C-EC6DAE34225C}" srcOrd="0" destOrd="1" presId="urn:microsoft.com/office/officeart/2005/8/layout/list1"/>
-    <dgm:cxn modelId="{F9534221-0DC0-46A0-851C-22886AEB0B69}" srcId="{485D5B1D-903C-413B-B0AD-6B3FB26B0803}" destId="{56DFEC99-1BE3-4649-B163-64032183DA9B}" srcOrd="0" destOrd="0" parTransId="{31890155-98BB-40A0-A2A6-9135329860BB}" sibTransId="{BB38674E-7D42-4EB1-B1C0-252C2D96233E}"/>
-    <dgm:cxn modelId="{4A7EF1BE-B6D9-4831-B3CC-19D4D7C900E9}" srcId="{56DFEC99-1BE3-4649-B163-64032183DA9B}" destId="{E6193717-8EEB-4DE5-9D88-E5529EA98A44}" srcOrd="6" destOrd="0" parTransId="{653A93FE-F856-4B5C-BD38-7EF8462BC8B9}" sibTransId="{53EC580D-C97D-40BF-A5DF-D99DB4F3CC89}"/>
     <dgm:cxn modelId="{5AE1AA47-8347-4769-B548-B8ACE9353693}" type="presOf" srcId="{5342364F-03C9-40EA-B947-0A1E8FF2DFFD}" destId="{824034AE-157F-469F-915C-EC6DAE34225C}" srcOrd="0" destOrd="4" presId="urn:microsoft.com/office/officeart/2005/8/layout/list1"/>
-    <dgm:cxn modelId="{58593818-384C-4AA9-8792-E7E2A80E97EA}" type="presOf" srcId="{56DFEC99-1BE3-4649-B163-64032183DA9B}" destId="{1101DBBA-AC85-4020-A333-5D67476C6769}" srcOrd="1" destOrd="0" presId="urn:microsoft.com/office/officeart/2005/8/layout/list1"/>
-    <dgm:cxn modelId="{790CD76D-DF0E-4707-B837-549BE52FE2C9}" srcId="{56DFEC99-1BE3-4649-B163-64032183DA9B}" destId="{5342364F-03C9-40EA-B947-0A1E8FF2DFFD}" srcOrd="4" destOrd="0" parTransId="{78F65C66-BE3D-4C5B-A580-5C4D26C33DC7}" sibTransId="{D035AAD7-5B76-412E-B5EA-90275420FCEC}"/>
-    <dgm:cxn modelId="{34C9358C-A3BB-41D5-A02E-CD8F52673EA1}" type="presOf" srcId="{F1D326BD-323A-462E-916A-CAE1A338A5AA}" destId="{824034AE-157F-469F-915C-EC6DAE34225C}" srcOrd="0" destOrd="7" presId="urn:microsoft.com/office/officeart/2005/8/layout/list1"/>
-    <dgm:cxn modelId="{EE3DF911-3B46-4416-9BC6-402B4C4ED425}" type="presOf" srcId="{E6193717-8EEB-4DE5-9D88-E5529EA98A44}" destId="{824034AE-157F-469F-915C-EC6DAE34225C}" srcOrd="0" destOrd="6" presId="urn:microsoft.com/office/officeart/2005/8/layout/list1"/>
-    <dgm:cxn modelId="{689ED813-078C-4E25-B357-99A14C62A75C}" type="presOf" srcId="{B9A408EB-46D1-4286-9978-16F4B141D682}" destId="{824034AE-157F-469F-915C-EC6DAE34225C}" srcOrd="0" destOrd="5" presId="urn:microsoft.com/office/officeart/2005/8/layout/list1"/>
-    <dgm:cxn modelId="{639206B6-1007-4EBE-A9E6-6F63D4F5701F}" srcId="{56DFEC99-1BE3-4649-B163-64032183DA9B}" destId="{F1D326BD-323A-462E-916A-CAE1A338A5AA}" srcOrd="7" destOrd="0" parTransId="{E58752A9-2A93-4DA6-A81E-C9B030FF80FA}" sibTransId="{51258105-F9C2-40D9-8D83-CDC5204DC392}"/>
-    <dgm:cxn modelId="{640BEF3B-8744-45F5-AD9C-CA50A98D5D9E}" type="presOf" srcId="{B77DD61F-508C-4C9F-9801-165F04FF833E}" destId="{824034AE-157F-469F-915C-EC6DAE34225C}" srcOrd="0" destOrd="3" presId="urn:microsoft.com/office/officeart/2005/8/layout/list1"/>
-    <dgm:cxn modelId="{E9A1D600-2D5C-4980-85C3-AC8CEB930AF0}" type="presOf" srcId="{56DFEC99-1BE3-4649-B163-64032183DA9B}" destId="{4A8D3081-7512-4D70-A185-0C05CB422303}" srcOrd="0" destOrd="0" presId="urn:microsoft.com/office/officeart/2005/8/layout/list1"/>
-    <dgm:cxn modelId="{987B5A9F-4DBC-469C-A200-7D071B49D629}" srcId="{56DFEC99-1BE3-4649-B163-64032183DA9B}" destId="{1242562C-204B-42C8-ABA3-71B984A7B80A}" srcOrd="2" destOrd="0" parTransId="{75DA7DCC-A661-4C3C-9986-E4BC1EA843E1}" sibTransId="{509D950F-078B-4142-A195-AFFA2AE2A4B2}"/>
     <dgm:cxn modelId="{6496232C-25DD-4806-AC38-A11726E7FC12}" type="presParOf" srcId="{6B8D3ABC-BB23-4FCF-A6E2-0739D23C1D2C}" destId="{FA496A43-5010-4464-87EC-8438CE2FD638}" srcOrd="0" destOrd="0" presId="urn:microsoft.com/office/officeart/2005/8/layout/list1"/>
     <dgm:cxn modelId="{3E4C632B-B88F-47C3-A4B4-D76D1BD6CB99}" type="presParOf" srcId="{FA496A43-5010-4464-87EC-8438CE2FD638}" destId="{4A8D3081-7512-4D70-A185-0C05CB422303}" srcOrd="0" destOrd="0" presId="urn:microsoft.com/office/officeart/2005/8/layout/list1"/>
     <dgm:cxn modelId="{FD3576EE-2893-4309-A53B-86B7DB6CF266}" type="presParOf" srcId="{FA496A43-5010-4464-87EC-8438CE2FD638}" destId="{1101DBBA-AC85-4020-A333-5D67476C6769}" srcOrd="1" destOrd="0" presId="urn:microsoft.com/office/officeart/2005/8/layout/list1"/>
@@ -4408,1421 +5045,7 @@
 </dgm:dataModel>
 </file>
 
-<file path=ppt/diagrams/data4.xml><?xml version="1.0" encoding="utf-8"?>
-<dgm:dataModel xmlns:dgm="http://schemas.openxmlformats.org/drawingml/2006/diagram" xmlns:a="http://schemas.openxmlformats.org/drawingml/2006/main">
-  <dgm:ptLst>
-    <dgm:pt modelId="{C27691A8-FCE4-4FEB-A451-4A5EA187EB67}" type="doc">
-      <dgm:prSet loTypeId="urn:microsoft.com/office/officeart/2005/8/layout/orgChart1" loCatId="hierarchy" qsTypeId="urn:microsoft.com/office/officeart/2005/8/quickstyle/simple1" qsCatId="simple" csTypeId="urn:microsoft.com/office/officeart/2005/8/colors/accent1_2" csCatId="accent1" phldr="1"/>
-      <dgm:spPr/>
-      <dgm:t>
-        <a:bodyPr/>
-        <a:lstStyle/>
-        <a:p>
-          <a:endParaRPr lang="en-US"/>
-        </a:p>
-      </dgm:t>
-    </dgm:pt>
-    <dgm:pt modelId="{B0ADAF9C-6C30-4E23-8508-4FA7AD2A7848}">
-      <dgm:prSet phldrT="[Text]"/>
-      <dgm:spPr/>
-      <dgm:t>
-        <a:bodyPr/>
-        <a:lstStyle/>
-        <a:p>
-          <a:r>
-            <a:rPr lang="en-US" dirty="0" err="1" smtClean="0"/>
-            <a:t>ArrayBot</a:t>
-          </a:r>
-          <a:r>
-            <a:rPr lang="en-US" dirty="0" smtClean="0"/>
-            <a:t> C++ API </a:t>
-          </a:r>
-          <a:endParaRPr lang="en-US" dirty="0"/>
-        </a:p>
-      </dgm:t>
-    </dgm:pt>
-    <dgm:pt modelId="{34ADD3B4-ED4D-4D20-96EA-801281A31C07}" type="parTrans" cxnId="{0309876D-1A7E-45E7-BE79-2B8FC2C2D90C}">
-      <dgm:prSet/>
-      <dgm:spPr/>
-      <dgm:t>
-        <a:bodyPr/>
-        <a:lstStyle/>
-        <a:p>
-          <a:endParaRPr lang="en-US"/>
-        </a:p>
-      </dgm:t>
-    </dgm:pt>
-    <dgm:pt modelId="{FF02142E-1F08-4564-94A8-C41EBE3A20CF}" type="sibTrans" cxnId="{0309876D-1A7E-45E7-BE79-2B8FC2C2D90C}">
-      <dgm:prSet/>
-      <dgm:spPr/>
-      <dgm:t>
-        <a:bodyPr/>
-        <a:lstStyle/>
-        <a:p>
-          <a:endParaRPr lang="en-US"/>
-        </a:p>
-      </dgm:t>
-    </dgm:pt>
-    <dgm:pt modelId="{8A966797-98B1-4E01-95D7-DB1428427F69}">
-      <dgm:prSet phldrT="[Text]"/>
-      <dgm:spPr/>
-      <dgm:t>
-        <a:bodyPr/>
-        <a:lstStyle/>
-        <a:p>
-          <a:r>
-            <a:rPr lang="en-US" dirty="0" err="1" smtClean="0"/>
-            <a:t>ThorLabs</a:t>
-          </a:r>
-          <a:r>
-            <a:rPr lang="en-US" dirty="0" smtClean="0"/>
-            <a:t> C – API</a:t>
-          </a:r>
-          <a:endParaRPr lang="en-US" dirty="0"/>
-        </a:p>
-      </dgm:t>
-    </dgm:pt>
-    <dgm:pt modelId="{E66AF807-E90C-462F-8417-C2A56E687749}" type="parTrans" cxnId="{0D963521-8D90-4E7C-BF39-3F4838EF47F4}">
-      <dgm:prSet/>
-      <dgm:spPr/>
-      <dgm:t>
-        <a:bodyPr/>
-        <a:lstStyle/>
-        <a:p>
-          <a:endParaRPr lang="en-US"/>
-        </a:p>
-      </dgm:t>
-    </dgm:pt>
-    <dgm:pt modelId="{DC81EB2D-702A-409F-81AB-F490B1369376}" type="sibTrans" cxnId="{0D963521-8D90-4E7C-BF39-3F4838EF47F4}">
-      <dgm:prSet/>
-      <dgm:spPr/>
-      <dgm:t>
-        <a:bodyPr/>
-        <a:lstStyle/>
-        <a:p>
-          <a:endParaRPr lang="en-US"/>
-        </a:p>
-      </dgm:t>
-    </dgm:pt>
-    <dgm:pt modelId="{3C63B6D8-03B6-446F-92B2-40BEE7EA3DA6}">
-      <dgm:prSet phldrT="[Text]"/>
-      <dgm:spPr/>
-      <dgm:t>
-        <a:bodyPr/>
-        <a:lstStyle/>
-        <a:p>
-          <a:r>
-            <a:rPr lang="en-US" dirty="0" err="1" smtClean="0"/>
-            <a:t>ThirdParty</a:t>
-          </a:r>
-          <a:r>
-            <a:rPr lang="en-US" dirty="0" smtClean="0"/>
-            <a:t> API’s</a:t>
-          </a:r>
-          <a:endParaRPr lang="en-US" dirty="0"/>
-        </a:p>
-      </dgm:t>
-    </dgm:pt>
-    <dgm:pt modelId="{1B146C1E-74BE-4F8D-827B-AF978D01F3BD}" type="parTrans" cxnId="{7F723C5C-1D77-427D-A4FD-119B477564DB}">
-      <dgm:prSet/>
-      <dgm:spPr/>
-      <dgm:t>
-        <a:bodyPr/>
-        <a:lstStyle/>
-        <a:p>
-          <a:endParaRPr lang="en-US"/>
-        </a:p>
-      </dgm:t>
-    </dgm:pt>
-    <dgm:pt modelId="{E7A2B69A-CA81-4761-B221-CA8D05E706EA}" type="sibTrans" cxnId="{7F723C5C-1D77-427D-A4FD-119B477564DB}">
-      <dgm:prSet/>
-      <dgm:spPr/>
-      <dgm:t>
-        <a:bodyPr/>
-        <a:lstStyle/>
-        <a:p>
-          <a:endParaRPr lang="en-US"/>
-        </a:p>
-      </dgm:t>
-    </dgm:pt>
-    <dgm:pt modelId="{3326A2DC-08EA-4603-9C9B-32AA62F5C864}">
-      <dgm:prSet phldrT="[Text]"/>
-      <dgm:spPr/>
-      <dgm:t>
-        <a:bodyPr/>
-        <a:lstStyle/>
-        <a:p>
-          <a:r>
-            <a:rPr lang="en-US" dirty="0" err="1" smtClean="0"/>
-            <a:t>Poco</a:t>
-          </a:r>
-          <a:r>
-            <a:rPr lang="en-US" dirty="0" smtClean="0"/>
-            <a:t> (Threads, </a:t>
-          </a:r>
-          <a:r>
-            <a:rPr lang="en-US" dirty="0" err="1" smtClean="0"/>
-            <a:t>TimeStamps</a:t>
-          </a:r>
-          <a:r>
-            <a:rPr lang="en-US" dirty="0" smtClean="0"/>
-            <a:t>)</a:t>
-          </a:r>
-          <a:endParaRPr lang="en-US" dirty="0"/>
-        </a:p>
-      </dgm:t>
-    </dgm:pt>
-    <dgm:pt modelId="{4B85568B-08F2-447E-8ACD-859B07B0C2FE}" type="parTrans" cxnId="{42EE8868-A611-41B2-B3B2-AD15465BA30E}">
-      <dgm:prSet/>
-      <dgm:spPr/>
-      <dgm:t>
-        <a:bodyPr/>
-        <a:lstStyle/>
-        <a:p>
-          <a:endParaRPr lang="en-US"/>
-        </a:p>
-      </dgm:t>
-    </dgm:pt>
-    <dgm:pt modelId="{3402F55D-CE79-4CF6-845C-3CC03ECD6E58}" type="sibTrans" cxnId="{42EE8868-A611-41B2-B3B2-AD15465BA30E}">
-      <dgm:prSet/>
-      <dgm:spPr/>
-      <dgm:t>
-        <a:bodyPr/>
-        <a:lstStyle/>
-        <a:p>
-          <a:endParaRPr lang="en-US"/>
-        </a:p>
-      </dgm:t>
-    </dgm:pt>
-    <dgm:pt modelId="{CF1C50AA-41C3-4932-BDF5-F4650C8B1E71}">
-      <dgm:prSet phldrT="[Text]"/>
-      <dgm:spPr/>
-      <dgm:t>
-        <a:bodyPr/>
-        <a:lstStyle/>
-        <a:p>
-          <a:r>
-            <a:rPr lang="en-US" dirty="0" err="1" smtClean="0"/>
-            <a:t>TkLibs</a:t>
-          </a:r>
-          <a:r>
-            <a:rPr lang="en-US" dirty="0" smtClean="0"/>
-            <a:t> (Various utilities, sockets, properties)</a:t>
-          </a:r>
-          <a:endParaRPr lang="en-US" dirty="0"/>
-        </a:p>
-      </dgm:t>
-    </dgm:pt>
-    <dgm:pt modelId="{1EC6A4E2-2B61-426A-A8C9-EA292C8D7D97}" type="parTrans" cxnId="{68185268-6B24-4AAF-93BE-5395A88A5FB0}">
-      <dgm:prSet/>
-      <dgm:spPr/>
-      <dgm:t>
-        <a:bodyPr/>
-        <a:lstStyle/>
-        <a:p>
-          <a:endParaRPr lang="en-US"/>
-        </a:p>
-      </dgm:t>
-    </dgm:pt>
-    <dgm:pt modelId="{471064F5-EE27-47A4-8DC6-0518BBC39794}" type="sibTrans" cxnId="{68185268-6B24-4AAF-93BE-5395A88A5FB0}">
-      <dgm:prSet/>
-      <dgm:spPr/>
-      <dgm:t>
-        <a:bodyPr/>
-        <a:lstStyle/>
-        <a:p>
-          <a:endParaRPr lang="en-US"/>
-        </a:p>
-      </dgm:t>
-    </dgm:pt>
-    <dgm:pt modelId="{E3C94D6B-9473-4B75-B2D6-600D5819A349}" type="pres">
-      <dgm:prSet presAssocID="{C27691A8-FCE4-4FEB-A451-4A5EA187EB67}" presName="hierChild1" presStyleCnt="0">
-        <dgm:presLayoutVars>
-          <dgm:orgChart val="1"/>
-          <dgm:chPref val="1"/>
-          <dgm:dir/>
-          <dgm:animOne val="branch"/>
-          <dgm:animLvl val="lvl"/>
-          <dgm:resizeHandles/>
-        </dgm:presLayoutVars>
-      </dgm:prSet>
-      <dgm:spPr/>
-    </dgm:pt>
-    <dgm:pt modelId="{08E0B425-84D9-4291-AC34-5D71EDD8778C}" type="pres">
-      <dgm:prSet presAssocID="{B0ADAF9C-6C30-4E23-8508-4FA7AD2A7848}" presName="hierRoot1" presStyleCnt="0">
-        <dgm:presLayoutVars>
-          <dgm:hierBranch val="init"/>
-        </dgm:presLayoutVars>
-      </dgm:prSet>
-      <dgm:spPr/>
-    </dgm:pt>
-    <dgm:pt modelId="{AB18ECB2-E9F2-4093-A36A-92DDF935F27E}" type="pres">
-      <dgm:prSet presAssocID="{B0ADAF9C-6C30-4E23-8508-4FA7AD2A7848}" presName="rootComposite1" presStyleCnt="0"/>
-      <dgm:spPr/>
-    </dgm:pt>
-    <dgm:pt modelId="{DA1DF513-0211-4E50-AC19-D95364F9EEAD}" type="pres">
-      <dgm:prSet presAssocID="{B0ADAF9C-6C30-4E23-8508-4FA7AD2A7848}" presName="rootText1" presStyleLbl="node0" presStyleIdx="0" presStyleCnt="1">
-        <dgm:presLayoutVars>
-          <dgm:chPref val="3"/>
-        </dgm:presLayoutVars>
-      </dgm:prSet>
-      <dgm:spPr/>
-      <dgm:t>
-        <a:bodyPr/>
-        <a:lstStyle/>
-        <a:p>
-          <a:endParaRPr lang="en-US"/>
-        </a:p>
-      </dgm:t>
-    </dgm:pt>
-    <dgm:pt modelId="{E4DDD033-2C5D-416D-904F-10A129269413}" type="pres">
-      <dgm:prSet presAssocID="{B0ADAF9C-6C30-4E23-8508-4FA7AD2A7848}" presName="rootConnector1" presStyleLbl="node1" presStyleIdx="0" presStyleCnt="0"/>
-      <dgm:spPr/>
-    </dgm:pt>
-    <dgm:pt modelId="{FE393823-B80C-40E6-9303-CE99527CA84B}" type="pres">
-      <dgm:prSet presAssocID="{B0ADAF9C-6C30-4E23-8508-4FA7AD2A7848}" presName="hierChild2" presStyleCnt="0"/>
-      <dgm:spPr/>
-    </dgm:pt>
-    <dgm:pt modelId="{8800A970-562A-4D8F-A6DF-A5487E7E711D}" type="pres">
-      <dgm:prSet presAssocID="{E66AF807-E90C-462F-8417-C2A56E687749}" presName="Name37" presStyleLbl="parChTrans1D2" presStyleIdx="0" presStyleCnt="2"/>
-      <dgm:spPr/>
-    </dgm:pt>
-    <dgm:pt modelId="{4A5E1E19-7174-45E1-8910-4705C3A7FF95}" type="pres">
-      <dgm:prSet presAssocID="{8A966797-98B1-4E01-95D7-DB1428427F69}" presName="hierRoot2" presStyleCnt="0">
-        <dgm:presLayoutVars>
-          <dgm:hierBranch val="init"/>
-        </dgm:presLayoutVars>
-      </dgm:prSet>
-      <dgm:spPr/>
-    </dgm:pt>
-    <dgm:pt modelId="{3F065280-ABBD-4FA1-8DED-07F5B0E3E141}" type="pres">
-      <dgm:prSet presAssocID="{8A966797-98B1-4E01-95D7-DB1428427F69}" presName="rootComposite" presStyleCnt="0"/>
-      <dgm:spPr/>
-    </dgm:pt>
-    <dgm:pt modelId="{F080FFD0-E628-4673-8797-4006B01CAA2F}" type="pres">
-      <dgm:prSet presAssocID="{8A966797-98B1-4E01-95D7-DB1428427F69}" presName="rootText" presStyleLbl="node2" presStyleIdx="0" presStyleCnt="2">
-        <dgm:presLayoutVars>
-          <dgm:chPref val="3"/>
-        </dgm:presLayoutVars>
-      </dgm:prSet>
-      <dgm:spPr/>
-      <dgm:t>
-        <a:bodyPr/>
-        <a:lstStyle/>
-        <a:p>
-          <a:endParaRPr lang="en-US"/>
-        </a:p>
-      </dgm:t>
-    </dgm:pt>
-    <dgm:pt modelId="{ED6C467A-0E9B-4151-BB54-B53CF409BE13}" type="pres">
-      <dgm:prSet presAssocID="{8A966797-98B1-4E01-95D7-DB1428427F69}" presName="rootConnector" presStyleLbl="node2" presStyleIdx="0" presStyleCnt="2"/>
-      <dgm:spPr/>
-    </dgm:pt>
-    <dgm:pt modelId="{644E2427-0440-481B-A5A7-9D16DD1BE7D8}" type="pres">
-      <dgm:prSet presAssocID="{8A966797-98B1-4E01-95D7-DB1428427F69}" presName="hierChild4" presStyleCnt="0"/>
-      <dgm:spPr/>
-    </dgm:pt>
-    <dgm:pt modelId="{6E94FF00-C1AD-4A26-8260-C1F62D8BA54B}" type="pres">
-      <dgm:prSet presAssocID="{8A966797-98B1-4E01-95D7-DB1428427F69}" presName="hierChild5" presStyleCnt="0"/>
-      <dgm:spPr/>
-    </dgm:pt>
-    <dgm:pt modelId="{04D282F3-260E-4A5A-BE00-49DCD89279A9}" type="pres">
-      <dgm:prSet presAssocID="{1B146C1E-74BE-4F8D-827B-AF978D01F3BD}" presName="Name37" presStyleLbl="parChTrans1D2" presStyleIdx="1" presStyleCnt="2"/>
-      <dgm:spPr/>
-    </dgm:pt>
-    <dgm:pt modelId="{D38ACC22-54FF-4127-8AB7-D1697E34B100}" type="pres">
-      <dgm:prSet presAssocID="{3C63B6D8-03B6-446F-92B2-40BEE7EA3DA6}" presName="hierRoot2" presStyleCnt="0">
-        <dgm:presLayoutVars>
-          <dgm:hierBranch val="init"/>
-        </dgm:presLayoutVars>
-      </dgm:prSet>
-      <dgm:spPr/>
-    </dgm:pt>
-    <dgm:pt modelId="{18589B92-1FDE-402A-8A04-6867194F5349}" type="pres">
-      <dgm:prSet presAssocID="{3C63B6D8-03B6-446F-92B2-40BEE7EA3DA6}" presName="rootComposite" presStyleCnt="0"/>
-      <dgm:spPr/>
-    </dgm:pt>
-    <dgm:pt modelId="{0645EB98-586A-4DCD-B836-3E3EEE58E52E}" type="pres">
-      <dgm:prSet presAssocID="{3C63B6D8-03B6-446F-92B2-40BEE7EA3DA6}" presName="rootText" presStyleLbl="node2" presStyleIdx="1" presStyleCnt="2">
-        <dgm:presLayoutVars>
-          <dgm:chPref val="3"/>
-        </dgm:presLayoutVars>
-      </dgm:prSet>
-      <dgm:spPr/>
-      <dgm:t>
-        <a:bodyPr/>
-        <a:lstStyle/>
-        <a:p>
-          <a:endParaRPr lang="en-US"/>
-        </a:p>
-      </dgm:t>
-    </dgm:pt>
-    <dgm:pt modelId="{44FE198B-48EF-4841-A19B-095E78FB73F6}" type="pres">
-      <dgm:prSet presAssocID="{3C63B6D8-03B6-446F-92B2-40BEE7EA3DA6}" presName="rootConnector" presStyleLbl="node2" presStyleIdx="1" presStyleCnt="2"/>
-      <dgm:spPr/>
-    </dgm:pt>
-    <dgm:pt modelId="{37113379-99D0-46B3-AD8E-24FA6BA30D66}" type="pres">
-      <dgm:prSet presAssocID="{3C63B6D8-03B6-446F-92B2-40BEE7EA3DA6}" presName="hierChild4" presStyleCnt="0"/>
-      <dgm:spPr/>
-    </dgm:pt>
-    <dgm:pt modelId="{5639C658-2BD7-4A83-BD78-4E05F0E6AB33}" type="pres">
-      <dgm:prSet presAssocID="{4B85568B-08F2-447E-8ACD-859B07B0C2FE}" presName="Name37" presStyleLbl="parChTrans1D3" presStyleIdx="0" presStyleCnt="2"/>
-      <dgm:spPr/>
-    </dgm:pt>
-    <dgm:pt modelId="{47FBFDAB-336C-4696-8DA1-F56DCA277A6E}" type="pres">
-      <dgm:prSet presAssocID="{3326A2DC-08EA-4603-9C9B-32AA62F5C864}" presName="hierRoot2" presStyleCnt="0">
-        <dgm:presLayoutVars>
-          <dgm:hierBranch val="init"/>
-        </dgm:presLayoutVars>
-      </dgm:prSet>
-      <dgm:spPr/>
-    </dgm:pt>
-    <dgm:pt modelId="{2733A5F7-E481-4414-AB9D-6063F874AB1D}" type="pres">
-      <dgm:prSet presAssocID="{3326A2DC-08EA-4603-9C9B-32AA62F5C864}" presName="rootComposite" presStyleCnt="0"/>
-      <dgm:spPr/>
-    </dgm:pt>
-    <dgm:pt modelId="{BC33716E-EF27-4F7C-BDAB-71B2ABEC9DF0}" type="pres">
-      <dgm:prSet presAssocID="{3326A2DC-08EA-4603-9C9B-32AA62F5C864}" presName="rootText" presStyleLbl="node3" presStyleIdx="0" presStyleCnt="2">
-        <dgm:presLayoutVars>
-          <dgm:chPref val="3"/>
-        </dgm:presLayoutVars>
-      </dgm:prSet>
-      <dgm:spPr/>
-      <dgm:t>
-        <a:bodyPr/>
-        <a:lstStyle/>
-        <a:p>
-          <a:endParaRPr lang="en-US"/>
-        </a:p>
-      </dgm:t>
-    </dgm:pt>
-    <dgm:pt modelId="{27FBED91-B74B-416F-ADA1-C8C6806F0406}" type="pres">
-      <dgm:prSet presAssocID="{3326A2DC-08EA-4603-9C9B-32AA62F5C864}" presName="rootConnector" presStyleLbl="node3" presStyleIdx="0" presStyleCnt="2"/>
-      <dgm:spPr/>
-    </dgm:pt>
-    <dgm:pt modelId="{57FCB84A-2BCE-4416-AD48-4EF35348E875}" type="pres">
-      <dgm:prSet presAssocID="{3326A2DC-08EA-4603-9C9B-32AA62F5C864}" presName="hierChild4" presStyleCnt="0"/>
-      <dgm:spPr/>
-    </dgm:pt>
-    <dgm:pt modelId="{7744116D-A8FC-40ED-87A3-3B586CAA8D1D}" type="pres">
-      <dgm:prSet presAssocID="{3326A2DC-08EA-4603-9C9B-32AA62F5C864}" presName="hierChild5" presStyleCnt="0"/>
-      <dgm:spPr/>
-    </dgm:pt>
-    <dgm:pt modelId="{F672C2DB-56F9-4B57-BEC3-70464139E944}" type="pres">
-      <dgm:prSet presAssocID="{1EC6A4E2-2B61-426A-A8C9-EA292C8D7D97}" presName="Name37" presStyleLbl="parChTrans1D3" presStyleIdx="1" presStyleCnt="2"/>
-      <dgm:spPr/>
-    </dgm:pt>
-    <dgm:pt modelId="{5F61C70F-6CD1-4E4D-8873-A73566BBD418}" type="pres">
-      <dgm:prSet presAssocID="{CF1C50AA-41C3-4932-BDF5-F4650C8B1E71}" presName="hierRoot2" presStyleCnt="0">
-        <dgm:presLayoutVars>
-          <dgm:hierBranch val="init"/>
-        </dgm:presLayoutVars>
-      </dgm:prSet>
-      <dgm:spPr/>
-    </dgm:pt>
-    <dgm:pt modelId="{86FFEEF0-86BF-47B6-A0E7-9E4935DD8227}" type="pres">
-      <dgm:prSet presAssocID="{CF1C50AA-41C3-4932-BDF5-F4650C8B1E71}" presName="rootComposite" presStyleCnt="0"/>
-      <dgm:spPr/>
-    </dgm:pt>
-    <dgm:pt modelId="{39D95C32-42CA-456A-A0FA-ACA16DD34769}" type="pres">
-      <dgm:prSet presAssocID="{CF1C50AA-41C3-4932-BDF5-F4650C8B1E71}" presName="rootText" presStyleLbl="node3" presStyleIdx="1" presStyleCnt="2">
-        <dgm:presLayoutVars>
-          <dgm:chPref val="3"/>
-        </dgm:presLayoutVars>
-      </dgm:prSet>
-      <dgm:spPr/>
-      <dgm:t>
-        <a:bodyPr/>
-        <a:lstStyle/>
-        <a:p>
-          <a:endParaRPr lang="en-US"/>
-        </a:p>
-      </dgm:t>
-    </dgm:pt>
-    <dgm:pt modelId="{C573AA09-49C0-40F9-984B-0E4CA2EDB9D5}" type="pres">
-      <dgm:prSet presAssocID="{CF1C50AA-41C3-4932-BDF5-F4650C8B1E71}" presName="rootConnector" presStyleLbl="node3" presStyleIdx="1" presStyleCnt="2"/>
-      <dgm:spPr/>
-    </dgm:pt>
-    <dgm:pt modelId="{0C4B4591-E654-4E0F-BE0D-E824EADE6C91}" type="pres">
-      <dgm:prSet presAssocID="{CF1C50AA-41C3-4932-BDF5-F4650C8B1E71}" presName="hierChild4" presStyleCnt="0"/>
-      <dgm:spPr/>
-    </dgm:pt>
-    <dgm:pt modelId="{55EC3252-659C-4C99-905C-02BEA301973B}" type="pres">
-      <dgm:prSet presAssocID="{CF1C50AA-41C3-4932-BDF5-F4650C8B1E71}" presName="hierChild5" presStyleCnt="0"/>
-      <dgm:spPr/>
-    </dgm:pt>
-    <dgm:pt modelId="{E5A5AA47-C69D-41A1-BC30-1DE9BEA08BE0}" type="pres">
-      <dgm:prSet presAssocID="{3C63B6D8-03B6-446F-92B2-40BEE7EA3DA6}" presName="hierChild5" presStyleCnt="0"/>
-      <dgm:spPr/>
-    </dgm:pt>
-    <dgm:pt modelId="{513ADA36-CAE2-4A0C-8E47-BCE657E512EE}" type="pres">
-      <dgm:prSet presAssocID="{B0ADAF9C-6C30-4E23-8508-4FA7AD2A7848}" presName="hierChild3" presStyleCnt="0"/>
-      <dgm:spPr/>
-    </dgm:pt>
-  </dgm:ptLst>
-  <dgm:cxnLst>
-    <dgm:cxn modelId="{21BE1FBB-4699-4FC9-BA01-E0C0B89CE602}" type="presOf" srcId="{3326A2DC-08EA-4603-9C9B-32AA62F5C864}" destId="{BC33716E-EF27-4F7C-BDAB-71B2ABEC9DF0}" srcOrd="0" destOrd="0" presId="urn:microsoft.com/office/officeart/2005/8/layout/orgChart1"/>
-    <dgm:cxn modelId="{7F723C5C-1D77-427D-A4FD-119B477564DB}" srcId="{B0ADAF9C-6C30-4E23-8508-4FA7AD2A7848}" destId="{3C63B6D8-03B6-446F-92B2-40BEE7EA3DA6}" srcOrd="1" destOrd="0" parTransId="{1B146C1E-74BE-4F8D-827B-AF978D01F3BD}" sibTransId="{E7A2B69A-CA81-4761-B221-CA8D05E706EA}"/>
-    <dgm:cxn modelId="{9EFE1485-5344-4FC6-BCD2-B87E4EEBBE82}" type="presOf" srcId="{B0ADAF9C-6C30-4E23-8508-4FA7AD2A7848}" destId="{E4DDD033-2C5D-416D-904F-10A129269413}" srcOrd="1" destOrd="0" presId="urn:microsoft.com/office/officeart/2005/8/layout/orgChart1"/>
-    <dgm:cxn modelId="{E54F1FFA-E9FB-4B79-B525-3F65E1BA0E04}" type="presOf" srcId="{3C63B6D8-03B6-446F-92B2-40BEE7EA3DA6}" destId="{44FE198B-48EF-4841-A19B-095E78FB73F6}" srcOrd="1" destOrd="0" presId="urn:microsoft.com/office/officeart/2005/8/layout/orgChart1"/>
-    <dgm:cxn modelId="{E61CC3F6-6627-4B90-BC36-23E6E76B102F}" type="presOf" srcId="{3326A2DC-08EA-4603-9C9B-32AA62F5C864}" destId="{27FBED91-B74B-416F-ADA1-C8C6806F0406}" srcOrd="1" destOrd="0" presId="urn:microsoft.com/office/officeart/2005/8/layout/orgChart1"/>
-    <dgm:cxn modelId="{3B1DB8ED-0F27-4DC0-9769-41F056669BF6}" type="presOf" srcId="{1B146C1E-74BE-4F8D-827B-AF978D01F3BD}" destId="{04D282F3-260E-4A5A-BE00-49DCD89279A9}" srcOrd="0" destOrd="0" presId="urn:microsoft.com/office/officeart/2005/8/layout/orgChart1"/>
-    <dgm:cxn modelId="{68185268-6B24-4AAF-93BE-5395A88A5FB0}" srcId="{3C63B6D8-03B6-446F-92B2-40BEE7EA3DA6}" destId="{CF1C50AA-41C3-4932-BDF5-F4650C8B1E71}" srcOrd="1" destOrd="0" parTransId="{1EC6A4E2-2B61-426A-A8C9-EA292C8D7D97}" sibTransId="{471064F5-EE27-47A4-8DC6-0518BBC39794}"/>
-    <dgm:cxn modelId="{0309876D-1A7E-45E7-BE79-2B8FC2C2D90C}" srcId="{C27691A8-FCE4-4FEB-A451-4A5EA187EB67}" destId="{B0ADAF9C-6C30-4E23-8508-4FA7AD2A7848}" srcOrd="0" destOrd="0" parTransId="{34ADD3B4-ED4D-4D20-96EA-801281A31C07}" sibTransId="{FF02142E-1F08-4564-94A8-C41EBE3A20CF}"/>
-    <dgm:cxn modelId="{36EEE7FA-AA02-4817-A221-01F5326BAABE}" type="presOf" srcId="{CF1C50AA-41C3-4932-BDF5-F4650C8B1E71}" destId="{C573AA09-49C0-40F9-984B-0E4CA2EDB9D5}" srcOrd="1" destOrd="0" presId="urn:microsoft.com/office/officeart/2005/8/layout/orgChart1"/>
-    <dgm:cxn modelId="{08F18BA8-3F79-457B-A6A7-F98377083B62}" type="presOf" srcId="{CF1C50AA-41C3-4932-BDF5-F4650C8B1E71}" destId="{39D95C32-42CA-456A-A0FA-ACA16DD34769}" srcOrd="0" destOrd="0" presId="urn:microsoft.com/office/officeart/2005/8/layout/orgChart1"/>
-    <dgm:cxn modelId="{42EE8868-A611-41B2-B3B2-AD15465BA30E}" srcId="{3C63B6D8-03B6-446F-92B2-40BEE7EA3DA6}" destId="{3326A2DC-08EA-4603-9C9B-32AA62F5C864}" srcOrd="0" destOrd="0" parTransId="{4B85568B-08F2-447E-8ACD-859B07B0C2FE}" sibTransId="{3402F55D-CE79-4CF6-845C-3CC03ECD6E58}"/>
-    <dgm:cxn modelId="{0D963521-8D90-4E7C-BF39-3F4838EF47F4}" srcId="{B0ADAF9C-6C30-4E23-8508-4FA7AD2A7848}" destId="{8A966797-98B1-4E01-95D7-DB1428427F69}" srcOrd="0" destOrd="0" parTransId="{E66AF807-E90C-462F-8417-C2A56E687749}" sibTransId="{DC81EB2D-702A-409F-81AB-F490B1369376}"/>
-    <dgm:cxn modelId="{6C6E6177-10B9-4F1A-AB2C-B5C0F41D661A}" type="presOf" srcId="{8A966797-98B1-4E01-95D7-DB1428427F69}" destId="{F080FFD0-E628-4673-8797-4006B01CAA2F}" srcOrd="0" destOrd="0" presId="urn:microsoft.com/office/officeart/2005/8/layout/orgChart1"/>
-    <dgm:cxn modelId="{336DB0AA-E6CF-458B-ABEA-DAFB17A4E722}" type="presOf" srcId="{1EC6A4E2-2B61-426A-A8C9-EA292C8D7D97}" destId="{F672C2DB-56F9-4B57-BEC3-70464139E944}" srcOrd="0" destOrd="0" presId="urn:microsoft.com/office/officeart/2005/8/layout/orgChart1"/>
-    <dgm:cxn modelId="{E6B76AF3-549F-4FDB-911A-3FBC9D4535D8}" type="presOf" srcId="{C27691A8-FCE4-4FEB-A451-4A5EA187EB67}" destId="{E3C94D6B-9473-4B75-B2D6-600D5819A349}" srcOrd="0" destOrd="0" presId="urn:microsoft.com/office/officeart/2005/8/layout/orgChart1"/>
-    <dgm:cxn modelId="{68DB1FF2-D15A-4897-8CFC-0DA7C2AF8BF2}" type="presOf" srcId="{4B85568B-08F2-447E-8ACD-859B07B0C2FE}" destId="{5639C658-2BD7-4A83-BD78-4E05F0E6AB33}" srcOrd="0" destOrd="0" presId="urn:microsoft.com/office/officeart/2005/8/layout/orgChart1"/>
-    <dgm:cxn modelId="{058E2C32-BF11-4C0A-B666-4600B6E936E6}" type="presOf" srcId="{3C63B6D8-03B6-446F-92B2-40BEE7EA3DA6}" destId="{0645EB98-586A-4DCD-B836-3E3EEE58E52E}" srcOrd="0" destOrd="0" presId="urn:microsoft.com/office/officeart/2005/8/layout/orgChart1"/>
-    <dgm:cxn modelId="{ED848360-D7CA-4732-AC55-4614543D1AA2}" type="presOf" srcId="{B0ADAF9C-6C30-4E23-8508-4FA7AD2A7848}" destId="{DA1DF513-0211-4E50-AC19-D95364F9EEAD}" srcOrd="0" destOrd="0" presId="urn:microsoft.com/office/officeart/2005/8/layout/orgChart1"/>
-    <dgm:cxn modelId="{E34B821E-9029-483E-9AC8-7C87D4CDD006}" type="presOf" srcId="{8A966797-98B1-4E01-95D7-DB1428427F69}" destId="{ED6C467A-0E9B-4151-BB54-B53CF409BE13}" srcOrd="1" destOrd="0" presId="urn:microsoft.com/office/officeart/2005/8/layout/orgChart1"/>
-    <dgm:cxn modelId="{6CFC55ED-A8ED-4DB5-AEFA-D44F88C1C047}" type="presOf" srcId="{E66AF807-E90C-462F-8417-C2A56E687749}" destId="{8800A970-562A-4D8F-A6DF-A5487E7E711D}" srcOrd="0" destOrd="0" presId="urn:microsoft.com/office/officeart/2005/8/layout/orgChart1"/>
-    <dgm:cxn modelId="{11ADC771-45AB-4D7E-848D-277DAC0F1524}" type="presParOf" srcId="{E3C94D6B-9473-4B75-B2D6-600D5819A349}" destId="{08E0B425-84D9-4291-AC34-5D71EDD8778C}" srcOrd="0" destOrd="0" presId="urn:microsoft.com/office/officeart/2005/8/layout/orgChart1"/>
-    <dgm:cxn modelId="{0D406673-B579-498B-9718-3837F153AF41}" type="presParOf" srcId="{08E0B425-84D9-4291-AC34-5D71EDD8778C}" destId="{AB18ECB2-E9F2-4093-A36A-92DDF935F27E}" srcOrd="0" destOrd="0" presId="urn:microsoft.com/office/officeart/2005/8/layout/orgChart1"/>
-    <dgm:cxn modelId="{521AAF7D-FC1B-4410-98EA-3F897C1042C6}" type="presParOf" srcId="{AB18ECB2-E9F2-4093-A36A-92DDF935F27E}" destId="{DA1DF513-0211-4E50-AC19-D95364F9EEAD}" srcOrd="0" destOrd="0" presId="urn:microsoft.com/office/officeart/2005/8/layout/orgChart1"/>
-    <dgm:cxn modelId="{7917DDA4-2E45-4ABA-85CF-0602480C787B}" type="presParOf" srcId="{AB18ECB2-E9F2-4093-A36A-92DDF935F27E}" destId="{E4DDD033-2C5D-416D-904F-10A129269413}" srcOrd="1" destOrd="0" presId="urn:microsoft.com/office/officeart/2005/8/layout/orgChart1"/>
-    <dgm:cxn modelId="{5E9C9BFE-B728-4F07-8FAC-B0B3F43BFAA0}" type="presParOf" srcId="{08E0B425-84D9-4291-AC34-5D71EDD8778C}" destId="{FE393823-B80C-40E6-9303-CE99527CA84B}" srcOrd="1" destOrd="0" presId="urn:microsoft.com/office/officeart/2005/8/layout/orgChart1"/>
-    <dgm:cxn modelId="{0EBCF60A-93ED-46D6-A369-60667E62DC53}" type="presParOf" srcId="{FE393823-B80C-40E6-9303-CE99527CA84B}" destId="{8800A970-562A-4D8F-A6DF-A5487E7E711D}" srcOrd="0" destOrd="0" presId="urn:microsoft.com/office/officeart/2005/8/layout/orgChart1"/>
-    <dgm:cxn modelId="{14A56794-A8DE-4A9D-8A0E-74E837959D6C}" type="presParOf" srcId="{FE393823-B80C-40E6-9303-CE99527CA84B}" destId="{4A5E1E19-7174-45E1-8910-4705C3A7FF95}" srcOrd="1" destOrd="0" presId="urn:microsoft.com/office/officeart/2005/8/layout/orgChart1"/>
-    <dgm:cxn modelId="{E8827F38-CA68-4195-94EB-69BF01217DD0}" type="presParOf" srcId="{4A5E1E19-7174-45E1-8910-4705C3A7FF95}" destId="{3F065280-ABBD-4FA1-8DED-07F5B0E3E141}" srcOrd="0" destOrd="0" presId="urn:microsoft.com/office/officeart/2005/8/layout/orgChart1"/>
-    <dgm:cxn modelId="{243DEFE7-F193-4640-A272-8561E86B1771}" type="presParOf" srcId="{3F065280-ABBD-4FA1-8DED-07F5B0E3E141}" destId="{F080FFD0-E628-4673-8797-4006B01CAA2F}" srcOrd="0" destOrd="0" presId="urn:microsoft.com/office/officeart/2005/8/layout/orgChart1"/>
-    <dgm:cxn modelId="{82E3356B-4392-4FD7-BBDA-454869DB5B96}" type="presParOf" srcId="{3F065280-ABBD-4FA1-8DED-07F5B0E3E141}" destId="{ED6C467A-0E9B-4151-BB54-B53CF409BE13}" srcOrd="1" destOrd="0" presId="urn:microsoft.com/office/officeart/2005/8/layout/orgChart1"/>
-    <dgm:cxn modelId="{CA2E32F3-FAFB-4416-9921-CE2FB5E689B1}" type="presParOf" srcId="{4A5E1E19-7174-45E1-8910-4705C3A7FF95}" destId="{644E2427-0440-481B-A5A7-9D16DD1BE7D8}" srcOrd="1" destOrd="0" presId="urn:microsoft.com/office/officeart/2005/8/layout/orgChart1"/>
-    <dgm:cxn modelId="{5DEF3056-2FC1-42A1-960F-4A62FC78568C}" type="presParOf" srcId="{4A5E1E19-7174-45E1-8910-4705C3A7FF95}" destId="{6E94FF00-C1AD-4A26-8260-C1F62D8BA54B}" srcOrd="2" destOrd="0" presId="urn:microsoft.com/office/officeart/2005/8/layout/orgChart1"/>
-    <dgm:cxn modelId="{EB66CC2C-17D7-4558-8241-F0CCCCA0BF71}" type="presParOf" srcId="{FE393823-B80C-40E6-9303-CE99527CA84B}" destId="{04D282F3-260E-4A5A-BE00-49DCD89279A9}" srcOrd="2" destOrd="0" presId="urn:microsoft.com/office/officeart/2005/8/layout/orgChart1"/>
-    <dgm:cxn modelId="{4DBF75BA-D4F0-403C-9A32-4F81E0BF7F59}" type="presParOf" srcId="{FE393823-B80C-40E6-9303-CE99527CA84B}" destId="{D38ACC22-54FF-4127-8AB7-D1697E34B100}" srcOrd="3" destOrd="0" presId="urn:microsoft.com/office/officeart/2005/8/layout/orgChart1"/>
-    <dgm:cxn modelId="{3E171E9E-EE5E-4DB9-9812-52C90078D9E7}" type="presParOf" srcId="{D38ACC22-54FF-4127-8AB7-D1697E34B100}" destId="{18589B92-1FDE-402A-8A04-6867194F5349}" srcOrd="0" destOrd="0" presId="urn:microsoft.com/office/officeart/2005/8/layout/orgChart1"/>
-    <dgm:cxn modelId="{727FCEAF-43FD-4CFC-BE41-ACD577CEE7FB}" type="presParOf" srcId="{18589B92-1FDE-402A-8A04-6867194F5349}" destId="{0645EB98-586A-4DCD-B836-3E3EEE58E52E}" srcOrd="0" destOrd="0" presId="urn:microsoft.com/office/officeart/2005/8/layout/orgChart1"/>
-    <dgm:cxn modelId="{29EB09C1-FCCE-4A8C-9426-7EC7F5DFD365}" type="presParOf" srcId="{18589B92-1FDE-402A-8A04-6867194F5349}" destId="{44FE198B-48EF-4841-A19B-095E78FB73F6}" srcOrd="1" destOrd="0" presId="urn:microsoft.com/office/officeart/2005/8/layout/orgChart1"/>
-    <dgm:cxn modelId="{F5EB8116-900E-4625-888E-4E9CB27CDBE3}" type="presParOf" srcId="{D38ACC22-54FF-4127-8AB7-D1697E34B100}" destId="{37113379-99D0-46B3-AD8E-24FA6BA30D66}" srcOrd="1" destOrd="0" presId="urn:microsoft.com/office/officeart/2005/8/layout/orgChart1"/>
-    <dgm:cxn modelId="{9C67DD28-234E-453A-9C51-4B2CE94091ED}" type="presParOf" srcId="{37113379-99D0-46B3-AD8E-24FA6BA30D66}" destId="{5639C658-2BD7-4A83-BD78-4E05F0E6AB33}" srcOrd="0" destOrd="0" presId="urn:microsoft.com/office/officeart/2005/8/layout/orgChart1"/>
-    <dgm:cxn modelId="{6440BB8A-EFF0-4578-A778-6C47F16CEDC1}" type="presParOf" srcId="{37113379-99D0-46B3-AD8E-24FA6BA30D66}" destId="{47FBFDAB-336C-4696-8DA1-F56DCA277A6E}" srcOrd="1" destOrd="0" presId="urn:microsoft.com/office/officeart/2005/8/layout/orgChart1"/>
-    <dgm:cxn modelId="{770926D4-99B7-4B10-9BEF-1F14DCABA584}" type="presParOf" srcId="{47FBFDAB-336C-4696-8DA1-F56DCA277A6E}" destId="{2733A5F7-E481-4414-AB9D-6063F874AB1D}" srcOrd="0" destOrd="0" presId="urn:microsoft.com/office/officeart/2005/8/layout/orgChart1"/>
-    <dgm:cxn modelId="{C5FD2D4F-8AC6-477B-A830-03B6715C2867}" type="presParOf" srcId="{2733A5F7-E481-4414-AB9D-6063F874AB1D}" destId="{BC33716E-EF27-4F7C-BDAB-71B2ABEC9DF0}" srcOrd="0" destOrd="0" presId="urn:microsoft.com/office/officeart/2005/8/layout/orgChart1"/>
-    <dgm:cxn modelId="{D950A65B-E8E2-4C1B-A3D6-CE48728C542F}" type="presParOf" srcId="{2733A5F7-E481-4414-AB9D-6063F874AB1D}" destId="{27FBED91-B74B-416F-ADA1-C8C6806F0406}" srcOrd="1" destOrd="0" presId="urn:microsoft.com/office/officeart/2005/8/layout/orgChart1"/>
-    <dgm:cxn modelId="{43B349A0-BC76-4681-ACE9-A3B1240E4C41}" type="presParOf" srcId="{47FBFDAB-336C-4696-8DA1-F56DCA277A6E}" destId="{57FCB84A-2BCE-4416-AD48-4EF35348E875}" srcOrd="1" destOrd="0" presId="urn:microsoft.com/office/officeart/2005/8/layout/orgChart1"/>
-    <dgm:cxn modelId="{7C90BD87-36AD-4583-88A2-84F5A4CB2FF1}" type="presParOf" srcId="{47FBFDAB-336C-4696-8DA1-F56DCA277A6E}" destId="{7744116D-A8FC-40ED-87A3-3B586CAA8D1D}" srcOrd="2" destOrd="0" presId="urn:microsoft.com/office/officeart/2005/8/layout/orgChart1"/>
-    <dgm:cxn modelId="{9537F61B-A61D-4186-8911-A73AE1A464A8}" type="presParOf" srcId="{37113379-99D0-46B3-AD8E-24FA6BA30D66}" destId="{F672C2DB-56F9-4B57-BEC3-70464139E944}" srcOrd="2" destOrd="0" presId="urn:microsoft.com/office/officeart/2005/8/layout/orgChart1"/>
-    <dgm:cxn modelId="{7BDEE341-CBC2-431D-818A-61757B6D2D84}" type="presParOf" srcId="{37113379-99D0-46B3-AD8E-24FA6BA30D66}" destId="{5F61C70F-6CD1-4E4D-8873-A73566BBD418}" srcOrd="3" destOrd="0" presId="urn:microsoft.com/office/officeart/2005/8/layout/orgChart1"/>
-    <dgm:cxn modelId="{5189CA86-7BDE-4A01-B3B0-ED6C0E43722D}" type="presParOf" srcId="{5F61C70F-6CD1-4E4D-8873-A73566BBD418}" destId="{86FFEEF0-86BF-47B6-A0E7-9E4935DD8227}" srcOrd="0" destOrd="0" presId="urn:microsoft.com/office/officeart/2005/8/layout/orgChart1"/>
-    <dgm:cxn modelId="{72DDE198-B557-469F-B71F-CF661D54BB87}" type="presParOf" srcId="{86FFEEF0-86BF-47B6-A0E7-9E4935DD8227}" destId="{39D95C32-42CA-456A-A0FA-ACA16DD34769}" srcOrd="0" destOrd="0" presId="urn:microsoft.com/office/officeart/2005/8/layout/orgChart1"/>
-    <dgm:cxn modelId="{D4FDA357-AEC7-4E37-AB74-B2086C30EE64}" type="presParOf" srcId="{86FFEEF0-86BF-47B6-A0E7-9E4935DD8227}" destId="{C573AA09-49C0-40F9-984B-0E4CA2EDB9D5}" srcOrd="1" destOrd="0" presId="urn:microsoft.com/office/officeart/2005/8/layout/orgChart1"/>
-    <dgm:cxn modelId="{361D4D1C-89F1-4C1E-BE03-935E4DDDE015}" type="presParOf" srcId="{5F61C70F-6CD1-4E4D-8873-A73566BBD418}" destId="{0C4B4591-E654-4E0F-BE0D-E824EADE6C91}" srcOrd="1" destOrd="0" presId="urn:microsoft.com/office/officeart/2005/8/layout/orgChart1"/>
-    <dgm:cxn modelId="{5B5AFC05-F06F-4685-B229-D54771662480}" type="presParOf" srcId="{5F61C70F-6CD1-4E4D-8873-A73566BBD418}" destId="{55EC3252-659C-4C99-905C-02BEA301973B}" srcOrd="2" destOrd="0" presId="urn:microsoft.com/office/officeart/2005/8/layout/orgChart1"/>
-    <dgm:cxn modelId="{F80BB52D-8E1C-4AEF-AF15-1DA7F19B6C74}" type="presParOf" srcId="{D38ACC22-54FF-4127-8AB7-D1697E34B100}" destId="{E5A5AA47-C69D-41A1-BC30-1DE9BEA08BE0}" srcOrd="2" destOrd="0" presId="urn:microsoft.com/office/officeart/2005/8/layout/orgChart1"/>
-    <dgm:cxn modelId="{14A27332-07F4-4E0B-A424-720AD8CFD356}" type="presParOf" srcId="{08E0B425-84D9-4291-AC34-5D71EDD8778C}" destId="{513ADA36-CAE2-4A0C-8E47-BCE657E512EE}" srcOrd="2" destOrd="0" presId="urn:microsoft.com/office/officeart/2005/8/layout/orgChart1"/>
-  </dgm:cxnLst>
-  <dgm:bg/>
-  <dgm:whole/>
-  <dgm:extLst>
-    <a:ext uri="http://schemas.microsoft.com/office/drawing/2008/diagram">
-      <dsp:dataModelExt xmlns:dsp="http://schemas.microsoft.com/office/drawing/2008/diagram" relId="rId6" minVer="http://schemas.openxmlformats.org/drawingml/2006/diagram"/>
-    </a:ext>
-  </dgm:extLst>
-</dgm:dataModel>
-</file>
-
 <file path=ppt/diagrams/drawing1.xml><?xml version="1.0" encoding="utf-8"?>
-<dsp:drawing xmlns:dgm="http://schemas.openxmlformats.org/drawingml/2006/diagram" xmlns:dsp="http://schemas.microsoft.com/office/drawing/2008/diagram" xmlns:a="http://schemas.openxmlformats.org/drawingml/2006/main">
-  <dsp:spTree>
-    <dsp:nvGrpSpPr>
-      <dsp:cNvPr id="0" name=""/>
-      <dsp:cNvGrpSpPr/>
-    </dsp:nvGrpSpPr>
-    <dsp:grpSpPr/>
-    <dsp:sp modelId="{3B84BF06-5215-4FCB-A48A-56981FC939CD}">
-      <dsp:nvSpPr>
-        <dsp:cNvPr id="0" name=""/>
-        <dsp:cNvSpPr/>
-      </dsp:nvSpPr>
-      <dsp:spPr>
-        <a:xfrm>
-          <a:off x="0" y="748241"/>
-          <a:ext cx="3468687" cy="3439800"/>
-        </a:xfrm>
-        <a:prstGeom prst="rect">
-          <a:avLst/>
-        </a:prstGeom>
-        <a:solidFill>
-          <a:schemeClr val="lt1">
-            <a:alpha val="90000"/>
-            <a:hueOff val="0"/>
-            <a:satOff val="0"/>
-            <a:lumOff val="0"/>
-            <a:alphaOff val="0"/>
-          </a:schemeClr>
-        </a:solidFill>
-        <a:ln w="15875" cap="rnd" cmpd="sng" algn="ctr">
-          <a:solidFill>
-            <a:schemeClr val="accent1">
-              <a:hueOff val="0"/>
-              <a:satOff val="0"/>
-              <a:lumOff val="0"/>
-              <a:alphaOff val="0"/>
-            </a:schemeClr>
-          </a:solidFill>
-          <a:prstDash val="solid"/>
-        </a:ln>
-        <a:effectLst/>
-      </dsp:spPr>
-      <dsp:style>
-        <a:lnRef idx="2">
-          <a:scrgbClr r="0" g="0" b="0"/>
-        </a:lnRef>
-        <a:fillRef idx="1">
-          <a:scrgbClr r="0" g="0" b="0"/>
-        </a:fillRef>
-        <a:effectRef idx="0">
-          <a:scrgbClr r="0" g="0" b="0"/>
-        </a:effectRef>
-        <a:fontRef idx="minor"/>
-      </dsp:style>
-      <dsp:txBody>
-        <a:bodyPr spcFirstLastPara="0" vert="horz" wrap="square" lIns="269209" tIns="291592" rIns="269209" bIns="99568" numCol="1" spcCol="1270" anchor="t" anchorCtr="0">
-          <a:noAutofit/>
-        </a:bodyPr>
-        <a:lstStyle/>
-        <a:p>
-          <a:pPr marL="114300" lvl="1" indent="-114300" algn="l" defTabSz="622300">
-            <a:lnSpc>
-              <a:spcPct val="90000"/>
-            </a:lnSpc>
-            <a:spcBef>
-              <a:spcPct val="0"/>
-            </a:spcBef>
-            <a:spcAft>
-              <a:spcPct val="15000"/>
-            </a:spcAft>
-            <a:buChar char="••"/>
-          </a:pPr>
-          <a:r>
-            <a:rPr lang="en-US" sz="1400" kern="1200" dirty="0" smtClean="0"/>
-            <a:t>Coverslip</a:t>
-          </a:r>
-          <a:endParaRPr lang="en-US" sz="1400" kern="1200" dirty="0"/>
-        </a:p>
-        <a:p>
-          <a:pPr marL="228600" lvl="2" indent="-114300" algn="l" defTabSz="622300">
-            <a:lnSpc>
-              <a:spcPct val="90000"/>
-            </a:lnSpc>
-            <a:spcBef>
-              <a:spcPct val="0"/>
-            </a:spcBef>
-            <a:spcAft>
-              <a:spcPct val="15000"/>
-            </a:spcAft>
-            <a:buChar char="••"/>
-          </a:pPr>
-          <a:r>
-            <a:rPr lang="en-US" sz="1400" kern="1200" dirty="0" smtClean="0"/>
-            <a:t>Positioner</a:t>
-          </a:r>
-          <a:br>
-            <a:rPr lang="en-US" sz="1400" kern="1200" dirty="0" smtClean="0"/>
-          </a:br>
-          <a:endParaRPr lang="en-US" sz="1400" kern="1200" dirty="0"/>
-        </a:p>
-        <a:p>
-          <a:pPr marL="114300" lvl="1" indent="-114300" algn="l" defTabSz="622300">
-            <a:lnSpc>
-              <a:spcPct val="90000"/>
-            </a:lnSpc>
-            <a:spcBef>
-              <a:spcPct val="0"/>
-            </a:spcBef>
-            <a:spcAft>
-              <a:spcPct val="15000"/>
-            </a:spcAft>
-            <a:buChar char="••"/>
-          </a:pPr>
-          <a:r>
-            <a:rPr lang="en-US" sz="1400" kern="1200" dirty="0" smtClean="0"/>
-            <a:t>Whisker</a:t>
-          </a:r>
-          <a:endParaRPr lang="en-US" sz="1400" kern="1200" dirty="0"/>
-        </a:p>
-        <a:p>
-          <a:pPr marL="228600" lvl="2" indent="-114300" algn="l" defTabSz="622300">
-            <a:lnSpc>
-              <a:spcPct val="90000"/>
-            </a:lnSpc>
-            <a:spcBef>
-              <a:spcPct val="0"/>
-            </a:spcBef>
-            <a:spcAft>
-              <a:spcPct val="15000"/>
-            </a:spcAft>
-            <a:buChar char="••"/>
-          </a:pPr>
-          <a:r>
-            <a:rPr lang="en-US" sz="1400" kern="1200" dirty="0" smtClean="0"/>
-            <a:t>Positioner</a:t>
-          </a:r>
-          <a:br>
-            <a:rPr lang="en-US" sz="1400" kern="1200" dirty="0" smtClean="0"/>
-          </a:br>
-          <a:endParaRPr lang="en-US" sz="1400" kern="1200" dirty="0"/>
-        </a:p>
-        <a:p>
-          <a:pPr marL="114300" lvl="1" indent="-114300" algn="l" defTabSz="622300">
-            <a:lnSpc>
-              <a:spcPct val="90000"/>
-            </a:lnSpc>
-            <a:spcBef>
-              <a:spcPct val="0"/>
-            </a:spcBef>
-            <a:spcAft>
-              <a:spcPct val="15000"/>
-            </a:spcAft>
-            <a:buChar char="••"/>
-          </a:pPr>
-          <a:r>
-            <a:rPr lang="en-US" sz="1400" kern="1200" dirty="0" smtClean="0"/>
-            <a:t>Camera</a:t>
-          </a:r>
-          <a:br>
-            <a:rPr lang="en-US" sz="1400" kern="1200" dirty="0" smtClean="0"/>
-          </a:br>
-          <a:endParaRPr lang="en-US" sz="1400" kern="1200" dirty="0"/>
-        </a:p>
-        <a:p>
-          <a:pPr marL="114300" lvl="1" indent="-114300" algn="l" defTabSz="622300">
-            <a:lnSpc>
-              <a:spcPct val="90000"/>
-            </a:lnSpc>
-            <a:spcBef>
-              <a:spcPct val="0"/>
-            </a:spcBef>
-            <a:spcAft>
-              <a:spcPct val="15000"/>
-            </a:spcAft>
-            <a:buChar char="••"/>
-          </a:pPr>
-          <a:r>
-            <a:rPr lang="en-US" sz="1400" kern="1200" dirty="0" smtClean="0"/>
-            <a:t>Settings</a:t>
-          </a:r>
-          <a:endParaRPr lang="en-US" sz="1400" kern="1200" dirty="0"/>
-        </a:p>
-        <a:p>
-          <a:pPr marL="114300" lvl="1" indent="-114300" algn="l" defTabSz="622300">
-            <a:lnSpc>
-              <a:spcPct val="90000"/>
-            </a:lnSpc>
-            <a:spcBef>
-              <a:spcPct val="0"/>
-            </a:spcBef>
-            <a:spcAft>
-              <a:spcPct val="15000"/>
-            </a:spcAft>
-            <a:buChar char="••"/>
-          </a:pPr>
-          <a:r>
-            <a:rPr lang="en-US" sz="1400" kern="1200" dirty="0" smtClean="0"/>
-            <a:t>Initialize()</a:t>
-          </a:r>
-          <a:endParaRPr lang="en-US" sz="1400" kern="1200" dirty="0"/>
-        </a:p>
-        <a:p>
-          <a:pPr marL="114300" lvl="1" indent="-114300" algn="l" defTabSz="622300">
-            <a:lnSpc>
-              <a:spcPct val="90000"/>
-            </a:lnSpc>
-            <a:spcBef>
-              <a:spcPct val="0"/>
-            </a:spcBef>
-            <a:spcAft>
-              <a:spcPct val="15000"/>
-            </a:spcAft>
-            <a:buChar char="••"/>
-          </a:pPr>
-          <a:r>
-            <a:rPr lang="en-US" sz="1400" kern="1200" dirty="0" smtClean="0"/>
-            <a:t>Stow()</a:t>
-          </a:r>
-          <a:br>
-            <a:rPr lang="en-US" sz="1400" kern="1200" dirty="0" smtClean="0"/>
-          </a:br>
-          <a:endParaRPr lang="en-US" sz="1400" kern="1200" dirty="0"/>
-        </a:p>
-        <a:p>
-          <a:pPr marL="228600" lvl="2" indent="-114300" algn="l" defTabSz="622300">
-            <a:lnSpc>
-              <a:spcPct val="90000"/>
-            </a:lnSpc>
-            <a:spcBef>
-              <a:spcPct val="0"/>
-            </a:spcBef>
-            <a:spcAft>
-              <a:spcPct val="15000"/>
-            </a:spcAft>
-            <a:buChar char="••"/>
-          </a:pPr>
-          <a:endParaRPr lang="en-US" sz="1400" kern="1200" dirty="0"/>
-        </a:p>
-        <a:p>
-          <a:pPr marL="114300" lvl="1" indent="-114300" algn="l" defTabSz="622300">
-            <a:lnSpc>
-              <a:spcPct val="90000"/>
-            </a:lnSpc>
-            <a:spcBef>
-              <a:spcPct val="0"/>
-            </a:spcBef>
-            <a:spcAft>
-              <a:spcPct val="15000"/>
-            </a:spcAft>
-            <a:buChar char="••"/>
-          </a:pPr>
-          <a:endParaRPr lang="en-US" sz="1400" kern="1200" dirty="0"/>
-        </a:p>
-      </dsp:txBody>
-      <dsp:txXfrm>
-        <a:off x="0" y="748241"/>
-        <a:ext cx="3468687" cy="3439800"/>
-      </dsp:txXfrm>
-    </dsp:sp>
-    <dsp:sp modelId="{82C996F2-0ACD-4DD0-BE97-B8AED07A97C6}">
-      <dsp:nvSpPr>
-        <dsp:cNvPr id="0" name=""/>
-        <dsp:cNvSpPr/>
-      </dsp:nvSpPr>
-      <dsp:spPr>
-        <a:xfrm>
-          <a:off x="173434" y="66458"/>
-          <a:ext cx="2428080" cy="888423"/>
-        </a:xfrm>
-        <a:prstGeom prst="roundRect">
-          <a:avLst/>
-        </a:prstGeom>
-        <a:solidFill>
-          <a:schemeClr val="accent1">
-            <a:hueOff val="0"/>
-            <a:satOff val="0"/>
-            <a:lumOff val="0"/>
-            <a:alphaOff val="0"/>
-          </a:schemeClr>
-        </a:solidFill>
-        <a:ln w="15875" cap="rnd" cmpd="sng" algn="ctr">
-          <a:solidFill>
-            <a:schemeClr val="lt1">
-              <a:hueOff val="0"/>
-              <a:satOff val="0"/>
-              <a:lumOff val="0"/>
-              <a:alphaOff val="0"/>
-            </a:schemeClr>
-          </a:solidFill>
-          <a:prstDash val="solid"/>
-        </a:ln>
-        <a:effectLst/>
-      </dsp:spPr>
-      <dsp:style>
-        <a:lnRef idx="2">
-          <a:scrgbClr r="0" g="0" b="0"/>
-        </a:lnRef>
-        <a:fillRef idx="1">
-          <a:scrgbClr r="0" g="0" b="0"/>
-        </a:fillRef>
-        <a:effectRef idx="0">
-          <a:scrgbClr r="0" g="0" b="0"/>
-        </a:effectRef>
-        <a:fontRef idx="minor">
-          <a:schemeClr val="lt1"/>
-        </a:fontRef>
-      </dsp:style>
-      <dsp:txBody>
-        <a:bodyPr spcFirstLastPara="0" vert="horz" wrap="square" lIns="91776" tIns="0" rIns="91776" bIns="0" numCol="1" spcCol="1270" anchor="ctr" anchorCtr="0">
-          <a:noAutofit/>
-        </a:bodyPr>
-        <a:lstStyle/>
-        <a:p>
-          <a:pPr lvl="0" algn="l" defTabSz="1066800">
-            <a:lnSpc>
-              <a:spcPct val="90000"/>
-            </a:lnSpc>
-            <a:spcBef>
-              <a:spcPct val="0"/>
-            </a:spcBef>
-            <a:spcAft>
-              <a:spcPct val="35000"/>
-            </a:spcAft>
-          </a:pPr>
-          <a:r>
-            <a:rPr lang="en-US" sz="2400" kern="1200" dirty="0" err="1" smtClean="0"/>
-            <a:t>ArrayBot</a:t>
-          </a:r>
-          <a:endParaRPr lang="en-US" sz="2400" kern="1200" dirty="0"/>
-        </a:p>
-      </dsp:txBody>
-      <dsp:txXfrm>
-        <a:off x="216803" y="109827"/>
-        <a:ext cx="2341342" cy="801685"/>
-      </dsp:txXfrm>
-    </dsp:sp>
-  </dsp:spTree>
-</dsp:drawing>
-</file>
-
-<file path=ppt/diagrams/drawing2.xml><?xml version="1.0" encoding="utf-8"?>
-<dsp:drawing xmlns:dgm="http://schemas.openxmlformats.org/drawingml/2006/diagram" xmlns:dsp="http://schemas.microsoft.com/office/drawing/2008/diagram" xmlns:a="http://schemas.openxmlformats.org/drawingml/2006/main">
-  <dsp:spTree>
-    <dsp:nvGrpSpPr>
-      <dsp:cNvPr id="0" name=""/>
-      <dsp:cNvGrpSpPr/>
-    </dsp:nvGrpSpPr>
-    <dsp:grpSpPr/>
-    <dsp:sp modelId="{824034AE-157F-469F-915C-EC6DAE34225C}">
-      <dsp:nvSpPr>
-        <dsp:cNvPr id="0" name=""/>
-        <dsp:cNvSpPr/>
-      </dsp:nvSpPr>
-      <dsp:spPr>
-        <a:xfrm>
-          <a:off x="0" y="366808"/>
-          <a:ext cx="2997200" cy="3786091"/>
-        </a:xfrm>
-        <a:prstGeom prst="rect">
-          <a:avLst/>
-        </a:prstGeom>
-        <a:solidFill>
-          <a:schemeClr val="lt1">
-            <a:alpha val="90000"/>
-            <a:hueOff val="0"/>
-            <a:satOff val="0"/>
-            <a:lumOff val="0"/>
-            <a:alphaOff val="0"/>
-          </a:schemeClr>
-        </a:solidFill>
-        <a:ln w="15875" cap="rnd" cmpd="sng" algn="ctr">
-          <a:solidFill>
-            <a:schemeClr val="accent1">
-              <a:hueOff val="0"/>
-              <a:satOff val="0"/>
-              <a:lumOff val="0"/>
-              <a:alphaOff val="0"/>
-            </a:schemeClr>
-          </a:solidFill>
-          <a:prstDash val="solid"/>
-        </a:ln>
-        <a:effectLst/>
-      </dsp:spPr>
-      <dsp:style>
-        <a:lnRef idx="2">
-          <a:scrgbClr r="0" g="0" b="0"/>
-        </a:lnRef>
-        <a:fillRef idx="1">
-          <a:scrgbClr r="0" g="0" b="0"/>
-        </a:fillRef>
-        <a:effectRef idx="0">
-          <a:scrgbClr r="0" g="0" b="0"/>
-        </a:effectRef>
-        <a:fontRef idx="minor"/>
-      </dsp:style>
-      <dsp:txBody>
-        <a:bodyPr spcFirstLastPara="0" vert="horz" wrap="square" lIns="232616" tIns="437388" rIns="232616" bIns="135128" numCol="1" spcCol="1270" anchor="t" anchorCtr="0">
-          <a:noAutofit/>
-        </a:bodyPr>
-        <a:lstStyle/>
-        <a:p>
-          <a:pPr marL="171450" lvl="1" indent="-171450" algn="l" defTabSz="844550">
-            <a:lnSpc>
-              <a:spcPct val="90000"/>
-            </a:lnSpc>
-            <a:spcBef>
-              <a:spcPct val="0"/>
-            </a:spcBef>
-            <a:spcAft>
-              <a:spcPct val="15000"/>
-            </a:spcAft>
-            <a:buChar char="••"/>
-          </a:pPr>
-          <a:r>
-            <a:rPr lang="en-US" sz="1900" kern="1200" dirty="0" smtClean="0"/>
-            <a:t>X, Y, Z Position Controller</a:t>
-          </a:r>
-          <a:endParaRPr lang="en-US" sz="1900" kern="1200" dirty="0"/>
-        </a:p>
-        <a:p>
-          <a:pPr marL="171450" lvl="1" indent="-171450" algn="l" defTabSz="844550">
-            <a:lnSpc>
-              <a:spcPct val="90000"/>
-            </a:lnSpc>
-            <a:spcBef>
-              <a:spcPct val="0"/>
-            </a:spcBef>
-            <a:spcAft>
-              <a:spcPct val="15000"/>
-            </a:spcAft>
-            <a:buChar char="••"/>
-          </a:pPr>
-          <a:r>
-            <a:rPr lang="en-US" sz="1900" kern="1200" dirty="0" smtClean="0"/>
-            <a:t>Settings</a:t>
-          </a:r>
-          <a:br>
-            <a:rPr lang="en-US" sz="1900" kern="1200" dirty="0" smtClean="0"/>
-          </a:br>
-          <a:endParaRPr lang="en-US" sz="1900" kern="1200" dirty="0"/>
-        </a:p>
-        <a:p>
-          <a:pPr marL="171450" lvl="1" indent="-171450" algn="l" defTabSz="844550">
-            <a:lnSpc>
-              <a:spcPct val="90000"/>
-            </a:lnSpc>
-            <a:spcBef>
-              <a:spcPct val="0"/>
-            </a:spcBef>
-            <a:spcAft>
-              <a:spcPct val="15000"/>
-            </a:spcAft>
-            <a:buChar char="••"/>
-          </a:pPr>
-          <a:r>
-            <a:rPr lang="en-US" sz="1900" kern="1200" dirty="0" smtClean="0"/>
-            <a:t>Initialize()</a:t>
-          </a:r>
-          <a:endParaRPr lang="en-US" sz="1900" kern="1200" dirty="0"/>
-        </a:p>
-        <a:p>
-          <a:pPr marL="171450" lvl="1" indent="-171450" algn="l" defTabSz="844550">
-            <a:lnSpc>
-              <a:spcPct val="90000"/>
-            </a:lnSpc>
-            <a:spcBef>
-              <a:spcPct val="0"/>
-            </a:spcBef>
-            <a:spcAft>
-              <a:spcPct val="15000"/>
-            </a:spcAft>
-            <a:buChar char="••"/>
-          </a:pPr>
-          <a:r>
-            <a:rPr lang="en-US" sz="1900" kern="1200" dirty="0" smtClean="0"/>
-            <a:t>Stow()</a:t>
-          </a:r>
-          <a:endParaRPr lang="en-US" sz="1900" kern="1200" dirty="0"/>
-        </a:p>
-        <a:p>
-          <a:pPr marL="171450" lvl="1" indent="-171450" algn="l" defTabSz="844550">
-            <a:lnSpc>
-              <a:spcPct val="90000"/>
-            </a:lnSpc>
-            <a:spcBef>
-              <a:spcPct val="0"/>
-            </a:spcBef>
-            <a:spcAft>
-              <a:spcPct val="15000"/>
-            </a:spcAft>
-            <a:buChar char="••"/>
-          </a:pPr>
-          <a:r>
-            <a:rPr lang="en-US" sz="1900" kern="1200" dirty="0" smtClean="0"/>
-            <a:t>Move to Defined location()</a:t>
-          </a:r>
-          <a:endParaRPr lang="en-US" sz="1900" kern="1200" dirty="0"/>
-        </a:p>
-        <a:p>
-          <a:pPr marL="171450" lvl="1" indent="-171450" algn="l" defTabSz="844550">
-            <a:lnSpc>
-              <a:spcPct val="90000"/>
-            </a:lnSpc>
-            <a:spcBef>
-              <a:spcPct val="0"/>
-            </a:spcBef>
-            <a:spcAft>
-              <a:spcPct val="15000"/>
-            </a:spcAft>
-            <a:buChar char="••"/>
-          </a:pPr>
-          <a:endParaRPr lang="en-US" sz="1900" kern="1200" dirty="0"/>
-        </a:p>
-      </dsp:txBody>
-      <dsp:txXfrm>
-        <a:off x="0" y="366808"/>
-        <a:ext cx="2997200" cy="3786091"/>
-      </dsp:txXfrm>
-    </dsp:sp>
-    <dsp:sp modelId="{1101DBBA-AC85-4020-A333-5D67476C6769}">
-      <dsp:nvSpPr>
-        <dsp:cNvPr id="0" name=""/>
-        <dsp:cNvSpPr/>
-      </dsp:nvSpPr>
-      <dsp:spPr>
-        <a:xfrm>
-          <a:off x="149860" y="28424"/>
-          <a:ext cx="2098040" cy="619920"/>
-        </a:xfrm>
-        <a:prstGeom prst="roundRect">
-          <a:avLst/>
-        </a:prstGeom>
-        <a:solidFill>
-          <a:schemeClr val="accent1">
-            <a:hueOff val="0"/>
-            <a:satOff val="0"/>
-            <a:lumOff val="0"/>
-            <a:alphaOff val="0"/>
-          </a:schemeClr>
-        </a:solidFill>
-        <a:ln w="15875" cap="rnd" cmpd="sng" algn="ctr">
-          <a:solidFill>
-            <a:schemeClr val="lt1">
-              <a:hueOff val="0"/>
-              <a:satOff val="0"/>
-              <a:lumOff val="0"/>
-              <a:alphaOff val="0"/>
-            </a:schemeClr>
-          </a:solidFill>
-          <a:prstDash val="solid"/>
-        </a:ln>
-        <a:effectLst/>
-      </dsp:spPr>
-      <dsp:style>
-        <a:lnRef idx="2">
-          <a:scrgbClr r="0" g="0" b="0"/>
-        </a:lnRef>
-        <a:fillRef idx="1">
-          <a:scrgbClr r="0" g="0" b="0"/>
-        </a:fillRef>
-        <a:effectRef idx="0">
-          <a:scrgbClr r="0" g="0" b="0"/>
-        </a:effectRef>
-        <a:fontRef idx="minor">
-          <a:schemeClr val="lt1"/>
-        </a:fontRef>
-      </dsp:style>
-      <dsp:txBody>
-        <a:bodyPr spcFirstLastPara="0" vert="horz" wrap="square" lIns="79301" tIns="0" rIns="79301" bIns="0" numCol="1" spcCol="1270" anchor="ctr" anchorCtr="0">
-          <a:noAutofit/>
-        </a:bodyPr>
-        <a:lstStyle/>
-        <a:p>
-          <a:pPr lvl="0" algn="l" defTabSz="933450">
-            <a:lnSpc>
-              <a:spcPct val="90000"/>
-            </a:lnSpc>
-            <a:spcBef>
-              <a:spcPct val="0"/>
-            </a:spcBef>
-            <a:spcAft>
-              <a:spcPct val="35000"/>
-            </a:spcAft>
-          </a:pPr>
-          <a:r>
-            <a:rPr lang="en-US" sz="2100" kern="1200" dirty="0" smtClean="0"/>
-            <a:t>Positioner (3D)</a:t>
-          </a:r>
-          <a:endParaRPr lang="en-US" sz="2100" kern="1200" dirty="0"/>
-        </a:p>
-      </dsp:txBody>
-      <dsp:txXfrm>
-        <a:off x="180122" y="58686"/>
-        <a:ext cx="2037516" cy="559396"/>
-      </dsp:txXfrm>
-    </dsp:sp>
-  </dsp:spTree>
-</dsp:drawing>
-</file>
-
-<file path=ppt/diagrams/drawing3.xml><?xml version="1.0" encoding="utf-8"?>
-<dsp:drawing xmlns:dgm="http://schemas.openxmlformats.org/drawingml/2006/diagram" xmlns:dsp="http://schemas.microsoft.com/office/drawing/2008/diagram" xmlns:a="http://schemas.openxmlformats.org/drawingml/2006/main">
-  <dsp:spTree>
-    <dsp:nvGrpSpPr>
-      <dsp:cNvPr id="0" name=""/>
-      <dsp:cNvGrpSpPr/>
-    </dsp:nvGrpSpPr>
-    <dsp:grpSpPr/>
-    <dsp:sp modelId="{824034AE-157F-469F-915C-EC6DAE34225C}">
-      <dsp:nvSpPr>
-        <dsp:cNvPr id="0" name=""/>
-        <dsp:cNvSpPr/>
-      </dsp:nvSpPr>
-      <dsp:spPr>
-        <a:xfrm>
-          <a:off x="0" y="830074"/>
-          <a:ext cx="3873500" cy="3602225"/>
-        </a:xfrm>
-        <a:prstGeom prst="rect">
-          <a:avLst/>
-        </a:prstGeom>
-        <a:solidFill>
-          <a:schemeClr val="lt1">
-            <a:alpha val="90000"/>
-            <a:hueOff val="0"/>
-            <a:satOff val="0"/>
-            <a:lumOff val="0"/>
-            <a:alphaOff val="0"/>
-          </a:schemeClr>
-        </a:solidFill>
-        <a:ln w="15875" cap="rnd" cmpd="sng" algn="ctr">
-          <a:solidFill>
-            <a:schemeClr val="accent1">
-              <a:hueOff val="0"/>
-              <a:satOff val="0"/>
-              <a:lumOff val="0"/>
-              <a:alphaOff val="0"/>
-            </a:schemeClr>
-          </a:solidFill>
-          <a:prstDash val="solid"/>
-        </a:ln>
-        <a:effectLst/>
-      </dsp:spPr>
-      <dsp:style>
-        <a:lnRef idx="2">
-          <a:scrgbClr r="0" g="0" b="0"/>
-        </a:lnRef>
-        <a:fillRef idx="1">
-          <a:scrgbClr r="0" g="0" b="0"/>
-        </a:fillRef>
-        <a:effectRef idx="0">
-          <a:scrgbClr r="0" g="0" b="0"/>
-        </a:effectRef>
-        <a:fontRef idx="minor"/>
-      </dsp:style>
-      <dsp:txBody>
-        <a:bodyPr spcFirstLastPara="0" vert="horz" wrap="square" lIns="300627" tIns="208280" rIns="300627" bIns="135128" numCol="1" spcCol="1270" anchor="t" anchorCtr="0">
-          <a:noAutofit/>
-        </a:bodyPr>
-        <a:lstStyle/>
-        <a:p>
-          <a:pPr marL="171450" lvl="1" indent="-171450" algn="l" defTabSz="844550">
-            <a:lnSpc>
-              <a:spcPct val="90000"/>
-            </a:lnSpc>
-            <a:spcBef>
-              <a:spcPct val="0"/>
-            </a:spcBef>
-            <a:spcAft>
-              <a:spcPct val="15000"/>
-            </a:spcAft>
-            <a:buChar char="••"/>
-          </a:pPr>
-          <a:r>
-            <a:rPr lang="en-US" sz="1900" kern="1200" dirty="0" smtClean="0"/>
-            <a:t>Initialize()</a:t>
-          </a:r>
-          <a:endParaRPr lang="en-US" sz="1900" kern="1200" dirty="0"/>
-        </a:p>
-        <a:p>
-          <a:pPr marL="171450" lvl="1" indent="-171450" algn="l" defTabSz="844550">
-            <a:lnSpc>
-              <a:spcPct val="90000"/>
-            </a:lnSpc>
-            <a:spcBef>
-              <a:spcPct val="0"/>
-            </a:spcBef>
-            <a:spcAft>
-              <a:spcPct val="15000"/>
-            </a:spcAft>
-            <a:buChar char="••"/>
-          </a:pPr>
-          <a:r>
-            <a:rPr lang="en-US" sz="1900" kern="1200" dirty="0" smtClean="0"/>
-            <a:t>Stow()</a:t>
-          </a:r>
-          <a:endParaRPr lang="en-US" sz="1900" kern="1200" dirty="0"/>
-        </a:p>
-        <a:p>
-          <a:pPr marL="171450" lvl="1" indent="-171450" algn="l" defTabSz="844550">
-            <a:lnSpc>
-              <a:spcPct val="90000"/>
-            </a:lnSpc>
-            <a:spcBef>
-              <a:spcPct val="0"/>
-            </a:spcBef>
-            <a:spcAft>
-              <a:spcPct val="15000"/>
-            </a:spcAft>
-            <a:buChar char="••"/>
-          </a:pPr>
-          <a:r>
-            <a:rPr lang="en-US" sz="1900" kern="1200" dirty="0" smtClean="0"/>
-            <a:t>Move forward/backward ()(with preset velocity/acceleration)</a:t>
-          </a:r>
-          <a:endParaRPr lang="en-US" sz="1900" kern="1200" dirty="0"/>
-        </a:p>
-        <a:p>
-          <a:pPr marL="171450" lvl="1" indent="-171450" algn="l" defTabSz="844550">
-            <a:lnSpc>
-              <a:spcPct val="90000"/>
-            </a:lnSpc>
-            <a:spcBef>
-              <a:spcPct val="0"/>
-            </a:spcBef>
-            <a:spcAft>
-              <a:spcPct val="15000"/>
-            </a:spcAft>
-            <a:buChar char="••"/>
-          </a:pPr>
-          <a:r>
-            <a:rPr lang="en-US" sz="1900" kern="1200" dirty="0" smtClean="0"/>
-            <a:t>Stop()</a:t>
-          </a:r>
-          <a:endParaRPr lang="en-US" sz="1900" kern="1200" dirty="0"/>
-        </a:p>
-        <a:p>
-          <a:pPr marL="171450" lvl="1" indent="-171450" algn="l" defTabSz="844550">
-            <a:lnSpc>
-              <a:spcPct val="90000"/>
-            </a:lnSpc>
-            <a:spcBef>
-              <a:spcPct val="0"/>
-            </a:spcBef>
-            <a:spcAft>
-              <a:spcPct val="15000"/>
-            </a:spcAft>
-            <a:buChar char="••"/>
-          </a:pPr>
-          <a:r>
-            <a:rPr lang="en-US" sz="1900" kern="1200" dirty="0" smtClean="0"/>
-            <a:t>Jog() (forward/backward)</a:t>
-          </a:r>
-          <a:endParaRPr lang="en-US" sz="1900" kern="1200" dirty="0"/>
-        </a:p>
-        <a:p>
-          <a:pPr marL="171450" lvl="1" indent="-171450" algn="l" defTabSz="844550">
-            <a:lnSpc>
-              <a:spcPct val="90000"/>
-            </a:lnSpc>
-            <a:spcBef>
-              <a:spcPct val="0"/>
-            </a:spcBef>
-            <a:spcAft>
-              <a:spcPct val="15000"/>
-            </a:spcAft>
-            <a:buChar char="••"/>
-          </a:pPr>
-          <a:r>
-            <a:rPr lang="en-US" sz="1900" kern="1200" dirty="0" smtClean="0"/>
-            <a:t>Move() to defined location</a:t>
-          </a:r>
-          <a:endParaRPr lang="en-US" sz="1900" kern="1200" dirty="0"/>
-        </a:p>
-        <a:p>
-          <a:pPr marL="171450" lvl="1" indent="-171450" algn="l" defTabSz="844550">
-            <a:lnSpc>
-              <a:spcPct val="90000"/>
-            </a:lnSpc>
-            <a:spcBef>
-              <a:spcPct val="0"/>
-            </a:spcBef>
-            <a:spcAft>
-              <a:spcPct val="15000"/>
-            </a:spcAft>
-            <a:buChar char="••"/>
-          </a:pPr>
-          <a:endParaRPr lang="en-US" sz="1900" kern="1200" dirty="0"/>
-        </a:p>
-        <a:p>
-          <a:pPr marL="171450" lvl="1" indent="-171450" algn="l" defTabSz="844550">
-            <a:lnSpc>
-              <a:spcPct val="90000"/>
-            </a:lnSpc>
-            <a:spcBef>
-              <a:spcPct val="0"/>
-            </a:spcBef>
-            <a:spcAft>
-              <a:spcPct val="15000"/>
-            </a:spcAft>
-            <a:buChar char="••"/>
-          </a:pPr>
-          <a:r>
-            <a:rPr lang="en-US" sz="1900" kern="1200" dirty="0" smtClean="0"/>
-            <a:t>Settings (many)</a:t>
-          </a:r>
-          <a:endParaRPr lang="en-US" sz="1900" kern="1200" dirty="0"/>
-        </a:p>
-      </dsp:txBody>
-      <dsp:txXfrm>
-        <a:off x="0" y="830074"/>
-        <a:ext cx="3873500" cy="3602225"/>
-      </dsp:txXfrm>
-    </dsp:sp>
-    <dsp:sp modelId="{1101DBBA-AC85-4020-A333-5D67476C6769}">
-      <dsp:nvSpPr>
-        <dsp:cNvPr id="0" name=""/>
-        <dsp:cNvSpPr/>
-      </dsp:nvSpPr>
-      <dsp:spPr>
-        <a:xfrm>
-          <a:off x="193485" y="799"/>
-          <a:ext cx="2708802" cy="889375"/>
-        </a:xfrm>
-        <a:prstGeom prst="roundRect">
-          <a:avLst/>
-        </a:prstGeom>
-        <a:solidFill>
-          <a:schemeClr val="accent1">
-            <a:hueOff val="0"/>
-            <a:satOff val="0"/>
-            <a:lumOff val="0"/>
-            <a:alphaOff val="0"/>
-          </a:schemeClr>
-        </a:solidFill>
-        <a:ln w="15875" cap="rnd" cmpd="sng" algn="ctr">
-          <a:solidFill>
-            <a:schemeClr val="lt1">
-              <a:hueOff val="0"/>
-              <a:satOff val="0"/>
-              <a:lumOff val="0"/>
-              <a:alphaOff val="0"/>
-            </a:schemeClr>
-          </a:solidFill>
-          <a:prstDash val="solid"/>
-        </a:ln>
-        <a:effectLst/>
-      </dsp:spPr>
-      <dsp:style>
-        <a:lnRef idx="2">
-          <a:scrgbClr r="0" g="0" b="0"/>
-        </a:lnRef>
-        <a:fillRef idx="1">
-          <a:scrgbClr r="0" g="0" b="0"/>
-        </a:fillRef>
-        <a:effectRef idx="0">
-          <a:scrgbClr r="0" g="0" b="0"/>
-        </a:effectRef>
-        <a:fontRef idx="minor">
-          <a:schemeClr val="lt1"/>
-        </a:fontRef>
-      </dsp:style>
-      <dsp:txBody>
-        <a:bodyPr spcFirstLastPara="0" vert="horz" wrap="square" lIns="102486" tIns="0" rIns="102486" bIns="0" numCol="1" spcCol="1270" anchor="ctr" anchorCtr="0">
-          <a:noAutofit/>
-        </a:bodyPr>
-        <a:lstStyle/>
-        <a:p>
-          <a:pPr lvl="0" algn="l" defTabSz="800100">
-            <a:lnSpc>
-              <a:spcPct val="90000"/>
-            </a:lnSpc>
-            <a:spcBef>
-              <a:spcPct val="0"/>
-            </a:spcBef>
-            <a:spcAft>
-              <a:spcPct val="35000"/>
-            </a:spcAft>
-          </a:pPr>
-          <a:r>
-            <a:rPr lang="en-US" sz="1800" kern="1200" dirty="0" smtClean="0"/>
-            <a:t>Position Controller</a:t>
-          </a:r>
-          <a:endParaRPr lang="en-US" sz="1800" kern="1200" dirty="0"/>
-        </a:p>
-      </dsp:txBody>
-      <dsp:txXfrm>
-        <a:off x="236901" y="44215"/>
-        <a:ext cx="2621970" cy="802543"/>
-      </dsp:txXfrm>
-    </dsp:sp>
-  </dsp:spTree>
-</dsp:drawing>
-</file>
-
-<file path=ppt/diagrams/drawing4.xml><?xml version="1.0" encoding="utf-8"?>
 <dsp:drawing xmlns:dgm="http://schemas.openxmlformats.org/drawingml/2006/diagram" xmlns:dsp="http://schemas.microsoft.com/office/drawing/2008/diagram" xmlns:a="http://schemas.openxmlformats.org/drawingml/2006/main">
   <dsp:spTree>
     <dsp:nvGrpSpPr>
@@ -6485,682 +5708,903 @@
 </dsp:drawing>
 </file>
 
-<file path=ppt/diagrams/layout1.xml><?xml version="1.0" encoding="utf-8"?>
-<dgm:layoutDef xmlns:dgm="http://schemas.openxmlformats.org/drawingml/2006/diagram" xmlns:a="http://schemas.openxmlformats.org/drawingml/2006/main" uniqueId="urn:microsoft.com/office/officeart/2005/8/layout/list1">
-  <dgm:title val=""/>
-  <dgm:desc val=""/>
-  <dgm:catLst>
-    <dgm:cat type="list" pri="4000"/>
-  </dgm:catLst>
-  <dgm:sampData>
-    <dgm:dataModel>
-      <dgm:ptLst>
-        <dgm:pt modelId="0" type="doc"/>
-        <dgm:pt modelId="1">
-          <dgm:prSet phldr="1"/>
-        </dgm:pt>
-        <dgm:pt modelId="2">
-          <dgm:prSet phldr="1"/>
-        </dgm:pt>
-        <dgm:pt modelId="3">
-          <dgm:prSet phldr="1"/>
-        </dgm:pt>
-      </dgm:ptLst>
-      <dgm:cxnLst>
-        <dgm:cxn modelId="4" srcId="0" destId="1" srcOrd="0" destOrd="0"/>
-        <dgm:cxn modelId="5" srcId="0" destId="2" srcOrd="1" destOrd="0"/>
-        <dgm:cxn modelId="6" srcId="0" destId="3" srcOrd="2" destOrd="0"/>
-      </dgm:cxnLst>
-      <dgm:bg/>
-      <dgm:whole/>
-    </dgm:dataModel>
-  </dgm:sampData>
-  <dgm:styleData>
-    <dgm:dataModel>
-      <dgm:ptLst>
-        <dgm:pt modelId="0" type="doc"/>
-        <dgm:pt modelId="1"/>
-        <dgm:pt modelId="2"/>
-      </dgm:ptLst>
-      <dgm:cxnLst>
-        <dgm:cxn modelId="4" srcId="0" destId="1" srcOrd="0" destOrd="0"/>
-        <dgm:cxn modelId="5" srcId="0" destId="2" srcOrd="1" destOrd="0"/>
-      </dgm:cxnLst>
-      <dgm:bg/>
-      <dgm:whole/>
-    </dgm:dataModel>
-  </dgm:styleData>
-  <dgm:clrData>
-    <dgm:dataModel>
-      <dgm:ptLst>
-        <dgm:pt modelId="0" type="doc"/>
-        <dgm:pt modelId="1"/>
-        <dgm:pt modelId="2"/>
-        <dgm:pt modelId="3"/>
-        <dgm:pt modelId="4"/>
-      </dgm:ptLst>
-      <dgm:cxnLst>
-        <dgm:cxn modelId="5" srcId="0" destId="1" srcOrd="0" destOrd="0"/>
-        <dgm:cxn modelId="6" srcId="0" destId="2" srcOrd="1" destOrd="0"/>
-        <dgm:cxn modelId="7" srcId="0" destId="3" srcOrd="2" destOrd="0"/>
-        <dgm:cxn modelId="8" srcId="0" destId="4" srcOrd="3" destOrd="0"/>
-      </dgm:cxnLst>
-      <dgm:bg/>
-      <dgm:whole/>
-    </dgm:dataModel>
-  </dgm:clrData>
-  <dgm:layoutNode name="linear">
-    <dgm:varLst>
-      <dgm:dir/>
-      <dgm:animLvl val="lvl"/>
-      <dgm:resizeHandles val="exact"/>
-    </dgm:varLst>
-    <dgm:choose name="Name0">
-      <dgm:if name="Name1" func="var" arg="dir" op="equ" val="norm">
-        <dgm:alg type="lin">
-          <dgm:param type="linDir" val="fromT"/>
-          <dgm:param type="vertAlign" val="mid"/>
-          <dgm:param type="horzAlign" val="l"/>
-          <dgm:param type="nodeHorzAlign" val="l"/>
-        </dgm:alg>
-      </dgm:if>
-      <dgm:else name="Name2">
-        <dgm:alg type="lin">
-          <dgm:param type="linDir" val="fromT"/>
-          <dgm:param type="vertAlign" val="mid"/>
-          <dgm:param type="horzAlign" val="r"/>
-          <dgm:param type="nodeHorzAlign" val="r"/>
-        </dgm:alg>
-      </dgm:else>
-    </dgm:choose>
-    <dgm:shape xmlns:r="http://schemas.openxmlformats.org/officeDocument/2006/relationships" r:blip="">
-      <dgm:adjLst/>
-    </dgm:shape>
-    <dgm:presOf/>
-    <dgm:constrLst>
-      <dgm:constr type="w" for="ch" forName="parentLin" refType="w"/>
-      <dgm:constr type="h" for="ch" forName="parentLin" val="INF"/>
-      <dgm:constr type="w" for="des" forName="parentLeftMargin" refType="w" fact="0.05"/>
-      <dgm:constr type="w" for="des" forName="parentText" refType="w" fact="0.7"/>
-      <dgm:constr type="h" for="des" forName="parentText" refType="primFontSz" refFor="des" refForName="parentText" fact="0.82"/>
-      <dgm:constr type="h" for="ch" forName="negativeSpace" refType="primFontSz" refFor="des" refForName="parentText" fact="-0.41"/>
-      <dgm:constr type="h" for="ch" forName="negativeSpace" refType="h" refFor="des" refForName="parentText" op="lte" fact="-0.82"/>
-      <dgm:constr type="h" for="ch" forName="negativeSpace" refType="h" refFor="des" refForName="parentText" op="gte" fact="-0.82"/>
-      <dgm:constr type="w" for="ch" forName="childText" refType="w"/>
-      <dgm:constr type="h" for="ch" forName="childText" refType="primFontSz" refFor="des" refForName="parentText" fact="0.7"/>
-      <dgm:constr type="primFontSz" for="des" forName="parentText" val="65"/>
-      <dgm:constr type="primFontSz" for="ch" forName="childText" refType="primFontSz" refFor="des" refForName="parentText"/>
-      <dgm:constr type="tMarg" for="ch" forName="childText" refType="primFontSz" refFor="des" refForName="parentText" fact="1.64"/>
-      <dgm:constr type="tMarg" for="ch" forName="childText" refType="h" refFor="des" refForName="parentText" op="lte" fact="3.28"/>
-      <dgm:constr type="tMarg" for="ch" forName="childText" refType="h" refFor="des" refForName="parentText" op="gte" fact="3.28"/>
-      <dgm:constr type="lMarg" for="ch" forName="childText" refType="w" fact="0.22"/>
-      <dgm:constr type="rMarg" for="ch" forName="childText" refType="lMarg" refFor="ch" refForName="childText"/>
-      <dgm:constr type="lMarg" for="des" forName="parentText" refType="w" fact="0.075"/>
-      <dgm:constr type="rMarg" for="des" forName="parentText" refType="lMarg" refFor="des" refForName="parentText"/>
-      <dgm:constr type="h" for="ch" forName="spaceBetweenRectangles" refType="primFontSz" refFor="des" refForName="parentText" fact="0.15"/>
-    </dgm:constrLst>
-    <dgm:ruleLst>
-      <dgm:rule type="primFontSz" for="des" forName="parentText" val="5" fact="NaN" max="NaN"/>
-    </dgm:ruleLst>
-    <dgm:forEach name="Name3" axis="ch" ptType="node">
-      <dgm:layoutNode name="parentLin">
-        <dgm:choose name="Name4">
-          <dgm:if name="Name5" func="var" arg="dir" op="equ" val="norm">
-            <dgm:alg type="lin">
-              <dgm:param type="linDir" val="fromL"/>
-              <dgm:param type="horzAlign" val="l"/>
-              <dgm:param type="nodeHorzAlign" val="l"/>
-            </dgm:alg>
-          </dgm:if>
-          <dgm:else name="Name6">
-            <dgm:alg type="lin">
-              <dgm:param type="linDir" val="fromR"/>
-              <dgm:param type="horzAlign" val="r"/>
-              <dgm:param type="nodeHorzAlign" val="r"/>
-            </dgm:alg>
-          </dgm:else>
-        </dgm:choose>
-        <dgm:shape xmlns:r="http://schemas.openxmlformats.org/officeDocument/2006/relationships" r:blip="">
-          <dgm:adjLst/>
-        </dgm:shape>
-        <dgm:presOf/>
-        <dgm:constrLst/>
-        <dgm:ruleLst/>
-        <dgm:layoutNode name="parentLeftMargin">
-          <dgm:alg type="sp"/>
-          <dgm:shape xmlns:r="http://schemas.openxmlformats.org/officeDocument/2006/relationships" type="rect" r:blip="" hideGeom="1">
-            <dgm:adjLst/>
-          </dgm:shape>
-          <dgm:presOf axis="self"/>
-          <dgm:constrLst>
-            <dgm:constr type="h"/>
-          </dgm:constrLst>
-          <dgm:ruleLst/>
-        </dgm:layoutNode>
-        <dgm:layoutNode name="parentText" styleLbl="node1">
-          <dgm:varLst>
-            <dgm:chMax val="0"/>
-            <dgm:bulletEnabled val="1"/>
-          </dgm:varLst>
-          <dgm:choose name="Name7">
-            <dgm:if name="Name8" func="var" arg="dir" op="equ" val="norm">
-              <dgm:alg type="tx">
-                <dgm:param type="parTxLTRAlign" val="l"/>
-                <dgm:param type="parTxRTLAlign" val="l"/>
-              </dgm:alg>
-            </dgm:if>
-            <dgm:else name="Name9">
-              <dgm:alg type="tx">
-                <dgm:param type="parTxLTRAlign" val="r"/>
-                <dgm:param type="parTxRTLAlign" val="r"/>
-              </dgm:alg>
-            </dgm:else>
-          </dgm:choose>
-          <dgm:shape xmlns:r="http://schemas.openxmlformats.org/officeDocument/2006/relationships" type="roundRect" r:blip="">
-            <dgm:adjLst/>
-          </dgm:shape>
-          <dgm:presOf axis="self" ptType="node"/>
-          <dgm:constrLst>
-            <dgm:constr type="tMarg"/>
-            <dgm:constr type="bMarg"/>
-          </dgm:constrLst>
-          <dgm:ruleLst/>
-        </dgm:layoutNode>
-      </dgm:layoutNode>
-      <dgm:layoutNode name="negativeSpace">
-        <dgm:alg type="sp"/>
-        <dgm:shape xmlns:r="http://schemas.openxmlformats.org/officeDocument/2006/relationships" r:blip="">
-          <dgm:adjLst/>
-        </dgm:shape>
-        <dgm:presOf/>
-        <dgm:constrLst/>
-        <dgm:ruleLst/>
-      </dgm:layoutNode>
-      <dgm:layoutNode name="childText" styleLbl="conFgAcc1">
-        <dgm:varLst>
-          <dgm:bulletEnabled val="1"/>
-        </dgm:varLst>
-        <dgm:alg type="tx">
-          <dgm:param type="stBulletLvl" val="1"/>
-        </dgm:alg>
-        <dgm:shape xmlns:r="http://schemas.openxmlformats.org/officeDocument/2006/relationships" type="rect" r:blip="" zOrderOff="-2">
-          <dgm:adjLst/>
-        </dgm:shape>
-        <dgm:presOf axis="des" ptType="node"/>
-        <dgm:constrLst>
-          <dgm:constr type="secFontSz" refType="primFontSz"/>
-        </dgm:constrLst>
-        <dgm:ruleLst>
-          <dgm:rule type="h" val="INF" fact="NaN" max="NaN"/>
-        </dgm:ruleLst>
-      </dgm:layoutNode>
-      <dgm:forEach name="Name10" axis="followSib" ptType="sibTrans" cnt="1">
-        <dgm:layoutNode name="spaceBetweenRectangles">
-          <dgm:alg type="sp"/>
-          <dgm:shape xmlns:r="http://schemas.openxmlformats.org/officeDocument/2006/relationships" r:blip="">
-            <dgm:adjLst/>
-          </dgm:shape>
-          <dgm:presOf/>
-          <dgm:constrLst/>
-          <dgm:ruleLst/>
-        </dgm:layoutNode>
-      </dgm:forEach>
-    </dgm:forEach>
-  </dgm:layoutNode>
-</dgm:layoutDef>
+<file path=ppt/diagrams/drawing2.xml><?xml version="1.0" encoding="utf-8"?>
+<dsp:drawing xmlns:dgm="http://schemas.openxmlformats.org/drawingml/2006/diagram" xmlns:dsp="http://schemas.microsoft.com/office/drawing/2008/diagram" xmlns:a="http://schemas.openxmlformats.org/drawingml/2006/main">
+  <dsp:spTree>
+    <dsp:nvGrpSpPr>
+      <dsp:cNvPr id="0" name=""/>
+      <dsp:cNvGrpSpPr/>
+    </dsp:nvGrpSpPr>
+    <dsp:grpSpPr/>
+    <dsp:sp modelId="{3B84BF06-5215-4FCB-A48A-56981FC939CD}">
+      <dsp:nvSpPr>
+        <dsp:cNvPr id="0" name=""/>
+        <dsp:cNvSpPr/>
+      </dsp:nvSpPr>
+      <dsp:spPr>
+        <a:xfrm>
+          <a:off x="0" y="748241"/>
+          <a:ext cx="3468687" cy="3439800"/>
+        </a:xfrm>
+        <a:prstGeom prst="rect">
+          <a:avLst/>
+        </a:prstGeom>
+        <a:solidFill>
+          <a:schemeClr val="lt1">
+            <a:alpha val="90000"/>
+            <a:hueOff val="0"/>
+            <a:satOff val="0"/>
+            <a:lumOff val="0"/>
+            <a:alphaOff val="0"/>
+          </a:schemeClr>
+        </a:solidFill>
+        <a:ln w="15875" cap="rnd" cmpd="sng" algn="ctr">
+          <a:solidFill>
+            <a:schemeClr val="accent1">
+              <a:hueOff val="0"/>
+              <a:satOff val="0"/>
+              <a:lumOff val="0"/>
+              <a:alphaOff val="0"/>
+            </a:schemeClr>
+          </a:solidFill>
+          <a:prstDash val="solid"/>
+        </a:ln>
+        <a:effectLst/>
+      </dsp:spPr>
+      <dsp:style>
+        <a:lnRef idx="2">
+          <a:scrgbClr r="0" g="0" b="0"/>
+        </a:lnRef>
+        <a:fillRef idx="1">
+          <a:scrgbClr r="0" g="0" b="0"/>
+        </a:fillRef>
+        <a:effectRef idx="0">
+          <a:scrgbClr r="0" g="0" b="0"/>
+        </a:effectRef>
+        <a:fontRef idx="minor"/>
+      </dsp:style>
+      <dsp:txBody>
+        <a:bodyPr spcFirstLastPara="0" vert="horz" wrap="square" lIns="269209" tIns="291592" rIns="269209" bIns="99568" numCol="1" spcCol="1270" anchor="t" anchorCtr="0">
+          <a:noAutofit/>
+        </a:bodyPr>
+        <a:lstStyle/>
+        <a:p>
+          <a:pPr marL="114300" lvl="1" indent="-114300" algn="l" defTabSz="622300">
+            <a:lnSpc>
+              <a:spcPct val="90000"/>
+            </a:lnSpc>
+            <a:spcBef>
+              <a:spcPct val="0"/>
+            </a:spcBef>
+            <a:spcAft>
+              <a:spcPct val="15000"/>
+            </a:spcAft>
+            <a:buChar char="••"/>
+          </a:pPr>
+          <a:r>
+            <a:rPr lang="en-US" sz="1400" kern="1200" dirty="0" smtClean="0"/>
+            <a:t>Coverslip</a:t>
+          </a:r>
+          <a:endParaRPr lang="en-US" sz="1400" kern="1200" dirty="0"/>
+        </a:p>
+        <a:p>
+          <a:pPr marL="228600" lvl="2" indent="-114300" algn="l" defTabSz="622300">
+            <a:lnSpc>
+              <a:spcPct val="90000"/>
+            </a:lnSpc>
+            <a:spcBef>
+              <a:spcPct val="0"/>
+            </a:spcBef>
+            <a:spcAft>
+              <a:spcPct val="15000"/>
+            </a:spcAft>
+            <a:buChar char="••"/>
+          </a:pPr>
+          <a:r>
+            <a:rPr lang="en-US" sz="1400" kern="1200" dirty="0" smtClean="0"/>
+            <a:t>Positioner</a:t>
+          </a:r>
+          <a:br>
+            <a:rPr lang="en-US" sz="1400" kern="1200" dirty="0" smtClean="0"/>
+          </a:br>
+          <a:endParaRPr lang="en-US" sz="1400" kern="1200" dirty="0"/>
+        </a:p>
+        <a:p>
+          <a:pPr marL="114300" lvl="1" indent="-114300" algn="l" defTabSz="622300">
+            <a:lnSpc>
+              <a:spcPct val="90000"/>
+            </a:lnSpc>
+            <a:spcBef>
+              <a:spcPct val="0"/>
+            </a:spcBef>
+            <a:spcAft>
+              <a:spcPct val="15000"/>
+            </a:spcAft>
+            <a:buChar char="••"/>
+          </a:pPr>
+          <a:r>
+            <a:rPr lang="en-US" sz="1400" kern="1200" dirty="0" smtClean="0"/>
+            <a:t>Whisker</a:t>
+          </a:r>
+          <a:endParaRPr lang="en-US" sz="1400" kern="1200" dirty="0"/>
+        </a:p>
+        <a:p>
+          <a:pPr marL="228600" lvl="2" indent="-114300" algn="l" defTabSz="622300">
+            <a:lnSpc>
+              <a:spcPct val="90000"/>
+            </a:lnSpc>
+            <a:spcBef>
+              <a:spcPct val="0"/>
+            </a:spcBef>
+            <a:spcAft>
+              <a:spcPct val="15000"/>
+            </a:spcAft>
+            <a:buChar char="••"/>
+          </a:pPr>
+          <a:r>
+            <a:rPr lang="en-US" sz="1400" kern="1200" dirty="0" smtClean="0"/>
+            <a:t>Positioner</a:t>
+          </a:r>
+          <a:br>
+            <a:rPr lang="en-US" sz="1400" kern="1200" dirty="0" smtClean="0"/>
+          </a:br>
+          <a:endParaRPr lang="en-US" sz="1400" kern="1200" dirty="0"/>
+        </a:p>
+        <a:p>
+          <a:pPr marL="114300" lvl="1" indent="-114300" algn="l" defTabSz="622300">
+            <a:lnSpc>
+              <a:spcPct val="90000"/>
+            </a:lnSpc>
+            <a:spcBef>
+              <a:spcPct val="0"/>
+            </a:spcBef>
+            <a:spcAft>
+              <a:spcPct val="15000"/>
+            </a:spcAft>
+            <a:buChar char="••"/>
+          </a:pPr>
+          <a:r>
+            <a:rPr lang="en-US" sz="1400" kern="1200" dirty="0" smtClean="0"/>
+            <a:t>Camera</a:t>
+          </a:r>
+          <a:br>
+            <a:rPr lang="en-US" sz="1400" kern="1200" dirty="0" smtClean="0"/>
+          </a:br>
+          <a:endParaRPr lang="en-US" sz="1400" kern="1200" dirty="0"/>
+        </a:p>
+        <a:p>
+          <a:pPr marL="114300" lvl="1" indent="-114300" algn="l" defTabSz="622300">
+            <a:lnSpc>
+              <a:spcPct val="90000"/>
+            </a:lnSpc>
+            <a:spcBef>
+              <a:spcPct val="0"/>
+            </a:spcBef>
+            <a:spcAft>
+              <a:spcPct val="15000"/>
+            </a:spcAft>
+            <a:buChar char="••"/>
+          </a:pPr>
+          <a:r>
+            <a:rPr lang="en-US" sz="1400" kern="1200" dirty="0" smtClean="0"/>
+            <a:t>Settings</a:t>
+          </a:r>
+          <a:endParaRPr lang="en-US" sz="1400" kern="1200" dirty="0"/>
+        </a:p>
+        <a:p>
+          <a:pPr marL="114300" lvl="1" indent="-114300" algn="l" defTabSz="622300">
+            <a:lnSpc>
+              <a:spcPct val="90000"/>
+            </a:lnSpc>
+            <a:spcBef>
+              <a:spcPct val="0"/>
+            </a:spcBef>
+            <a:spcAft>
+              <a:spcPct val="15000"/>
+            </a:spcAft>
+            <a:buChar char="••"/>
+          </a:pPr>
+          <a:r>
+            <a:rPr lang="en-US" sz="1400" kern="1200" dirty="0" smtClean="0"/>
+            <a:t>Initialize()</a:t>
+          </a:r>
+          <a:endParaRPr lang="en-US" sz="1400" kern="1200" dirty="0"/>
+        </a:p>
+        <a:p>
+          <a:pPr marL="114300" lvl="1" indent="-114300" algn="l" defTabSz="622300">
+            <a:lnSpc>
+              <a:spcPct val="90000"/>
+            </a:lnSpc>
+            <a:spcBef>
+              <a:spcPct val="0"/>
+            </a:spcBef>
+            <a:spcAft>
+              <a:spcPct val="15000"/>
+            </a:spcAft>
+            <a:buChar char="••"/>
+          </a:pPr>
+          <a:r>
+            <a:rPr lang="en-US" sz="1400" kern="1200" dirty="0" smtClean="0"/>
+            <a:t>Stow()</a:t>
+          </a:r>
+          <a:br>
+            <a:rPr lang="en-US" sz="1400" kern="1200" dirty="0" smtClean="0"/>
+          </a:br>
+          <a:endParaRPr lang="en-US" sz="1400" kern="1200" dirty="0"/>
+        </a:p>
+        <a:p>
+          <a:pPr marL="228600" lvl="2" indent="-114300" algn="l" defTabSz="622300">
+            <a:lnSpc>
+              <a:spcPct val="90000"/>
+            </a:lnSpc>
+            <a:spcBef>
+              <a:spcPct val="0"/>
+            </a:spcBef>
+            <a:spcAft>
+              <a:spcPct val="15000"/>
+            </a:spcAft>
+            <a:buChar char="••"/>
+          </a:pPr>
+          <a:endParaRPr lang="en-US" sz="1400" kern="1200" dirty="0"/>
+        </a:p>
+        <a:p>
+          <a:pPr marL="114300" lvl="1" indent="-114300" algn="l" defTabSz="622300">
+            <a:lnSpc>
+              <a:spcPct val="90000"/>
+            </a:lnSpc>
+            <a:spcBef>
+              <a:spcPct val="0"/>
+            </a:spcBef>
+            <a:spcAft>
+              <a:spcPct val="15000"/>
+            </a:spcAft>
+            <a:buChar char="••"/>
+          </a:pPr>
+          <a:endParaRPr lang="en-US" sz="1400" kern="1200" dirty="0"/>
+        </a:p>
+      </dsp:txBody>
+      <dsp:txXfrm>
+        <a:off x="0" y="748241"/>
+        <a:ext cx="3468687" cy="3439800"/>
+      </dsp:txXfrm>
+    </dsp:sp>
+    <dsp:sp modelId="{82C996F2-0ACD-4DD0-BE97-B8AED07A97C6}">
+      <dsp:nvSpPr>
+        <dsp:cNvPr id="0" name=""/>
+        <dsp:cNvSpPr/>
+      </dsp:nvSpPr>
+      <dsp:spPr>
+        <a:xfrm>
+          <a:off x="173434" y="66458"/>
+          <a:ext cx="2428080" cy="888423"/>
+        </a:xfrm>
+        <a:prstGeom prst="roundRect">
+          <a:avLst/>
+        </a:prstGeom>
+        <a:solidFill>
+          <a:schemeClr val="accent1">
+            <a:hueOff val="0"/>
+            <a:satOff val="0"/>
+            <a:lumOff val="0"/>
+            <a:alphaOff val="0"/>
+          </a:schemeClr>
+        </a:solidFill>
+        <a:ln w="15875" cap="rnd" cmpd="sng" algn="ctr">
+          <a:solidFill>
+            <a:schemeClr val="lt1">
+              <a:hueOff val="0"/>
+              <a:satOff val="0"/>
+              <a:lumOff val="0"/>
+              <a:alphaOff val="0"/>
+            </a:schemeClr>
+          </a:solidFill>
+          <a:prstDash val="solid"/>
+        </a:ln>
+        <a:effectLst/>
+      </dsp:spPr>
+      <dsp:style>
+        <a:lnRef idx="2">
+          <a:scrgbClr r="0" g="0" b="0"/>
+        </a:lnRef>
+        <a:fillRef idx="1">
+          <a:scrgbClr r="0" g="0" b="0"/>
+        </a:fillRef>
+        <a:effectRef idx="0">
+          <a:scrgbClr r="0" g="0" b="0"/>
+        </a:effectRef>
+        <a:fontRef idx="minor">
+          <a:schemeClr val="lt1"/>
+        </a:fontRef>
+      </dsp:style>
+      <dsp:txBody>
+        <a:bodyPr spcFirstLastPara="0" vert="horz" wrap="square" lIns="91776" tIns="0" rIns="91776" bIns="0" numCol="1" spcCol="1270" anchor="ctr" anchorCtr="0">
+          <a:noAutofit/>
+        </a:bodyPr>
+        <a:lstStyle/>
+        <a:p>
+          <a:pPr lvl="0" algn="l" defTabSz="1066800">
+            <a:lnSpc>
+              <a:spcPct val="90000"/>
+            </a:lnSpc>
+            <a:spcBef>
+              <a:spcPct val="0"/>
+            </a:spcBef>
+            <a:spcAft>
+              <a:spcPct val="35000"/>
+            </a:spcAft>
+          </a:pPr>
+          <a:r>
+            <a:rPr lang="en-US" sz="2400" kern="1200" dirty="0" err="1" smtClean="0"/>
+            <a:t>ArrayBot</a:t>
+          </a:r>
+          <a:endParaRPr lang="en-US" sz="2400" kern="1200" dirty="0"/>
+        </a:p>
+      </dsp:txBody>
+      <dsp:txXfrm>
+        <a:off x="216803" y="109827"/>
+        <a:ext cx="2341342" cy="801685"/>
+      </dsp:txXfrm>
+    </dsp:sp>
+  </dsp:spTree>
+</dsp:drawing>
 </file>
 
-<file path=ppt/diagrams/layout2.xml><?xml version="1.0" encoding="utf-8"?>
-<dgm:layoutDef xmlns:dgm="http://schemas.openxmlformats.org/drawingml/2006/diagram" xmlns:a="http://schemas.openxmlformats.org/drawingml/2006/main" uniqueId="urn:microsoft.com/office/officeart/2005/8/layout/list1">
-  <dgm:title val=""/>
-  <dgm:desc val=""/>
-  <dgm:catLst>
-    <dgm:cat type="list" pri="4000"/>
-  </dgm:catLst>
-  <dgm:sampData>
-    <dgm:dataModel>
-      <dgm:ptLst>
-        <dgm:pt modelId="0" type="doc"/>
-        <dgm:pt modelId="1">
-          <dgm:prSet phldr="1"/>
-        </dgm:pt>
-        <dgm:pt modelId="2">
-          <dgm:prSet phldr="1"/>
-        </dgm:pt>
-        <dgm:pt modelId="3">
-          <dgm:prSet phldr="1"/>
-        </dgm:pt>
-      </dgm:ptLst>
-      <dgm:cxnLst>
-        <dgm:cxn modelId="4" srcId="0" destId="1" srcOrd="0" destOrd="0"/>
-        <dgm:cxn modelId="5" srcId="0" destId="2" srcOrd="1" destOrd="0"/>
-        <dgm:cxn modelId="6" srcId="0" destId="3" srcOrd="2" destOrd="0"/>
-      </dgm:cxnLst>
-      <dgm:bg/>
-      <dgm:whole/>
-    </dgm:dataModel>
-  </dgm:sampData>
-  <dgm:styleData>
-    <dgm:dataModel>
-      <dgm:ptLst>
-        <dgm:pt modelId="0" type="doc"/>
-        <dgm:pt modelId="1"/>
-        <dgm:pt modelId="2"/>
-      </dgm:ptLst>
-      <dgm:cxnLst>
-        <dgm:cxn modelId="4" srcId="0" destId="1" srcOrd="0" destOrd="0"/>
-        <dgm:cxn modelId="5" srcId="0" destId="2" srcOrd="1" destOrd="0"/>
-      </dgm:cxnLst>
-      <dgm:bg/>
-      <dgm:whole/>
-    </dgm:dataModel>
-  </dgm:styleData>
-  <dgm:clrData>
-    <dgm:dataModel>
-      <dgm:ptLst>
-        <dgm:pt modelId="0" type="doc"/>
-        <dgm:pt modelId="1"/>
-        <dgm:pt modelId="2"/>
-        <dgm:pt modelId="3"/>
-        <dgm:pt modelId="4"/>
-      </dgm:ptLst>
-      <dgm:cxnLst>
-        <dgm:cxn modelId="5" srcId="0" destId="1" srcOrd="0" destOrd="0"/>
-        <dgm:cxn modelId="6" srcId="0" destId="2" srcOrd="1" destOrd="0"/>
-        <dgm:cxn modelId="7" srcId="0" destId="3" srcOrd="2" destOrd="0"/>
-        <dgm:cxn modelId="8" srcId="0" destId="4" srcOrd="3" destOrd="0"/>
-      </dgm:cxnLst>
-      <dgm:bg/>
-      <dgm:whole/>
-    </dgm:dataModel>
-  </dgm:clrData>
-  <dgm:layoutNode name="linear">
-    <dgm:varLst>
-      <dgm:dir/>
-      <dgm:animLvl val="lvl"/>
-      <dgm:resizeHandles val="exact"/>
-    </dgm:varLst>
-    <dgm:choose name="Name0">
-      <dgm:if name="Name1" func="var" arg="dir" op="equ" val="norm">
-        <dgm:alg type="lin">
-          <dgm:param type="linDir" val="fromT"/>
-          <dgm:param type="vertAlign" val="mid"/>
-          <dgm:param type="horzAlign" val="l"/>
-          <dgm:param type="nodeHorzAlign" val="l"/>
-        </dgm:alg>
-      </dgm:if>
-      <dgm:else name="Name2">
-        <dgm:alg type="lin">
-          <dgm:param type="linDir" val="fromT"/>
-          <dgm:param type="vertAlign" val="mid"/>
-          <dgm:param type="horzAlign" val="r"/>
-          <dgm:param type="nodeHorzAlign" val="r"/>
-        </dgm:alg>
-      </dgm:else>
-    </dgm:choose>
-    <dgm:shape xmlns:r="http://schemas.openxmlformats.org/officeDocument/2006/relationships" r:blip="">
-      <dgm:adjLst/>
-    </dgm:shape>
-    <dgm:presOf/>
-    <dgm:constrLst>
-      <dgm:constr type="w" for="ch" forName="parentLin" refType="w"/>
-      <dgm:constr type="h" for="ch" forName="parentLin" val="INF"/>
-      <dgm:constr type="w" for="des" forName="parentLeftMargin" refType="w" fact="0.05"/>
-      <dgm:constr type="w" for="des" forName="parentText" refType="w" fact="0.7"/>
-      <dgm:constr type="h" for="des" forName="parentText" refType="primFontSz" refFor="des" refForName="parentText" fact="0.82"/>
-      <dgm:constr type="h" for="ch" forName="negativeSpace" refType="primFontSz" refFor="des" refForName="parentText" fact="-0.41"/>
-      <dgm:constr type="h" for="ch" forName="negativeSpace" refType="h" refFor="des" refForName="parentText" op="lte" fact="-0.82"/>
-      <dgm:constr type="h" for="ch" forName="negativeSpace" refType="h" refFor="des" refForName="parentText" op="gte" fact="-0.82"/>
-      <dgm:constr type="w" for="ch" forName="childText" refType="w"/>
-      <dgm:constr type="h" for="ch" forName="childText" refType="primFontSz" refFor="des" refForName="parentText" fact="0.7"/>
-      <dgm:constr type="primFontSz" for="des" forName="parentText" val="65"/>
-      <dgm:constr type="primFontSz" for="ch" forName="childText" refType="primFontSz" refFor="des" refForName="parentText"/>
-      <dgm:constr type="tMarg" for="ch" forName="childText" refType="primFontSz" refFor="des" refForName="parentText" fact="1.64"/>
-      <dgm:constr type="tMarg" for="ch" forName="childText" refType="h" refFor="des" refForName="parentText" op="lte" fact="3.28"/>
-      <dgm:constr type="tMarg" for="ch" forName="childText" refType="h" refFor="des" refForName="parentText" op="gte" fact="3.28"/>
-      <dgm:constr type="lMarg" for="ch" forName="childText" refType="w" fact="0.22"/>
-      <dgm:constr type="rMarg" for="ch" forName="childText" refType="lMarg" refFor="ch" refForName="childText"/>
-      <dgm:constr type="lMarg" for="des" forName="parentText" refType="w" fact="0.075"/>
-      <dgm:constr type="rMarg" for="des" forName="parentText" refType="lMarg" refFor="des" refForName="parentText"/>
-      <dgm:constr type="h" for="ch" forName="spaceBetweenRectangles" refType="primFontSz" refFor="des" refForName="parentText" fact="0.15"/>
-    </dgm:constrLst>
-    <dgm:ruleLst>
-      <dgm:rule type="primFontSz" for="des" forName="parentText" val="5" fact="NaN" max="NaN"/>
-    </dgm:ruleLst>
-    <dgm:forEach name="Name3" axis="ch" ptType="node">
-      <dgm:layoutNode name="parentLin">
-        <dgm:choose name="Name4">
-          <dgm:if name="Name5" func="var" arg="dir" op="equ" val="norm">
-            <dgm:alg type="lin">
-              <dgm:param type="linDir" val="fromL"/>
-              <dgm:param type="horzAlign" val="l"/>
-              <dgm:param type="nodeHorzAlign" val="l"/>
-            </dgm:alg>
-          </dgm:if>
-          <dgm:else name="Name6">
-            <dgm:alg type="lin">
-              <dgm:param type="linDir" val="fromR"/>
-              <dgm:param type="horzAlign" val="r"/>
-              <dgm:param type="nodeHorzAlign" val="r"/>
-            </dgm:alg>
-          </dgm:else>
-        </dgm:choose>
-        <dgm:shape xmlns:r="http://schemas.openxmlformats.org/officeDocument/2006/relationships" r:blip="">
-          <dgm:adjLst/>
-        </dgm:shape>
-        <dgm:presOf/>
-        <dgm:constrLst/>
-        <dgm:ruleLst/>
-        <dgm:layoutNode name="parentLeftMargin">
-          <dgm:alg type="sp"/>
-          <dgm:shape xmlns:r="http://schemas.openxmlformats.org/officeDocument/2006/relationships" type="rect" r:blip="" hideGeom="1">
-            <dgm:adjLst/>
-          </dgm:shape>
-          <dgm:presOf axis="self"/>
-          <dgm:constrLst>
-            <dgm:constr type="h"/>
-          </dgm:constrLst>
-          <dgm:ruleLst/>
-        </dgm:layoutNode>
-        <dgm:layoutNode name="parentText" styleLbl="node1">
-          <dgm:varLst>
-            <dgm:chMax val="0"/>
-            <dgm:bulletEnabled val="1"/>
-          </dgm:varLst>
-          <dgm:choose name="Name7">
-            <dgm:if name="Name8" func="var" arg="dir" op="equ" val="norm">
-              <dgm:alg type="tx">
-                <dgm:param type="parTxLTRAlign" val="l"/>
-                <dgm:param type="parTxRTLAlign" val="l"/>
-              </dgm:alg>
-            </dgm:if>
-            <dgm:else name="Name9">
-              <dgm:alg type="tx">
-                <dgm:param type="parTxLTRAlign" val="r"/>
-                <dgm:param type="parTxRTLAlign" val="r"/>
-              </dgm:alg>
-            </dgm:else>
-          </dgm:choose>
-          <dgm:shape xmlns:r="http://schemas.openxmlformats.org/officeDocument/2006/relationships" type="roundRect" r:blip="">
-            <dgm:adjLst/>
-          </dgm:shape>
-          <dgm:presOf axis="self" ptType="node"/>
-          <dgm:constrLst>
-            <dgm:constr type="tMarg"/>
-            <dgm:constr type="bMarg"/>
-          </dgm:constrLst>
-          <dgm:ruleLst/>
-        </dgm:layoutNode>
-      </dgm:layoutNode>
-      <dgm:layoutNode name="negativeSpace">
-        <dgm:alg type="sp"/>
-        <dgm:shape xmlns:r="http://schemas.openxmlformats.org/officeDocument/2006/relationships" r:blip="">
-          <dgm:adjLst/>
-        </dgm:shape>
-        <dgm:presOf/>
-        <dgm:constrLst/>
-        <dgm:ruleLst/>
-      </dgm:layoutNode>
-      <dgm:layoutNode name="childText" styleLbl="conFgAcc1">
-        <dgm:varLst>
-          <dgm:bulletEnabled val="1"/>
-        </dgm:varLst>
-        <dgm:alg type="tx">
-          <dgm:param type="stBulletLvl" val="1"/>
-        </dgm:alg>
-        <dgm:shape xmlns:r="http://schemas.openxmlformats.org/officeDocument/2006/relationships" type="rect" r:blip="" zOrderOff="-2">
-          <dgm:adjLst/>
-        </dgm:shape>
-        <dgm:presOf axis="des" ptType="node"/>
-        <dgm:constrLst>
-          <dgm:constr type="secFontSz" refType="primFontSz"/>
-        </dgm:constrLst>
-        <dgm:ruleLst>
-          <dgm:rule type="h" val="INF" fact="NaN" max="NaN"/>
-        </dgm:ruleLst>
-      </dgm:layoutNode>
-      <dgm:forEach name="Name10" axis="followSib" ptType="sibTrans" cnt="1">
-        <dgm:layoutNode name="spaceBetweenRectangles">
-          <dgm:alg type="sp"/>
-          <dgm:shape xmlns:r="http://schemas.openxmlformats.org/officeDocument/2006/relationships" r:blip="">
-            <dgm:adjLst/>
-          </dgm:shape>
-          <dgm:presOf/>
-          <dgm:constrLst/>
-          <dgm:ruleLst/>
-        </dgm:layoutNode>
-      </dgm:forEach>
-    </dgm:forEach>
-  </dgm:layoutNode>
-</dgm:layoutDef>
+<file path=ppt/diagrams/drawing3.xml><?xml version="1.0" encoding="utf-8"?>
+<dsp:drawing xmlns:dgm="http://schemas.openxmlformats.org/drawingml/2006/diagram" xmlns:dsp="http://schemas.microsoft.com/office/drawing/2008/diagram" xmlns:a="http://schemas.openxmlformats.org/drawingml/2006/main">
+  <dsp:spTree>
+    <dsp:nvGrpSpPr>
+      <dsp:cNvPr id="0" name=""/>
+      <dsp:cNvGrpSpPr/>
+    </dsp:nvGrpSpPr>
+    <dsp:grpSpPr/>
+    <dsp:sp modelId="{824034AE-157F-469F-915C-EC6DAE34225C}">
+      <dsp:nvSpPr>
+        <dsp:cNvPr id="0" name=""/>
+        <dsp:cNvSpPr/>
+      </dsp:nvSpPr>
+      <dsp:spPr>
+        <a:xfrm>
+          <a:off x="0" y="366808"/>
+          <a:ext cx="2997200" cy="3786091"/>
+        </a:xfrm>
+        <a:prstGeom prst="rect">
+          <a:avLst/>
+        </a:prstGeom>
+        <a:solidFill>
+          <a:schemeClr val="lt1">
+            <a:alpha val="90000"/>
+            <a:hueOff val="0"/>
+            <a:satOff val="0"/>
+            <a:lumOff val="0"/>
+            <a:alphaOff val="0"/>
+          </a:schemeClr>
+        </a:solidFill>
+        <a:ln w="15875" cap="rnd" cmpd="sng" algn="ctr">
+          <a:solidFill>
+            <a:schemeClr val="accent1">
+              <a:hueOff val="0"/>
+              <a:satOff val="0"/>
+              <a:lumOff val="0"/>
+              <a:alphaOff val="0"/>
+            </a:schemeClr>
+          </a:solidFill>
+          <a:prstDash val="solid"/>
+        </a:ln>
+        <a:effectLst/>
+      </dsp:spPr>
+      <dsp:style>
+        <a:lnRef idx="2">
+          <a:scrgbClr r="0" g="0" b="0"/>
+        </a:lnRef>
+        <a:fillRef idx="1">
+          <a:scrgbClr r="0" g="0" b="0"/>
+        </a:fillRef>
+        <a:effectRef idx="0">
+          <a:scrgbClr r="0" g="0" b="0"/>
+        </a:effectRef>
+        <a:fontRef idx="minor"/>
+      </dsp:style>
+      <dsp:txBody>
+        <a:bodyPr spcFirstLastPara="0" vert="horz" wrap="square" lIns="232616" tIns="437388" rIns="232616" bIns="135128" numCol="1" spcCol="1270" anchor="t" anchorCtr="0">
+          <a:noAutofit/>
+        </a:bodyPr>
+        <a:lstStyle/>
+        <a:p>
+          <a:pPr marL="171450" lvl="1" indent="-171450" algn="l" defTabSz="844550">
+            <a:lnSpc>
+              <a:spcPct val="90000"/>
+            </a:lnSpc>
+            <a:spcBef>
+              <a:spcPct val="0"/>
+            </a:spcBef>
+            <a:spcAft>
+              <a:spcPct val="15000"/>
+            </a:spcAft>
+            <a:buChar char="••"/>
+          </a:pPr>
+          <a:r>
+            <a:rPr lang="en-US" sz="1900" kern="1200" dirty="0" smtClean="0"/>
+            <a:t>X, Y, Z Position Controller</a:t>
+          </a:r>
+          <a:endParaRPr lang="en-US" sz="1900" kern="1200" dirty="0"/>
+        </a:p>
+        <a:p>
+          <a:pPr marL="171450" lvl="1" indent="-171450" algn="l" defTabSz="844550">
+            <a:lnSpc>
+              <a:spcPct val="90000"/>
+            </a:lnSpc>
+            <a:spcBef>
+              <a:spcPct val="0"/>
+            </a:spcBef>
+            <a:spcAft>
+              <a:spcPct val="15000"/>
+            </a:spcAft>
+            <a:buChar char="••"/>
+          </a:pPr>
+          <a:r>
+            <a:rPr lang="en-US" sz="1900" kern="1200" dirty="0" smtClean="0"/>
+            <a:t>Settings</a:t>
+          </a:r>
+          <a:br>
+            <a:rPr lang="en-US" sz="1900" kern="1200" dirty="0" smtClean="0"/>
+          </a:br>
+          <a:endParaRPr lang="en-US" sz="1900" kern="1200" dirty="0"/>
+        </a:p>
+        <a:p>
+          <a:pPr marL="171450" lvl="1" indent="-171450" algn="l" defTabSz="844550">
+            <a:lnSpc>
+              <a:spcPct val="90000"/>
+            </a:lnSpc>
+            <a:spcBef>
+              <a:spcPct val="0"/>
+            </a:spcBef>
+            <a:spcAft>
+              <a:spcPct val="15000"/>
+            </a:spcAft>
+            <a:buChar char="••"/>
+          </a:pPr>
+          <a:r>
+            <a:rPr lang="en-US" sz="1900" kern="1200" dirty="0" smtClean="0"/>
+            <a:t>Initialize()</a:t>
+          </a:r>
+          <a:endParaRPr lang="en-US" sz="1900" kern="1200" dirty="0"/>
+        </a:p>
+        <a:p>
+          <a:pPr marL="171450" lvl="1" indent="-171450" algn="l" defTabSz="844550">
+            <a:lnSpc>
+              <a:spcPct val="90000"/>
+            </a:lnSpc>
+            <a:spcBef>
+              <a:spcPct val="0"/>
+            </a:spcBef>
+            <a:spcAft>
+              <a:spcPct val="15000"/>
+            </a:spcAft>
+            <a:buChar char="••"/>
+          </a:pPr>
+          <a:r>
+            <a:rPr lang="en-US" sz="1900" kern="1200" dirty="0" smtClean="0"/>
+            <a:t>Stow()</a:t>
+          </a:r>
+          <a:endParaRPr lang="en-US" sz="1900" kern="1200" dirty="0"/>
+        </a:p>
+        <a:p>
+          <a:pPr marL="171450" lvl="1" indent="-171450" algn="l" defTabSz="844550">
+            <a:lnSpc>
+              <a:spcPct val="90000"/>
+            </a:lnSpc>
+            <a:spcBef>
+              <a:spcPct val="0"/>
+            </a:spcBef>
+            <a:spcAft>
+              <a:spcPct val="15000"/>
+            </a:spcAft>
+            <a:buChar char="••"/>
+          </a:pPr>
+          <a:r>
+            <a:rPr lang="en-US" sz="1900" kern="1200" dirty="0" smtClean="0"/>
+            <a:t>Move to Defined location()</a:t>
+          </a:r>
+          <a:endParaRPr lang="en-US" sz="1900" kern="1200" dirty="0"/>
+        </a:p>
+        <a:p>
+          <a:pPr marL="171450" lvl="1" indent="-171450" algn="l" defTabSz="844550">
+            <a:lnSpc>
+              <a:spcPct val="90000"/>
+            </a:lnSpc>
+            <a:spcBef>
+              <a:spcPct val="0"/>
+            </a:spcBef>
+            <a:spcAft>
+              <a:spcPct val="15000"/>
+            </a:spcAft>
+            <a:buChar char="••"/>
+          </a:pPr>
+          <a:endParaRPr lang="en-US" sz="1900" kern="1200" dirty="0"/>
+        </a:p>
+      </dsp:txBody>
+      <dsp:txXfrm>
+        <a:off x="0" y="366808"/>
+        <a:ext cx="2997200" cy="3786091"/>
+      </dsp:txXfrm>
+    </dsp:sp>
+    <dsp:sp modelId="{1101DBBA-AC85-4020-A333-5D67476C6769}">
+      <dsp:nvSpPr>
+        <dsp:cNvPr id="0" name=""/>
+        <dsp:cNvSpPr/>
+      </dsp:nvSpPr>
+      <dsp:spPr>
+        <a:xfrm>
+          <a:off x="149860" y="28424"/>
+          <a:ext cx="2098040" cy="619920"/>
+        </a:xfrm>
+        <a:prstGeom prst="roundRect">
+          <a:avLst/>
+        </a:prstGeom>
+        <a:solidFill>
+          <a:schemeClr val="accent1">
+            <a:hueOff val="0"/>
+            <a:satOff val="0"/>
+            <a:lumOff val="0"/>
+            <a:alphaOff val="0"/>
+          </a:schemeClr>
+        </a:solidFill>
+        <a:ln w="15875" cap="rnd" cmpd="sng" algn="ctr">
+          <a:solidFill>
+            <a:schemeClr val="lt1">
+              <a:hueOff val="0"/>
+              <a:satOff val="0"/>
+              <a:lumOff val="0"/>
+              <a:alphaOff val="0"/>
+            </a:schemeClr>
+          </a:solidFill>
+          <a:prstDash val="solid"/>
+        </a:ln>
+        <a:effectLst/>
+      </dsp:spPr>
+      <dsp:style>
+        <a:lnRef idx="2">
+          <a:scrgbClr r="0" g="0" b="0"/>
+        </a:lnRef>
+        <a:fillRef idx="1">
+          <a:scrgbClr r="0" g="0" b="0"/>
+        </a:fillRef>
+        <a:effectRef idx="0">
+          <a:scrgbClr r="0" g="0" b="0"/>
+        </a:effectRef>
+        <a:fontRef idx="minor">
+          <a:schemeClr val="lt1"/>
+        </a:fontRef>
+      </dsp:style>
+      <dsp:txBody>
+        <a:bodyPr spcFirstLastPara="0" vert="horz" wrap="square" lIns="79301" tIns="0" rIns="79301" bIns="0" numCol="1" spcCol="1270" anchor="ctr" anchorCtr="0">
+          <a:noAutofit/>
+        </a:bodyPr>
+        <a:lstStyle/>
+        <a:p>
+          <a:pPr lvl="0" algn="l" defTabSz="933450">
+            <a:lnSpc>
+              <a:spcPct val="90000"/>
+            </a:lnSpc>
+            <a:spcBef>
+              <a:spcPct val="0"/>
+            </a:spcBef>
+            <a:spcAft>
+              <a:spcPct val="35000"/>
+            </a:spcAft>
+          </a:pPr>
+          <a:r>
+            <a:rPr lang="en-US" sz="2100" kern="1200" dirty="0" smtClean="0"/>
+            <a:t>Positioner (3D)</a:t>
+          </a:r>
+          <a:endParaRPr lang="en-US" sz="2100" kern="1200" dirty="0"/>
+        </a:p>
+      </dsp:txBody>
+      <dsp:txXfrm>
+        <a:off x="180122" y="58686"/>
+        <a:ext cx="2037516" cy="559396"/>
+      </dsp:txXfrm>
+    </dsp:sp>
+  </dsp:spTree>
+</dsp:drawing>
 </file>
 
-<file path=ppt/diagrams/layout3.xml><?xml version="1.0" encoding="utf-8"?>
-<dgm:layoutDef xmlns:dgm="http://schemas.openxmlformats.org/drawingml/2006/diagram" xmlns:a="http://schemas.openxmlformats.org/drawingml/2006/main" uniqueId="urn:microsoft.com/office/officeart/2005/8/layout/list1">
-  <dgm:title val=""/>
-  <dgm:desc val=""/>
-  <dgm:catLst>
-    <dgm:cat type="list" pri="4000"/>
-  </dgm:catLst>
-  <dgm:sampData>
-    <dgm:dataModel>
-      <dgm:ptLst>
-        <dgm:pt modelId="0" type="doc"/>
-        <dgm:pt modelId="1">
-          <dgm:prSet phldr="1"/>
-        </dgm:pt>
-        <dgm:pt modelId="2">
-          <dgm:prSet phldr="1"/>
-        </dgm:pt>
-        <dgm:pt modelId="3">
-          <dgm:prSet phldr="1"/>
-        </dgm:pt>
-      </dgm:ptLst>
-      <dgm:cxnLst>
-        <dgm:cxn modelId="4" srcId="0" destId="1" srcOrd="0" destOrd="0"/>
-        <dgm:cxn modelId="5" srcId="0" destId="2" srcOrd="1" destOrd="0"/>
-        <dgm:cxn modelId="6" srcId="0" destId="3" srcOrd="2" destOrd="0"/>
-      </dgm:cxnLst>
-      <dgm:bg/>
-      <dgm:whole/>
-    </dgm:dataModel>
-  </dgm:sampData>
-  <dgm:styleData>
-    <dgm:dataModel>
-      <dgm:ptLst>
-        <dgm:pt modelId="0" type="doc"/>
-        <dgm:pt modelId="1"/>
-        <dgm:pt modelId="2"/>
-      </dgm:ptLst>
-      <dgm:cxnLst>
-        <dgm:cxn modelId="4" srcId="0" destId="1" srcOrd="0" destOrd="0"/>
-        <dgm:cxn modelId="5" srcId="0" destId="2" srcOrd="1" destOrd="0"/>
-      </dgm:cxnLst>
-      <dgm:bg/>
-      <dgm:whole/>
-    </dgm:dataModel>
-  </dgm:styleData>
-  <dgm:clrData>
-    <dgm:dataModel>
-      <dgm:ptLst>
-        <dgm:pt modelId="0" type="doc"/>
-        <dgm:pt modelId="1"/>
-        <dgm:pt modelId="2"/>
-        <dgm:pt modelId="3"/>
-        <dgm:pt modelId="4"/>
-      </dgm:ptLst>
-      <dgm:cxnLst>
-        <dgm:cxn modelId="5" srcId="0" destId="1" srcOrd="0" destOrd="0"/>
-        <dgm:cxn modelId="6" srcId="0" destId="2" srcOrd="1" destOrd="0"/>
-        <dgm:cxn modelId="7" srcId="0" destId="3" srcOrd="2" destOrd="0"/>
-        <dgm:cxn modelId="8" srcId="0" destId="4" srcOrd="3" destOrd="0"/>
-      </dgm:cxnLst>
-      <dgm:bg/>
-      <dgm:whole/>
-    </dgm:dataModel>
-  </dgm:clrData>
-  <dgm:layoutNode name="linear">
-    <dgm:varLst>
-      <dgm:dir/>
-      <dgm:animLvl val="lvl"/>
-      <dgm:resizeHandles val="exact"/>
-    </dgm:varLst>
-    <dgm:choose name="Name0">
-      <dgm:if name="Name1" func="var" arg="dir" op="equ" val="norm">
-        <dgm:alg type="lin">
-          <dgm:param type="linDir" val="fromT"/>
-          <dgm:param type="vertAlign" val="mid"/>
-          <dgm:param type="horzAlign" val="l"/>
-          <dgm:param type="nodeHorzAlign" val="l"/>
-        </dgm:alg>
-      </dgm:if>
-      <dgm:else name="Name2">
-        <dgm:alg type="lin">
-          <dgm:param type="linDir" val="fromT"/>
-          <dgm:param type="vertAlign" val="mid"/>
-          <dgm:param type="horzAlign" val="r"/>
-          <dgm:param type="nodeHorzAlign" val="r"/>
-        </dgm:alg>
-      </dgm:else>
-    </dgm:choose>
-    <dgm:shape xmlns:r="http://schemas.openxmlformats.org/officeDocument/2006/relationships" r:blip="">
-      <dgm:adjLst/>
-    </dgm:shape>
-    <dgm:presOf/>
-    <dgm:constrLst>
-      <dgm:constr type="w" for="ch" forName="parentLin" refType="w"/>
-      <dgm:constr type="h" for="ch" forName="parentLin" val="INF"/>
-      <dgm:constr type="w" for="des" forName="parentLeftMargin" refType="w" fact="0.05"/>
-      <dgm:constr type="w" for="des" forName="parentText" refType="w" fact="0.7"/>
-      <dgm:constr type="h" for="des" forName="parentText" refType="primFontSz" refFor="des" refForName="parentText" fact="0.82"/>
-      <dgm:constr type="h" for="ch" forName="negativeSpace" refType="primFontSz" refFor="des" refForName="parentText" fact="-0.41"/>
-      <dgm:constr type="h" for="ch" forName="negativeSpace" refType="h" refFor="des" refForName="parentText" op="lte" fact="-0.82"/>
-      <dgm:constr type="h" for="ch" forName="negativeSpace" refType="h" refFor="des" refForName="parentText" op="gte" fact="-0.82"/>
-      <dgm:constr type="w" for="ch" forName="childText" refType="w"/>
-      <dgm:constr type="h" for="ch" forName="childText" refType="primFontSz" refFor="des" refForName="parentText" fact="0.7"/>
-      <dgm:constr type="primFontSz" for="des" forName="parentText" val="65"/>
-      <dgm:constr type="primFontSz" for="ch" forName="childText" refType="primFontSz" refFor="des" refForName="parentText"/>
-      <dgm:constr type="tMarg" for="ch" forName="childText" refType="primFontSz" refFor="des" refForName="parentText" fact="1.64"/>
-      <dgm:constr type="tMarg" for="ch" forName="childText" refType="h" refFor="des" refForName="parentText" op="lte" fact="3.28"/>
-      <dgm:constr type="tMarg" for="ch" forName="childText" refType="h" refFor="des" refForName="parentText" op="gte" fact="3.28"/>
-      <dgm:constr type="lMarg" for="ch" forName="childText" refType="w" fact="0.22"/>
-      <dgm:constr type="rMarg" for="ch" forName="childText" refType="lMarg" refFor="ch" refForName="childText"/>
-      <dgm:constr type="lMarg" for="des" forName="parentText" refType="w" fact="0.075"/>
-      <dgm:constr type="rMarg" for="des" forName="parentText" refType="lMarg" refFor="des" refForName="parentText"/>
-      <dgm:constr type="h" for="ch" forName="spaceBetweenRectangles" refType="primFontSz" refFor="des" refForName="parentText" fact="0.15"/>
-    </dgm:constrLst>
-    <dgm:ruleLst>
-      <dgm:rule type="primFontSz" for="des" forName="parentText" val="5" fact="NaN" max="NaN"/>
-    </dgm:ruleLst>
-    <dgm:forEach name="Name3" axis="ch" ptType="node">
-      <dgm:layoutNode name="parentLin">
-        <dgm:choose name="Name4">
-          <dgm:if name="Name5" func="var" arg="dir" op="equ" val="norm">
-            <dgm:alg type="lin">
-              <dgm:param type="linDir" val="fromL"/>
-              <dgm:param type="horzAlign" val="l"/>
-              <dgm:param type="nodeHorzAlign" val="l"/>
-            </dgm:alg>
-          </dgm:if>
-          <dgm:else name="Name6">
-            <dgm:alg type="lin">
-              <dgm:param type="linDir" val="fromR"/>
-              <dgm:param type="horzAlign" val="r"/>
-              <dgm:param type="nodeHorzAlign" val="r"/>
-            </dgm:alg>
-          </dgm:else>
-        </dgm:choose>
-        <dgm:shape xmlns:r="http://schemas.openxmlformats.org/officeDocument/2006/relationships" r:blip="">
-          <dgm:adjLst/>
-        </dgm:shape>
-        <dgm:presOf/>
-        <dgm:constrLst/>
-        <dgm:ruleLst/>
-        <dgm:layoutNode name="parentLeftMargin">
-          <dgm:alg type="sp"/>
-          <dgm:shape xmlns:r="http://schemas.openxmlformats.org/officeDocument/2006/relationships" type="rect" r:blip="" hideGeom="1">
-            <dgm:adjLst/>
-          </dgm:shape>
-          <dgm:presOf axis="self"/>
-          <dgm:constrLst>
-            <dgm:constr type="h"/>
-          </dgm:constrLst>
-          <dgm:ruleLst/>
-        </dgm:layoutNode>
-        <dgm:layoutNode name="parentText" styleLbl="node1">
-          <dgm:varLst>
-            <dgm:chMax val="0"/>
-            <dgm:bulletEnabled val="1"/>
-          </dgm:varLst>
-          <dgm:choose name="Name7">
-            <dgm:if name="Name8" func="var" arg="dir" op="equ" val="norm">
-              <dgm:alg type="tx">
-                <dgm:param type="parTxLTRAlign" val="l"/>
-                <dgm:param type="parTxRTLAlign" val="l"/>
-              </dgm:alg>
-            </dgm:if>
-            <dgm:else name="Name9">
-              <dgm:alg type="tx">
-                <dgm:param type="parTxLTRAlign" val="r"/>
-                <dgm:param type="parTxRTLAlign" val="r"/>
-              </dgm:alg>
-            </dgm:else>
-          </dgm:choose>
-          <dgm:shape xmlns:r="http://schemas.openxmlformats.org/officeDocument/2006/relationships" type="roundRect" r:blip="">
-            <dgm:adjLst/>
-          </dgm:shape>
-          <dgm:presOf axis="self" ptType="node"/>
-          <dgm:constrLst>
-            <dgm:constr type="tMarg"/>
-            <dgm:constr type="bMarg"/>
-          </dgm:constrLst>
-          <dgm:ruleLst/>
-        </dgm:layoutNode>
-      </dgm:layoutNode>
-      <dgm:layoutNode name="negativeSpace">
-        <dgm:alg type="sp"/>
-        <dgm:shape xmlns:r="http://schemas.openxmlformats.org/officeDocument/2006/relationships" r:blip="">
-          <dgm:adjLst/>
-        </dgm:shape>
-        <dgm:presOf/>
-        <dgm:constrLst/>
-        <dgm:ruleLst/>
-      </dgm:layoutNode>
-      <dgm:layoutNode name="childText" styleLbl="conFgAcc1">
-        <dgm:varLst>
-          <dgm:bulletEnabled val="1"/>
-        </dgm:varLst>
-        <dgm:alg type="tx">
-          <dgm:param type="stBulletLvl" val="1"/>
-        </dgm:alg>
-        <dgm:shape xmlns:r="http://schemas.openxmlformats.org/officeDocument/2006/relationships" type="rect" r:blip="" zOrderOff="-2">
-          <dgm:adjLst/>
-        </dgm:shape>
-        <dgm:presOf axis="des" ptType="node"/>
-        <dgm:constrLst>
-          <dgm:constr type="secFontSz" refType="primFontSz"/>
-        </dgm:constrLst>
-        <dgm:ruleLst>
-          <dgm:rule type="h" val="INF" fact="NaN" max="NaN"/>
-        </dgm:ruleLst>
-      </dgm:layoutNode>
-      <dgm:forEach name="Name10" axis="followSib" ptType="sibTrans" cnt="1">
-        <dgm:layoutNode name="spaceBetweenRectangles">
-          <dgm:alg type="sp"/>
-          <dgm:shape xmlns:r="http://schemas.openxmlformats.org/officeDocument/2006/relationships" r:blip="">
-            <dgm:adjLst/>
-          </dgm:shape>
-          <dgm:presOf/>
-          <dgm:constrLst/>
-          <dgm:ruleLst/>
-        </dgm:layoutNode>
-      </dgm:forEach>
-    </dgm:forEach>
-  </dgm:layoutNode>
-</dgm:layoutDef>
+<file path=ppt/diagrams/drawing4.xml><?xml version="1.0" encoding="utf-8"?>
+<dsp:drawing xmlns:dgm="http://schemas.openxmlformats.org/drawingml/2006/diagram" xmlns:dsp="http://schemas.microsoft.com/office/drawing/2008/diagram" xmlns:a="http://schemas.openxmlformats.org/drawingml/2006/main">
+  <dsp:spTree>
+    <dsp:nvGrpSpPr>
+      <dsp:cNvPr id="0" name=""/>
+      <dsp:cNvGrpSpPr/>
+    </dsp:nvGrpSpPr>
+    <dsp:grpSpPr/>
+    <dsp:sp modelId="{824034AE-157F-469F-915C-EC6DAE34225C}">
+      <dsp:nvSpPr>
+        <dsp:cNvPr id="0" name=""/>
+        <dsp:cNvSpPr/>
+      </dsp:nvSpPr>
+      <dsp:spPr>
+        <a:xfrm>
+          <a:off x="0" y="830074"/>
+          <a:ext cx="3873500" cy="3602225"/>
+        </a:xfrm>
+        <a:prstGeom prst="rect">
+          <a:avLst/>
+        </a:prstGeom>
+        <a:solidFill>
+          <a:schemeClr val="lt1">
+            <a:alpha val="90000"/>
+            <a:hueOff val="0"/>
+            <a:satOff val="0"/>
+            <a:lumOff val="0"/>
+            <a:alphaOff val="0"/>
+          </a:schemeClr>
+        </a:solidFill>
+        <a:ln w="15875" cap="rnd" cmpd="sng" algn="ctr">
+          <a:solidFill>
+            <a:schemeClr val="accent1">
+              <a:hueOff val="0"/>
+              <a:satOff val="0"/>
+              <a:lumOff val="0"/>
+              <a:alphaOff val="0"/>
+            </a:schemeClr>
+          </a:solidFill>
+          <a:prstDash val="solid"/>
+        </a:ln>
+        <a:effectLst/>
+      </dsp:spPr>
+      <dsp:style>
+        <a:lnRef idx="2">
+          <a:scrgbClr r="0" g="0" b="0"/>
+        </a:lnRef>
+        <a:fillRef idx="1">
+          <a:scrgbClr r="0" g="0" b="0"/>
+        </a:fillRef>
+        <a:effectRef idx="0">
+          <a:scrgbClr r="0" g="0" b="0"/>
+        </a:effectRef>
+        <a:fontRef idx="minor"/>
+      </dsp:style>
+      <dsp:txBody>
+        <a:bodyPr spcFirstLastPara="0" vert="horz" wrap="square" lIns="300627" tIns="208280" rIns="300627" bIns="135128" numCol="1" spcCol="1270" anchor="t" anchorCtr="0">
+          <a:noAutofit/>
+        </a:bodyPr>
+        <a:lstStyle/>
+        <a:p>
+          <a:pPr marL="171450" lvl="1" indent="-171450" algn="l" defTabSz="844550">
+            <a:lnSpc>
+              <a:spcPct val="90000"/>
+            </a:lnSpc>
+            <a:spcBef>
+              <a:spcPct val="0"/>
+            </a:spcBef>
+            <a:spcAft>
+              <a:spcPct val="15000"/>
+            </a:spcAft>
+            <a:buChar char="••"/>
+          </a:pPr>
+          <a:r>
+            <a:rPr lang="en-US" sz="1900" kern="1200" dirty="0" smtClean="0"/>
+            <a:t>Initialize()</a:t>
+          </a:r>
+          <a:endParaRPr lang="en-US" sz="1900" kern="1200" dirty="0"/>
+        </a:p>
+        <a:p>
+          <a:pPr marL="171450" lvl="1" indent="-171450" algn="l" defTabSz="844550">
+            <a:lnSpc>
+              <a:spcPct val="90000"/>
+            </a:lnSpc>
+            <a:spcBef>
+              <a:spcPct val="0"/>
+            </a:spcBef>
+            <a:spcAft>
+              <a:spcPct val="15000"/>
+            </a:spcAft>
+            <a:buChar char="••"/>
+          </a:pPr>
+          <a:r>
+            <a:rPr lang="en-US" sz="1900" kern="1200" dirty="0" smtClean="0"/>
+            <a:t>Stow()</a:t>
+          </a:r>
+          <a:endParaRPr lang="en-US" sz="1900" kern="1200" dirty="0"/>
+        </a:p>
+        <a:p>
+          <a:pPr marL="171450" lvl="1" indent="-171450" algn="l" defTabSz="844550">
+            <a:lnSpc>
+              <a:spcPct val="90000"/>
+            </a:lnSpc>
+            <a:spcBef>
+              <a:spcPct val="0"/>
+            </a:spcBef>
+            <a:spcAft>
+              <a:spcPct val="15000"/>
+            </a:spcAft>
+            <a:buChar char="••"/>
+          </a:pPr>
+          <a:r>
+            <a:rPr lang="en-US" sz="1900" kern="1200" dirty="0" smtClean="0"/>
+            <a:t>Move forward/backward ()(with preset velocity/acceleration)</a:t>
+          </a:r>
+          <a:endParaRPr lang="en-US" sz="1900" kern="1200" dirty="0"/>
+        </a:p>
+        <a:p>
+          <a:pPr marL="171450" lvl="1" indent="-171450" algn="l" defTabSz="844550">
+            <a:lnSpc>
+              <a:spcPct val="90000"/>
+            </a:lnSpc>
+            <a:spcBef>
+              <a:spcPct val="0"/>
+            </a:spcBef>
+            <a:spcAft>
+              <a:spcPct val="15000"/>
+            </a:spcAft>
+            <a:buChar char="••"/>
+          </a:pPr>
+          <a:r>
+            <a:rPr lang="en-US" sz="1900" kern="1200" dirty="0" smtClean="0"/>
+            <a:t>Stop()</a:t>
+          </a:r>
+          <a:endParaRPr lang="en-US" sz="1900" kern="1200" dirty="0"/>
+        </a:p>
+        <a:p>
+          <a:pPr marL="171450" lvl="1" indent="-171450" algn="l" defTabSz="844550">
+            <a:lnSpc>
+              <a:spcPct val="90000"/>
+            </a:lnSpc>
+            <a:spcBef>
+              <a:spcPct val="0"/>
+            </a:spcBef>
+            <a:spcAft>
+              <a:spcPct val="15000"/>
+            </a:spcAft>
+            <a:buChar char="••"/>
+          </a:pPr>
+          <a:r>
+            <a:rPr lang="en-US" sz="1900" kern="1200" dirty="0" smtClean="0"/>
+            <a:t>Jog() (forward/backward)</a:t>
+          </a:r>
+          <a:endParaRPr lang="en-US" sz="1900" kern="1200" dirty="0"/>
+        </a:p>
+        <a:p>
+          <a:pPr marL="171450" lvl="1" indent="-171450" algn="l" defTabSz="844550">
+            <a:lnSpc>
+              <a:spcPct val="90000"/>
+            </a:lnSpc>
+            <a:spcBef>
+              <a:spcPct val="0"/>
+            </a:spcBef>
+            <a:spcAft>
+              <a:spcPct val="15000"/>
+            </a:spcAft>
+            <a:buChar char="••"/>
+          </a:pPr>
+          <a:r>
+            <a:rPr lang="en-US" sz="1900" kern="1200" dirty="0" smtClean="0"/>
+            <a:t>Move() to defined location</a:t>
+          </a:r>
+          <a:endParaRPr lang="en-US" sz="1900" kern="1200" dirty="0"/>
+        </a:p>
+        <a:p>
+          <a:pPr marL="171450" lvl="1" indent="-171450" algn="l" defTabSz="844550">
+            <a:lnSpc>
+              <a:spcPct val="90000"/>
+            </a:lnSpc>
+            <a:spcBef>
+              <a:spcPct val="0"/>
+            </a:spcBef>
+            <a:spcAft>
+              <a:spcPct val="15000"/>
+            </a:spcAft>
+            <a:buChar char="••"/>
+          </a:pPr>
+          <a:endParaRPr lang="en-US" sz="1900" kern="1200" dirty="0"/>
+        </a:p>
+        <a:p>
+          <a:pPr marL="171450" lvl="1" indent="-171450" algn="l" defTabSz="844550">
+            <a:lnSpc>
+              <a:spcPct val="90000"/>
+            </a:lnSpc>
+            <a:spcBef>
+              <a:spcPct val="0"/>
+            </a:spcBef>
+            <a:spcAft>
+              <a:spcPct val="15000"/>
+            </a:spcAft>
+            <a:buChar char="••"/>
+          </a:pPr>
+          <a:r>
+            <a:rPr lang="en-US" sz="1900" kern="1200" dirty="0" smtClean="0"/>
+            <a:t>Settings (many)</a:t>
+          </a:r>
+          <a:endParaRPr lang="en-US" sz="1900" kern="1200" dirty="0"/>
+        </a:p>
+      </dsp:txBody>
+      <dsp:txXfrm>
+        <a:off x="0" y="830074"/>
+        <a:ext cx="3873500" cy="3602225"/>
+      </dsp:txXfrm>
+    </dsp:sp>
+    <dsp:sp modelId="{1101DBBA-AC85-4020-A333-5D67476C6769}">
+      <dsp:nvSpPr>
+        <dsp:cNvPr id="0" name=""/>
+        <dsp:cNvSpPr/>
+      </dsp:nvSpPr>
+      <dsp:spPr>
+        <a:xfrm>
+          <a:off x="193485" y="799"/>
+          <a:ext cx="2708802" cy="889375"/>
+        </a:xfrm>
+        <a:prstGeom prst="roundRect">
+          <a:avLst/>
+        </a:prstGeom>
+        <a:solidFill>
+          <a:schemeClr val="accent1">
+            <a:hueOff val="0"/>
+            <a:satOff val="0"/>
+            <a:lumOff val="0"/>
+            <a:alphaOff val="0"/>
+          </a:schemeClr>
+        </a:solidFill>
+        <a:ln w="15875" cap="rnd" cmpd="sng" algn="ctr">
+          <a:solidFill>
+            <a:schemeClr val="lt1">
+              <a:hueOff val="0"/>
+              <a:satOff val="0"/>
+              <a:lumOff val="0"/>
+              <a:alphaOff val="0"/>
+            </a:schemeClr>
+          </a:solidFill>
+          <a:prstDash val="solid"/>
+        </a:ln>
+        <a:effectLst/>
+      </dsp:spPr>
+      <dsp:style>
+        <a:lnRef idx="2">
+          <a:scrgbClr r="0" g="0" b="0"/>
+        </a:lnRef>
+        <a:fillRef idx="1">
+          <a:scrgbClr r="0" g="0" b="0"/>
+        </a:fillRef>
+        <a:effectRef idx="0">
+          <a:scrgbClr r="0" g="0" b="0"/>
+        </a:effectRef>
+        <a:fontRef idx="minor">
+          <a:schemeClr val="lt1"/>
+        </a:fontRef>
+      </dsp:style>
+      <dsp:txBody>
+        <a:bodyPr spcFirstLastPara="0" vert="horz" wrap="square" lIns="102486" tIns="0" rIns="102486" bIns="0" numCol="1" spcCol="1270" anchor="ctr" anchorCtr="0">
+          <a:noAutofit/>
+        </a:bodyPr>
+        <a:lstStyle/>
+        <a:p>
+          <a:pPr lvl="0" algn="l" defTabSz="800100">
+            <a:lnSpc>
+              <a:spcPct val="90000"/>
+            </a:lnSpc>
+            <a:spcBef>
+              <a:spcPct val="0"/>
+            </a:spcBef>
+            <a:spcAft>
+              <a:spcPct val="35000"/>
+            </a:spcAft>
+          </a:pPr>
+          <a:r>
+            <a:rPr lang="en-US" sz="1800" kern="1200" dirty="0" smtClean="0"/>
+            <a:t>Position Controller</a:t>
+          </a:r>
+          <a:endParaRPr lang="en-US" sz="1800" kern="1200" dirty="0"/>
+        </a:p>
+      </dsp:txBody>
+      <dsp:txXfrm>
+        <a:off x="236901" y="44215"/>
+        <a:ext cx="2621970" cy="802543"/>
+      </dsp:txXfrm>
+    </dsp:sp>
+  </dsp:spTree>
+</dsp:drawing>
 </file>
 
-<file path=ppt/diagrams/layout4.xml><?xml version="1.0" encoding="utf-8"?>
+<file path=ppt/diagrams/layout1.xml><?xml version="1.0" encoding="utf-8"?>
 <dgm:layoutDef xmlns:dgm="http://schemas.openxmlformats.org/drawingml/2006/diagram" xmlns:a="http://schemas.openxmlformats.org/drawingml/2006/main" uniqueId="urn:microsoft.com/office/officeart/2005/8/layout/orgChart1">
   <dgm:title val=""/>
   <dgm:desc val=""/>
@@ -8306,6 +7750,681 @@
 </dgm:layoutDef>
 </file>
 
+<file path=ppt/diagrams/layout2.xml><?xml version="1.0" encoding="utf-8"?>
+<dgm:layoutDef xmlns:dgm="http://schemas.openxmlformats.org/drawingml/2006/diagram" xmlns:a="http://schemas.openxmlformats.org/drawingml/2006/main" uniqueId="urn:microsoft.com/office/officeart/2005/8/layout/list1">
+  <dgm:title val=""/>
+  <dgm:desc val=""/>
+  <dgm:catLst>
+    <dgm:cat type="list" pri="4000"/>
+  </dgm:catLst>
+  <dgm:sampData>
+    <dgm:dataModel>
+      <dgm:ptLst>
+        <dgm:pt modelId="0" type="doc"/>
+        <dgm:pt modelId="1">
+          <dgm:prSet phldr="1"/>
+        </dgm:pt>
+        <dgm:pt modelId="2">
+          <dgm:prSet phldr="1"/>
+        </dgm:pt>
+        <dgm:pt modelId="3">
+          <dgm:prSet phldr="1"/>
+        </dgm:pt>
+      </dgm:ptLst>
+      <dgm:cxnLst>
+        <dgm:cxn modelId="4" srcId="0" destId="1" srcOrd="0" destOrd="0"/>
+        <dgm:cxn modelId="5" srcId="0" destId="2" srcOrd="1" destOrd="0"/>
+        <dgm:cxn modelId="6" srcId="0" destId="3" srcOrd="2" destOrd="0"/>
+      </dgm:cxnLst>
+      <dgm:bg/>
+      <dgm:whole/>
+    </dgm:dataModel>
+  </dgm:sampData>
+  <dgm:styleData>
+    <dgm:dataModel>
+      <dgm:ptLst>
+        <dgm:pt modelId="0" type="doc"/>
+        <dgm:pt modelId="1"/>
+        <dgm:pt modelId="2"/>
+      </dgm:ptLst>
+      <dgm:cxnLst>
+        <dgm:cxn modelId="4" srcId="0" destId="1" srcOrd="0" destOrd="0"/>
+        <dgm:cxn modelId="5" srcId="0" destId="2" srcOrd="1" destOrd="0"/>
+      </dgm:cxnLst>
+      <dgm:bg/>
+      <dgm:whole/>
+    </dgm:dataModel>
+  </dgm:styleData>
+  <dgm:clrData>
+    <dgm:dataModel>
+      <dgm:ptLst>
+        <dgm:pt modelId="0" type="doc"/>
+        <dgm:pt modelId="1"/>
+        <dgm:pt modelId="2"/>
+        <dgm:pt modelId="3"/>
+        <dgm:pt modelId="4"/>
+      </dgm:ptLst>
+      <dgm:cxnLst>
+        <dgm:cxn modelId="5" srcId="0" destId="1" srcOrd="0" destOrd="0"/>
+        <dgm:cxn modelId="6" srcId="0" destId="2" srcOrd="1" destOrd="0"/>
+        <dgm:cxn modelId="7" srcId="0" destId="3" srcOrd="2" destOrd="0"/>
+        <dgm:cxn modelId="8" srcId="0" destId="4" srcOrd="3" destOrd="0"/>
+      </dgm:cxnLst>
+      <dgm:bg/>
+      <dgm:whole/>
+    </dgm:dataModel>
+  </dgm:clrData>
+  <dgm:layoutNode name="linear">
+    <dgm:varLst>
+      <dgm:dir/>
+      <dgm:animLvl val="lvl"/>
+      <dgm:resizeHandles val="exact"/>
+    </dgm:varLst>
+    <dgm:choose name="Name0">
+      <dgm:if name="Name1" func="var" arg="dir" op="equ" val="norm">
+        <dgm:alg type="lin">
+          <dgm:param type="linDir" val="fromT"/>
+          <dgm:param type="vertAlign" val="mid"/>
+          <dgm:param type="horzAlign" val="l"/>
+          <dgm:param type="nodeHorzAlign" val="l"/>
+        </dgm:alg>
+      </dgm:if>
+      <dgm:else name="Name2">
+        <dgm:alg type="lin">
+          <dgm:param type="linDir" val="fromT"/>
+          <dgm:param type="vertAlign" val="mid"/>
+          <dgm:param type="horzAlign" val="r"/>
+          <dgm:param type="nodeHorzAlign" val="r"/>
+        </dgm:alg>
+      </dgm:else>
+    </dgm:choose>
+    <dgm:shape xmlns:r="http://schemas.openxmlformats.org/officeDocument/2006/relationships" r:blip="">
+      <dgm:adjLst/>
+    </dgm:shape>
+    <dgm:presOf/>
+    <dgm:constrLst>
+      <dgm:constr type="w" for="ch" forName="parentLin" refType="w"/>
+      <dgm:constr type="h" for="ch" forName="parentLin" val="INF"/>
+      <dgm:constr type="w" for="des" forName="parentLeftMargin" refType="w" fact="0.05"/>
+      <dgm:constr type="w" for="des" forName="parentText" refType="w" fact="0.7"/>
+      <dgm:constr type="h" for="des" forName="parentText" refType="primFontSz" refFor="des" refForName="parentText" fact="0.82"/>
+      <dgm:constr type="h" for="ch" forName="negativeSpace" refType="primFontSz" refFor="des" refForName="parentText" fact="-0.41"/>
+      <dgm:constr type="h" for="ch" forName="negativeSpace" refType="h" refFor="des" refForName="parentText" op="lte" fact="-0.82"/>
+      <dgm:constr type="h" for="ch" forName="negativeSpace" refType="h" refFor="des" refForName="parentText" op="gte" fact="-0.82"/>
+      <dgm:constr type="w" for="ch" forName="childText" refType="w"/>
+      <dgm:constr type="h" for="ch" forName="childText" refType="primFontSz" refFor="des" refForName="parentText" fact="0.7"/>
+      <dgm:constr type="primFontSz" for="des" forName="parentText" val="65"/>
+      <dgm:constr type="primFontSz" for="ch" forName="childText" refType="primFontSz" refFor="des" refForName="parentText"/>
+      <dgm:constr type="tMarg" for="ch" forName="childText" refType="primFontSz" refFor="des" refForName="parentText" fact="1.64"/>
+      <dgm:constr type="tMarg" for="ch" forName="childText" refType="h" refFor="des" refForName="parentText" op="lte" fact="3.28"/>
+      <dgm:constr type="tMarg" for="ch" forName="childText" refType="h" refFor="des" refForName="parentText" op="gte" fact="3.28"/>
+      <dgm:constr type="lMarg" for="ch" forName="childText" refType="w" fact="0.22"/>
+      <dgm:constr type="rMarg" for="ch" forName="childText" refType="lMarg" refFor="ch" refForName="childText"/>
+      <dgm:constr type="lMarg" for="des" forName="parentText" refType="w" fact="0.075"/>
+      <dgm:constr type="rMarg" for="des" forName="parentText" refType="lMarg" refFor="des" refForName="parentText"/>
+      <dgm:constr type="h" for="ch" forName="spaceBetweenRectangles" refType="primFontSz" refFor="des" refForName="parentText" fact="0.15"/>
+    </dgm:constrLst>
+    <dgm:ruleLst>
+      <dgm:rule type="primFontSz" for="des" forName="parentText" val="5" fact="NaN" max="NaN"/>
+    </dgm:ruleLst>
+    <dgm:forEach name="Name3" axis="ch" ptType="node">
+      <dgm:layoutNode name="parentLin">
+        <dgm:choose name="Name4">
+          <dgm:if name="Name5" func="var" arg="dir" op="equ" val="norm">
+            <dgm:alg type="lin">
+              <dgm:param type="linDir" val="fromL"/>
+              <dgm:param type="horzAlign" val="l"/>
+              <dgm:param type="nodeHorzAlign" val="l"/>
+            </dgm:alg>
+          </dgm:if>
+          <dgm:else name="Name6">
+            <dgm:alg type="lin">
+              <dgm:param type="linDir" val="fromR"/>
+              <dgm:param type="horzAlign" val="r"/>
+              <dgm:param type="nodeHorzAlign" val="r"/>
+            </dgm:alg>
+          </dgm:else>
+        </dgm:choose>
+        <dgm:shape xmlns:r="http://schemas.openxmlformats.org/officeDocument/2006/relationships" r:blip="">
+          <dgm:adjLst/>
+        </dgm:shape>
+        <dgm:presOf/>
+        <dgm:constrLst/>
+        <dgm:ruleLst/>
+        <dgm:layoutNode name="parentLeftMargin">
+          <dgm:alg type="sp"/>
+          <dgm:shape xmlns:r="http://schemas.openxmlformats.org/officeDocument/2006/relationships" type="rect" r:blip="" hideGeom="1">
+            <dgm:adjLst/>
+          </dgm:shape>
+          <dgm:presOf axis="self"/>
+          <dgm:constrLst>
+            <dgm:constr type="h"/>
+          </dgm:constrLst>
+          <dgm:ruleLst/>
+        </dgm:layoutNode>
+        <dgm:layoutNode name="parentText" styleLbl="node1">
+          <dgm:varLst>
+            <dgm:chMax val="0"/>
+            <dgm:bulletEnabled val="1"/>
+          </dgm:varLst>
+          <dgm:choose name="Name7">
+            <dgm:if name="Name8" func="var" arg="dir" op="equ" val="norm">
+              <dgm:alg type="tx">
+                <dgm:param type="parTxLTRAlign" val="l"/>
+                <dgm:param type="parTxRTLAlign" val="l"/>
+              </dgm:alg>
+            </dgm:if>
+            <dgm:else name="Name9">
+              <dgm:alg type="tx">
+                <dgm:param type="parTxLTRAlign" val="r"/>
+                <dgm:param type="parTxRTLAlign" val="r"/>
+              </dgm:alg>
+            </dgm:else>
+          </dgm:choose>
+          <dgm:shape xmlns:r="http://schemas.openxmlformats.org/officeDocument/2006/relationships" type="roundRect" r:blip="">
+            <dgm:adjLst/>
+          </dgm:shape>
+          <dgm:presOf axis="self" ptType="node"/>
+          <dgm:constrLst>
+            <dgm:constr type="tMarg"/>
+            <dgm:constr type="bMarg"/>
+          </dgm:constrLst>
+          <dgm:ruleLst/>
+        </dgm:layoutNode>
+      </dgm:layoutNode>
+      <dgm:layoutNode name="negativeSpace">
+        <dgm:alg type="sp"/>
+        <dgm:shape xmlns:r="http://schemas.openxmlformats.org/officeDocument/2006/relationships" r:blip="">
+          <dgm:adjLst/>
+        </dgm:shape>
+        <dgm:presOf/>
+        <dgm:constrLst/>
+        <dgm:ruleLst/>
+      </dgm:layoutNode>
+      <dgm:layoutNode name="childText" styleLbl="conFgAcc1">
+        <dgm:varLst>
+          <dgm:bulletEnabled val="1"/>
+        </dgm:varLst>
+        <dgm:alg type="tx">
+          <dgm:param type="stBulletLvl" val="1"/>
+        </dgm:alg>
+        <dgm:shape xmlns:r="http://schemas.openxmlformats.org/officeDocument/2006/relationships" type="rect" r:blip="" zOrderOff="-2">
+          <dgm:adjLst/>
+        </dgm:shape>
+        <dgm:presOf axis="des" ptType="node"/>
+        <dgm:constrLst>
+          <dgm:constr type="secFontSz" refType="primFontSz"/>
+        </dgm:constrLst>
+        <dgm:ruleLst>
+          <dgm:rule type="h" val="INF" fact="NaN" max="NaN"/>
+        </dgm:ruleLst>
+      </dgm:layoutNode>
+      <dgm:forEach name="Name10" axis="followSib" ptType="sibTrans" cnt="1">
+        <dgm:layoutNode name="spaceBetweenRectangles">
+          <dgm:alg type="sp"/>
+          <dgm:shape xmlns:r="http://schemas.openxmlformats.org/officeDocument/2006/relationships" r:blip="">
+            <dgm:adjLst/>
+          </dgm:shape>
+          <dgm:presOf/>
+          <dgm:constrLst/>
+          <dgm:ruleLst/>
+        </dgm:layoutNode>
+      </dgm:forEach>
+    </dgm:forEach>
+  </dgm:layoutNode>
+</dgm:layoutDef>
+</file>
+
+<file path=ppt/diagrams/layout3.xml><?xml version="1.0" encoding="utf-8"?>
+<dgm:layoutDef xmlns:dgm="http://schemas.openxmlformats.org/drawingml/2006/diagram" xmlns:a="http://schemas.openxmlformats.org/drawingml/2006/main" uniqueId="urn:microsoft.com/office/officeart/2005/8/layout/list1">
+  <dgm:title val=""/>
+  <dgm:desc val=""/>
+  <dgm:catLst>
+    <dgm:cat type="list" pri="4000"/>
+  </dgm:catLst>
+  <dgm:sampData>
+    <dgm:dataModel>
+      <dgm:ptLst>
+        <dgm:pt modelId="0" type="doc"/>
+        <dgm:pt modelId="1">
+          <dgm:prSet phldr="1"/>
+        </dgm:pt>
+        <dgm:pt modelId="2">
+          <dgm:prSet phldr="1"/>
+        </dgm:pt>
+        <dgm:pt modelId="3">
+          <dgm:prSet phldr="1"/>
+        </dgm:pt>
+      </dgm:ptLst>
+      <dgm:cxnLst>
+        <dgm:cxn modelId="4" srcId="0" destId="1" srcOrd="0" destOrd="0"/>
+        <dgm:cxn modelId="5" srcId="0" destId="2" srcOrd="1" destOrd="0"/>
+        <dgm:cxn modelId="6" srcId="0" destId="3" srcOrd="2" destOrd="0"/>
+      </dgm:cxnLst>
+      <dgm:bg/>
+      <dgm:whole/>
+    </dgm:dataModel>
+  </dgm:sampData>
+  <dgm:styleData>
+    <dgm:dataModel>
+      <dgm:ptLst>
+        <dgm:pt modelId="0" type="doc"/>
+        <dgm:pt modelId="1"/>
+        <dgm:pt modelId="2"/>
+      </dgm:ptLst>
+      <dgm:cxnLst>
+        <dgm:cxn modelId="4" srcId="0" destId="1" srcOrd="0" destOrd="0"/>
+        <dgm:cxn modelId="5" srcId="0" destId="2" srcOrd="1" destOrd="0"/>
+      </dgm:cxnLst>
+      <dgm:bg/>
+      <dgm:whole/>
+    </dgm:dataModel>
+  </dgm:styleData>
+  <dgm:clrData>
+    <dgm:dataModel>
+      <dgm:ptLst>
+        <dgm:pt modelId="0" type="doc"/>
+        <dgm:pt modelId="1"/>
+        <dgm:pt modelId="2"/>
+        <dgm:pt modelId="3"/>
+        <dgm:pt modelId="4"/>
+      </dgm:ptLst>
+      <dgm:cxnLst>
+        <dgm:cxn modelId="5" srcId="0" destId="1" srcOrd="0" destOrd="0"/>
+        <dgm:cxn modelId="6" srcId="0" destId="2" srcOrd="1" destOrd="0"/>
+        <dgm:cxn modelId="7" srcId="0" destId="3" srcOrd="2" destOrd="0"/>
+        <dgm:cxn modelId="8" srcId="0" destId="4" srcOrd="3" destOrd="0"/>
+      </dgm:cxnLst>
+      <dgm:bg/>
+      <dgm:whole/>
+    </dgm:dataModel>
+  </dgm:clrData>
+  <dgm:layoutNode name="linear">
+    <dgm:varLst>
+      <dgm:dir/>
+      <dgm:animLvl val="lvl"/>
+      <dgm:resizeHandles val="exact"/>
+    </dgm:varLst>
+    <dgm:choose name="Name0">
+      <dgm:if name="Name1" func="var" arg="dir" op="equ" val="norm">
+        <dgm:alg type="lin">
+          <dgm:param type="linDir" val="fromT"/>
+          <dgm:param type="vertAlign" val="mid"/>
+          <dgm:param type="horzAlign" val="l"/>
+          <dgm:param type="nodeHorzAlign" val="l"/>
+        </dgm:alg>
+      </dgm:if>
+      <dgm:else name="Name2">
+        <dgm:alg type="lin">
+          <dgm:param type="linDir" val="fromT"/>
+          <dgm:param type="vertAlign" val="mid"/>
+          <dgm:param type="horzAlign" val="r"/>
+          <dgm:param type="nodeHorzAlign" val="r"/>
+        </dgm:alg>
+      </dgm:else>
+    </dgm:choose>
+    <dgm:shape xmlns:r="http://schemas.openxmlformats.org/officeDocument/2006/relationships" r:blip="">
+      <dgm:adjLst/>
+    </dgm:shape>
+    <dgm:presOf/>
+    <dgm:constrLst>
+      <dgm:constr type="w" for="ch" forName="parentLin" refType="w"/>
+      <dgm:constr type="h" for="ch" forName="parentLin" val="INF"/>
+      <dgm:constr type="w" for="des" forName="parentLeftMargin" refType="w" fact="0.05"/>
+      <dgm:constr type="w" for="des" forName="parentText" refType="w" fact="0.7"/>
+      <dgm:constr type="h" for="des" forName="parentText" refType="primFontSz" refFor="des" refForName="parentText" fact="0.82"/>
+      <dgm:constr type="h" for="ch" forName="negativeSpace" refType="primFontSz" refFor="des" refForName="parentText" fact="-0.41"/>
+      <dgm:constr type="h" for="ch" forName="negativeSpace" refType="h" refFor="des" refForName="parentText" op="lte" fact="-0.82"/>
+      <dgm:constr type="h" for="ch" forName="negativeSpace" refType="h" refFor="des" refForName="parentText" op="gte" fact="-0.82"/>
+      <dgm:constr type="w" for="ch" forName="childText" refType="w"/>
+      <dgm:constr type="h" for="ch" forName="childText" refType="primFontSz" refFor="des" refForName="parentText" fact="0.7"/>
+      <dgm:constr type="primFontSz" for="des" forName="parentText" val="65"/>
+      <dgm:constr type="primFontSz" for="ch" forName="childText" refType="primFontSz" refFor="des" refForName="parentText"/>
+      <dgm:constr type="tMarg" for="ch" forName="childText" refType="primFontSz" refFor="des" refForName="parentText" fact="1.64"/>
+      <dgm:constr type="tMarg" for="ch" forName="childText" refType="h" refFor="des" refForName="parentText" op="lte" fact="3.28"/>
+      <dgm:constr type="tMarg" for="ch" forName="childText" refType="h" refFor="des" refForName="parentText" op="gte" fact="3.28"/>
+      <dgm:constr type="lMarg" for="ch" forName="childText" refType="w" fact="0.22"/>
+      <dgm:constr type="rMarg" for="ch" forName="childText" refType="lMarg" refFor="ch" refForName="childText"/>
+      <dgm:constr type="lMarg" for="des" forName="parentText" refType="w" fact="0.075"/>
+      <dgm:constr type="rMarg" for="des" forName="parentText" refType="lMarg" refFor="des" refForName="parentText"/>
+      <dgm:constr type="h" for="ch" forName="spaceBetweenRectangles" refType="primFontSz" refFor="des" refForName="parentText" fact="0.15"/>
+    </dgm:constrLst>
+    <dgm:ruleLst>
+      <dgm:rule type="primFontSz" for="des" forName="parentText" val="5" fact="NaN" max="NaN"/>
+    </dgm:ruleLst>
+    <dgm:forEach name="Name3" axis="ch" ptType="node">
+      <dgm:layoutNode name="parentLin">
+        <dgm:choose name="Name4">
+          <dgm:if name="Name5" func="var" arg="dir" op="equ" val="norm">
+            <dgm:alg type="lin">
+              <dgm:param type="linDir" val="fromL"/>
+              <dgm:param type="horzAlign" val="l"/>
+              <dgm:param type="nodeHorzAlign" val="l"/>
+            </dgm:alg>
+          </dgm:if>
+          <dgm:else name="Name6">
+            <dgm:alg type="lin">
+              <dgm:param type="linDir" val="fromR"/>
+              <dgm:param type="horzAlign" val="r"/>
+              <dgm:param type="nodeHorzAlign" val="r"/>
+            </dgm:alg>
+          </dgm:else>
+        </dgm:choose>
+        <dgm:shape xmlns:r="http://schemas.openxmlformats.org/officeDocument/2006/relationships" r:blip="">
+          <dgm:adjLst/>
+        </dgm:shape>
+        <dgm:presOf/>
+        <dgm:constrLst/>
+        <dgm:ruleLst/>
+        <dgm:layoutNode name="parentLeftMargin">
+          <dgm:alg type="sp"/>
+          <dgm:shape xmlns:r="http://schemas.openxmlformats.org/officeDocument/2006/relationships" type="rect" r:blip="" hideGeom="1">
+            <dgm:adjLst/>
+          </dgm:shape>
+          <dgm:presOf axis="self"/>
+          <dgm:constrLst>
+            <dgm:constr type="h"/>
+          </dgm:constrLst>
+          <dgm:ruleLst/>
+        </dgm:layoutNode>
+        <dgm:layoutNode name="parentText" styleLbl="node1">
+          <dgm:varLst>
+            <dgm:chMax val="0"/>
+            <dgm:bulletEnabled val="1"/>
+          </dgm:varLst>
+          <dgm:choose name="Name7">
+            <dgm:if name="Name8" func="var" arg="dir" op="equ" val="norm">
+              <dgm:alg type="tx">
+                <dgm:param type="parTxLTRAlign" val="l"/>
+                <dgm:param type="parTxRTLAlign" val="l"/>
+              </dgm:alg>
+            </dgm:if>
+            <dgm:else name="Name9">
+              <dgm:alg type="tx">
+                <dgm:param type="parTxLTRAlign" val="r"/>
+                <dgm:param type="parTxRTLAlign" val="r"/>
+              </dgm:alg>
+            </dgm:else>
+          </dgm:choose>
+          <dgm:shape xmlns:r="http://schemas.openxmlformats.org/officeDocument/2006/relationships" type="roundRect" r:blip="">
+            <dgm:adjLst/>
+          </dgm:shape>
+          <dgm:presOf axis="self" ptType="node"/>
+          <dgm:constrLst>
+            <dgm:constr type="tMarg"/>
+            <dgm:constr type="bMarg"/>
+          </dgm:constrLst>
+          <dgm:ruleLst/>
+        </dgm:layoutNode>
+      </dgm:layoutNode>
+      <dgm:layoutNode name="negativeSpace">
+        <dgm:alg type="sp"/>
+        <dgm:shape xmlns:r="http://schemas.openxmlformats.org/officeDocument/2006/relationships" r:blip="">
+          <dgm:adjLst/>
+        </dgm:shape>
+        <dgm:presOf/>
+        <dgm:constrLst/>
+        <dgm:ruleLst/>
+      </dgm:layoutNode>
+      <dgm:layoutNode name="childText" styleLbl="conFgAcc1">
+        <dgm:varLst>
+          <dgm:bulletEnabled val="1"/>
+        </dgm:varLst>
+        <dgm:alg type="tx">
+          <dgm:param type="stBulletLvl" val="1"/>
+        </dgm:alg>
+        <dgm:shape xmlns:r="http://schemas.openxmlformats.org/officeDocument/2006/relationships" type="rect" r:blip="" zOrderOff="-2">
+          <dgm:adjLst/>
+        </dgm:shape>
+        <dgm:presOf axis="des" ptType="node"/>
+        <dgm:constrLst>
+          <dgm:constr type="secFontSz" refType="primFontSz"/>
+        </dgm:constrLst>
+        <dgm:ruleLst>
+          <dgm:rule type="h" val="INF" fact="NaN" max="NaN"/>
+        </dgm:ruleLst>
+      </dgm:layoutNode>
+      <dgm:forEach name="Name10" axis="followSib" ptType="sibTrans" cnt="1">
+        <dgm:layoutNode name="spaceBetweenRectangles">
+          <dgm:alg type="sp"/>
+          <dgm:shape xmlns:r="http://schemas.openxmlformats.org/officeDocument/2006/relationships" r:blip="">
+            <dgm:adjLst/>
+          </dgm:shape>
+          <dgm:presOf/>
+          <dgm:constrLst/>
+          <dgm:ruleLst/>
+        </dgm:layoutNode>
+      </dgm:forEach>
+    </dgm:forEach>
+  </dgm:layoutNode>
+</dgm:layoutDef>
+</file>
+
+<file path=ppt/diagrams/layout4.xml><?xml version="1.0" encoding="utf-8"?>
+<dgm:layoutDef xmlns:dgm="http://schemas.openxmlformats.org/drawingml/2006/diagram" xmlns:a="http://schemas.openxmlformats.org/drawingml/2006/main" uniqueId="urn:microsoft.com/office/officeart/2005/8/layout/list1">
+  <dgm:title val=""/>
+  <dgm:desc val=""/>
+  <dgm:catLst>
+    <dgm:cat type="list" pri="4000"/>
+  </dgm:catLst>
+  <dgm:sampData>
+    <dgm:dataModel>
+      <dgm:ptLst>
+        <dgm:pt modelId="0" type="doc"/>
+        <dgm:pt modelId="1">
+          <dgm:prSet phldr="1"/>
+        </dgm:pt>
+        <dgm:pt modelId="2">
+          <dgm:prSet phldr="1"/>
+        </dgm:pt>
+        <dgm:pt modelId="3">
+          <dgm:prSet phldr="1"/>
+        </dgm:pt>
+      </dgm:ptLst>
+      <dgm:cxnLst>
+        <dgm:cxn modelId="4" srcId="0" destId="1" srcOrd="0" destOrd="0"/>
+        <dgm:cxn modelId="5" srcId="0" destId="2" srcOrd="1" destOrd="0"/>
+        <dgm:cxn modelId="6" srcId="0" destId="3" srcOrd="2" destOrd="0"/>
+      </dgm:cxnLst>
+      <dgm:bg/>
+      <dgm:whole/>
+    </dgm:dataModel>
+  </dgm:sampData>
+  <dgm:styleData>
+    <dgm:dataModel>
+      <dgm:ptLst>
+        <dgm:pt modelId="0" type="doc"/>
+        <dgm:pt modelId="1"/>
+        <dgm:pt modelId="2"/>
+      </dgm:ptLst>
+      <dgm:cxnLst>
+        <dgm:cxn modelId="4" srcId="0" destId="1" srcOrd="0" destOrd="0"/>
+        <dgm:cxn modelId="5" srcId="0" destId="2" srcOrd="1" destOrd="0"/>
+      </dgm:cxnLst>
+      <dgm:bg/>
+      <dgm:whole/>
+    </dgm:dataModel>
+  </dgm:styleData>
+  <dgm:clrData>
+    <dgm:dataModel>
+      <dgm:ptLst>
+        <dgm:pt modelId="0" type="doc"/>
+        <dgm:pt modelId="1"/>
+        <dgm:pt modelId="2"/>
+        <dgm:pt modelId="3"/>
+        <dgm:pt modelId="4"/>
+      </dgm:ptLst>
+      <dgm:cxnLst>
+        <dgm:cxn modelId="5" srcId="0" destId="1" srcOrd="0" destOrd="0"/>
+        <dgm:cxn modelId="6" srcId="0" destId="2" srcOrd="1" destOrd="0"/>
+        <dgm:cxn modelId="7" srcId="0" destId="3" srcOrd="2" destOrd="0"/>
+        <dgm:cxn modelId="8" srcId="0" destId="4" srcOrd="3" destOrd="0"/>
+      </dgm:cxnLst>
+      <dgm:bg/>
+      <dgm:whole/>
+    </dgm:dataModel>
+  </dgm:clrData>
+  <dgm:layoutNode name="linear">
+    <dgm:varLst>
+      <dgm:dir/>
+      <dgm:animLvl val="lvl"/>
+      <dgm:resizeHandles val="exact"/>
+    </dgm:varLst>
+    <dgm:choose name="Name0">
+      <dgm:if name="Name1" func="var" arg="dir" op="equ" val="norm">
+        <dgm:alg type="lin">
+          <dgm:param type="linDir" val="fromT"/>
+          <dgm:param type="vertAlign" val="mid"/>
+          <dgm:param type="horzAlign" val="l"/>
+          <dgm:param type="nodeHorzAlign" val="l"/>
+        </dgm:alg>
+      </dgm:if>
+      <dgm:else name="Name2">
+        <dgm:alg type="lin">
+          <dgm:param type="linDir" val="fromT"/>
+          <dgm:param type="vertAlign" val="mid"/>
+          <dgm:param type="horzAlign" val="r"/>
+          <dgm:param type="nodeHorzAlign" val="r"/>
+        </dgm:alg>
+      </dgm:else>
+    </dgm:choose>
+    <dgm:shape xmlns:r="http://schemas.openxmlformats.org/officeDocument/2006/relationships" r:blip="">
+      <dgm:adjLst/>
+    </dgm:shape>
+    <dgm:presOf/>
+    <dgm:constrLst>
+      <dgm:constr type="w" for="ch" forName="parentLin" refType="w"/>
+      <dgm:constr type="h" for="ch" forName="parentLin" val="INF"/>
+      <dgm:constr type="w" for="des" forName="parentLeftMargin" refType="w" fact="0.05"/>
+      <dgm:constr type="w" for="des" forName="parentText" refType="w" fact="0.7"/>
+      <dgm:constr type="h" for="des" forName="parentText" refType="primFontSz" refFor="des" refForName="parentText" fact="0.82"/>
+      <dgm:constr type="h" for="ch" forName="negativeSpace" refType="primFontSz" refFor="des" refForName="parentText" fact="-0.41"/>
+      <dgm:constr type="h" for="ch" forName="negativeSpace" refType="h" refFor="des" refForName="parentText" op="lte" fact="-0.82"/>
+      <dgm:constr type="h" for="ch" forName="negativeSpace" refType="h" refFor="des" refForName="parentText" op="gte" fact="-0.82"/>
+      <dgm:constr type="w" for="ch" forName="childText" refType="w"/>
+      <dgm:constr type="h" for="ch" forName="childText" refType="primFontSz" refFor="des" refForName="parentText" fact="0.7"/>
+      <dgm:constr type="primFontSz" for="des" forName="parentText" val="65"/>
+      <dgm:constr type="primFontSz" for="ch" forName="childText" refType="primFontSz" refFor="des" refForName="parentText"/>
+      <dgm:constr type="tMarg" for="ch" forName="childText" refType="primFontSz" refFor="des" refForName="parentText" fact="1.64"/>
+      <dgm:constr type="tMarg" for="ch" forName="childText" refType="h" refFor="des" refForName="parentText" op="lte" fact="3.28"/>
+      <dgm:constr type="tMarg" for="ch" forName="childText" refType="h" refFor="des" refForName="parentText" op="gte" fact="3.28"/>
+      <dgm:constr type="lMarg" for="ch" forName="childText" refType="w" fact="0.22"/>
+      <dgm:constr type="rMarg" for="ch" forName="childText" refType="lMarg" refFor="ch" refForName="childText"/>
+      <dgm:constr type="lMarg" for="des" forName="parentText" refType="w" fact="0.075"/>
+      <dgm:constr type="rMarg" for="des" forName="parentText" refType="lMarg" refFor="des" refForName="parentText"/>
+      <dgm:constr type="h" for="ch" forName="spaceBetweenRectangles" refType="primFontSz" refFor="des" refForName="parentText" fact="0.15"/>
+    </dgm:constrLst>
+    <dgm:ruleLst>
+      <dgm:rule type="primFontSz" for="des" forName="parentText" val="5" fact="NaN" max="NaN"/>
+    </dgm:ruleLst>
+    <dgm:forEach name="Name3" axis="ch" ptType="node">
+      <dgm:layoutNode name="parentLin">
+        <dgm:choose name="Name4">
+          <dgm:if name="Name5" func="var" arg="dir" op="equ" val="norm">
+            <dgm:alg type="lin">
+              <dgm:param type="linDir" val="fromL"/>
+              <dgm:param type="horzAlign" val="l"/>
+              <dgm:param type="nodeHorzAlign" val="l"/>
+            </dgm:alg>
+          </dgm:if>
+          <dgm:else name="Name6">
+            <dgm:alg type="lin">
+              <dgm:param type="linDir" val="fromR"/>
+              <dgm:param type="horzAlign" val="r"/>
+              <dgm:param type="nodeHorzAlign" val="r"/>
+            </dgm:alg>
+          </dgm:else>
+        </dgm:choose>
+        <dgm:shape xmlns:r="http://schemas.openxmlformats.org/officeDocument/2006/relationships" r:blip="">
+          <dgm:adjLst/>
+        </dgm:shape>
+        <dgm:presOf/>
+        <dgm:constrLst/>
+        <dgm:ruleLst/>
+        <dgm:layoutNode name="parentLeftMargin">
+          <dgm:alg type="sp"/>
+          <dgm:shape xmlns:r="http://schemas.openxmlformats.org/officeDocument/2006/relationships" type="rect" r:blip="" hideGeom="1">
+            <dgm:adjLst/>
+          </dgm:shape>
+          <dgm:presOf axis="self"/>
+          <dgm:constrLst>
+            <dgm:constr type="h"/>
+          </dgm:constrLst>
+          <dgm:ruleLst/>
+        </dgm:layoutNode>
+        <dgm:layoutNode name="parentText" styleLbl="node1">
+          <dgm:varLst>
+            <dgm:chMax val="0"/>
+            <dgm:bulletEnabled val="1"/>
+          </dgm:varLst>
+          <dgm:choose name="Name7">
+            <dgm:if name="Name8" func="var" arg="dir" op="equ" val="norm">
+              <dgm:alg type="tx">
+                <dgm:param type="parTxLTRAlign" val="l"/>
+                <dgm:param type="parTxRTLAlign" val="l"/>
+              </dgm:alg>
+            </dgm:if>
+            <dgm:else name="Name9">
+              <dgm:alg type="tx">
+                <dgm:param type="parTxLTRAlign" val="r"/>
+                <dgm:param type="parTxRTLAlign" val="r"/>
+              </dgm:alg>
+            </dgm:else>
+          </dgm:choose>
+          <dgm:shape xmlns:r="http://schemas.openxmlformats.org/officeDocument/2006/relationships" type="roundRect" r:blip="">
+            <dgm:adjLst/>
+          </dgm:shape>
+          <dgm:presOf axis="self" ptType="node"/>
+          <dgm:constrLst>
+            <dgm:constr type="tMarg"/>
+            <dgm:constr type="bMarg"/>
+          </dgm:constrLst>
+          <dgm:ruleLst/>
+        </dgm:layoutNode>
+      </dgm:layoutNode>
+      <dgm:layoutNode name="negativeSpace">
+        <dgm:alg type="sp"/>
+        <dgm:shape xmlns:r="http://schemas.openxmlformats.org/officeDocument/2006/relationships" r:blip="">
+          <dgm:adjLst/>
+        </dgm:shape>
+        <dgm:presOf/>
+        <dgm:constrLst/>
+        <dgm:ruleLst/>
+      </dgm:layoutNode>
+      <dgm:layoutNode name="childText" styleLbl="conFgAcc1">
+        <dgm:varLst>
+          <dgm:bulletEnabled val="1"/>
+        </dgm:varLst>
+        <dgm:alg type="tx">
+          <dgm:param type="stBulletLvl" val="1"/>
+        </dgm:alg>
+        <dgm:shape xmlns:r="http://schemas.openxmlformats.org/officeDocument/2006/relationships" type="rect" r:blip="" zOrderOff="-2">
+          <dgm:adjLst/>
+        </dgm:shape>
+        <dgm:presOf axis="des" ptType="node"/>
+        <dgm:constrLst>
+          <dgm:constr type="secFontSz" refType="primFontSz"/>
+        </dgm:constrLst>
+        <dgm:ruleLst>
+          <dgm:rule type="h" val="INF" fact="NaN" max="NaN"/>
+        </dgm:ruleLst>
+      </dgm:layoutNode>
+      <dgm:forEach name="Name10" axis="followSib" ptType="sibTrans" cnt="1">
+        <dgm:layoutNode name="spaceBetweenRectangles">
+          <dgm:alg type="sp"/>
+          <dgm:shape xmlns:r="http://schemas.openxmlformats.org/officeDocument/2006/relationships" r:blip="">
+            <dgm:adjLst/>
+          </dgm:shape>
+          <dgm:presOf/>
+          <dgm:constrLst/>
+          <dgm:ruleLst/>
+        </dgm:layoutNode>
+      </dgm:forEach>
+    </dgm:forEach>
+  </dgm:layoutNode>
+</dgm:layoutDef>
+</file>
+
 <file path=ppt/diagrams/quickStyle1.xml><?xml version="1.0" encoding="utf-8"?>
 <dgm:styleDef xmlns:dgm="http://schemas.openxmlformats.org/drawingml/2006/diagram" xmlns:a="http://schemas.openxmlformats.org/drawingml/2006/main" uniqueId="urn:microsoft.com/office/officeart/2005/8/quickstyle/simple1">
   <dgm:title val=""/>
@@ -12634,7 +12753,7 @@
             <a:fld id="{B61BEF0D-F0BB-DE4B-95CE-6DB70DBA9567}" type="datetimeFigureOut">
               <a:rPr lang="en-US" dirty="0"/>
               <a:pPr/>
-              <a:t>4/21/2016</a:t>
+              <a:t>5/10/2016</a:t>
             </a:fld>
             <a:endParaRPr lang="en-US" dirty="0"/>
           </a:p>
@@ -13067,7 +13186,7 @@
             <a:fld id="{B61BEF0D-F0BB-DE4B-95CE-6DB70DBA9567}" type="datetimeFigureOut">
               <a:rPr lang="en-US" dirty="0"/>
               <a:pPr/>
-              <a:t>4/21/2016</a:t>
+              <a:t>5/10/2016</a:t>
             </a:fld>
             <a:endParaRPr lang="en-US" dirty="0"/>
           </a:p>
@@ -13314,7 +13433,7 @@
             <a:fld id="{B61BEF0D-F0BB-DE4B-95CE-6DB70DBA9567}" type="datetimeFigureOut">
               <a:rPr lang="en-US" dirty="0"/>
               <a:pPr/>
-              <a:t>4/21/2016</a:t>
+              <a:t>5/10/2016</a:t>
             </a:fld>
             <a:endParaRPr lang="en-US" dirty="0"/>
           </a:p>
@@ -13619,7 +13738,7 @@
             <a:fld id="{B61BEF0D-F0BB-DE4B-95CE-6DB70DBA9567}" type="datetimeFigureOut">
               <a:rPr lang="en-US" dirty="0"/>
               <a:pPr/>
-              <a:t>4/21/2016</a:t>
+              <a:t>5/10/2016</a:t>
             </a:fld>
             <a:endParaRPr lang="en-US" dirty="0"/>
           </a:p>
@@ -13934,7 +14053,7 @@
             <a:fld id="{B61BEF0D-F0BB-DE4B-95CE-6DB70DBA9567}" type="datetimeFigureOut">
               <a:rPr lang="en-US" dirty="0"/>
               <a:pPr/>
-              <a:t>4/21/2016</a:t>
+              <a:t>5/10/2016</a:t>
             </a:fld>
             <a:endParaRPr lang="en-US" dirty="0"/>
           </a:p>
@@ -14233,7 +14352,7 @@
             <a:fld id="{B61BEF0D-F0BB-DE4B-95CE-6DB70DBA9567}" type="datetimeFigureOut">
               <a:rPr lang="en-US" dirty="0"/>
               <a:pPr/>
-              <a:t>4/21/2016</a:t>
+              <a:t>5/10/2016</a:t>
             </a:fld>
             <a:endParaRPr lang="en-US" dirty="0"/>
           </a:p>
@@ -14597,7 +14716,7 @@
             <a:fld id="{B61BEF0D-F0BB-DE4B-95CE-6DB70DBA9567}" type="datetimeFigureOut">
               <a:rPr lang="en-US" dirty="0"/>
               <a:pPr/>
-              <a:t>4/21/2016</a:t>
+              <a:t>5/10/2016</a:t>
             </a:fld>
             <a:endParaRPr lang="en-US" dirty="0"/>
           </a:p>
@@ -14768,7 +14887,7 @@
             <a:fld id="{B61BEF0D-F0BB-DE4B-95CE-6DB70DBA9567}" type="datetimeFigureOut">
               <a:rPr lang="en-US" dirty="0"/>
               <a:pPr/>
-              <a:t>4/21/2016</a:t>
+              <a:t>5/10/2016</a:t>
             </a:fld>
             <a:endParaRPr lang="en-US" dirty="0"/>
           </a:p>
@@ -14945,7 +15064,7 @@
             <a:fld id="{B61BEF0D-F0BB-DE4B-95CE-6DB70DBA9567}" type="datetimeFigureOut">
               <a:rPr lang="en-US" dirty="0"/>
               <a:pPr/>
-              <a:t>4/21/2016</a:t>
+              <a:t>5/10/2016</a:t>
             </a:fld>
             <a:endParaRPr lang="en-US" dirty="0"/>
           </a:p>
@@ -15112,7 +15231,7 @@
             <a:fld id="{B61BEF0D-F0BB-DE4B-95CE-6DB70DBA9567}" type="datetimeFigureOut">
               <a:rPr lang="en-US" dirty="0"/>
               <a:pPr/>
-              <a:t>4/21/2016</a:t>
+              <a:t>5/10/2016</a:t>
             </a:fld>
             <a:endParaRPr lang="en-US" dirty="0"/>
           </a:p>
@@ -15359,7 +15478,7 @@
             <a:fld id="{B61BEF0D-F0BB-DE4B-95CE-6DB70DBA9567}" type="datetimeFigureOut">
               <a:rPr lang="en-US" dirty="0"/>
               <a:pPr/>
-              <a:t>4/21/2016</a:t>
+              <a:t>5/10/2016</a:t>
             </a:fld>
             <a:endParaRPr lang="en-US" dirty="0"/>
           </a:p>
@@ -15592,7 +15711,7 @@
             <a:fld id="{B61BEF0D-F0BB-DE4B-95CE-6DB70DBA9567}" type="datetimeFigureOut">
               <a:rPr lang="en-US" dirty="0"/>
               <a:pPr/>
-              <a:t>4/21/2016</a:t>
+              <a:t>5/10/2016</a:t>
             </a:fld>
             <a:endParaRPr lang="en-US" dirty="0"/>
           </a:p>
@@ -15971,7 +16090,7 @@
             <a:fld id="{B61BEF0D-F0BB-DE4B-95CE-6DB70DBA9567}" type="datetimeFigureOut">
               <a:rPr lang="en-US" dirty="0"/>
               <a:pPr/>
-              <a:t>4/21/2016</a:t>
+              <a:t>5/10/2016</a:t>
             </a:fld>
             <a:endParaRPr lang="en-US" dirty="0"/>
           </a:p>
@@ -16086,7 +16205,7 @@
             <a:fld id="{B61BEF0D-F0BB-DE4B-95CE-6DB70DBA9567}" type="datetimeFigureOut">
               <a:rPr lang="en-US" dirty="0"/>
               <a:pPr/>
-              <a:t>4/21/2016</a:t>
+              <a:t>5/10/2016</a:t>
             </a:fld>
             <a:endParaRPr lang="en-US" dirty="0"/>
           </a:p>
@@ -16178,7 +16297,7 @@
             <a:fld id="{B61BEF0D-F0BB-DE4B-95CE-6DB70DBA9567}" type="datetimeFigureOut">
               <a:rPr lang="en-US" dirty="0"/>
               <a:pPr/>
-              <a:t>4/21/2016</a:t>
+              <a:t>5/10/2016</a:t>
             </a:fld>
             <a:endParaRPr lang="en-US" dirty="0"/>
           </a:p>
@@ -16430,7 +16549,7 @@
             <a:fld id="{B61BEF0D-F0BB-DE4B-95CE-6DB70DBA9567}" type="datetimeFigureOut">
               <a:rPr lang="en-US" dirty="0"/>
               <a:pPr/>
-              <a:t>4/21/2016</a:t>
+              <a:t>5/10/2016</a:t>
             </a:fld>
             <a:endParaRPr lang="en-US" dirty="0"/>
           </a:p>
@@ -16710,7 +16829,7 @@
             <a:fld id="{B61BEF0D-F0BB-DE4B-95CE-6DB70DBA9567}" type="datetimeFigureOut">
               <a:rPr lang="en-US" dirty="0"/>
               <a:pPr/>
-              <a:t>4/21/2016</a:t>
+              <a:t>5/10/2016</a:t>
             </a:fld>
             <a:endParaRPr lang="en-US" dirty="0"/>
           </a:p>
@@ -17113,7 +17232,7 @@
             <a:fld id="{B61BEF0D-F0BB-DE4B-95CE-6DB70DBA9567}" type="datetimeFigureOut">
               <a:rPr lang="en-US" dirty="0"/>
               <a:pPr/>
-              <a:t>4/21/2016</a:t>
+              <a:t>5/10/2016</a:t>
             </a:fld>
             <a:endParaRPr lang="en-US" dirty="0"/>
           </a:p>
@@ -17724,6 +17843,100 @@
           <a:chExt cx="0" cy="0"/>
         </a:xfrm>
       </p:grpSpPr>
+      <p:graphicFrame>
+        <p:nvGraphicFramePr>
+          <p:cNvPr id="4" name="Content Placeholder 3"/>
+          <p:cNvGraphicFramePr>
+            <a:graphicFrameLocks noGrp="1"/>
+          </p:cNvGraphicFramePr>
+          <p:nvPr>
+            <p:ph idx="1"/>
+            <p:extLst>
+              <p:ext uri="{D42A27DB-BD31-4B8C-83A1-F6EECF244321}">
+                <p14:modId xmlns:p14="http://schemas.microsoft.com/office/powerpoint/2010/main" val="3247979206"/>
+              </p:ext>
+            </p:extLst>
+          </p:nvPr>
+        </p:nvGraphicFramePr>
+        <p:xfrm>
+          <a:off x="392112" y="1219200"/>
+          <a:ext cx="10020300" cy="4521200"/>
+        </p:xfrm>
+        <a:graphic>
+          <a:graphicData uri="http://schemas.openxmlformats.org/drawingml/2006/diagram">
+            <dgm:relIds xmlns:dgm="http://schemas.openxmlformats.org/drawingml/2006/diagram" xmlns:r="http://schemas.openxmlformats.org/officeDocument/2006/relationships" r:dm="rId2" r:lo="rId3" r:qs="rId4" r:cs="rId5"/>
+          </a:graphicData>
+        </a:graphic>
+      </p:graphicFrame>
+      <p:sp>
+        <p:nvSpPr>
+          <p:cNvPr id="8" name="Title 1"/>
+          <p:cNvSpPr>
+            <a:spLocks noGrp="1"/>
+          </p:cNvSpPr>
+          <p:nvPr>
+            <p:ph type="title"/>
+          </p:nvPr>
+        </p:nvSpPr>
+        <p:spPr>
+          <a:xfrm>
+            <a:off x="392112" y="0"/>
+            <a:ext cx="8534400" cy="1507067"/>
+          </a:xfrm>
+        </p:spPr>
+        <p:txBody>
+          <a:bodyPr/>
+          <a:lstStyle/>
+          <a:p>
+            <a:r>
+              <a:rPr lang="en-US" dirty="0" err="1" smtClean="0"/>
+              <a:t>ArrayBOT</a:t>
+            </a:r>
+            <a:r>
+              <a:rPr lang="en-US" dirty="0" smtClean="0"/>
+              <a:t> API</a:t>
+            </a:r>
+            <a:endParaRPr lang="en-US" dirty="0"/>
+          </a:p>
+        </p:txBody>
+      </p:sp>
+    </p:spTree>
+    <p:extLst>
+      <p:ext uri="{BB962C8B-B14F-4D97-AF65-F5344CB8AC3E}">
+        <p14:creationId xmlns:p14="http://schemas.microsoft.com/office/powerpoint/2010/main" val="1152536643"/>
+      </p:ext>
+    </p:extLst>
+  </p:cSld>
+  <p:clrMapOvr>
+    <a:masterClrMapping/>
+  </p:clrMapOvr>
+  <p:timing>
+    <p:tnLst>
+      <p:par>
+        <p:cTn id="1" dur="indefinite" restart="never" nodeType="tmRoot"/>
+      </p:par>
+    </p:tnLst>
+  </p:timing>
+</p:sld>
+</file>
+
+<file path=ppt/slides/slide3.xml><?xml version="1.0" encoding="utf-8"?>
+<p:sld xmlns:a="http://schemas.openxmlformats.org/drawingml/2006/main" xmlns:r="http://schemas.openxmlformats.org/officeDocument/2006/relationships" xmlns:p="http://schemas.openxmlformats.org/presentationml/2006/main">
+  <p:cSld>
+    <p:spTree>
+      <p:nvGrpSpPr>
+        <p:cNvPr id="1" name=""/>
+        <p:cNvGrpSpPr/>
+        <p:nvPr/>
+      </p:nvGrpSpPr>
+      <p:grpSpPr>
+        <a:xfrm>
+          <a:off x="0" y="0"/>
+          <a:ext cx="0" cy="0"/>
+          <a:chOff x="0" y="0"/>
+          <a:chExt cx="0" cy="0"/>
+        </a:xfrm>
+      </p:grpSpPr>
       <p:sp>
         <p:nvSpPr>
           <p:cNvPr id="2" name="Title 1"/>
@@ -17820,100 +18033,6 @@
     <p:extLst>
       <p:ext uri="{BB962C8B-B14F-4D97-AF65-F5344CB8AC3E}">
         <p14:creationId xmlns:p14="http://schemas.microsoft.com/office/powerpoint/2010/main" val="1938617043"/>
-      </p:ext>
-    </p:extLst>
-  </p:cSld>
-  <p:clrMapOvr>
-    <a:masterClrMapping/>
-  </p:clrMapOvr>
-  <p:timing>
-    <p:tnLst>
-      <p:par>
-        <p:cTn id="1" dur="indefinite" restart="never" nodeType="tmRoot"/>
-      </p:par>
-    </p:tnLst>
-  </p:timing>
-</p:sld>
-</file>
-
-<file path=ppt/slides/slide3.xml><?xml version="1.0" encoding="utf-8"?>
-<p:sld xmlns:a="http://schemas.openxmlformats.org/drawingml/2006/main" xmlns:r="http://schemas.openxmlformats.org/officeDocument/2006/relationships" xmlns:p="http://schemas.openxmlformats.org/presentationml/2006/main">
-  <p:cSld>
-    <p:spTree>
-      <p:nvGrpSpPr>
-        <p:cNvPr id="1" name=""/>
-        <p:cNvGrpSpPr/>
-        <p:nvPr/>
-      </p:nvGrpSpPr>
-      <p:grpSpPr>
-        <a:xfrm>
-          <a:off x="0" y="0"/>
-          <a:ext cx="0" cy="0"/>
-          <a:chOff x="0" y="0"/>
-          <a:chExt cx="0" cy="0"/>
-        </a:xfrm>
-      </p:grpSpPr>
-      <p:graphicFrame>
-        <p:nvGraphicFramePr>
-          <p:cNvPr id="4" name="Content Placeholder 3"/>
-          <p:cNvGraphicFramePr>
-            <a:graphicFrameLocks noGrp="1"/>
-          </p:cNvGraphicFramePr>
-          <p:nvPr>
-            <p:ph idx="1"/>
-            <p:extLst>
-              <p:ext uri="{D42A27DB-BD31-4B8C-83A1-F6EECF244321}">
-                <p14:modId xmlns:p14="http://schemas.microsoft.com/office/powerpoint/2010/main" val="3247979206"/>
-              </p:ext>
-            </p:extLst>
-          </p:nvPr>
-        </p:nvGraphicFramePr>
-        <p:xfrm>
-          <a:off x="392112" y="1219200"/>
-          <a:ext cx="10020300" cy="4521200"/>
-        </p:xfrm>
-        <a:graphic>
-          <a:graphicData uri="http://schemas.openxmlformats.org/drawingml/2006/diagram">
-            <dgm:relIds xmlns:dgm="http://schemas.openxmlformats.org/drawingml/2006/diagram" xmlns:r="http://schemas.openxmlformats.org/officeDocument/2006/relationships" r:dm="rId2" r:lo="rId3" r:qs="rId4" r:cs="rId5"/>
-          </a:graphicData>
-        </a:graphic>
-      </p:graphicFrame>
-      <p:sp>
-        <p:nvSpPr>
-          <p:cNvPr id="8" name="Title 1"/>
-          <p:cNvSpPr>
-            <a:spLocks noGrp="1"/>
-          </p:cNvSpPr>
-          <p:nvPr>
-            <p:ph type="title"/>
-          </p:nvPr>
-        </p:nvSpPr>
-        <p:spPr>
-          <a:xfrm>
-            <a:off x="392112" y="0"/>
-            <a:ext cx="8534400" cy="1507067"/>
-          </a:xfrm>
-        </p:spPr>
-        <p:txBody>
-          <a:bodyPr/>
-          <a:lstStyle/>
-          <a:p>
-            <a:r>
-              <a:rPr lang="en-US" dirty="0" err="1" smtClean="0"/>
-              <a:t>ArrayBOT</a:t>
-            </a:r>
-            <a:r>
-              <a:rPr lang="en-US" dirty="0" smtClean="0"/>
-              <a:t> API</a:t>
-            </a:r>
-            <a:endParaRPr lang="en-US" dirty="0"/>
-          </a:p>
-        </p:txBody>
-      </p:sp>
-    </p:spTree>
-    <p:extLst>
-      <p:ext uri="{BB962C8B-B14F-4D97-AF65-F5344CB8AC3E}">
-        <p14:creationId xmlns:p14="http://schemas.microsoft.com/office/powerpoint/2010/main" val="1152536643"/>
       </p:ext>
     </p:extLst>
   </p:cSld>

</xml_diff>

<commit_message>
Cleaning up Before deriving from Registry form
</commit_message>
<xml_diff>
--- a/Sketches.pptx
+++ b/Sketches.pptx
@@ -8,6 +8,7 @@
     <p:sldId id="256" r:id="rId2"/>
     <p:sldId id="258" r:id="rId3"/>
     <p:sldId id="257" r:id="rId4"/>
+    <p:sldId id="259" r:id="rId5"/>
   </p:sldIdLst>
   <p:sldSz cx="12192000" cy="6858000"/>
   <p:notesSz cx="6858000" cy="9144000"/>
@@ -2356,6 +2357,753 @@
 </file>
 
 <file path=ppt/diagrams/colors4.xml><?xml version="1.0" encoding="utf-8"?>
+<dgm:colorsDef xmlns:dgm="http://schemas.openxmlformats.org/drawingml/2006/diagram" xmlns:a="http://schemas.openxmlformats.org/drawingml/2006/main" uniqueId="urn:microsoft.com/office/officeart/2005/8/colors/accent1_2">
+  <dgm:title val=""/>
+  <dgm:desc val=""/>
+  <dgm:catLst>
+    <dgm:cat type="accent1" pri="11200"/>
+  </dgm:catLst>
+  <dgm:styleLbl name="node0">
+    <dgm:fillClrLst meth="repeat">
+      <a:schemeClr val="accent1"/>
+    </dgm:fillClrLst>
+    <dgm:linClrLst meth="repeat">
+      <a:schemeClr val="lt1"/>
+    </dgm:linClrLst>
+    <dgm:effectClrLst/>
+    <dgm:txLinClrLst/>
+    <dgm:txFillClrLst/>
+    <dgm:txEffectClrLst/>
+  </dgm:styleLbl>
+  <dgm:styleLbl name="alignNode1">
+    <dgm:fillClrLst meth="repeat">
+      <a:schemeClr val="accent1"/>
+    </dgm:fillClrLst>
+    <dgm:linClrLst meth="repeat">
+      <a:schemeClr val="accent1"/>
+    </dgm:linClrLst>
+    <dgm:effectClrLst/>
+    <dgm:txLinClrLst/>
+    <dgm:txFillClrLst/>
+    <dgm:txEffectClrLst/>
+  </dgm:styleLbl>
+  <dgm:styleLbl name="node1">
+    <dgm:fillClrLst meth="repeat">
+      <a:schemeClr val="accent1"/>
+    </dgm:fillClrLst>
+    <dgm:linClrLst meth="repeat">
+      <a:schemeClr val="lt1"/>
+    </dgm:linClrLst>
+    <dgm:effectClrLst/>
+    <dgm:txLinClrLst/>
+    <dgm:txFillClrLst/>
+    <dgm:txEffectClrLst/>
+  </dgm:styleLbl>
+  <dgm:styleLbl name="lnNode1">
+    <dgm:fillClrLst meth="repeat">
+      <a:schemeClr val="accent1"/>
+    </dgm:fillClrLst>
+    <dgm:linClrLst meth="repeat">
+      <a:schemeClr val="lt1"/>
+    </dgm:linClrLst>
+    <dgm:effectClrLst/>
+    <dgm:txLinClrLst/>
+    <dgm:txFillClrLst/>
+    <dgm:txEffectClrLst/>
+  </dgm:styleLbl>
+  <dgm:styleLbl name="vennNode1">
+    <dgm:fillClrLst meth="repeat">
+      <a:schemeClr val="accent1">
+        <a:alpha val="50000"/>
+      </a:schemeClr>
+    </dgm:fillClrLst>
+    <dgm:linClrLst meth="repeat">
+      <a:schemeClr val="lt1"/>
+    </dgm:linClrLst>
+    <dgm:effectClrLst/>
+    <dgm:txLinClrLst/>
+    <dgm:txFillClrLst/>
+    <dgm:txEffectClrLst/>
+  </dgm:styleLbl>
+  <dgm:styleLbl name="node2">
+    <dgm:fillClrLst meth="repeat">
+      <a:schemeClr val="accent1"/>
+    </dgm:fillClrLst>
+    <dgm:linClrLst meth="repeat">
+      <a:schemeClr val="lt1"/>
+    </dgm:linClrLst>
+    <dgm:effectClrLst/>
+    <dgm:txLinClrLst/>
+    <dgm:txFillClrLst/>
+    <dgm:txEffectClrLst/>
+  </dgm:styleLbl>
+  <dgm:styleLbl name="node3">
+    <dgm:fillClrLst meth="repeat">
+      <a:schemeClr val="accent1"/>
+    </dgm:fillClrLst>
+    <dgm:linClrLst meth="repeat">
+      <a:schemeClr val="lt1"/>
+    </dgm:linClrLst>
+    <dgm:effectClrLst/>
+    <dgm:txLinClrLst/>
+    <dgm:txFillClrLst/>
+    <dgm:txEffectClrLst/>
+  </dgm:styleLbl>
+  <dgm:styleLbl name="node4">
+    <dgm:fillClrLst meth="repeat">
+      <a:schemeClr val="accent1"/>
+    </dgm:fillClrLst>
+    <dgm:linClrLst meth="repeat">
+      <a:schemeClr val="lt1"/>
+    </dgm:linClrLst>
+    <dgm:effectClrLst/>
+    <dgm:txLinClrLst/>
+    <dgm:txFillClrLst/>
+    <dgm:txEffectClrLst/>
+  </dgm:styleLbl>
+  <dgm:styleLbl name="fgImgPlace1">
+    <dgm:fillClrLst meth="repeat">
+      <a:schemeClr val="accent1">
+        <a:tint val="50000"/>
+      </a:schemeClr>
+    </dgm:fillClrLst>
+    <dgm:linClrLst meth="repeat">
+      <a:schemeClr val="lt1"/>
+    </dgm:linClrLst>
+    <dgm:effectClrLst/>
+    <dgm:txLinClrLst/>
+    <dgm:txFillClrLst meth="repeat">
+      <a:schemeClr val="lt1"/>
+    </dgm:txFillClrLst>
+    <dgm:txEffectClrLst/>
+  </dgm:styleLbl>
+  <dgm:styleLbl name="alignImgPlace1">
+    <dgm:fillClrLst meth="repeat">
+      <a:schemeClr val="accent1">
+        <a:tint val="50000"/>
+      </a:schemeClr>
+    </dgm:fillClrLst>
+    <dgm:linClrLst meth="repeat">
+      <a:schemeClr val="lt1"/>
+    </dgm:linClrLst>
+    <dgm:effectClrLst/>
+    <dgm:txLinClrLst/>
+    <dgm:txFillClrLst meth="repeat">
+      <a:schemeClr val="lt1"/>
+    </dgm:txFillClrLst>
+    <dgm:txEffectClrLst/>
+  </dgm:styleLbl>
+  <dgm:styleLbl name="bgImgPlace1">
+    <dgm:fillClrLst meth="repeat">
+      <a:schemeClr val="accent1">
+        <a:tint val="50000"/>
+      </a:schemeClr>
+    </dgm:fillClrLst>
+    <dgm:linClrLst meth="repeat">
+      <a:schemeClr val="lt1"/>
+    </dgm:linClrLst>
+    <dgm:effectClrLst/>
+    <dgm:txLinClrLst/>
+    <dgm:txFillClrLst meth="repeat">
+      <a:schemeClr val="lt1"/>
+    </dgm:txFillClrLst>
+    <dgm:txEffectClrLst/>
+  </dgm:styleLbl>
+  <dgm:styleLbl name="sibTrans2D1">
+    <dgm:fillClrLst meth="repeat">
+      <a:schemeClr val="accent1">
+        <a:tint val="60000"/>
+      </a:schemeClr>
+    </dgm:fillClrLst>
+    <dgm:linClrLst meth="repeat">
+      <a:schemeClr val="accent1">
+        <a:tint val="60000"/>
+      </a:schemeClr>
+    </dgm:linClrLst>
+    <dgm:effectClrLst/>
+    <dgm:txLinClrLst/>
+    <dgm:txFillClrLst/>
+    <dgm:txEffectClrLst/>
+  </dgm:styleLbl>
+  <dgm:styleLbl name="fgSibTrans2D1">
+    <dgm:fillClrLst meth="repeat">
+      <a:schemeClr val="accent1">
+        <a:tint val="60000"/>
+      </a:schemeClr>
+    </dgm:fillClrLst>
+    <dgm:linClrLst meth="repeat">
+      <a:schemeClr val="accent1">
+        <a:tint val="60000"/>
+      </a:schemeClr>
+    </dgm:linClrLst>
+    <dgm:effectClrLst/>
+    <dgm:txLinClrLst/>
+    <dgm:txFillClrLst/>
+    <dgm:txEffectClrLst/>
+  </dgm:styleLbl>
+  <dgm:styleLbl name="bgSibTrans2D1">
+    <dgm:fillClrLst meth="repeat">
+      <a:schemeClr val="accent1">
+        <a:tint val="60000"/>
+      </a:schemeClr>
+    </dgm:fillClrLst>
+    <dgm:linClrLst meth="repeat">
+      <a:schemeClr val="accent1">
+        <a:tint val="60000"/>
+      </a:schemeClr>
+    </dgm:linClrLst>
+    <dgm:effectClrLst/>
+    <dgm:txLinClrLst/>
+    <dgm:txFillClrLst/>
+    <dgm:txEffectClrLst/>
+  </dgm:styleLbl>
+  <dgm:styleLbl name="sibTrans1D1">
+    <dgm:fillClrLst meth="repeat">
+      <a:schemeClr val="accent1"/>
+    </dgm:fillClrLst>
+    <dgm:linClrLst meth="repeat">
+      <a:schemeClr val="accent1"/>
+    </dgm:linClrLst>
+    <dgm:effectClrLst/>
+    <dgm:txLinClrLst/>
+    <dgm:txFillClrLst meth="repeat">
+      <a:schemeClr val="tx1"/>
+    </dgm:txFillClrLst>
+    <dgm:txEffectClrLst/>
+  </dgm:styleLbl>
+  <dgm:styleLbl name="callout">
+    <dgm:fillClrLst meth="repeat">
+      <a:schemeClr val="accent1"/>
+    </dgm:fillClrLst>
+    <dgm:linClrLst meth="repeat">
+      <a:schemeClr val="accent1">
+        <a:tint val="50000"/>
+      </a:schemeClr>
+    </dgm:linClrLst>
+    <dgm:effectClrLst/>
+    <dgm:txLinClrLst/>
+    <dgm:txFillClrLst meth="repeat">
+      <a:schemeClr val="tx1"/>
+    </dgm:txFillClrLst>
+    <dgm:txEffectClrLst/>
+  </dgm:styleLbl>
+  <dgm:styleLbl name="asst0">
+    <dgm:fillClrLst meth="repeat">
+      <a:schemeClr val="accent1"/>
+    </dgm:fillClrLst>
+    <dgm:linClrLst meth="repeat">
+      <a:schemeClr val="lt1"/>
+    </dgm:linClrLst>
+    <dgm:effectClrLst/>
+    <dgm:txLinClrLst/>
+    <dgm:txFillClrLst/>
+    <dgm:txEffectClrLst/>
+  </dgm:styleLbl>
+  <dgm:styleLbl name="asst1">
+    <dgm:fillClrLst meth="repeat">
+      <a:schemeClr val="accent1"/>
+    </dgm:fillClrLst>
+    <dgm:linClrLst meth="repeat">
+      <a:schemeClr val="lt1"/>
+    </dgm:linClrLst>
+    <dgm:effectClrLst/>
+    <dgm:txLinClrLst/>
+    <dgm:txFillClrLst/>
+    <dgm:txEffectClrLst/>
+  </dgm:styleLbl>
+  <dgm:styleLbl name="asst2">
+    <dgm:fillClrLst meth="repeat">
+      <a:schemeClr val="accent1"/>
+    </dgm:fillClrLst>
+    <dgm:linClrLst meth="repeat">
+      <a:schemeClr val="lt1"/>
+    </dgm:linClrLst>
+    <dgm:effectClrLst/>
+    <dgm:txLinClrLst/>
+    <dgm:txFillClrLst/>
+    <dgm:txEffectClrLst/>
+  </dgm:styleLbl>
+  <dgm:styleLbl name="asst3">
+    <dgm:fillClrLst meth="repeat">
+      <a:schemeClr val="accent1"/>
+    </dgm:fillClrLst>
+    <dgm:linClrLst meth="repeat">
+      <a:schemeClr val="lt1"/>
+    </dgm:linClrLst>
+    <dgm:effectClrLst/>
+    <dgm:txLinClrLst/>
+    <dgm:txFillClrLst/>
+    <dgm:txEffectClrLst/>
+  </dgm:styleLbl>
+  <dgm:styleLbl name="asst4">
+    <dgm:fillClrLst meth="repeat">
+      <a:schemeClr val="accent1"/>
+    </dgm:fillClrLst>
+    <dgm:linClrLst meth="repeat">
+      <a:schemeClr val="lt1"/>
+    </dgm:linClrLst>
+    <dgm:effectClrLst/>
+    <dgm:txLinClrLst/>
+    <dgm:txFillClrLst/>
+    <dgm:txEffectClrLst/>
+  </dgm:styleLbl>
+  <dgm:styleLbl name="parChTrans2D1">
+    <dgm:fillClrLst meth="repeat">
+      <a:schemeClr val="accent1">
+        <a:tint val="60000"/>
+      </a:schemeClr>
+    </dgm:fillClrLst>
+    <dgm:linClrLst meth="repeat">
+      <a:schemeClr val="accent1">
+        <a:tint val="60000"/>
+      </a:schemeClr>
+    </dgm:linClrLst>
+    <dgm:effectClrLst/>
+    <dgm:txLinClrLst/>
+    <dgm:txFillClrLst meth="repeat">
+      <a:schemeClr val="lt1"/>
+    </dgm:txFillClrLst>
+    <dgm:txEffectClrLst/>
+  </dgm:styleLbl>
+  <dgm:styleLbl name="parChTrans2D2">
+    <dgm:fillClrLst meth="repeat">
+      <a:schemeClr val="accent1"/>
+    </dgm:fillClrLst>
+    <dgm:linClrLst meth="repeat">
+      <a:schemeClr val="accent1"/>
+    </dgm:linClrLst>
+    <dgm:effectClrLst/>
+    <dgm:txLinClrLst/>
+    <dgm:txFillClrLst meth="repeat">
+      <a:schemeClr val="lt1"/>
+    </dgm:txFillClrLst>
+    <dgm:txEffectClrLst/>
+  </dgm:styleLbl>
+  <dgm:styleLbl name="parChTrans2D3">
+    <dgm:fillClrLst meth="repeat">
+      <a:schemeClr val="accent1"/>
+    </dgm:fillClrLst>
+    <dgm:linClrLst meth="repeat">
+      <a:schemeClr val="accent1"/>
+    </dgm:linClrLst>
+    <dgm:effectClrLst/>
+    <dgm:txLinClrLst/>
+    <dgm:txFillClrLst meth="repeat">
+      <a:schemeClr val="lt1"/>
+    </dgm:txFillClrLst>
+    <dgm:txEffectClrLst/>
+  </dgm:styleLbl>
+  <dgm:styleLbl name="parChTrans2D4">
+    <dgm:fillClrLst meth="repeat">
+      <a:schemeClr val="accent1"/>
+    </dgm:fillClrLst>
+    <dgm:linClrLst meth="repeat">
+      <a:schemeClr val="accent1"/>
+    </dgm:linClrLst>
+    <dgm:effectClrLst/>
+    <dgm:txLinClrLst/>
+    <dgm:txFillClrLst meth="repeat">
+      <a:schemeClr val="lt1"/>
+    </dgm:txFillClrLst>
+    <dgm:txEffectClrLst/>
+  </dgm:styleLbl>
+  <dgm:styleLbl name="parChTrans1D1">
+    <dgm:fillClrLst meth="repeat">
+      <a:schemeClr val="accent1"/>
+    </dgm:fillClrLst>
+    <dgm:linClrLst meth="repeat">
+      <a:schemeClr val="accent1">
+        <a:shade val="60000"/>
+      </a:schemeClr>
+    </dgm:linClrLst>
+    <dgm:effectClrLst/>
+    <dgm:txLinClrLst/>
+    <dgm:txFillClrLst meth="repeat">
+      <a:schemeClr val="tx1"/>
+    </dgm:txFillClrLst>
+    <dgm:txEffectClrLst/>
+  </dgm:styleLbl>
+  <dgm:styleLbl name="parChTrans1D2">
+    <dgm:fillClrLst meth="repeat">
+      <a:schemeClr val="accent1"/>
+    </dgm:fillClrLst>
+    <dgm:linClrLst meth="repeat">
+      <a:schemeClr val="accent1">
+        <a:shade val="60000"/>
+      </a:schemeClr>
+    </dgm:linClrLst>
+    <dgm:effectClrLst/>
+    <dgm:txLinClrLst/>
+    <dgm:txFillClrLst meth="repeat">
+      <a:schemeClr val="tx1"/>
+    </dgm:txFillClrLst>
+    <dgm:txEffectClrLst/>
+  </dgm:styleLbl>
+  <dgm:styleLbl name="parChTrans1D3">
+    <dgm:fillClrLst meth="repeat">
+      <a:schemeClr val="accent1"/>
+    </dgm:fillClrLst>
+    <dgm:linClrLst meth="repeat">
+      <a:schemeClr val="accent1">
+        <a:shade val="80000"/>
+      </a:schemeClr>
+    </dgm:linClrLst>
+    <dgm:effectClrLst/>
+    <dgm:txLinClrLst/>
+    <dgm:txFillClrLst meth="repeat">
+      <a:schemeClr val="tx1"/>
+    </dgm:txFillClrLst>
+    <dgm:txEffectClrLst/>
+  </dgm:styleLbl>
+  <dgm:styleLbl name="parChTrans1D4">
+    <dgm:fillClrLst meth="repeat">
+      <a:schemeClr val="accent1"/>
+    </dgm:fillClrLst>
+    <dgm:linClrLst meth="repeat">
+      <a:schemeClr val="accent1">
+        <a:shade val="80000"/>
+      </a:schemeClr>
+    </dgm:linClrLst>
+    <dgm:effectClrLst/>
+    <dgm:txLinClrLst/>
+    <dgm:txFillClrLst meth="repeat">
+      <a:schemeClr val="tx1"/>
+    </dgm:txFillClrLst>
+    <dgm:txEffectClrLst/>
+  </dgm:styleLbl>
+  <dgm:styleLbl name="fgAcc1">
+    <dgm:fillClrLst meth="repeat">
+      <a:schemeClr val="lt1">
+        <a:alpha val="90000"/>
+      </a:schemeClr>
+    </dgm:fillClrLst>
+    <dgm:linClrLst meth="repeat">
+      <a:schemeClr val="accent1"/>
+    </dgm:linClrLst>
+    <dgm:effectClrLst/>
+    <dgm:txLinClrLst/>
+    <dgm:txFillClrLst meth="repeat">
+      <a:schemeClr val="dk1"/>
+    </dgm:txFillClrLst>
+    <dgm:txEffectClrLst/>
+  </dgm:styleLbl>
+  <dgm:styleLbl name="conFgAcc1">
+    <dgm:fillClrLst meth="repeat">
+      <a:schemeClr val="lt1">
+        <a:alpha val="90000"/>
+      </a:schemeClr>
+    </dgm:fillClrLst>
+    <dgm:linClrLst meth="repeat">
+      <a:schemeClr val="accent1"/>
+    </dgm:linClrLst>
+    <dgm:effectClrLst/>
+    <dgm:txLinClrLst/>
+    <dgm:txFillClrLst meth="repeat">
+      <a:schemeClr val="dk1"/>
+    </dgm:txFillClrLst>
+    <dgm:txEffectClrLst/>
+  </dgm:styleLbl>
+  <dgm:styleLbl name="alignAcc1">
+    <dgm:fillClrLst meth="repeat">
+      <a:schemeClr val="lt1">
+        <a:alpha val="90000"/>
+      </a:schemeClr>
+    </dgm:fillClrLst>
+    <dgm:linClrLst meth="repeat">
+      <a:schemeClr val="accent1"/>
+    </dgm:linClrLst>
+    <dgm:effectClrLst/>
+    <dgm:txLinClrLst/>
+    <dgm:txFillClrLst meth="repeat">
+      <a:schemeClr val="dk1"/>
+    </dgm:txFillClrLst>
+    <dgm:txEffectClrLst/>
+  </dgm:styleLbl>
+  <dgm:styleLbl name="trAlignAcc1">
+    <dgm:fillClrLst meth="repeat">
+      <a:schemeClr val="lt1">
+        <a:alpha val="40000"/>
+      </a:schemeClr>
+    </dgm:fillClrLst>
+    <dgm:linClrLst meth="repeat">
+      <a:schemeClr val="accent1"/>
+    </dgm:linClrLst>
+    <dgm:effectClrLst/>
+    <dgm:txLinClrLst/>
+    <dgm:txFillClrLst meth="repeat">
+      <a:schemeClr val="dk1"/>
+    </dgm:txFillClrLst>
+    <dgm:txEffectClrLst/>
+  </dgm:styleLbl>
+  <dgm:styleLbl name="bgAcc1">
+    <dgm:fillClrLst meth="repeat">
+      <a:schemeClr val="lt1">
+        <a:alpha val="90000"/>
+      </a:schemeClr>
+    </dgm:fillClrLst>
+    <dgm:linClrLst meth="repeat">
+      <a:schemeClr val="accent1"/>
+    </dgm:linClrLst>
+    <dgm:effectClrLst/>
+    <dgm:txLinClrLst/>
+    <dgm:txFillClrLst meth="repeat">
+      <a:schemeClr val="dk1"/>
+    </dgm:txFillClrLst>
+    <dgm:txEffectClrLst/>
+  </dgm:styleLbl>
+  <dgm:styleLbl name="solidFgAcc1">
+    <dgm:fillClrLst meth="repeat">
+      <a:schemeClr val="lt1"/>
+    </dgm:fillClrLst>
+    <dgm:linClrLst meth="repeat">
+      <a:schemeClr val="accent1"/>
+    </dgm:linClrLst>
+    <dgm:effectClrLst/>
+    <dgm:txLinClrLst/>
+    <dgm:txFillClrLst meth="repeat">
+      <a:schemeClr val="dk1"/>
+    </dgm:txFillClrLst>
+    <dgm:txEffectClrLst/>
+  </dgm:styleLbl>
+  <dgm:styleLbl name="solidAlignAcc1">
+    <dgm:fillClrLst meth="repeat">
+      <a:schemeClr val="lt1"/>
+    </dgm:fillClrLst>
+    <dgm:linClrLst meth="repeat">
+      <a:schemeClr val="accent1"/>
+    </dgm:linClrLst>
+    <dgm:effectClrLst/>
+    <dgm:txLinClrLst/>
+    <dgm:txFillClrLst meth="repeat">
+      <a:schemeClr val="dk1"/>
+    </dgm:txFillClrLst>
+    <dgm:txEffectClrLst/>
+  </dgm:styleLbl>
+  <dgm:styleLbl name="solidBgAcc1">
+    <dgm:fillClrLst meth="repeat">
+      <a:schemeClr val="lt1"/>
+    </dgm:fillClrLst>
+    <dgm:linClrLst meth="repeat">
+      <a:schemeClr val="accent1"/>
+    </dgm:linClrLst>
+    <dgm:effectClrLst/>
+    <dgm:txLinClrLst/>
+    <dgm:txFillClrLst meth="repeat">
+      <a:schemeClr val="dk1"/>
+    </dgm:txFillClrLst>
+    <dgm:txEffectClrLst/>
+  </dgm:styleLbl>
+  <dgm:styleLbl name="fgAccFollowNode1">
+    <dgm:fillClrLst meth="repeat">
+      <a:schemeClr val="accent1">
+        <a:alpha val="90000"/>
+        <a:tint val="40000"/>
+      </a:schemeClr>
+    </dgm:fillClrLst>
+    <dgm:linClrLst meth="repeat">
+      <a:schemeClr val="accent1">
+        <a:alpha val="90000"/>
+        <a:tint val="40000"/>
+      </a:schemeClr>
+    </dgm:linClrLst>
+    <dgm:effectClrLst/>
+    <dgm:txLinClrLst/>
+    <dgm:txFillClrLst meth="repeat">
+      <a:schemeClr val="dk1"/>
+    </dgm:txFillClrLst>
+    <dgm:txEffectClrLst/>
+  </dgm:styleLbl>
+  <dgm:styleLbl name="alignAccFollowNode1">
+    <dgm:fillClrLst meth="repeat">
+      <a:schemeClr val="accent1">
+        <a:alpha val="90000"/>
+        <a:tint val="40000"/>
+      </a:schemeClr>
+    </dgm:fillClrLst>
+    <dgm:linClrLst meth="repeat">
+      <a:schemeClr val="accent1">
+        <a:alpha val="90000"/>
+        <a:tint val="40000"/>
+      </a:schemeClr>
+    </dgm:linClrLst>
+    <dgm:effectClrLst/>
+    <dgm:txLinClrLst/>
+    <dgm:txFillClrLst meth="repeat">
+      <a:schemeClr val="dk1"/>
+    </dgm:txFillClrLst>
+    <dgm:txEffectClrLst/>
+  </dgm:styleLbl>
+  <dgm:styleLbl name="bgAccFollowNode1">
+    <dgm:fillClrLst meth="repeat">
+      <a:schemeClr val="accent1">
+        <a:alpha val="90000"/>
+        <a:tint val="40000"/>
+      </a:schemeClr>
+    </dgm:fillClrLst>
+    <dgm:linClrLst meth="repeat">
+      <a:schemeClr val="accent1">
+        <a:alpha val="90000"/>
+        <a:tint val="40000"/>
+      </a:schemeClr>
+    </dgm:linClrLst>
+    <dgm:effectClrLst/>
+    <dgm:txLinClrLst/>
+    <dgm:txFillClrLst meth="repeat">
+      <a:schemeClr val="dk1"/>
+    </dgm:txFillClrLst>
+    <dgm:txEffectClrLst/>
+  </dgm:styleLbl>
+  <dgm:styleLbl name="fgAcc0">
+    <dgm:fillClrLst meth="repeat">
+      <a:schemeClr val="lt1">
+        <a:alpha val="90000"/>
+      </a:schemeClr>
+    </dgm:fillClrLst>
+    <dgm:linClrLst meth="repeat">
+      <a:schemeClr val="accent1"/>
+    </dgm:linClrLst>
+    <dgm:effectClrLst/>
+    <dgm:txLinClrLst/>
+    <dgm:txFillClrLst meth="repeat">
+      <a:schemeClr val="dk1"/>
+    </dgm:txFillClrLst>
+    <dgm:txEffectClrLst/>
+  </dgm:styleLbl>
+  <dgm:styleLbl name="fgAcc2">
+    <dgm:fillClrLst meth="repeat">
+      <a:schemeClr val="lt1">
+        <a:alpha val="90000"/>
+      </a:schemeClr>
+    </dgm:fillClrLst>
+    <dgm:linClrLst meth="repeat">
+      <a:schemeClr val="accent1"/>
+    </dgm:linClrLst>
+    <dgm:effectClrLst/>
+    <dgm:txLinClrLst/>
+    <dgm:txFillClrLst meth="repeat">
+      <a:schemeClr val="dk1"/>
+    </dgm:txFillClrLst>
+    <dgm:txEffectClrLst/>
+  </dgm:styleLbl>
+  <dgm:styleLbl name="fgAcc3">
+    <dgm:fillClrLst meth="repeat">
+      <a:schemeClr val="lt1">
+        <a:alpha val="90000"/>
+      </a:schemeClr>
+    </dgm:fillClrLst>
+    <dgm:linClrLst meth="repeat">
+      <a:schemeClr val="accent1"/>
+    </dgm:linClrLst>
+    <dgm:effectClrLst/>
+    <dgm:txLinClrLst/>
+    <dgm:txFillClrLst meth="repeat">
+      <a:schemeClr val="dk1"/>
+    </dgm:txFillClrLst>
+    <dgm:txEffectClrLst/>
+  </dgm:styleLbl>
+  <dgm:styleLbl name="fgAcc4">
+    <dgm:fillClrLst meth="repeat">
+      <a:schemeClr val="lt1">
+        <a:alpha val="90000"/>
+      </a:schemeClr>
+    </dgm:fillClrLst>
+    <dgm:linClrLst meth="repeat">
+      <a:schemeClr val="accent1"/>
+    </dgm:linClrLst>
+    <dgm:effectClrLst/>
+    <dgm:txLinClrLst/>
+    <dgm:txFillClrLst meth="repeat">
+      <a:schemeClr val="dk1"/>
+    </dgm:txFillClrLst>
+    <dgm:txEffectClrLst/>
+  </dgm:styleLbl>
+  <dgm:styleLbl name="bgShp">
+    <dgm:fillClrLst meth="repeat">
+      <a:schemeClr val="accent1">
+        <a:tint val="40000"/>
+      </a:schemeClr>
+    </dgm:fillClrLst>
+    <dgm:linClrLst meth="repeat">
+      <a:schemeClr val="accent1"/>
+    </dgm:linClrLst>
+    <dgm:effectClrLst/>
+    <dgm:txLinClrLst/>
+    <dgm:txFillClrLst meth="repeat">
+      <a:schemeClr val="dk1"/>
+    </dgm:txFillClrLst>
+    <dgm:txEffectClrLst/>
+  </dgm:styleLbl>
+  <dgm:styleLbl name="dkBgShp">
+    <dgm:fillClrLst meth="repeat">
+      <a:schemeClr val="accent1">
+        <a:shade val="80000"/>
+      </a:schemeClr>
+    </dgm:fillClrLst>
+    <dgm:linClrLst meth="repeat">
+      <a:schemeClr val="accent1"/>
+    </dgm:linClrLst>
+    <dgm:effectClrLst/>
+    <dgm:txLinClrLst/>
+    <dgm:txFillClrLst meth="repeat">
+      <a:schemeClr val="lt1"/>
+    </dgm:txFillClrLst>
+    <dgm:txEffectClrLst/>
+  </dgm:styleLbl>
+  <dgm:styleLbl name="trBgShp">
+    <dgm:fillClrLst meth="repeat">
+      <a:schemeClr val="accent1">
+        <a:tint val="50000"/>
+        <a:alpha val="40000"/>
+      </a:schemeClr>
+    </dgm:fillClrLst>
+    <dgm:linClrLst meth="repeat">
+      <a:schemeClr val="accent1"/>
+    </dgm:linClrLst>
+    <dgm:effectClrLst/>
+    <dgm:txLinClrLst/>
+    <dgm:txFillClrLst meth="repeat">
+      <a:schemeClr val="lt1"/>
+    </dgm:txFillClrLst>
+    <dgm:txEffectClrLst/>
+  </dgm:styleLbl>
+  <dgm:styleLbl name="fgShp">
+    <dgm:fillClrLst meth="repeat">
+      <a:schemeClr val="accent1">
+        <a:tint val="60000"/>
+      </a:schemeClr>
+    </dgm:fillClrLst>
+    <dgm:linClrLst meth="repeat">
+      <a:schemeClr val="lt1"/>
+    </dgm:linClrLst>
+    <dgm:effectClrLst/>
+    <dgm:txLinClrLst/>
+    <dgm:txFillClrLst meth="repeat">
+      <a:schemeClr val="dk1"/>
+    </dgm:txFillClrLst>
+    <dgm:txEffectClrLst/>
+  </dgm:styleLbl>
+  <dgm:styleLbl name="revTx">
+    <dgm:fillClrLst meth="repeat">
+      <a:schemeClr val="lt1">
+        <a:alpha val="0"/>
+      </a:schemeClr>
+    </dgm:fillClrLst>
+    <dgm:linClrLst meth="repeat">
+      <a:schemeClr val="dk1">
+        <a:alpha val="0"/>
+      </a:schemeClr>
+    </dgm:linClrLst>
+    <dgm:effectClrLst/>
+    <dgm:txLinClrLst/>
+    <dgm:txFillClrLst meth="repeat">
+      <a:schemeClr val="tx1"/>
+    </dgm:txFillClrLst>
+    <dgm:txEffectClrLst/>
+  </dgm:styleLbl>
+</dgm:colorsDef>
+</file>
+
+<file path=ppt/diagrams/colors5.xml><?xml version="1.0" encoding="utf-8"?>
 <dgm:colorsDef xmlns:dgm="http://schemas.openxmlformats.org/drawingml/2006/diagram" xmlns:a="http://schemas.openxmlformats.org/drawingml/2006/main" uniqueId="urn:microsoft.com/office/officeart/2005/8/colors/accent1_2">
   <dgm:title val=""/>
   <dgm:desc val=""/>
@@ -4195,12 +4943,12 @@
     <dgm:cxn modelId="{3486D8CA-E5DB-4B7D-AFC6-71B28B84FD36}" srcId="{CF5C43D8-C84E-46E1-85CE-3EC88A01A91B}" destId="{54CCB61D-F2EE-4314-BC9D-ABC5E501DB91}" srcOrd="4" destOrd="0" parTransId="{19517F10-0496-4F36-B7BA-4CF0FA66692B}" sibTransId="{D52BAEBE-9257-47D0-8100-4C00C79359E4}"/>
     <dgm:cxn modelId="{745CE406-5128-458B-B2D5-CF14E1931C88}" srcId="{CF5C43D8-C84E-46E1-85CE-3EC88A01A91B}" destId="{6FA4DFF2-6413-4965-8784-FB891A72171D}" srcOrd="5" destOrd="0" parTransId="{08110C5B-EF1A-4423-95DA-82457F8D7C94}" sibTransId="{0B6F363B-44DD-45D2-93A6-568ABCBBA118}"/>
     <dgm:cxn modelId="{C13A67D0-556E-4BF9-AAE0-683CB2BC09C4}" srcId="{CF5C43D8-C84E-46E1-85CE-3EC88A01A91B}" destId="{A6034635-CE9C-4F1F-B17D-A149A117144B}" srcOrd="2" destOrd="0" parTransId="{B06A5FF7-01E4-402B-AFBF-088E8CB44DBE}" sibTransId="{CB5B2CBD-CDA9-4592-897A-3C7B311BE66F}"/>
+    <dgm:cxn modelId="{E3F7167D-D3E0-4C40-ACBA-EAFAD0C5679D}" type="presOf" srcId="{4634B951-9E5C-4417-841F-7CB6DC619A35}" destId="{3B84BF06-5215-4FCB-A48A-56981FC939CD}" srcOrd="0" destOrd="9" presId="urn:microsoft.com/office/officeart/2005/8/layout/list1"/>
     <dgm:cxn modelId="{D727FC75-3B89-4C7F-BF47-577F309B56F2}" type="presOf" srcId="{3A9783CA-6553-4A0B-868B-FDBA984A1B11}" destId="{3B84BF06-5215-4FCB-A48A-56981FC939CD}" srcOrd="0" destOrd="5" presId="urn:microsoft.com/office/officeart/2005/8/layout/list1"/>
-    <dgm:cxn modelId="{E3F7167D-D3E0-4C40-ACBA-EAFAD0C5679D}" type="presOf" srcId="{4634B951-9E5C-4417-841F-7CB6DC619A35}" destId="{3B84BF06-5215-4FCB-A48A-56981FC939CD}" srcOrd="0" destOrd="9" presId="urn:microsoft.com/office/officeart/2005/8/layout/list1"/>
     <dgm:cxn modelId="{C8E73D34-570D-4FD8-80A6-C9E4056A60D3}" type="presOf" srcId="{5F1FA8A2-A2C6-43A8-B147-7BB65F4BB03A}" destId="{3B84BF06-5215-4FCB-A48A-56981FC939CD}" srcOrd="0" destOrd="3" presId="urn:microsoft.com/office/officeart/2005/8/layout/list1"/>
-    <dgm:cxn modelId="{D636C8A2-632E-4D68-814B-8D3E67ACA27B}" type="presOf" srcId="{09DA4C2E-DF79-475B-8C7F-6D5FB9BA57CE}" destId="{3B84BF06-5215-4FCB-A48A-56981FC939CD}" srcOrd="0" destOrd="2" presId="urn:microsoft.com/office/officeart/2005/8/layout/list1"/>
     <dgm:cxn modelId="{F6F4266C-B814-45FC-80AE-371CF8DFB092}" srcId="{CF5C43D8-C84E-46E1-85CE-3EC88A01A91B}" destId="{4A764DE4-D219-4C4E-9F0B-70D95E9E64BC}" srcOrd="0" destOrd="0" parTransId="{76BF6AC2-F473-4258-8B91-A02C9A17CFEE}" sibTransId="{9CED1E82-486C-4DC1-8214-493A56E01658}"/>
     <dgm:cxn modelId="{08F1F8E3-28EE-47BE-B9F4-A23FAA919285}" type="presOf" srcId="{CF5C43D8-C84E-46E1-85CE-3EC88A01A91B}" destId="{0E7EB5B0-3EC6-4268-9FC4-1A506436F450}" srcOrd="0" destOrd="0" presId="urn:microsoft.com/office/officeart/2005/8/layout/list1"/>
+    <dgm:cxn modelId="{D636C8A2-632E-4D68-814B-8D3E67ACA27B}" type="presOf" srcId="{09DA4C2E-DF79-475B-8C7F-6D5FB9BA57CE}" destId="{3B84BF06-5215-4FCB-A48A-56981FC939CD}" srcOrd="0" destOrd="2" presId="urn:microsoft.com/office/officeart/2005/8/layout/list1"/>
     <dgm:cxn modelId="{448020AA-DDD0-4DC9-8FD7-01C0C861B625}" type="presOf" srcId="{0783DD29-89F7-420B-94EE-E555D8C0FAE0}" destId="{3B84BF06-5215-4FCB-A48A-56981FC939CD}" srcOrd="0" destOrd="8" presId="urn:microsoft.com/office/officeart/2005/8/layout/list1"/>
     <dgm:cxn modelId="{8B34AFFF-F81A-49B7-A643-DD7C53BB8892}" type="presOf" srcId="{2A27AED6-97A3-43BB-B9F0-6F1262D8FA81}" destId="{849A44E8-8868-4543-A367-720B1C71A282}" srcOrd="0" destOrd="0" presId="urn:microsoft.com/office/officeart/2005/8/layout/list1"/>
     <dgm:cxn modelId="{4ACF83E9-ACE8-4567-A1E0-B2191838196C}" srcId="{CF5C43D8-C84E-46E1-85CE-3EC88A01A91B}" destId="{4634B951-9E5C-4417-841F-7CB6DC619A35}" srcOrd="6" destOrd="0" parTransId="{0988401F-B765-4FB9-B9AC-99E45DF05846}" sibTransId="{A67AF27D-1EED-4048-94CA-DC57ABC3DB32}"/>
@@ -5018,10 +5766,10 @@
     <dgm:cxn modelId="{C4D2F3F0-2E34-40E9-AC18-F80A11DA656C}" type="presOf" srcId="{29EDB42D-8DAB-449B-B2FA-2C215A55F5A7}" destId="{824034AE-157F-469F-915C-EC6DAE34225C}" srcOrd="0" destOrd="1" presId="urn:microsoft.com/office/officeart/2005/8/layout/list1"/>
     <dgm:cxn modelId="{DFDCFD37-4118-4C80-821E-ED21B27F0844}" type="presOf" srcId="{1242562C-204B-42C8-ABA3-71B984A7B80A}" destId="{824034AE-157F-469F-915C-EC6DAE34225C}" srcOrd="0" destOrd="2" presId="urn:microsoft.com/office/officeart/2005/8/layout/list1"/>
     <dgm:cxn modelId="{CE75C4DE-D18F-4171-921D-6D454CC6E360}" srcId="{56DFEC99-1BE3-4649-B163-64032183DA9B}" destId="{29EDB42D-8DAB-449B-B2FA-2C215A55F5A7}" srcOrd="1" destOrd="0" parTransId="{75F1861D-17ED-4B4D-9DBB-A7329D2F7A8E}" sibTransId="{1E8A200F-29E6-44CD-993A-0244584F7C40}"/>
+    <dgm:cxn modelId="{640BEF3B-8744-45F5-AD9C-CA50A98D5D9E}" type="presOf" srcId="{B77DD61F-508C-4C9F-9801-165F04FF833E}" destId="{824034AE-157F-469F-915C-EC6DAE34225C}" srcOrd="0" destOrd="3" presId="urn:microsoft.com/office/officeart/2005/8/layout/list1"/>
+    <dgm:cxn modelId="{987B5A9F-4DBC-469C-A200-7D071B49D629}" srcId="{56DFEC99-1BE3-4649-B163-64032183DA9B}" destId="{1242562C-204B-42C8-ABA3-71B984A7B80A}" srcOrd="2" destOrd="0" parTransId="{75DA7DCC-A661-4C3C-9986-E4BC1EA843E1}" sibTransId="{509D950F-078B-4142-A195-AFFA2AE2A4B2}"/>
     <dgm:cxn modelId="{BB2BE5B1-1235-4F38-98D8-93ED53BEF108}" srcId="{56DFEC99-1BE3-4649-B163-64032183DA9B}" destId="{B77DD61F-508C-4C9F-9801-165F04FF833E}" srcOrd="3" destOrd="0" parTransId="{C6DB83C5-C4E1-453E-9B86-FD1A70464FDF}" sibTransId="{FC4836F9-CC7F-4B52-83ED-B6DF15D3916A}"/>
-    <dgm:cxn modelId="{987B5A9F-4DBC-469C-A200-7D071B49D629}" srcId="{56DFEC99-1BE3-4649-B163-64032183DA9B}" destId="{1242562C-204B-42C8-ABA3-71B984A7B80A}" srcOrd="2" destOrd="0" parTransId="{75DA7DCC-A661-4C3C-9986-E4BC1EA843E1}" sibTransId="{509D950F-078B-4142-A195-AFFA2AE2A4B2}"/>
     <dgm:cxn modelId="{E9A1D600-2D5C-4980-85C3-AC8CEB930AF0}" type="presOf" srcId="{56DFEC99-1BE3-4649-B163-64032183DA9B}" destId="{4A8D3081-7512-4D70-A185-0C05CB422303}" srcOrd="0" destOrd="0" presId="urn:microsoft.com/office/officeart/2005/8/layout/list1"/>
-    <dgm:cxn modelId="{640BEF3B-8744-45F5-AD9C-CA50A98D5D9E}" type="presOf" srcId="{B77DD61F-508C-4C9F-9801-165F04FF833E}" destId="{824034AE-157F-469F-915C-EC6DAE34225C}" srcOrd="0" destOrd="3" presId="urn:microsoft.com/office/officeart/2005/8/layout/list1"/>
     <dgm:cxn modelId="{401B848C-C899-4ED9-A821-CD60D4F4FF46}" type="presOf" srcId="{A1A12EA5-71A7-4711-B9AC-168808FAB365}" destId="{824034AE-157F-469F-915C-EC6DAE34225C}" srcOrd="0" destOrd="0" presId="urn:microsoft.com/office/officeart/2005/8/layout/list1"/>
     <dgm:cxn modelId="{689ED813-078C-4E25-B357-99A14C62A75C}" type="presOf" srcId="{B9A408EB-46D1-4286-9978-16F4B141D682}" destId="{824034AE-157F-469F-915C-EC6DAE34225C}" srcOrd="0" destOrd="5" presId="urn:microsoft.com/office/officeart/2005/8/layout/list1"/>
     <dgm:cxn modelId="{56994F8B-612A-4A0A-866B-5DF24D70544F}" srcId="{56DFEC99-1BE3-4649-B163-64032183DA9B}" destId="{B9A408EB-46D1-4286-9978-16F4B141D682}" srcOrd="5" destOrd="0" parTransId="{08351E79-3A68-4ABB-9E92-039EBE587875}" sibTransId="{FC5FA0A2-C123-44AF-9ADA-5554B9CA3CCF}"/>
@@ -5045,6 +5793,583 @@
 </dgm:dataModel>
 </file>
 
+<file path=ppt/diagrams/data5.xml><?xml version="1.0" encoding="utf-8"?>
+<dgm:dataModel xmlns:dgm="http://schemas.openxmlformats.org/drawingml/2006/diagram" xmlns:a="http://schemas.openxmlformats.org/drawingml/2006/main">
+  <dgm:ptLst>
+    <dgm:pt modelId="{5788C4EB-3091-4723-9105-2DE072224E19}" type="doc">
+      <dgm:prSet loTypeId="urn:microsoft.com/office/officeart/2005/8/layout/hProcess11" loCatId="process" qsTypeId="urn:microsoft.com/office/officeart/2005/8/quickstyle/simple1" qsCatId="simple" csTypeId="urn:microsoft.com/office/officeart/2005/8/colors/accent1_2" csCatId="accent1" phldr="1"/>
+      <dgm:spPr/>
+      <dgm:t>
+        <a:bodyPr/>
+        <a:lstStyle/>
+        <a:p>
+          <a:endParaRPr lang="en-US"/>
+        </a:p>
+      </dgm:t>
+    </dgm:pt>
+    <dgm:pt modelId="{B3581DE2-F776-407D-BEBE-22E761798BB2}">
+      <dgm:prSet phldrT="[Text]"/>
+      <dgm:spPr/>
+      <dgm:t>
+        <a:bodyPr/>
+        <a:lstStyle/>
+        <a:p>
+          <a:r>
+            <a:rPr lang="en-US" dirty="0" smtClean="0"/>
+            <a:t>Position The </a:t>
+          </a:r>
+          <a:r>
+            <a:rPr lang="en-US" dirty="0" err="1" smtClean="0"/>
+            <a:t>CoverSlip</a:t>
+          </a:r>
+          <a:endParaRPr lang="en-US" dirty="0"/>
+        </a:p>
+      </dgm:t>
+    </dgm:pt>
+    <dgm:pt modelId="{BA64BA81-280C-4CCE-B7ED-2C8C96BABE8C}" type="parTrans" cxnId="{833710CD-1383-4296-8690-691606A4006B}">
+      <dgm:prSet/>
+      <dgm:spPr/>
+      <dgm:t>
+        <a:bodyPr/>
+        <a:lstStyle/>
+        <a:p>
+          <a:endParaRPr lang="en-US"/>
+        </a:p>
+      </dgm:t>
+    </dgm:pt>
+    <dgm:pt modelId="{6B07E0C6-EA77-43B6-B5E4-2E731C1E7E88}" type="sibTrans" cxnId="{833710CD-1383-4296-8690-691606A4006B}">
+      <dgm:prSet/>
+      <dgm:spPr/>
+      <dgm:t>
+        <a:bodyPr/>
+        <a:lstStyle/>
+        <a:p>
+          <a:endParaRPr lang="en-US"/>
+        </a:p>
+      </dgm:t>
+    </dgm:pt>
+    <dgm:pt modelId="{59C8D260-123F-4F97-8502-E35F4728ACD6}">
+      <dgm:prSet phldrT="[Text]"/>
+      <dgm:spPr/>
+      <dgm:t>
+        <a:bodyPr/>
+        <a:lstStyle/>
+        <a:p>
+          <a:r>
+            <a:rPr lang="en-US" dirty="0" smtClean="0"/>
+            <a:t>Cut tissue &amp; Puff off tissue</a:t>
+          </a:r>
+          <a:endParaRPr lang="en-US" dirty="0"/>
+        </a:p>
+      </dgm:t>
+    </dgm:pt>
+    <dgm:pt modelId="{E34D62B5-2A71-45CD-B784-4EEC19667D7C}" type="parTrans" cxnId="{8B433D64-1CF4-4B03-BBB7-4483A2A1864E}">
+      <dgm:prSet/>
+      <dgm:spPr/>
+      <dgm:t>
+        <a:bodyPr/>
+        <a:lstStyle/>
+        <a:p>
+          <a:endParaRPr lang="en-US"/>
+        </a:p>
+      </dgm:t>
+    </dgm:pt>
+    <dgm:pt modelId="{BA71C4BA-9ABD-44B9-9499-784E6873D86D}" type="sibTrans" cxnId="{8B433D64-1CF4-4B03-BBB7-4483A2A1864E}">
+      <dgm:prSet/>
+      <dgm:spPr/>
+      <dgm:t>
+        <a:bodyPr/>
+        <a:lstStyle/>
+        <a:p>
+          <a:endParaRPr lang="en-US"/>
+        </a:p>
+      </dgm:t>
+    </dgm:pt>
+    <dgm:pt modelId="{3DB2E199-83E1-4C98-A857-046D7BE01DEA}">
+      <dgm:prSet phldrT="[Text]"/>
+      <dgm:spPr/>
+      <dgm:t>
+        <a:bodyPr/>
+        <a:lstStyle/>
+        <a:p>
+          <a:endParaRPr lang="en-US" dirty="0"/>
+        </a:p>
+      </dgm:t>
+    </dgm:pt>
+    <dgm:pt modelId="{2C501509-5A2D-46B3-B0DA-938151559723}" type="parTrans" cxnId="{37D06CED-B15C-4F99-AE65-07776FE4FF6C}">
+      <dgm:prSet/>
+      <dgm:spPr/>
+      <dgm:t>
+        <a:bodyPr/>
+        <a:lstStyle/>
+        <a:p>
+          <a:endParaRPr lang="en-US"/>
+        </a:p>
+      </dgm:t>
+    </dgm:pt>
+    <dgm:pt modelId="{32317475-FF65-41CC-A7A7-52FEE091121E}" type="sibTrans" cxnId="{37D06CED-B15C-4F99-AE65-07776FE4FF6C}">
+      <dgm:prSet/>
+      <dgm:spPr/>
+      <dgm:t>
+        <a:bodyPr/>
+        <a:lstStyle/>
+        <a:p>
+          <a:endParaRPr lang="en-US"/>
+        </a:p>
+      </dgm:t>
+    </dgm:pt>
+    <dgm:pt modelId="{8610F440-5FE0-4E70-952C-DD7D8956323B}">
+      <dgm:prSet phldrT="[Text]"/>
+      <dgm:spPr/>
+      <dgm:t>
+        <a:bodyPr/>
+        <a:lstStyle/>
+        <a:p>
+          <a:r>
+            <a:rPr lang="en-US" dirty="0" smtClean="0"/>
+            <a:t>Find ribbon</a:t>
+          </a:r>
+          <a:endParaRPr lang="en-US" dirty="0"/>
+        </a:p>
+      </dgm:t>
+    </dgm:pt>
+    <dgm:pt modelId="{AB16BCD1-6AFF-4689-BBC9-5FFDF0F9490E}" type="parTrans" cxnId="{60EA564E-9DDE-427E-BB36-28E180E9813A}">
+      <dgm:prSet/>
+      <dgm:spPr/>
+      <dgm:t>
+        <a:bodyPr/>
+        <a:lstStyle/>
+        <a:p>
+          <a:endParaRPr lang="en-US"/>
+        </a:p>
+      </dgm:t>
+    </dgm:pt>
+    <dgm:pt modelId="{9D5C81D2-E52B-40A1-AF67-ECFAD69E9BDC}" type="sibTrans" cxnId="{60EA564E-9DDE-427E-BB36-28E180E9813A}">
+      <dgm:prSet/>
+      <dgm:spPr/>
+      <dgm:t>
+        <a:bodyPr/>
+        <a:lstStyle/>
+        <a:p>
+          <a:endParaRPr lang="en-US"/>
+        </a:p>
+      </dgm:t>
+    </dgm:pt>
+    <dgm:pt modelId="{1E6A7E82-D44D-49FF-91FE-581D0169C214}">
+      <dgm:prSet phldrT="[Text]"/>
+      <dgm:spPr/>
+      <dgm:t>
+        <a:bodyPr/>
+        <a:lstStyle/>
+        <a:p>
+          <a:r>
+            <a:rPr lang="en-US" dirty="0" smtClean="0"/>
+            <a:t>Use joystick/camera to find leading edge of ribbon</a:t>
+          </a:r>
+          <a:endParaRPr lang="en-US" dirty="0"/>
+        </a:p>
+      </dgm:t>
+    </dgm:pt>
+    <dgm:pt modelId="{88C9CD77-FC26-4DF8-B346-1430C50683D4}" type="parTrans" cxnId="{E81CF322-6499-4333-AC73-A7872A8CC360}">
+      <dgm:prSet/>
+      <dgm:spPr/>
+      <dgm:t>
+        <a:bodyPr/>
+        <a:lstStyle/>
+        <a:p>
+          <a:endParaRPr lang="en-US"/>
+        </a:p>
+      </dgm:t>
+    </dgm:pt>
+    <dgm:pt modelId="{54CD760F-ED7D-4D14-A62F-42069CB7E5E3}" type="sibTrans" cxnId="{E81CF322-6499-4333-AC73-A7872A8CC360}">
+      <dgm:prSet/>
+      <dgm:spPr/>
+      <dgm:t>
+        <a:bodyPr/>
+        <a:lstStyle/>
+        <a:p>
+          <a:endParaRPr lang="en-US"/>
+        </a:p>
+      </dgm:t>
+    </dgm:pt>
+    <dgm:pt modelId="{C2FE8EAB-8BAF-4C58-BC2D-37E4657D4BF8}">
+      <dgm:prSet phldrT="[Text]"/>
+      <dgm:spPr/>
+      <dgm:t>
+        <a:bodyPr/>
+        <a:lstStyle/>
+        <a:p>
+          <a:r>
+            <a:rPr lang="en-US" dirty="0" smtClean="0"/>
+            <a:t>Lower carriage to whisker-water contact</a:t>
+          </a:r>
+          <a:endParaRPr lang="en-US" dirty="0"/>
+        </a:p>
+      </dgm:t>
+    </dgm:pt>
+    <dgm:pt modelId="{F339728D-298D-4720-8C44-145ECAE6434C}" type="parTrans" cxnId="{858ED8AE-0749-4743-91BC-7B1C7C8F07E3}">
+      <dgm:prSet/>
+      <dgm:spPr/>
+      <dgm:t>
+        <a:bodyPr/>
+        <a:lstStyle/>
+        <a:p>
+          <a:endParaRPr lang="en-US"/>
+        </a:p>
+      </dgm:t>
+    </dgm:pt>
+    <dgm:pt modelId="{92E35EA1-1B93-45F1-A672-C56410D95EA7}" type="sibTrans" cxnId="{858ED8AE-0749-4743-91BC-7B1C7C8F07E3}">
+      <dgm:prSet/>
+      <dgm:spPr/>
+      <dgm:t>
+        <a:bodyPr/>
+        <a:lstStyle/>
+        <a:p>
+          <a:endParaRPr lang="en-US"/>
+        </a:p>
+      </dgm:t>
+    </dgm:pt>
+    <dgm:pt modelId="{C97B8C1F-CE4E-40A2-84F3-1C8B58A5E244}">
+      <dgm:prSet phldrT="[Text]"/>
+      <dgm:spPr/>
+      <dgm:t>
+        <a:bodyPr/>
+        <a:lstStyle/>
+        <a:p>
+          <a:r>
+            <a:rPr lang="en-US" dirty="0" smtClean="0"/>
+            <a:t>Use camera and up/down buttons/joystick to make contact</a:t>
+          </a:r>
+          <a:endParaRPr lang="en-US" dirty="0"/>
+        </a:p>
+      </dgm:t>
+    </dgm:pt>
+    <dgm:pt modelId="{8F7CD162-5B81-42E5-B185-6AF3663C0A36}" type="parTrans" cxnId="{74A20FD4-0B03-40A9-8DAE-6D1F673AF057}">
+      <dgm:prSet/>
+      <dgm:spPr/>
+      <dgm:t>
+        <a:bodyPr/>
+        <a:lstStyle/>
+        <a:p>
+          <a:endParaRPr lang="en-US"/>
+        </a:p>
+      </dgm:t>
+    </dgm:pt>
+    <dgm:pt modelId="{0A158AFF-446E-4E50-B16B-5C5A9C877B83}" type="sibTrans" cxnId="{74A20FD4-0B03-40A9-8DAE-6D1F673AF057}">
+      <dgm:prSet/>
+      <dgm:spPr/>
+      <dgm:t>
+        <a:bodyPr/>
+        <a:lstStyle/>
+        <a:p>
+          <a:endParaRPr lang="en-US"/>
+        </a:p>
+      </dgm:t>
+    </dgm:pt>
+    <dgm:pt modelId="{4D851509-A745-4940-A5F1-8E29732C7891}">
+      <dgm:prSet phldrT="[Text]"/>
+      <dgm:spPr/>
+      <dgm:t>
+        <a:bodyPr/>
+        <a:lstStyle/>
+        <a:p>
+          <a:r>
+            <a:rPr lang="en-US" dirty="0" smtClean="0"/>
+            <a:t>Move ribbon to pickup area</a:t>
+          </a:r>
+          <a:endParaRPr lang="en-US" dirty="0"/>
+        </a:p>
+      </dgm:t>
+    </dgm:pt>
+    <dgm:pt modelId="{0D80DC4D-54A9-4AAC-A74F-691121E57799}" type="parTrans" cxnId="{C9B93C7B-B39D-4464-B364-AFA81EED88D7}">
+      <dgm:prSet/>
+      <dgm:spPr/>
+      <dgm:t>
+        <a:bodyPr/>
+        <a:lstStyle/>
+        <a:p>
+          <a:endParaRPr lang="en-US"/>
+        </a:p>
+      </dgm:t>
+    </dgm:pt>
+    <dgm:pt modelId="{C7149469-EA11-43D8-B7B2-762BC8C8D2BC}" type="sibTrans" cxnId="{C9B93C7B-B39D-4464-B364-AFA81EED88D7}">
+      <dgm:prSet/>
+      <dgm:spPr/>
+      <dgm:t>
+        <a:bodyPr/>
+        <a:lstStyle/>
+        <a:p>
+          <a:endParaRPr lang="en-US"/>
+        </a:p>
+      </dgm:t>
+    </dgm:pt>
+    <dgm:pt modelId="{1BDFC281-BF67-44A4-B333-68F8C293F7A0}">
+      <dgm:prSet/>
+      <dgm:spPr/>
+      <dgm:t>
+        <a:bodyPr/>
+        <a:lstStyle/>
+        <a:p>
+          <a:r>
+            <a:rPr lang="en-US" dirty="0" smtClean="0"/>
+            <a:t>Automatically move whisker/ribbon to pickup area using pre-programmed position</a:t>
+          </a:r>
+          <a:endParaRPr lang="en-US" dirty="0"/>
+        </a:p>
+      </dgm:t>
+    </dgm:pt>
+    <dgm:pt modelId="{7BFA6DA6-BCF6-4FA1-99F6-F85517ECE455}" type="parTrans" cxnId="{7C006A9F-8474-41CB-B68C-A54A861823EE}">
+      <dgm:prSet/>
+      <dgm:spPr/>
+      <dgm:t>
+        <a:bodyPr/>
+        <a:lstStyle/>
+        <a:p>
+          <a:endParaRPr lang="en-US"/>
+        </a:p>
+      </dgm:t>
+    </dgm:pt>
+    <dgm:pt modelId="{F7115284-CA53-407E-BCED-B5341FB81EA4}" type="sibTrans" cxnId="{7C006A9F-8474-41CB-B68C-A54A861823EE}">
+      <dgm:prSet/>
+      <dgm:spPr/>
+      <dgm:t>
+        <a:bodyPr/>
+        <a:lstStyle/>
+        <a:p>
+          <a:endParaRPr lang="en-US"/>
+        </a:p>
+      </dgm:t>
+    </dgm:pt>
+    <dgm:pt modelId="{03D790FD-EEE4-4D85-81CE-073AA02443CC}">
+      <dgm:prSet/>
+      <dgm:spPr/>
+      <dgm:t>
+        <a:bodyPr/>
+        <a:lstStyle/>
+        <a:p>
+          <a:r>
+            <a:rPr lang="en-US" dirty="0" smtClean="0"/>
+            <a:t>Lift/move whisker/ribbon + coverslip at predefined angle</a:t>
+          </a:r>
+          <a:endParaRPr lang="en-US" dirty="0"/>
+        </a:p>
+      </dgm:t>
+    </dgm:pt>
+    <dgm:pt modelId="{88C599FA-0205-4D09-85A6-94B0AC427F73}" type="parTrans" cxnId="{3396EC31-DA37-45CC-BAF5-FC72C89EF08A}">
+      <dgm:prSet/>
+      <dgm:spPr/>
+      <dgm:t>
+        <a:bodyPr/>
+        <a:lstStyle/>
+        <a:p>
+          <a:endParaRPr lang="en-US"/>
+        </a:p>
+      </dgm:t>
+    </dgm:pt>
+    <dgm:pt modelId="{3F4258B6-BFAE-4346-8E60-3ADC371958CC}" type="sibTrans" cxnId="{3396EC31-DA37-45CC-BAF5-FC72C89EF08A}">
+      <dgm:prSet/>
+      <dgm:spPr/>
+      <dgm:t>
+        <a:bodyPr/>
+        <a:lstStyle/>
+        <a:p>
+          <a:endParaRPr lang="en-US"/>
+        </a:p>
+      </dgm:t>
+    </dgm:pt>
+    <dgm:pt modelId="{DC0CA30F-B73B-4804-9559-790C53ADB2DA}" type="pres">
+      <dgm:prSet presAssocID="{5788C4EB-3091-4723-9105-2DE072224E19}" presName="Name0" presStyleCnt="0">
+        <dgm:presLayoutVars>
+          <dgm:dir/>
+          <dgm:resizeHandles val="exact"/>
+        </dgm:presLayoutVars>
+      </dgm:prSet>
+      <dgm:spPr/>
+    </dgm:pt>
+    <dgm:pt modelId="{69588E9B-0076-454A-919C-5608C89A2FE9}" type="pres">
+      <dgm:prSet presAssocID="{5788C4EB-3091-4723-9105-2DE072224E19}" presName="arrow" presStyleLbl="bgShp" presStyleIdx="0" presStyleCnt="1"/>
+      <dgm:spPr/>
+    </dgm:pt>
+    <dgm:pt modelId="{D621037C-6760-480C-87E4-CA24B1BAB3B8}" type="pres">
+      <dgm:prSet presAssocID="{5788C4EB-3091-4723-9105-2DE072224E19}" presName="points" presStyleCnt="0"/>
+      <dgm:spPr/>
+    </dgm:pt>
+    <dgm:pt modelId="{847F7AC8-A39C-48CF-855C-D6E108FD4C1D}" type="pres">
+      <dgm:prSet presAssocID="{B3581DE2-F776-407D-BEBE-22E761798BB2}" presName="compositeA" presStyleCnt="0"/>
+      <dgm:spPr/>
+    </dgm:pt>
+    <dgm:pt modelId="{E1D78355-7F25-4DDA-BD99-FC571C4B75EC}" type="pres">
+      <dgm:prSet presAssocID="{B3581DE2-F776-407D-BEBE-22E761798BB2}" presName="textA" presStyleLbl="revTx" presStyleIdx="0" presStyleCnt="5">
+        <dgm:presLayoutVars>
+          <dgm:bulletEnabled val="1"/>
+        </dgm:presLayoutVars>
+      </dgm:prSet>
+      <dgm:spPr/>
+    </dgm:pt>
+    <dgm:pt modelId="{585EDEC7-5406-4B25-8F82-0AFA2D7C88B3}" type="pres">
+      <dgm:prSet presAssocID="{B3581DE2-F776-407D-BEBE-22E761798BB2}" presName="circleA" presStyleLbl="node1" presStyleIdx="0" presStyleCnt="5"/>
+      <dgm:spPr/>
+    </dgm:pt>
+    <dgm:pt modelId="{8EF3D8C3-0279-4C3C-B9C2-0F2B23D31320}" type="pres">
+      <dgm:prSet presAssocID="{B3581DE2-F776-407D-BEBE-22E761798BB2}" presName="spaceA" presStyleCnt="0"/>
+      <dgm:spPr/>
+    </dgm:pt>
+    <dgm:pt modelId="{1CDD175C-F8EB-44D1-8D93-B56AA836D255}" type="pres">
+      <dgm:prSet presAssocID="{6B07E0C6-EA77-43B6-B5E4-2E731C1E7E88}" presName="space" presStyleCnt="0"/>
+      <dgm:spPr/>
+    </dgm:pt>
+    <dgm:pt modelId="{E69CAD52-9E8C-4F88-94B7-9EF0A0971C19}" type="pres">
+      <dgm:prSet presAssocID="{8610F440-5FE0-4E70-952C-DD7D8956323B}" presName="compositeB" presStyleCnt="0"/>
+      <dgm:spPr/>
+    </dgm:pt>
+    <dgm:pt modelId="{FA3E931D-5584-4A0D-9327-38A303FDAC16}" type="pres">
+      <dgm:prSet presAssocID="{8610F440-5FE0-4E70-952C-DD7D8956323B}" presName="textB" presStyleLbl="revTx" presStyleIdx="1" presStyleCnt="5">
+        <dgm:presLayoutVars>
+          <dgm:bulletEnabled val="1"/>
+        </dgm:presLayoutVars>
+      </dgm:prSet>
+      <dgm:spPr/>
+    </dgm:pt>
+    <dgm:pt modelId="{CD1561AB-9B77-43F2-93C2-A056205E2826}" type="pres">
+      <dgm:prSet presAssocID="{8610F440-5FE0-4E70-952C-DD7D8956323B}" presName="circleB" presStyleLbl="node1" presStyleIdx="1" presStyleCnt="5"/>
+      <dgm:spPr/>
+    </dgm:pt>
+    <dgm:pt modelId="{F62051E5-27C1-4282-B4A0-C33EC3601396}" type="pres">
+      <dgm:prSet presAssocID="{8610F440-5FE0-4E70-952C-DD7D8956323B}" presName="spaceB" presStyleCnt="0"/>
+      <dgm:spPr/>
+    </dgm:pt>
+    <dgm:pt modelId="{1237576F-4F10-452A-985D-F95832518693}" type="pres">
+      <dgm:prSet presAssocID="{9D5C81D2-E52B-40A1-AF67-ECFAD69E9BDC}" presName="space" presStyleCnt="0"/>
+      <dgm:spPr/>
+    </dgm:pt>
+    <dgm:pt modelId="{45173488-2122-4578-9CBB-45FF222D786E}" type="pres">
+      <dgm:prSet presAssocID="{C2FE8EAB-8BAF-4C58-BC2D-37E4657D4BF8}" presName="compositeA" presStyleCnt="0"/>
+      <dgm:spPr/>
+    </dgm:pt>
+    <dgm:pt modelId="{BC0F4EC0-560F-4635-B4C9-B3E657FF239C}" type="pres">
+      <dgm:prSet presAssocID="{C2FE8EAB-8BAF-4C58-BC2D-37E4657D4BF8}" presName="textA" presStyleLbl="revTx" presStyleIdx="2" presStyleCnt="5">
+        <dgm:presLayoutVars>
+          <dgm:bulletEnabled val="1"/>
+        </dgm:presLayoutVars>
+      </dgm:prSet>
+      <dgm:spPr/>
+    </dgm:pt>
+    <dgm:pt modelId="{C0DE246B-6565-4635-998A-B282F07B2765}" type="pres">
+      <dgm:prSet presAssocID="{C2FE8EAB-8BAF-4C58-BC2D-37E4657D4BF8}" presName="circleA" presStyleLbl="node1" presStyleIdx="2" presStyleCnt="5"/>
+      <dgm:spPr/>
+    </dgm:pt>
+    <dgm:pt modelId="{A2EAB4DB-0D00-479A-963D-7E1C01C63690}" type="pres">
+      <dgm:prSet presAssocID="{C2FE8EAB-8BAF-4C58-BC2D-37E4657D4BF8}" presName="spaceA" presStyleCnt="0"/>
+      <dgm:spPr/>
+    </dgm:pt>
+    <dgm:pt modelId="{05C9F1A7-5B86-4C23-9E00-3E03964487A2}" type="pres">
+      <dgm:prSet presAssocID="{92E35EA1-1B93-45F1-A672-C56410D95EA7}" presName="space" presStyleCnt="0"/>
+      <dgm:spPr/>
+    </dgm:pt>
+    <dgm:pt modelId="{63F3545A-E7B7-4D21-9101-D66276DCC8EC}" type="pres">
+      <dgm:prSet presAssocID="{4D851509-A745-4940-A5F1-8E29732C7891}" presName="compositeB" presStyleCnt="0"/>
+      <dgm:spPr/>
+    </dgm:pt>
+    <dgm:pt modelId="{8BC173FD-FF44-48FC-BB20-A61C7AADE61E}" type="pres">
+      <dgm:prSet presAssocID="{4D851509-A745-4940-A5F1-8E29732C7891}" presName="textB" presStyleLbl="revTx" presStyleIdx="3" presStyleCnt="5">
+        <dgm:presLayoutVars>
+          <dgm:bulletEnabled val="1"/>
+        </dgm:presLayoutVars>
+      </dgm:prSet>
+      <dgm:spPr/>
+    </dgm:pt>
+    <dgm:pt modelId="{C61CA8AD-7CE0-4DB3-A529-E1DB75680F68}" type="pres">
+      <dgm:prSet presAssocID="{4D851509-A745-4940-A5F1-8E29732C7891}" presName="circleB" presStyleLbl="node1" presStyleIdx="3" presStyleCnt="5"/>
+      <dgm:spPr/>
+    </dgm:pt>
+    <dgm:pt modelId="{5B5CD57E-684B-4713-9FC4-7FD1FE735E14}" type="pres">
+      <dgm:prSet presAssocID="{4D851509-A745-4940-A5F1-8E29732C7891}" presName="spaceB" presStyleCnt="0"/>
+      <dgm:spPr/>
+    </dgm:pt>
+    <dgm:pt modelId="{C82C48C8-76AF-42F7-A44D-46704BEF74AD}" type="pres">
+      <dgm:prSet presAssocID="{C7149469-EA11-43D8-B7B2-762BC8C8D2BC}" presName="space" presStyleCnt="0"/>
+      <dgm:spPr/>
+    </dgm:pt>
+    <dgm:pt modelId="{3C3DC423-56FF-4985-8181-1349964C2123}" type="pres">
+      <dgm:prSet presAssocID="{03D790FD-EEE4-4D85-81CE-073AA02443CC}" presName="compositeA" presStyleCnt="0"/>
+      <dgm:spPr/>
+    </dgm:pt>
+    <dgm:pt modelId="{B0BF278C-F85F-4485-A0FC-52AD89A6966C}" type="pres">
+      <dgm:prSet presAssocID="{03D790FD-EEE4-4D85-81CE-073AA02443CC}" presName="textA" presStyleLbl="revTx" presStyleIdx="4" presStyleCnt="5">
+        <dgm:presLayoutVars>
+          <dgm:bulletEnabled val="1"/>
+        </dgm:presLayoutVars>
+      </dgm:prSet>
+      <dgm:spPr/>
+    </dgm:pt>
+    <dgm:pt modelId="{0AE64CDA-39C7-445D-B127-C5B992FBEE4D}" type="pres">
+      <dgm:prSet presAssocID="{03D790FD-EEE4-4D85-81CE-073AA02443CC}" presName="circleA" presStyleLbl="node1" presStyleIdx="4" presStyleCnt="5"/>
+      <dgm:spPr/>
+    </dgm:pt>
+    <dgm:pt modelId="{7DB18B38-8569-427A-9468-79A937CCC800}" type="pres">
+      <dgm:prSet presAssocID="{03D790FD-EEE4-4D85-81CE-073AA02443CC}" presName="spaceA" presStyleCnt="0"/>
+      <dgm:spPr/>
+    </dgm:pt>
+  </dgm:ptLst>
+  <dgm:cxnLst>
+    <dgm:cxn modelId="{87F3AA68-DBAE-42A9-8398-6ADB3B36AB0F}" type="presOf" srcId="{03D790FD-EEE4-4D85-81CE-073AA02443CC}" destId="{B0BF278C-F85F-4485-A0FC-52AD89A6966C}" srcOrd="0" destOrd="0" presId="urn:microsoft.com/office/officeart/2005/8/layout/hProcess11"/>
+    <dgm:cxn modelId="{3396EC31-DA37-45CC-BAF5-FC72C89EF08A}" srcId="{5788C4EB-3091-4723-9105-2DE072224E19}" destId="{03D790FD-EEE4-4D85-81CE-073AA02443CC}" srcOrd="4" destOrd="0" parTransId="{88C599FA-0205-4D09-85A6-94B0AC427F73}" sibTransId="{3F4258B6-BFAE-4346-8E60-3ADC371958CC}"/>
+    <dgm:cxn modelId="{60EA564E-9DDE-427E-BB36-28E180E9813A}" srcId="{5788C4EB-3091-4723-9105-2DE072224E19}" destId="{8610F440-5FE0-4E70-952C-DD7D8956323B}" srcOrd="1" destOrd="0" parTransId="{AB16BCD1-6AFF-4689-BBC9-5FFDF0F9490E}" sibTransId="{9D5C81D2-E52B-40A1-AF67-ECFAD69E9BDC}"/>
+    <dgm:cxn modelId="{F0651BDE-C7A9-4040-B2D5-630C69BA3250}" type="presOf" srcId="{4D851509-A745-4940-A5F1-8E29732C7891}" destId="{8BC173FD-FF44-48FC-BB20-A61C7AADE61E}" srcOrd="0" destOrd="0" presId="urn:microsoft.com/office/officeart/2005/8/layout/hProcess11"/>
+    <dgm:cxn modelId="{7C006A9F-8474-41CB-B68C-A54A861823EE}" srcId="{4D851509-A745-4940-A5F1-8E29732C7891}" destId="{1BDFC281-BF67-44A4-B333-68F8C293F7A0}" srcOrd="0" destOrd="0" parTransId="{7BFA6DA6-BCF6-4FA1-99F6-F85517ECE455}" sibTransId="{F7115284-CA53-407E-BCED-B5341FB81EA4}"/>
+    <dgm:cxn modelId="{858ED8AE-0749-4743-91BC-7B1C7C8F07E3}" srcId="{5788C4EB-3091-4723-9105-2DE072224E19}" destId="{C2FE8EAB-8BAF-4C58-BC2D-37E4657D4BF8}" srcOrd="2" destOrd="0" parTransId="{F339728D-298D-4720-8C44-145ECAE6434C}" sibTransId="{92E35EA1-1B93-45F1-A672-C56410D95EA7}"/>
+    <dgm:cxn modelId="{37D06CED-B15C-4F99-AE65-07776FE4FF6C}" srcId="{B3581DE2-F776-407D-BEBE-22E761798BB2}" destId="{3DB2E199-83E1-4C98-A857-046D7BE01DEA}" srcOrd="1" destOrd="0" parTransId="{2C501509-5A2D-46B3-B0DA-938151559723}" sibTransId="{32317475-FF65-41CC-A7A7-52FEE091121E}"/>
+    <dgm:cxn modelId="{E48C5994-D977-496E-9DCF-6FF5B72F7017}" type="presOf" srcId="{B3581DE2-F776-407D-BEBE-22E761798BB2}" destId="{E1D78355-7F25-4DDA-BD99-FC571C4B75EC}" srcOrd="0" destOrd="0" presId="urn:microsoft.com/office/officeart/2005/8/layout/hProcess11"/>
+    <dgm:cxn modelId="{0E6B47F8-EC57-4164-87DD-5F112CF1B529}" type="presOf" srcId="{5788C4EB-3091-4723-9105-2DE072224E19}" destId="{DC0CA30F-B73B-4804-9559-790C53ADB2DA}" srcOrd="0" destOrd="0" presId="urn:microsoft.com/office/officeart/2005/8/layout/hProcess11"/>
+    <dgm:cxn modelId="{833710CD-1383-4296-8690-691606A4006B}" srcId="{5788C4EB-3091-4723-9105-2DE072224E19}" destId="{B3581DE2-F776-407D-BEBE-22E761798BB2}" srcOrd="0" destOrd="0" parTransId="{BA64BA81-280C-4CCE-B7ED-2C8C96BABE8C}" sibTransId="{6B07E0C6-EA77-43B6-B5E4-2E731C1E7E88}"/>
+    <dgm:cxn modelId="{8B433D64-1CF4-4B03-BBB7-4483A2A1864E}" srcId="{B3581DE2-F776-407D-BEBE-22E761798BB2}" destId="{59C8D260-123F-4F97-8502-E35F4728ACD6}" srcOrd="0" destOrd="0" parTransId="{E34D62B5-2A71-45CD-B784-4EEC19667D7C}" sibTransId="{BA71C4BA-9ABD-44B9-9499-784E6873D86D}"/>
+    <dgm:cxn modelId="{C9B93C7B-B39D-4464-B364-AFA81EED88D7}" srcId="{5788C4EB-3091-4723-9105-2DE072224E19}" destId="{4D851509-A745-4940-A5F1-8E29732C7891}" srcOrd="3" destOrd="0" parTransId="{0D80DC4D-54A9-4AAC-A74F-691121E57799}" sibTransId="{C7149469-EA11-43D8-B7B2-762BC8C8D2BC}"/>
+    <dgm:cxn modelId="{E81CF322-6499-4333-AC73-A7872A8CC360}" srcId="{8610F440-5FE0-4E70-952C-DD7D8956323B}" destId="{1E6A7E82-D44D-49FF-91FE-581D0169C214}" srcOrd="0" destOrd="0" parTransId="{88C9CD77-FC26-4DF8-B346-1430C50683D4}" sibTransId="{54CD760F-ED7D-4D14-A62F-42069CB7E5E3}"/>
+    <dgm:cxn modelId="{BCCC2226-37DE-4ADC-8ED3-D2836E68FA2F}" type="presOf" srcId="{8610F440-5FE0-4E70-952C-DD7D8956323B}" destId="{FA3E931D-5584-4A0D-9327-38A303FDAC16}" srcOrd="0" destOrd="0" presId="urn:microsoft.com/office/officeart/2005/8/layout/hProcess11"/>
+    <dgm:cxn modelId="{0D5B6158-DD27-48CE-BEEA-687B11DF528E}" type="presOf" srcId="{C97B8C1F-CE4E-40A2-84F3-1C8B58A5E244}" destId="{BC0F4EC0-560F-4635-B4C9-B3E657FF239C}" srcOrd="0" destOrd="1" presId="urn:microsoft.com/office/officeart/2005/8/layout/hProcess11"/>
+    <dgm:cxn modelId="{59EECF3D-C44C-40D7-A5C3-F3B3CC2831FD}" type="presOf" srcId="{59C8D260-123F-4F97-8502-E35F4728ACD6}" destId="{E1D78355-7F25-4DDA-BD99-FC571C4B75EC}" srcOrd="0" destOrd="1" presId="urn:microsoft.com/office/officeart/2005/8/layout/hProcess11"/>
+    <dgm:cxn modelId="{4CBE1E59-8C89-4A6D-A4C8-E962F6434FD7}" type="presOf" srcId="{3DB2E199-83E1-4C98-A857-046D7BE01DEA}" destId="{E1D78355-7F25-4DDA-BD99-FC571C4B75EC}" srcOrd="0" destOrd="2" presId="urn:microsoft.com/office/officeart/2005/8/layout/hProcess11"/>
+    <dgm:cxn modelId="{D7E8ADDF-8294-473E-BF88-4B7E0CC0B9D2}" type="presOf" srcId="{1E6A7E82-D44D-49FF-91FE-581D0169C214}" destId="{FA3E931D-5584-4A0D-9327-38A303FDAC16}" srcOrd="0" destOrd="1" presId="urn:microsoft.com/office/officeart/2005/8/layout/hProcess11"/>
+    <dgm:cxn modelId="{74A20FD4-0B03-40A9-8DAE-6D1F673AF057}" srcId="{C2FE8EAB-8BAF-4C58-BC2D-37E4657D4BF8}" destId="{C97B8C1F-CE4E-40A2-84F3-1C8B58A5E244}" srcOrd="0" destOrd="0" parTransId="{8F7CD162-5B81-42E5-B185-6AF3663C0A36}" sibTransId="{0A158AFF-446E-4E50-B16B-5C5A9C877B83}"/>
+    <dgm:cxn modelId="{A86E58AC-C298-4510-A916-CC8BEFF8FA07}" type="presOf" srcId="{C2FE8EAB-8BAF-4C58-BC2D-37E4657D4BF8}" destId="{BC0F4EC0-560F-4635-B4C9-B3E657FF239C}" srcOrd="0" destOrd="0" presId="urn:microsoft.com/office/officeart/2005/8/layout/hProcess11"/>
+    <dgm:cxn modelId="{CE0B3262-36AB-476B-A060-80DEE795E11D}" type="presOf" srcId="{1BDFC281-BF67-44A4-B333-68F8C293F7A0}" destId="{8BC173FD-FF44-48FC-BB20-A61C7AADE61E}" srcOrd="0" destOrd="1" presId="urn:microsoft.com/office/officeart/2005/8/layout/hProcess11"/>
+    <dgm:cxn modelId="{68F5ECCA-4C60-4734-A4C4-F6C9526878C5}" type="presParOf" srcId="{DC0CA30F-B73B-4804-9559-790C53ADB2DA}" destId="{69588E9B-0076-454A-919C-5608C89A2FE9}" srcOrd="0" destOrd="0" presId="urn:microsoft.com/office/officeart/2005/8/layout/hProcess11"/>
+    <dgm:cxn modelId="{E5E94B6F-DFCC-4BC0-8291-0A5E51BAD921}" type="presParOf" srcId="{DC0CA30F-B73B-4804-9559-790C53ADB2DA}" destId="{D621037C-6760-480C-87E4-CA24B1BAB3B8}" srcOrd="1" destOrd="0" presId="urn:microsoft.com/office/officeart/2005/8/layout/hProcess11"/>
+    <dgm:cxn modelId="{5B24DF0B-C3D6-4C5B-B90E-684E27980468}" type="presParOf" srcId="{D621037C-6760-480C-87E4-CA24B1BAB3B8}" destId="{847F7AC8-A39C-48CF-855C-D6E108FD4C1D}" srcOrd="0" destOrd="0" presId="urn:microsoft.com/office/officeart/2005/8/layout/hProcess11"/>
+    <dgm:cxn modelId="{5AED55EA-FCE8-41ED-97AE-584659E295B7}" type="presParOf" srcId="{847F7AC8-A39C-48CF-855C-D6E108FD4C1D}" destId="{E1D78355-7F25-4DDA-BD99-FC571C4B75EC}" srcOrd="0" destOrd="0" presId="urn:microsoft.com/office/officeart/2005/8/layout/hProcess11"/>
+    <dgm:cxn modelId="{549A2D72-1733-4ADB-A913-E087663AAF13}" type="presParOf" srcId="{847F7AC8-A39C-48CF-855C-D6E108FD4C1D}" destId="{585EDEC7-5406-4B25-8F82-0AFA2D7C88B3}" srcOrd="1" destOrd="0" presId="urn:microsoft.com/office/officeart/2005/8/layout/hProcess11"/>
+    <dgm:cxn modelId="{A7AA2F95-7752-4E90-BDCF-8DB025E5EA23}" type="presParOf" srcId="{847F7AC8-A39C-48CF-855C-D6E108FD4C1D}" destId="{8EF3D8C3-0279-4C3C-B9C2-0F2B23D31320}" srcOrd="2" destOrd="0" presId="urn:microsoft.com/office/officeart/2005/8/layout/hProcess11"/>
+    <dgm:cxn modelId="{5C66E4E3-5032-436A-BED9-4A16112443A1}" type="presParOf" srcId="{D621037C-6760-480C-87E4-CA24B1BAB3B8}" destId="{1CDD175C-F8EB-44D1-8D93-B56AA836D255}" srcOrd="1" destOrd="0" presId="urn:microsoft.com/office/officeart/2005/8/layout/hProcess11"/>
+    <dgm:cxn modelId="{1C28BC9B-8BFC-42CD-BC52-E652DE15F943}" type="presParOf" srcId="{D621037C-6760-480C-87E4-CA24B1BAB3B8}" destId="{E69CAD52-9E8C-4F88-94B7-9EF0A0971C19}" srcOrd="2" destOrd="0" presId="urn:microsoft.com/office/officeart/2005/8/layout/hProcess11"/>
+    <dgm:cxn modelId="{69C9A9E2-58C8-4811-B1B9-D6A8926C2DCA}" type="presParOf" srcId="{E69CAD52-9E8C-4F88-94B7-9EF0A0971C19}" destId="{FA3E931D-5584-4A0D-9327-38A303FDAC16}" srcOrd="0" destOrd="0" presId="urn:microsoft.com/office/officeart/2005/8/layout/hProcess11"/>
+    <dgm:cxn modelId="{75270666-72BD-44BE-847E-CFFB71A25522}" type="presParOf" srcId="{E69CAD52-9E8C-4F88-94B7-9EF0A0971C19}" destId="{CD1561AB-9B77-43F2-93C2-A056205E2826}" srcOrd="1" destOrd="0" presId="urn:microsoft.com/office/officeart/2005/8/layout/hProcess11"/>
+    <dgm:cxn modelId="{A657E23B-54E0-4389-894B-70D2F25D1168}" type="presParOf" srcId="{E69CAD52-9E8C-4F88-94B7-9EF0A0971C19}" destId="{F62051E5-27C1-4282-B4A0-C33EC3601396}" srcOrd="2" destOrd="0" presId="urn:microsoft.com/office/officeart/2005/8/layout/hProcess11"/>
+    <dgm:cxn modelId="{03B3440A-4B95-4150-9ACF-A0476E65634F}" type="presParOf" srcId="{D621037C-6760-480C-87E4-CA24B1BAB3B8}" destId="{1237576F-4F10-452A-985D-F95832518693}" srcOrd="3" destOrd="0" presId="urn:microsoft.com/office/officeart/2005/8/layout/hProcess11"/>
+    <dgm:cxn modelId="{DA25EB47-6403-44AD-B867-E8B12311482F}" type="presParOf" srcId="{D621037C-6760-480C-87E4-CA24B1BAB3B8}" destId="{45173488-2122-4578-9CBB-45FF222D786E}" srcOrd="4" destOrd="0" presId="urn:microsoft.com/office/officeart/2005/8/layout/hProcess11"/>
+    <dgm:cxn modelId="{BC493856-E0C2-4591-8555-480A18F34EBE}" type="presParOf" srcId="{45173488-2122-4578-9CBB-45FF222D786E}" destId="{BC0F4EC0-560F-4635-B4C9-B3E657FF239C}" srcOrd="0" destOrd="0" presId="urn:microsoft.com/office/officeart/2005/8/layout/hProcess11"/>
+    <dgm:cxn modelId="{196FB3DC-1776-4648-8BE4-E3DB4927B680}" type="presParOf" srcId="{45173488-2122-4578-9CBB-45FF222D786E}" destId="{C0DE246B-6565-4635-998A-B282F07B2765}" srcOrd="1" destOrd="0" presId="urn:microsoft.com/office/officeart/2005/8/layout/hProcess11"/>
+    <dgm:cxn modelId="{4E1497B2-A719-413C-84DA-2F883FDAD18F}" type="presParOf" srcId="{45173488-2122-4578-9CBB-45FF222D786E}" destId="{A2EAB4DB-0D00-479A-963D-7E1C01C63690}" srcOrd="2" destOrd="0" presId="urn:microsoft.com/office/officeart/2005/8/layout/hProcess11"/>
+    <dgm:cxn modelId="{8A6F260C-6DD6-4795-B5C5-D8AE7DEF7275}" type="presParOf" srcId="{D621037C-6760-480C-87E4-CA24B1BAB3B8}" destId="{05C9F1A7-5B86-4C23-9E00-3E03964487A2}" srcOrd="5" destOrd="0" presId="urn:microsoft.com/office/officeart/2005/8/layout/hProcess11"/>
+    <dgm:cxn modelId="{CDA1D9ED-3D07-4761-AA1B-64C9BDAE9824}" type="presParOf" srcId="{D621037C-6760-480C-87E4-CA24B1BAB3B8}" destId="{63F3545A-E7B7-4D21-9101-D66276DCC8EC}" srcOrd="6" destOrd="0" presId="urn:microsoft.com/office/officeart/2005/8/layout/hProcess11"/>
+    <dgm:cxn modelId="{926E0C78-5C50-4E20-A380-AA0C84497234}" type="presParOf" srcId="{63F3545A-E7B7-4D21-9101-D66276DCC8EC}" destId="{8BC173FD-FF44-48FC-BB20-A61C7AADE61E}" srcOrd="0" destOrd="0" presId="urn:microsoft.com/office/officeart/2005/8/layout/hProcess11"/>
+    <dgm:cxn modelId="{47AA0932-F9DB-46C9-93E9-75B1BD496D88}" type="presParOf" srcId="{63F3545A-E7B7-4D21-9101-D66276DCC8EC}" destId="{C61CA8AD-7CE0-4DB3-A529-E1DB75680F68}" srcOrd="1" destOrd="0" presId="urn:microsoft.com/office/officeart/2005/8/layout/hProcess11"/>
+    <dgm:cxn modelId="{26DB7696-969C-4F36-8895-99442CEA40C3}" type="presParOf" srcId="{63F3545A-E7B7-4D21-9101-D66276DCC8EC}" destId="{5B5CD57E-684B-4713-9FC4-7FD1FE735E14}" srcOrd="2" destOrd="0" presId="urn:microsoft.com/office/officeart/2005/8/layout/hProcess11"/>
+    <dgm:cxn modelId="{647AC8CD-703E-4E62-91E5-565072A6EE2D}" type="presParOf" srcId="{D621037C-6760-480C-87E4-CA24B1BAB3B8}" destId="{C82C48C8-76AF-42F7-A44D-46704BEF74AD}" srcOrd="7" destOrd="0" presId="urn:microsoft.com/office/officeart/2005/8/layout/hProcess11"/>
+    <dgm:cxn modelId="{E6DFDA75-5F4F-465C-9DA2-DF72D55B3569}" type="presParOf" srcId="{D621037C-6760-480C-87E4-CA24B1BAB3B8}" destId="{3C3DC423-56FF-4985-8181-1349964C2123}" srcOrd="8" destOrd="0" presId="urn:microsoft.com/office/officeart/2005/8/layout/hProcess11"/>
+    <dgm:cxn modelId="{869E899F-5CE8-4EA4-8E4B-908820A30B7D}" type="presParOf" srcId="{3C3DC423-56FF-4985-8181-1349964C2123}" destId="{B0BF278C-F85F-4485-A0FC-52AD89A6966C}" srcOrd="0" destOrd="0" presId="urn:microsoft.com/office/officeart/2005/8/layout/hProcess11"/>
+    <dgm:cxn modelId="{AB54C254-A2E9-4C3E-8466-60636BED5933}" type="presParOf" srcId="{3C3DC423-56FF-4985-8181-1349964C2123}" destId="{0AE64CDA-39C7-445D-B127-C5B992FBEE4D}" srcOrd="1" destOrd="0" presId="urn:microsoft.com/office/officeart/2005/8/layout/hProcess11"/>
+    <dgm:cxn modelId="{A34B54D3-7623-4A34-9F21-650E39B9980F}" type="presParOf" srcId="{3C3DC423-56FF-4985-8181-1349964C2123}" destId="{7DB18B38-8569-427A-9468-79A937CCC800}" srcOrd="2" destOrd="0" presId="urn:microsoft.com/office/officeart/2005/8/layout/hProcess11"/>
+  </dgm:cxnLst>
+  <dgm:bg/>
+  <dgm:whole/>
+  <dgm:extLst>
+    <a:ext uri="http://schemas.microsoft.com/office/drawing/2008/diagram">
+      <dsp:dataModelExt xmlns:dsp="http://schemas.microsoft.com/office/drawing/2008/diagram" relId="rId6" minVer="http://schemas.openxmlformats.org/drawingml/2006/diagram"/>
+    </a:ext>
+  </dgm:extLst>
+</dgm:dataModel>
+</file>
+
 <file path=ppt/diagrams/drawing1.xml><?xml version="1.0" encoding="utf-8"?>
 <dsp:drawing xmlns:dgm="http://schemas.openxmlformats.org/drawingml/2006/diagram" xmlns:dsp="http://schemas.microsoft.com/office/drawing/2008/diagram" xmlns:a="http://schemas.openxmlformats.org/drawingml/2006/main">
   <dsp:spTree>
@@ -5053,657 +6378,6 @@
       <dsp:cNvGrpSpPr/>
     </dsp:nvGrpSpPr>
     <dsp:grpSpPr/>
-    <dsp:sp modelId="{F672C2DB-56F9-4B57-BEC3-70464139E944}">
-      <dsp:nvSpPr>
-        <dsp:cNvPr id="0" name=""/>
-        <dsp:cNvSpPr/>
-      </dsp:nvSpPr>
-      <dsp:spPr>
-        <a:xfrm>
-          <a:off x="5147635" y="2080150"/>
-          <a:ext cx="257785" cy="2010726"/>
-        </a:xfrm>
-        <a:custGeom>
-          <a:avLst/>
-          <a:gdLst/>
-          <a:ahLst/>
-          <a:cxnLst/>
-          <a:rect l="0" t="0" r="0" b="0"/>
-          <a:pathLst>
-            <a:path>
-              <a:moveTo>
-                <a:pt x="0" y="0"/>
-              </a:moveTo>
-              <a:lnTo>
-                <a:pt x="0" y="2010726"/>
-              </a:lnTo>
-              <a:lnTo>
-                <a:pt x="257785" y="2010726"/>
-              </a:lnTo>
-            </a:path>
-          </a:pathLst>
-        </a:custGeom>
-        <a:noFill/>
-        <a:ln w="15875" cap="rnd" cmpd="sng" algn="ctr">
-          <a:solidFill>
-            <a:schemeClr val="accent1">
-              <a:shade val="80000"/>
-              <a:hueOff val="0"/>
-              <a:satOff val="0"/>
-              <a:lumOff val="0"/>
-              <a:alphaOff val="0"/>
-            </a:schemeClr>
-          </a:solidFill>
-          <a:prstDash val="solid"/>
-        </a:ln>
-        <a:effectLst/>
-      </dsp:spPr>
-      <dsp:style>
-        <a:lnRef idx="2">
-          <a:scrgbClr r="0" g="0" b="0"/>
-        </a:lnRef>
-        <a:fillRef idx="0">
-          <a:scrgbClr r="0" g="0" b="0"/>
-        </a:fillRef>
-        <a:effectRef idx="0">
-          <a:scrgbClr r="0" g="0" b="0"/>
-        </a:effectRef>
-        <a:fontRef idx="minor"/>
-      </dsp:style>
-    </dsp:sp>
-    <dsp:sp modelId="{5639C658-2BD7-4A83-BD78-4E05F0E6AB33}">
-      <dsp:nvSpPr>
-        <dsp:cNvPr id="0" name=""/>
-        <dsp:cNvSpPr/>
-      </dsp:nvSpPr>
-      <dsp:spPr>
-        <a:xfrm>
-          <a:off x="5147635" y="2080150"/>
-          <a:ext cx="257785" cy="790541"/>
-        </a:xfrm>
-        <a:custGeom>
-          <a:avLst/>
-          <a:gdLst/>
-          <a:ahLst/>
-          <a:cxnLst/>
-          <a:rect l="0" t="0" r="0" b="0"/>
-          <a:pathLst>
-            <a:path>
-              <a:moveTo>
-                <a:pt x="0" y="0"/>
-              </a:moveTo>
-              <a:lnTo>
-                <a:pt x="0" y="790541"/>
-              </a:lnTo>
-              <a:lnTo>
-                <a:pt x="257785" y="790541"/>
-              </a:lnTo>
-            </a:path>
-          </a:pathLst>
-        </a:custGeom>
-        <a:noFill/>
-        <a:ln w="15875" cap="rnd" cmpd="sng" algn="ctr">
-          <a:solidFill>
-            <a:schemeClr val="accent1">
-              <a:shade val="80000"/>
-              <a:hueOff val="0"/>
-              <a:satOff val="0"/>
-              <a:lumOff val="0"/>
-              <a:alphaOff val="0"/>
-            </a:schemeClr>
-          </a:solidFill>
-          <a:prstDash val="solid"/>
-        </a:ln>
-        <a:effectLst/>
-      </dsp:spPr>
-      <dsp:style>
-        <a:lnRef idx="2">
-          <a:scrgbClr r="0" g="0" b="0"/>
-        </a:lnRef>
-        <a:fillRef idx="0">
-          <a:scrgbClr r="0" g="0" b="0"/>
-        </a:fillRef>
-        <a:effectRef idx="0">
-          <a:scrgbClr r="0" g="0" b="0"/>
-        </a:effectRef>
-        <a:fontRef idx="minor"/>
-      </dsp:style>
-    </dsp:sp>
-    <dsp:sp modelId="{04D282F3-260E-4A5A-BE00-49DCD89279A9}">
-      <dsp:nvSpPr>
-        <dsp:cNvPr id="0" name=""/>
-        <dsp:cNvSpPr/>
-      </dsp:nvSpPr>
-      <dsp:spPr>
-        <a:xfrm>
-          <a:off x="4795328" y="859965"/>
-          <a:ext cx="1039734" cy="360899"/>
-        </a:xfrm>
-        <a:custGeom>
-          <a:avLst/>
-          <a:gdLst/>
-          <a:ahLst/>
-          <a:cxnLst/>
-          <a:rect l="0" t="0" r="0" b="0"/>
-          <a:pathLst>
-            <a:path>
-              <a:moveTo>
-                <a:pt x="0" y="0"/>
-              </a:moveTo>
-              <a:lnTo>
-                <a:pt x="0" y="180449"/>
-              </a:lnTo>
-              <a:lnTo>
-                <a:pt x="1039734" y="180449"/>
-              </a:lnTo>
-              <a:lnTo>
-                <a:pt x="1039734" y="360899"/>
-              </a:lnTo>
-            </a:path>
-          </a:pathLst>
-        </a:custGeom>
-        <a:noFill/>
-        <a:ln w="15875" cap="rnd" cmpd="sng" algn="ctr">
-          <a:solidFill>
-            <a:schemeClr val="accent1">
-              <a:shade val="60000"/>
-              <a:hueOff val="0"/>
-              <a:satOff val="0"/>
-              <a:lumOff val="0"/>
-              <a:alphaOff val="0"/>
-            </a:schemeClr>
-          </a:solidFill>
-          <a:prstDash val="solid"/>
-        </a:ln>
-        <a:effectLst/>
-      </dsp:spPr>
-      <dsp:style>
-        <a:lnRef idx="2">
-          <a:scrgbClr r="0" g="0" b="0"/>
-        </a:lnRef>
-        <a:fillRef idx="0">
-          <a:scrgbClr r="0" g="0" b="0"/>
-        </a:fillRef>
-        <a:effectRef idx="0">
-          <a:scrgbClr r="0" g="0" b="0"/>
-        </a:effectRef>
-        <a:fontRef idx="minor"/>
-      </dsp:style>
-    </dsp:sp>
-    <dsp:sp modelId="{8800A970-562A-4D8F-A6DF-A5487E7E711D}">
-      <dsp:nvSpPr>
-        <dsp:cNvPr id="0" name=""/>
-        <dsp:cNvSpPr/>
-      </dsp:nvSpPr>
-      <dsp:spPr>
-        <a:xfrm>
-          <a:off x="3755594" y="859965"/>
-          <a:ext cx="1039734" cy="360899"/>
-        </a:xfrm>
-        <a:custGeom>
-          <a:avLst/>
-          <a:gdLst/>
-          <a:ahLst/>
-          <a:cxnLst/>
-          <a:rect l="0" t="0" r="0" b="0"/>
-          <a:pathLst>
-            <a:path>
-              <a:moveTo>
-                <a:pt x="1039734" y="0"/>
-              </a:moveTo>
-              <a:lnTo>
-                <a:pt x="1039734" y="180449"/>
-              </a:lnTo>
-              <a:lnTo>
-                <a:pt x="0" y="180449"/>
-              </a:lnTo>
-              <a:lnTo>
-                <a:pt x="0" y="360899"/>
-              </a:lnTo>
-            </a:path>
-          </a:pathLst>
-        </a:custGeom>
-        <a:noFill/>
-        <a:ln w="15875" cap="rnd" cmpd="sng" algn="ctr">
-          <a:solidFill>
-            <a:schemeClr val="accent1">
-              <a:shade val="60000"/>
-              <a:hueOff val="0"/>
-              <a:satOff val="0"/>
-              <a:lumOff val="0"/>
-              <a:alphaOff val="0"/>
-            </a:schemeClr>
-          </a:solidFill>
-          <a:prstDash val="solid"/>
-        </a:ln>
-        <a:effectLst/>
-      </dsp:spPr>
-      <dsp:style>
-        <a:lnRef idx="2">
-          <a:scrgbClr r="0" g="0" b="0"/>
-        </a:lnRef>
-        <a:fillRef idx="0">
-          <a:scrgbClr r="0" g="0" b="0"/>
-        </a:fillRef>
-        <a:effectRef idx="0">
-          <a:scrgbClr r="0" g="0" b="0"/>
-        </a:effectRef>
-        <a:fontRef idx="minor"/>
-      </dsp:style>
-    </dsp:sp>
-    <dsp:sp modelId="{DA1DF513-0211-4E50-AC19-D95364F9EEAD}">
-      <dsp:nvSpPr>
-        <dsp:cNvPr id="0" name=""/>
-        <dsp:cNvSpPr/>
-      </dsp:nvSpPr>
-      <dsp:spPr>
-        <a:xfrm>
-          <a:off x="3936044" y="681"/>
-          <a:ext cx="1718569" cy="859284"/>
-        </a:xfrm>
-        <a:prstGeom prst="rect">
-          <a:avLst/>
-        </a:prstGeom>
-        <a:solidFill>
-          <a:schemeClr val="accent1">
-            <a:hueOff val="0"/>
-            <a:satOff val="0"/>
-            <a:lumOff val="0"/>
-            <a:alphaOff val="0"/>
-          </a:schemeClr>
-        </a:solidFill>
-        <a:ln w="15875" cap="rnd" cmpd="sng" algn="ctr">
-          <a:solidFill>
-            <a:schemeClr val="lt1">
-              <a:hueOff val="0"/>
-              <a:satOff val="0"/>
-              <a:lumOff val="0"/>
-              <a:alphaOff val="0"/>
-            </a:schemeClr>
-          </a:solidFill>
-          <a:prstDash val="solid"/>
-        </a:ln>
-        <a:effectLst/>
-      </dsp:spPr>
-      <dsp:style>
-        <a:lnRef idx="2">
-          <a:scrgbClr r="0" g="0" b="0"/>
-        </a:lnRef>
-        <a:fillRef idx="1">
-          <a:scrgbClr r="0" g="0" b="0"/>
-        </a:fillRef>
-        <a:effectRef idx="0">
-          <a:scrgbClr r="0" g="0" b="0"/>
-        </a:effectRef>
-        <a:fontRef idx="minor">
-          <a:schemeClr val="lt1"/>
-        </a:fontRef>
-      </dsp:style>
-      <dsp:txBody>
-        <a:bodyPr spcFirstLastPara="0" vert="horz" wrap="square" lIns="10795" tIns="10795" rIns="10795" bIns="10795" numCol="1" spcCol="1270" anchor="ctr" anchorCtr="0">
-          <a:noAutofit/>
-        </a:bodyPr>
-        <a:lstStyle/>
-        <a:p>
-          <a:pPr lvl="0" algn="ctr" defTabSz="755650">
-            <a:lnSpc>
-              <a:spcPct val="90000"/>
-            </a:lnSpc>
-            <a:spcBef>
-              <a:spcPct val="0"/>
-            </a:spcBef>
-            <a:spcAft>
-              <a:spcPct val="35000"/>
-            </a:spcAft>
-          </a:pPr>
-          <a:r>
-            <a:rPr lang="en-US" sz="1700" kern="1200" dirty="0" err="1" smtClean="0"/>
-            <a:t>ArrayBot</a:t>
-          </a:r>
-          <a:r>
-            <a:rPr lang="en-US" sz="1700" kern="1200" dirty="0" smtClean="0"/>
-            <a:t> C++ API </a:t>
-          </a:r>
-          <a:endParaRPr lang="en-US" sz="1700" kern="1200" dirty="0"/>
-        </a:p>
-      </dsp:txBody>
-      <dsp:txXfrm>
-        <a:off x="3936044" y="681"/>
-        <a:ext cx="1718569" cy="859284"/>
-      </dsp:txXfrm>
-    </dsp:sp>
-    <dsp:sp modelId="{F080FFD0-E628-4673-8797-4006B01CAA2F}">
-      <dsp:nvSpPr>
-        <dsp:cNvPr id="0" name=""/>
-        <dsp:cNvSpPr/>
-      </dsp:nvSpPr>
-      <dsp:spPr>
-        <a:xfrm>
-          <a:off x="2896309" y="1220865"/>
-          <a:ext cx="1718569" cy="859284"/>
-        </a:xfrm>
-        <a:prstGeom prst="rect">
-          <a:avLst/>
-        </a:prstGeom>
-        <a:solidFill>
-          <a:schemeClr val="accent1">
-            <a:hueOff val="0"/>
-            <a:satOff val="0"/>
-            <a:lumOff val="0"/>
-            <a:alphaOff val="0"/>
-          </a:schemeClr>
-        </a:solidFill>
-        <a:ln w="15875" cap="rnd" cmpd="sng" algn="ctr">
-          <a:solidFill>
-            <a:schemeClr val="lt1">
-              <a:hueOff val="0"/>
-              <a:satOff val="0"/>
-              <a:lumOff val="0"/>
-              <a:alphaOff val="0"/>
-            </a:schemeClr>
-          </a:solidFill>
-          <a:prstDash val="solid"/>
-        </a:ln>
-        <a:effectLst/>
-      </dsp:spPr>
-      <dsp:style>
-        <a:lnRef idx="2">
-          <a:scrgbClr r="0" g="0" b="0"/>
-        </a:lnRef>
-        <a:fillRef idx="1">
-          <a:scrgbClr r="0" g="0" b="0"/>
-        </a:fillRef>
-        <a:effectRef idx="0">
-          <a:scrgbClr r="0" g="0" b="0"/>
-        </a:effectRef>
-        <a:fontRef idx="minor">
-          <a:schemeClr val="lt1"/>
-        </a:fontRef>
-      </dsp:style>
-      <dsp:txBody>
-        <a:bodyPr spcFirstLastPara="0" vert="horz" wrap="square" lIns="10795" tIns="10795" rIns="10795" bIns="10795" numCol="1" spcCol="1270" anchor="ctr" anchorCtr="0">
-          <a:noAutofit/>
-        </a:bodyPr>
-        <a:lstStyle/>
-        <a:p>
-          <a:pPr lvl="0" algn="ctr" defTabSz="755650">
-            <a:lnSpc>
-              <a:spcPct val="90000"/>
-            </a:lnSpc>
-            <a:spcBef>
-              <a:spcPct val="0"/>
-            </a:spcBef>
-            <a:spcAft>
-              <a:spcPct val="35000"/>
-            </a:spcAft>
-          </a:pPr>
-          <a:r>
-            <a:rPr lang="en-US" sz="1700" kern="1200" dirty="0" err="1" smtClean="0"/>
-            <a:t>ThorLabs</a:t>
-          </a:r>
-          <a:r>
-            <a:rPr lang="en-US" sz="1700" kern="1200" dirty="0" smtClean="0"/>
-            <a:t> C – API</a:t>
-          </a:r>
-          <a:endParaRPr lang="en-US" sz="1700" kern="1200" dirty="0"/>
-        </a:p>
-      </dsp:txBody>
-      <dsp:txXfrm>
-        <a:off x="2896309" y="1220865"/>
-        <a:ext cx="1718569" cy="859284"/>
-      </dsp:txXfrm>
-    </dsp:sp>
-    <dsp:sp modelId="{0645EB98-586A-4DCD-B836-3E3EEE58E52E}">
-      <dsp:nvSpPr>
-        <dsp:cNvPr id="0" name=""/>
-        <dsp:cNvSpPr/>
-      </dsp:nvSpPr>
-      <dsp:spPr>
-        <a:xfrm>
-          <a:off x="4975778" y="1220865"/>
-          <a:ext cx="1718569" cy="859284"/>
-        </a:xfrm>
-        <a:prstGeom prst="rect">
-          <a:avLst/>
-        </a:prstGeom>
-        <a:solidFill>
-          <a:schemeClr val="accent1">
-            <a:hueOff val="0"/>
-            <a:satOff val="0"/>
-            <a:lumOff val="0"/>
-            <a:alphaOff val="0"/>
-          </a:schemeClr>
-        </a:solidFill>
-        <a:ln w="15875" cap="rnd" cmpd="sng" algn="ctr">
-          <a:solidFill>
-            <a:schemeClr val="lt1">
-              <a:hueOff val="0"/>
-              <a:satOff val="0"/>
-              <a:lumOff val="0"/>
-              <a:alphaOff val="0"/>
-            </a:schemeClr>
-          </a:solidFill>
-          <a:prstDash val="solid"/>
-        </a:ln>
-        <a:effectLst/>
-      </dsp:spPr>
-      <dsp:style>
-        <a:lnRef idx="2">
-          <a:scrgbClr r="0" g="0" b="0"/>
-        </a:lnRef>
-        <a:fillRef idx="1">
-          <a:scrgbClr r="0" g="0" b="0"/>
-        </a:fillRef>
-        <a:effectRef idx="0">
-          <a:scrgbClr r="0" g="0" b="0"/>
-        </a:effectRef>
-        <a:fontRef idx="minor">
-          <a:schemeClr val="lt1"/>
-        </a:fontRef>
-      </dsp:style>
-      <dsp:txBody>
-        <a:bodyPr spcFirstLastPara="0" vert="horz" wrap="square" lIns="10795" tIns="10795" rIns="10795" bIns="10795" numCol="1" spcCol="1270" anchor="ctr" anchorCtr="0">
-          <a:noAutofit/>
-        </a:bodyPr>
-        <a:lstStyle/>
-        <a:p>
-          <a:pPr lvl="0" algn="ctr" defTabSz="755650">
-            <a:lnSpc>
-              <a:spcPct val="90000"/>
-            </a:lnSpc>
-            <a:spcBef>
-              <a:spcPct val="0"/>
-            </a:spcBef>
-            <a:spcAft>
-              <a:spcPct val="35000"/>
-            </a:spcAft>
-          </a:pPr>
-          <a:r>
-            <a:rPr lang="en-US" sz="1700" kern="1200" dirty="0" err="1" smtClean="0"/>
-            <a:t>ThirdParty</a:t>
-          </a:r>
-          <a:r>
-            <a:rPr lang="en-US" sz="1700" kern="1200" dirty="0" smtClean="0"/>
-            <a:t> API’s</a:t>
-          </a:r>
-          <a:endParaRPr lang="en-US" sz="1700" kern="1200" dirty="0"/>
-        </a:p>
-      </dsp:txBody>
-      <dsp:txXfrm>
-        <a:off x="4975778" y="1220865"/>
-        <a:ext cx="1718569" cy="859284"/>
-      </dsp:txXfrm>
-    </dsp:sp>
-    <dsp:sp modelId="{BC33716E-EF27-4F7C-BDAB-71B2ABEC9DF0}">
-      <dsp:nvSpPr>
-        <dsp:cNvPr id="0" name=""/>
-        <dsp:cNvSpPr/>
-      </dsp:nvSpPr>
-      <dsp:spPr>
-        <a:xfrm>
-          <a:off x="5405420" y="2441049"/>
-          <a:ext cx="1718569" cy="859284"/>
-        </a:xfrm>
-        <a:prstGeom prst="rect">
-          <a:avLst/>
-        </a:prstGeom>
-        <a:solidFill>
-          <a:schemeClr val="accent1">
-            <a:hueOff val="0"/>
-            <a:satOff val="0"/>
-            <a:lumOff val="0"/>
-            <a:alphaOff val="0"/>
-          </a:schemeClr>
-        </a:solidFill>
-        <a:ln w="15875" cap="rnd" cmpd="sng" algn="ctr">
-          <a:solidFill>
-            <a:schemeClr val="lt1">
-              <a:hueOff val="0"/>
-              <a:satOff val="0"/>
-              <a:lumOff val="0"/>
-              <a:alphaOff val="0"/>
-            </a:schemeClr>
-          </a:solidFill>
-          <a:prstDash val="solid"/>
-        </a:ln>
-        <a:effectLst/>
-      </dsp:spPr>
-      <dsp:style>
-        <a:lnRef idx="2">
-          <a:scrgbClr r="0" g="0" b="0"/>
-        </a:lnRef>
-        <a:fillRef idx="1">
-          <a:scrgbClr r="0" g="0" b="0"/>
-        </a:fillRef>
-        <a:effectRef idx="0">
-          <a:scrgbClr r="0" g="0" b="0"/>
-        </a:effectRef>
-        <a:fontRef idx="minor">
-          <a:schemeClr val="lt1"/>
-        </a:fontRef>
-      </dsp:style>
-      <dsp:txBody>
-        <a:bodyPr spcFirstLastPara="0" vert="horz" wrap="square" lIns="10795" tIns="10795" rIns="10795" bIns="10795" numCol="1" spcCol="1270" anchor="ctr" anchorCtr="0">
-          <a:noAutofit/>
-        </a:bodyPr>
-        <a:lstStyle/>
-        <a:p>
-          <a:pPr lvl="0" algn="ctr" defTabSz="755650">
-            <a:lnSpc>
-              <a:spcPct val="90000"/>
-            </a:lnSpc>
-            <a:spcBef>
-              <a:spcPct val="0"/>
-            </a:spcBef>
-            <a:spcAft>
-              <a:spcPct val="35000"/>
-            </a:spcAft>
-          </a:pPr>
-          <a:r>
-            <a:rPr lang="en-US" sz="1700" kern="1200" dirty="0" err="1" smtClean="0"/>
-            <a:t>Poco</a:t>
-          </a:r>
-          <a:r>
-            <a:rPr lang="en-US" sz="1700" kern="1200" dirty="0" smtClean="0"/>
-            <a:t> (Threads, </a:t>
-          </a:r>
-          <a:r>
-            <a:rPr lang="en-US" sz="1700" kern="1200" dirty="0" err="1" smtClean="0"/>
-            <a:t>TimeStamps</a:t>
-          </a:r>
-          <a:r>
-            <a:rPr lang="en-US" sz="1700" kern="1200" dirty="0" smtClean="0"/>
-            <a:t>)</a:t>
-          </a:r>
-          <a:endParaRPr lang="en-US" sz="1700" kern="1200" dirty="0"/>
-        </a:p>
-      </dsp:txBody>
-      <dsp:txXfrm>
-        <a:off x="5405420" y="2441049"/>
-        <a:ext cx="1718569" cy="859284"/>
-      </dsp:txXfrm>
-    </dsp:sp>
-    <dsp:sp modelId="{39D95C32-42CA-456A-A0FA-ACA16DD34769}">
-      <dsp:nvSpPr>
-        <dsp:cNvPr id="0" name=""/>
-        <dsp:cNvSpPr/>
-      </dsp:nvSpPr>
-      <dsp:spPr>
-        <a:xfrm>
-          <a:off x="5405420" y="3661234"/>
-          <a:ext cx="1718569" cy="859284"/>
-        </a:xfrm>
-        <a:prstGeom prst="rect">
-          <a:avLst/>
-        </a:prstGeom>
-        <a:solidFill>
-          <a:schemeClr val="accent1">
-            <a:hueOff val="0"/>
-            <a:satOff val="0"/>
-            <a:lumOff val="0"/>
-            <a:alphaOff val="0"/>
-          </a:schemeClr>
-        </a:solidFill>
-        <a:ln w="15875" cap="rnd" cmpd="sng" algn="ctr">
-          <a:solidFill>
-            <a:schemeClr val="lt1">
-              <a:hueOff val="0"/>
-              <a:satOff val="0"/>
-              <a:lumOff val="0"/>
-              <a:alphaOff val="0"/>
-            </a:schemeClr>
-          </a:solidFill>
-          <a:prstDash val="solid"/>
-        </a:ln>
-        <a:effectLst/>
-      </dsp:spPr>
-      <dsp:style>
-        <a:lnRef idx="2">
-          <a:scrgbClr r="0" g="0" b="0"/>
-        </a:lnRef>
-        <a:fillRef idx="1">
-          <a:scrgbClr r="0" g="0" b="0"/>
-        </a:fillRef>
-        <a:effectRef idx="0">
-          <a:scrgbClr r="0" g="0" b="0"/>
-        </a:effectRef>
-        <a:fontRef idx="minor">
-          <a:schemeClr val="lt1"/>
-        </a:fontRef>
-      </dsp:style>
-      <dsp:txBody>
-        <a:bodyPr spcFirstLastPara="0" vert="horz" wrap="square" lIns="10795" tIns="10795" rIns="10795" bIns="10795" numCol="1" spcCol="1270" anchor="ctr" anchorCtr="0">
-          <a:noAutofit/>
-        </a:bodyPr>
-        <a:lstStyle/>
-        <a:p>
-          <a:pPr lvl="0" algn="ctr" defTabSz="755650">
-            <a:lnSpc>
-              <a:spcPct val="90000"/>
-            </a:lnSpc>
-            <a:spcBef>
-              <a:spcPct val="0"/>
-            </a:spcBef>
-            <a:spcAft>
-              <a:spcPct val="35000"/>
-            </a:spcAft>
-          </a:pPr>
-          <a:r>
-            <a:rPr lang="en-US" sz="1700" kern="1200" dirty="0" err="1" smtClean="0"/>
-            <a:t>TkLibs</a:t>
-          </a:r>
-          <a:r>
-            <a:rPr lang="en-US" sz="1700" kern="1200" dirty="0" smtClean="0"/>
-            <a:t> (Various utilities, sockets, properties)</a:t>
-          </a:r>
-          <a:endParaRPr lang="en-US" sz="1700" kern="1200" dirty="0"/>
-        </a:p>
-      </dsp:txBody>
-      <dsp:txXfrm>
-        <a:off x="5405420" y="3661234"/>
-        <a:ext cx="1718569" cy="859284"/>
-      </dsp:txXfrm>
-    </dsp:sp>
   </dsp:spTree>
 </dsp:drawing>
 </file>
@@ -6599,6 +7273,698 @@
         <a:off x="236901" y="44215"/>
         <a:ext cx="2621970" cy="802543"/>
       </dsp:txXfrm>
+    </dsp:sp>
+  </dsp:spTree>
+</dsp:drawing>
+</file>
+
+<file path=ppt/diagrams/drawing5.xml><?xml version="1.0" encoding="utf-8"?>
+<dsp:drawing xmlns:dgm="http://schemas.openxmlformats.org/drawingml/2006/diagram" xmlns:dsp="http://schemas.microsoft.com/office/drawing/2008/diagram" xmlns:a="http://schemas.openxmlformats.org/drawingml/2006/main">
+  <dsp:spTree>
+    <dsp:nvGrpSpPr>
+      <dsp:cNvPr id="0" name=""/>
+      <dsp:cNvGrpSpPr/>
+    </dsp:nvGrpSpPr>
+    <dsp:grpSpPr/>
+    <dsp:sp modelId="{69588E9B-0076-454A-919C-5608C89A2FE9}">
+      <dsp:nvSpPr>
+        <dsp:cNvPr id="0" name=""/>
+        <dsp:cNvSpPr/>
+      </dsp:nvSpPr>
+      <dsp:spPr>
+        <a:xfrm>
+          <a:off x="0" y="1676399"/>
+          <a:ext cx="10923587" cy="2235200"/>
+        </a:xfrm>
+        <a:prstGeom prst="notchedRightArrow">
+          <a:avLst/>
+        </a:prstGeom>
+        <a:solidFill>
+          <a:schemeClr val="accent1">
+            <a:tint val="40000"/>
+            <a:hueOff val="0"/>
+            <a:satOff val="0"/>
+            <a:lumOff val="0"/>
+            <a:alphaOff val="0"/>
+          </a:schemeClr>
+        </a:solidFill>
+        <a:ln>
+          <a:noFill/>
+        </a:ln>
+        <a:effectLst/>
+      </dsp:spPr>
+      <dsp:style>
+        <a:lnRef idx="0">
+          <a:scrgbClr r="0" g="0" b="0"/>
+        </a:lnRef>
+        <a:fillRef idx="1">
+          <a:scrgbClr r="0" g="0" b="0"/>
+        </a:fillRef>
+        <a:effectRef idx="0">
+          <a:scrgbClr r="0" g="0" b="0"/>
+        </a:effectRef>
+        <a:fontRef idx="minor"/>
+      </dsp:style>
+    </dsp:sp>
+    <dsp:sp modelId="{E1D78355-7F25-4DDA-BD99-FC571C4B75EC}">
+      <dsp:nvSpPr>
+        <dsp:cNvPr id="0" name=""/>
+        <dsp:cNvSpPr/>
+      </dsp:nvSpPr>
+      <dsp:spPr>
+        <a:xfrm>
+          <a:off x="4320" y="0"/>
+          <a:ext cx="1888959" cy="2235200"/>
+        </a:xfrm>
+        <a:prstGeom prst="rect">
+          <a:avLst/>
+        </a:prstGeom>
+        <a:noFill/>
+        <a:ln>
+          <a:noFill/>
+        </a:ln>
+        <a:effectLst/>
+      </dsp:spPr>
+      <dsp:style>
+        <a:lnRef idx="0">
+          <a:scrgbClr r="0" g="0" b="0"/>
+        </a:lnRef>
+        <a:fillRef idx="0">
+          <a:scrgbClr r="0" g="0" b="0"/>
+        </a:fillRef>
+        <a:effectRef idx="0">
+          <a:scrgbClr r="0" g="0" b="0"/>
+        </a:effectRef>
+        <a:fontRef idx="minor"/>
+      </dsp:style>
+      <dsp:txBody>
+        <a:bodyPr spcFirstLastPara="0" vert="horz" wrap="square" lIns="120904" tIns="120904" rIns="120904" bIns="120904" numCol="1" spcCol="1270" anchor="b" anchorCtr="1">
+          <a:noAutofit/>
+        </a:bodyPr>
+        <a:lstStyle/>
+        <a:p>
+          <a:pPr lvl="0" algn="l" defTabSz="755650">
+            <a:lnSpc>
+              <a:spcPct val="90000"/>
+            </a:lnSpc>
+            <a:spcBef>
+              <a:spcPct val="0"/>
+            </a:spcBef>
+            <a:spcAft>
+              <a:spcPct val="35000"/>
+            </a:spcAft>
+          </a:pPr>
+          <a:r>
+            <a:rPr lang="en-US" sz="1700" kern="1200" dirty="0" smtClean="0"/>
+            <a:t>Position The </a:t>
+          </a:r>
+          <a:r>
+            <a:rPr lang="en-US" sz="1700" kern="1200" dirty="0" err="1" smtClean="0"/>
+            <a:t>CoverSlip</a:t>
+          </a:r>
+          <a:endParaRPr lang="en-US" sz="1700" kern="1200" dirty="0"/>
+        </a:p>
+        <a:p>
+          <a:pPr marL="114300" lvl="1" indent="-114300" algn="l" defTabSz="577850">
+            <a:lnSpc>
+              <a:spcPct val="90000"/>
+            </a:lnSpc>
+            <a:spcBef>
+              <a:spcPct val="0"/>
+            </a:spcBef>
+            <a:spcAft>
+              <a:spcPct val="15000"/>
+            </a:spcAft>
+            <a:buChar char="••"/>
+          </a:pPr>
+          <a:r>
+            <a:rPr lang="en-US" sz="1300" kern="1200" dirty="0" smtClean="0"/>
+            <a:t>Cut tissue &amp; Puff off tissue</a:t>
+          </a:r>
+          <a:endParaRPr lang="en-US" sz="1300" kern="1200" dirty="0"/>
+        </a:p>
+        <a:p>
+          <a:pPr marL="114300" lvl="1" indent="-114300" algn="l" defTabSz="577850">
+            <a:lnSpc>
+              <a:spcPct val="90000"/>
+            </a:lnSpc>
+            <a:spcBef>
+              <a:spcPct val="0"/>
+            </a:spcBef>
+            <a:spcAft>
+              <a:spcPct val="15000"/>
+            </a:spcAft>
+            <a:buChar char="••"/>
+          </a:pPr>
+          <a:endParaRPr lang="en-US" sz="1300" kern="1200" dirty="0"/>
+        </a:p>
+      </dsp:txBody>
+      <dsp:txXfrm>
+        <a:off x="4320" y="0"/>
+        <a:ext cx="1888959" cy="2235200"/>
+      </dsp:txXfrm>
+    </dsp:sp>
+    <dsp:sp modelId="{585EDEC7-5406-4B25-8F82-0AFA2D7C88B3}">
+      <dsp:nvSpPr>
+        <dsp:cNvPr id="0" name=""/>
+        <dsp:cNvSpPr/>
+      </dsp:nvSpPr>
+      <dsp:spPr>
+        <a:xfrm>
+          <a:off x="669399" y="2514600"/>
+          <a:ext cx="558800" cy="558800"/>
+        </a:xfrm>
+        <a:prstGeom prst="ellipse">
+          <a:avLst/>
+        </a:prstGeom>
+        <a:solidFill>
+          <a:schemeClr val="accent1">
+            <a:hueOff val="0"/>
+            <a:satOff val="0"/>
+            <a:lumOff val="0"/>
+            <a:alphaOff val="0"/>
+          </a:schemeClr>
+        </a:solidFill>
+        <a:ln w="15875" cap="rnd" cmpd="sng" algn="ctr">
+          <a:solidFill>
+            <a:schemeClr val="lt1">
+              <a:hueOff val="0"/>
+              <a:satOff val="0"/>
+              <a:lumOff val="0"/>
+              <a:alphaOff val="0"/>
+            </a:schemeClr>
+          </a:solidFill>
+          <a:prstDash val="solid"/>
+        </a:ln>
+        <a:effectLst/>
+      </dsp:spPr>
+      <dsp:style>
+        <a:lnRef idx="2">
+          <a:scrgbClr r="0" g="0" b="0"/>
+        </a:lnRef>
+        <a:fillRef idx="1">
+          <a:scrgbClr r="0" g="0" b="0"/>
+        </a:fillRef>
+        <a:effectRef idx="0">
+          <a:scrgbClr r="0" g="0" b="0"/>
+        </a:effectRef>
+        <a:fontRef idx="minor">
+          <a:schemeClr val="lt1"/>
+        </a:fontRef>
+      </dsp:style>
+    </dsp:sp>
+    <dsp:sp modelId="{FA3E931D-5584-4A0D-9327-38A303FDAC16}">
+      <dsp:nvSpPr>
+        <dsp:cNvPr id="0" name=""/>
+        <dsp:cNvSpPr/>
+      </dsp:nvSpPr>
+      <dsp:spPr>
+        <a:xfrm>
+          <a:off x="1987727" y="3352799"/>
+          <a:ext cx="1888959" cy="2235200"/>
+        </a:xfrm>
+        <a:prstGeom prst="rect">
+          <a:avLst/>
+        </a:prstGeom>
+        <a:noFill/>
+        <a:ln>
+          <a:noFill/>
+        </a:ln>
+        <a:effectLst/>
+      </dsp:spPr>
+      <dsp:style>
+        <a:lnRef idx="0">
+          <a:scrgbClr r="0" g="0" b="0"/>
+        </a:lnRef>
+        <a:fillRef idx="0">
+          <a:scrgbClr r="0" g="0" b="0"/>
+        </a:fillRef>
+        <a:effectRef idx="0">
+          <a:scrgbClr r="0" g="0" b="0"/>
+        </a:effectRef>
+        <a:fontRef idx="minor"/>
+      </dsp:style>
+      <dsp:txBody>
+        <a:bodyPr spcFirstLastPara="0" vert="horz" wrap="square" lIns="120904" tIns="120904" rIns="120904" bIns="120904" numCol="1" spcCol="1270" anchor="t" anchorCtr="1">
+          <a:noAutofit/>
+        </a:bodyPr>
+        <a:lstStyle/>
+        <a:p>
+          <a:pPr lvl="0" algn="l" defTabSz="755650">
+            <a:lnSpc>
+              <a:spcPct val="90000"/>
+            </a:lnSpc>
+            <a:spcBef>
+              <a:spcPct val="0"/>
+            </a:spcBef>
+            <a:spcAft>
+              <a:spcPct val="35000"/>
+            </a:spcAft>
+          </a:pPr>
+          <a:r>
+            <a:rPr lang="en-US" sz="1700" kern="1200" dirty="0" smtClean="0"/>
+            <a:t>Find ribbon</a:t>
+          </a:r>
+          <a:endParaRPr lang="en-US" sz="1700" kern="1200" dirty="0"/>
+        </a:p>
+        <a:p>
+          <a:pPr marL="114300" lvl="1" indent="-114300" algn="l" defTabSz="577850">
+            <a:lnSpc>
+              <a:spcPct val="90000"/>
+            </a:lnSpc>
+            <a:spcBef>
+              <a:spcPct val="0"/>
+            </a:spcBef>
+            <a:spcAft>
+              <a:spcPct val="15000"/>
+            </a:spcAft>
+            <a:buChar char="••"/>
+          </a:pPr>
+          <a:r>
+            <a:rPr lang="en-US" sz="1300" kern="1200" dirty="0" smtClean="0"/>
+            <a:t>Use joystick/camera to find leading edge of ribbon</a:t>
+          </a:r>
+          <a:endParaRPr lang="en-US" sz="1300" kern="1200" dirty="0"/>
+        </a:p>
+      </dsp:txBody>
+      <dsp:txXfrm>
+        <a:off x="1987727" y="3352799"/>
+        <a:ext cx="1888959" cy="2235200"/>
+      </dsp:txXfrm>
+    </dsp:sp>
+    <dsp:sp modelId="{CD1561AB-9B77-43F2-93C2-A056205E2826}">
+      <dsp:nvSpPr>
+        <dsp:cNvPr id="0" name=""/>
+        <dsp:cNvSpPr/>
+      </dsp:nvSpPr>
+      <dsp:spPr>
+        <a:xfrm>
+          <a:off x="2652807" y="2514600"/>
+          <a:ext cx="558800" cy="558800"/>
+        </a:xfrm>
+        <a:prstGeom prst="ellipse">
+          <a:avLst/>
+        </a:prstGeom>
+        <a:solidFill>
+          <a:schemeClr val="accent1">
+            <a:hueOff val="0"/>
+            <a:satOff val="0"/>
+            <a:lumOff val="0"/>
+            <a:alphaOff val="0"/>
+          </a:schemeClr>
+        </a:solidFill>
+        <a:ln w="15875" cap="rnd" cmpd="sng" algn="ctr">
+          <a:solidFill>
+            <a:schemeClr val="lt1">
+              <a:hueOff val="0"/>
+              <a:satOff val="0"/>
+              <a:lumOff val="0"/>
+              <a:alphaOff val="0"/>
+            </a:schemeClr>
+          </a:solidFill>
+          <a:prstDash val="solid"/>
+        </a:ln>
+        <a:effectLst/>
+      </dsp:spPr>
+      <dsp:style>
+        <a:lnRef idx="2">
+          <a:scrgbClr r="0" g="0" b="0"/>
+        </a:lnRef>
+        <a:fillRef idx="1">
+          <a:scrgbClr r="0" g="0" b="0"/>
+        </a:fillRef>
+        <a:effectRef idx="0">
+          <a:scrgbClr r="0" g="0" b="0"/>
+        </a:effectRef>
+        <a:fontRef idx="minor">
+          <a:schemeClr val="lt1"/>
+        </a:fontRef>
+      </dsp:style>
+    </dsp:sp>
+    <dsp:sp modelId="{BC0F4EC0-560F-4635-B4C9-B3E657FF239C}">
+      <dsp:nvSpPr>
+        <dsp:cNvPr id="0" name=""/>
+        <dsp:cNvSpPr/>
+      </dsp:nvSpPr>
+      <dsp:spPr>
+        <a:xfrm>
+          <a:off x="3971134" y="0"/>
+          <a:ext cx="1888959" cy="2235200"/>
+        </a:xfrm>
+        <a:prstGeom prst="rect">
+          <a:avLst/>
+        </a:prstGeom>
+        <a:noFill/>
+        <a:ln>
+          <a:noFill/>
+        </a:ln>
+        <a:effectLst/>
+      </dsp:spPr>
+      <dsp:style>
+        <a:lnRef idx="0">
+          <a:scrgbClr r="0" g="0" b="0"/>
+        </a:lnRef>
+        <a:fillRef idx="0">
+          <a:scrgbClr r="0" g="0" b="0"/>
+        </a:fillRef>
+        <a:effectRef idx="0">
+          <a:scrgbClr r="0" g="0" b="0"/>
+        </a:effectRef>
+        <a:fontRef idx="minor"/>
+      </dsp:style>
+      <dsp:txBody>
+        <a:bodyPr spcFirstLastPara="0" vert="horz" wrap="square" lIns="120904" tIns="120904" rIns="120904" bIns="120904" numCol="1" spcCol="1270" anchor="b" anchorCtr="1">
+          <a:noAutofit/>
+        </a:bodyPr>
+        <a:lstStyle/>
+        <a:p>
+          <a:pPr lvl="0" algn="l" defTabSz="755650">
+            <a:lnSpc>
+              <a:spcPct val="90000"/>
+            </a:lnSpc>
+            <a:spcBef>
+              <a:spcPct val="0"/>
+            </a:spcBef>
+            <a:spcAft>
+              <a:spcPct val="35000"/>
+            </a:spcAft>
+          </a:pPr>
+          <a:r>
+            <a:rPr lang="en-US" sz="1700" kern="1200" dirty="0" smtClean="0"/>
+            <a:t>Lower carriage to whisker-water contact</a:t>
+          </a:r>
+          <a:endParaRPr lang="en-US" sz="1700" kern="1200" dirty="0"/>
+        </a:p>
+        <a:p>
+          <a:pPr marL="114300" lvl="1" indent="-114300" algn="l" defTabSz="577850">
+            <a:lnSpc>
+              <a:spcPct val="90000"/>
+            </a:lnSpc>
+            <a:spcBef>
+              <a:spcPct val="0"/>
+            </a:spcBef>
+            <a:spcAft>
+              <a:spcPct val="15000"/>
+            </a:spcAft>
+            <a:buChar char="••"/>
+          </a:pPr>
+          <a:r>
+            <a:rPr lang="en-US" sz="1300" kern="1200" dirty="0" smtClean="0"/>
+            <a:t>Use camera and up/down buttons/joystick to make contact</a:t>
+          </a:r>
+          <a:endParaRPr lang="en-US" sz="1300" kern="1200" dirty="0"/>
+        </a:p>
+      </dsp:txBody>
+      <dsp:txXfrm>
+        <a:off x="3971134" y="0"/>
+        <a:ext cx="1888959" cy="2235200"/>
+      </dsp:txXfrm>
+    </dsp:sp>
+    <dsp:sp modelId="{C0DE246B-6565-4635-998A-B282F07B2765}">
+      <dsp:nvSpPr>
+        <dsp:cNvPr id="0" name=""/>
+        <dsp:cNvSpPr/>
+      </dsp:nvSpPr>
+      <dsp:spPr>
+        <a:xfrm>
+          <a:off x="4636214" y="2514600"/>
+          <a:ext cx="558800" cy="558800"/>
+        </a:xfrm>
+        <a:prstGeom prst="ellipse">
+          <a:avLst/>
+        </a:prstGeom>
+        <a:solidFill>
+          <a:schemeClr val="accent1">
+            <a:hueOff val="0"/>
+            <a:satOff val="0"/>
+            <a:lumOff val="0"/>
+            <a:alphaOff val="0"/>
+          </a:schemeClr>
+        </a:solidFill>
+        <a:ln w="15875" cap="rnd" cmpd="sng" algn="ctr">
+          <a:solidFill>
+            <a:schemeClr val="lt1">
+              <a:hueOff val="0"/>
+              <a:satOff val="0"/>
+              <a:lumOff val="0"/>
+              <a:alphaOff val="0"/>
+            </a:schemeClr>
+          </a:solidFill>
+          <a:prstDash val="solid"/>
+        </a:ln>
+        <a:effectLst/>
+      </dsp:spPr>
+      <dsp:style>
+        <a:lnRef idx="2">
+          <a:scrgbClr r="0" g="0" b="0"/>
+        </a:lnRef>
+        <a:fillRef idx="1">
+          <a:scrgbClr r="0" g="0" b="0"/>
+        </a:fillRef>
+        <a:effectRef idx="0">
+          <a:scrgbClr r="0" g="0" b="0"/>
+        </a:effectRef>
+        <a:fontRef idx="minor">
+          <a:schemeClr val="lt1"/>
+        </a:fontRef>
+      </dsp:style>
+    </dsp:sp>
+    <dsp:sp modelId="{8BC173FD-FF44-48FC-BB20-A61C7AADE61E}">
+      <dsp:nvSpPr>
+        <dsp:cNvPr id="0" name=""/>
+        <dsp:cNvSpPr/>
+      </dsp:nvSpPr>
+      <dsp:spPr>
+        <a:xfrm>
+          <a:off x="5954541" y="3352799"/>
+          <a:ext cx="1888959" cy="2235200"/>
+        </a:xfrm>
+        <a:prstGeom prst="rect">
+          <a:avLst/>
+        </a:prstGeom>
+        <a:noFill/>
+        <a:ln>
+          <a:noFill/>
+        </a:ln>
+        <a:effectLst/>
+      </dsp:spPr>
+      <dsp:style>
+        <a:lnRef idx="0">
+          <a:scrgbClr r="0" g="0" b="0"/>
+        </a:lnRef>
+        <a:fillRef idx="0">
+          <a:scrgbClr r="0" g="0" b="0"/>
+        </a:fillRef>
+        <a:effectRef idx="0">
+          <a:scrgbClr r="0" g="0" b="0"/>
+        </a:effectRef>
+        <a:fontRef idx="minor"/>
+      </dsp:style>
+      <dsp:txBody>
+        <a:bodyPr spcFirstLastPara="0" vert="horz" wrap="square" lIns="120904" tIns="120904" rIns="120904" bIns="120904" numCol="1" spcCol="1270" anchor="t" anchorCtr="1">
+          <a:noAutofit/>
+        </a:bodyPr>
+        <a:lstStyle/>
+        <a:p>
+          <a:pPr lvl="0" algn="l" defTabSz="755650">
+            <a:lnSpc>
+              <a:spcPct val="90000"/>
+            </a:lnSpc>
+            <a:spcBef>
+              <a:spcPct val="0"/>
+            </a:spcBef>
+            <a:spcAft>
+              <a:spcPct val="35000"/>
+            </a:spcAft>
+          </a:pPr>
+          <a:r>
+            <a:rPr lang="en-US" sz="1700" kern="1200" dirty="0" smtClean="0"/>
+            <a:t>Move ribbon to pickup area</a:t>
+          </a:r>
+          <a:endParaRPr lang="en-US" sz="1700" kern="1200" dirty="0"/>
+        </a:p>
+        <a:p>
+          <a:pPr marL="114300" lvl="1" indent="-114300" algn="l" defTabSz="577850">
+            <a:lnSpc>
+              <a:spcPct val="90000"/>
+            </a:lnSpc>
+            <a:spcBef>
+              <a:spcPct val="0"/>
+            </a:spcBef>
+            <a:spcAft>
+              <a:spcPct val="15000"/>
+            </a:spcAft>
+            <a:buChar char="••"/>
+          </a:pPr>
+          <a:r>
+            <a:rPr lang="en-US" sz="1300" kern="1200" dirty="0" smtClean="0"/>
+            <a:t>Automatically move whisker/ribbon to pickup area using pre-programmed position</a:t>
+          </a:r>
+          <a:endParaRPr lang="en-US" sz="1300" kern="1200" dirty="0"/>
+        </a:p>
+      </dsp:txBody>
+      <dsp:txXfrm>
+        <a:off x="5954541" y="3352799"/>
+        <a:ext cx="1888959" cy="2235200"/>
+      </dsp:txXfrm>
+    </dsp:sp>
+    <dsp:sp modelId="{C61CA8AD-7CE0-4DB3-A529-E1DB75680F68}">
+      <dsp:nvSpPr>
+        <dsp:cNvPr id="0" name=""/>
+        <dsp:cNvSpPr/>
+      </dsp:nvSpPr>
+      <dsp:spPr>
+        <a:xfrm>
+          <a:off x="6619621" y="2514600"/>
+          <a:ext cx="558800" cy="558800"/>
+        </a:xfrm>
+        <a:prstGeom prst="ellipse">
+          <a:avLst/>
+        </a:prstGeom>
+        <a:solidFill>
+          <a:schemeClr val="accent1">
+            <a:hueOff val="0"/>
+            <a:satOff val="0"/>
+            <a:lumOff val="0"/>
+            <a:alphaOff val="0"/>
+          </a:schemeClr>
+        </a:solidFill>
+        <a:ln w="15875" cap="rnd" cmpd="sng" algn="ctr">
+          <a:solidFill>
+            <a:schemeClr val="lt1">
+              <a:hueOff val="0"/>
+              <a:satOff val="0"/>
+              <a:lumOff val="0"/>
+              <a:alphaOff val="0"/>
+            </a:schemeClr>
+          </a:solidFill>
+          <a:prstDash val="solid"/>
+        </a:ln>
+        <a:effectLst/>
+      </dsp:spPr>
+      <dsp:style>
+        <a:lnRef idx="2">
+          <a:scrgbClr r="0" g="0" b="0"/>
+        </a:lnRef>
+        <a:fillRef idx="1">
+          <a:scrgbClr r="0" g="0" b="0"/>
+        </a:fillRef>
+        <a:effectRef idx="0">
+          <a:scrgbClr r="0" g="0" b="0"/>
+        </a:effectRef>
+        <a:fontRef idx="minor">
+          <a:schemeClr val="lt1"/>
+        </a:fontRef>
+      </dsp:style>
+    </dsp:sp>
+    <dsp:sp modelId="{B0BF278C-F85F-4485-A0FC-52AD89A6966C}">
+      <dsp:nvSpPr>
+        <dsp:cNvPr id="0" name=""/>
+        <dsp:cNvSpPr/>
+      </dsp:nvSpPr>
+      <dsp:spPr>
+        <a:xfrm>
+          <a:off x="7937948" y="0"/>
+          <a:ext cx="1888959" cy="2235200"/>
+        </a:xfrm>
+        <a:prstGeom prst="rect">
+          <a:avLst/>
+        </a:prstGeom>
+        <a:noFill/>
+        <a:ln>
+          <a:noFill/>
+        </a:ln>
+        <a:effectLst/>
+      </dsp:spPr>
+      <dsp:style>
+        <a:lnRef idx="0">
+          <a:scrgbClr r="0" g="0" b="0"/>
+        </a:lnRef>
+        <a:fillRef idx="0">
+          <a:scrgbClr r="0" g="0" b="0"/>
+        </a:fillRef>
+        <a:effectRef idx="0">
+          <a:scrgbClr r="0" g="0" b="0"/>
+        </a:effectRef>
+        <a:fontRef idx="minor"/>
+      </dsp:style>
+      <dsp:txBody>
+        <a:bodyPr spcFirstLastPara="0" vert="horz" wrap="square" lIns="120904" tIns="120904" rIns="120904" bIns="120904" numCol="1" spcCol="1270" anchor="b" anchorCtr="0">
+          <a:noAutofit/>
+        </a:bodyPr>
+        <a:lstStyle/>
+        <a:p>
+          <a:pPr lvl="0" algn="ctr" defTabSz="755650">
+            <a:lnSpc>
+              <a:spcPct val="90000"/>
+            </a:lnSpc>
+            <a:spcBef>
+              <a:spcPct val="0"/>
+            </a:spcBef>
+            <a:spcAft>
+              <a:spcPct val="35000"/>
+            </a:spcAft>
+          </a:pPr>
+          <a:r>
+            <a:rPr lang="en-US" sz="1700" kern="1200" dirty="0" smtClean="0"/>
+            <a:t>Lift/move whisker/ribbon + coverslip at predefined angle</a:t>
+          </a:r>
+          <a:endParaRPr lang="en-US" sz="1700" kern="1200" dirty="0"/>
+        </a:p>
+      </dsp:txBody>
+      <dsp:txXfrm>
+        <a:off x="7937948" y="0"/>
+        <a:ext cx="1888959" cy="2235200"/>
+      </dsp:txXfrm>
+    </dsp:sp>
+    <dsp:sp modelId="{0AE64CDA-39C7-445D-B127-C5B992FBEE4D}">
+      <dsp:nvSpPr>
+        <dsp:cNvPr id="0" name=""/>
+        <dsp:cNvSpPr/>
+      </dsp:nvSpPr>
+      <dsp:spPr>
+        <a:xfrm>
+          <a:off x="8603028" y="2514600"/>
+          <a:ext cx="558800" cy="558800"/>
+        </a:xfrm>
+        <a:prstGeom prst="ellipse">
+          <a:avLst/>
+        </a:prstGeom>
+        <a:solidFill>
+          <a:schemeClr val="accent1">
+            <a:hueOff val="0"/>
+            <a:satOff val="0"/>
+            <a:lumOff val="0"/>
+            <a:alphaOff val="0"/>
+          </a:schemeClr>
+        </a:solidFill>
+        <a:ln w="15875" cap="rnd" cmpd="sng" algn="ctr">
+          <a:solidFill>
+            <a:schemeClr val="lt1">
+              <a:hueOff val="0"/>
+              <a:satOff val="0"/>
+              <a:lumOff val="0"/>
+              <a:alphaOff val="0"/>
+            </a:schemeClr>
+          </a:solidFill>
+          <a:prstDash val="solid"/>
+        </a:ln>
+        <a:effectLst/>
+      </dsp:spPr>
+      <dsp:style>
+        <a:lnRef idx="2">
+          <a:scrgbClr r="0" g="0" b="0"/>
+        </a:lnRef>
+        <a:fillRef idx="1">
+          <a:scrgbClr r="0" g="0" b="0"/>
+        </a:fillRef>
+        <a:effectRef idx="0">
+          <a:scrgbClr r="0" g="0" b="0"/>
+        </a:effectRef>
+        <a:fontRef idx="minor">
+          <a:schemeClr val="lt1"/>
+        </a:fontRef>
+      </dsp:style>
     </dsp:sp>
   </dsp:spTree>
 </dsp:drawing>
@@ -8425,6 +9791,278 @@
 </dgm:layoutDef>
 </file>
 
+<file path=ppt/diagrams/layout5.xml><?xml version="1.0" encoding="utf-8"?>
+<dgm:layoutDef xmlns:dgm="http://schemas.openxmlformats.org/drawingml/2006/diagram" xmlns:a="http://schemas.openxmlformats.org/drawingml/2006/main" uniqueId="urn:microsoft.com/office/officeart/2005/8/layout/hProcess11">
+  <dgm:title val=""/>
+  <dgm:desc val=""/>
+  <dgm:catLst>
+    <dgm:cat type="process" pri="8000"/>
+    <dgm:cat type="convert" pri="14000"/>
+  </dgm:catLst>
+  <dgm:sampData useDef="1">
+    <dgm:dataModel>
+      <dgm:ptLst/>
+      <dgm:bg/>
+      <dgm:whole/>
+    </dgm:dataModel>
+  </dgm:sampData>
+  <dgm:styleData>
+    <dgm:dataModel>
+      <dgm:ptLst>
+        <dgm:pt modelId="0" type="doc"/>
+        <dgm:pt modelId="1"/>
+        <dgm:pt modelId="2"/>
+      </dgm:ptLst>
+      <dgm:cxnLst>
+        <dgm:cxn modelId="4" srcId="0" destId="1" srcOrd="0" destOrd="0"/>
+        <dgm:cxn modelId="5" srcId="0" destId="2" srcOrd="1" destOrd="0"/>
+      </dgm:cxnLst>
+      <dgm:bg/>
+      <dgm:whole/>
+    </dgm:dataModel>
+  </dgm:styleData>
+  <dgm:clrData>
+    <dgm:dataModel>
+      <dgm:ptLst>
+        <dgm:pt modelId="0" type="doc"/>
+        <dgm:pt modelId="1"/>
+        <dgm:pt modelId="2"/>
+        <dgm:pt modelId="3"/>
+        <dgm:pt modelId="4"/>
+      </dgm:ptLst>
+      <dgm:cxnLst>
+        <dgm:cxn modelId="5" srcId="0" destId="1" srcOrd="0" destOrd="0"/>
+        <dgm:cxn modelId="6" srcId="0" destId="2" srcOrd="1" destOrd="0"/>
+        <dgm:cxn modelId="7" srcId="0" destId="3" srcOrd="2" destOrd="0"/>
+        <dgm:cxn modelId="8" srcId="0" destId="4" srcOrd="3" destOrd="0"/>
+      </dgm:cxnLst>
+      <dgm:bg/>
+      <dgm:whole/>
+    </dgm:dataModel>
+  </dgm:clrData>
+  <dgm:layoutNode name="Name0">
+    <dgm:varLst>
+      <dgm:dir/>
+      <dgm:resizeHandles val="exact"/>
+    </dgm:varLst>
+    <dgm:alg type="composite"/>
+    <dgm:shape xmlns:r="http://schemas.openxmlformats.org/officeDocument/2006/relationships" r:blip="">
+      <dgm:adjLst/>
+    </dgm:shape>
+    <dgm:presOf/>
+    <dgm:choose name="Name1">
+      <dgm:if name="Name2" func="var" arg="dir" op="equ" val="norm">
+        <dgm:constrLst>
+          <dgm:constr type="w" for="ch" forName="arrow" refType="w"/>
+          <dgm:constr type="h" for="ch" forName="arrow" refType="h" fact="0.4"/>
+          <dgm:constr type="ctrY" for="ch" forName="arrow" refType="h" fact="0.5"/>
+          <dgm:constr type="l" for="ch" forName="arrow"/>
+          <dgm:constr type="w" for="ch" forName="points" refType="w" fact="0.9"/>
+          <dgm:constr type="h" for="ch" forName="points" refType="h"/>
+          <dgm:constr type="t" for="ch" forName="points"/>
+          <dgm:constr type="l" for="ch" forName="points"/>
+        </dgm:constrLst>
+      </dgm:if>
+      <dgm:else name="Name3">
+        <dgm:constrLst>
+          <dgm:constr type="w" for="ch" forName="arrow" refType="w"/>
+          <dgm:constr type="h" for="ch" forName="arrow" refType="h" fact="0.4"/>
+          <dgm:constr type="ctrY" for="ch" forName="arrow" refType="h" fact="0.5"/>
+          <dgm:constr type="r" for="ch" forName="arrow" refType="w"/>
+          <dgm:constr type="w" for="ch" forName="points" refType="w" fact="0.9"/>
+          <dgm:constr type="h" for="ch" forName="points" refType="h"/>
+          <dgm:constr type="t" for="ch" forName="points"/>
+          <dgm:constr type="r" for="ch" forName="points" refType="w"/>
+        </dgm:constrLst>
+      </dgm:else>
+    </dgm:choose>
+    <dgm:ruleLst/>
+    <dgm:layoutNode name="arrow" styleLbl="bgShp">
+      <dgm:alg type="sp"/>
+      <dgm:choose name="Name4">
+        <dgm:if name="Name5" func="var" arg="dir" op="equ" val="norm">
+          <dgm:shape xmlns:r="http://schemas.openxmlformats.org/officeDocument/2006/relationships" type="notchedRightArrow" r:blip="">
+            <dgm:adjLst/>
+          </dgm:shape>
+        </dgm:if>
+        <dgm:else name="Name6">
+          <dgm:shape xmlns:r="http://schemas.openxmlformats.org/officeDocument/2006/relationships" rot="180" type="notchedRightArrow" r:blip="">
+            <dgm:adjLst/>
+          </dgm:shape>
+        </dgm:else>
+      </dgm:choose>
+      <dgm:presOf/>
+      <dgm:constrLst/>
+      <dgm:ruleLst/>
+    </dgm:layoutNode>
+    <dgm:layoutNode name="points">
+      <dgm:choose name="Name7">
+        <dgm:if name="Name8" func="var" arg="dir" op="equ" val="norm">
+          <dgm:alg type="lin">
+            <dgm:param type="linDir" val="fromL"/>
+          </dgm:alg>
+        </dgm:if>
+        <dgm:else name="Name9">
+          <dgm:alg type="lin">
+            <dgm:param type="linDir" val="fromR"/>
+          </dgm:alg>
+        </dgm:else>
+      </dgm:choose>
+      <dgm:shape xmlns:r="http://schemas.openxmlformats.org/officeDocument/2006/relationships" r:blip="">
+        <dgm:adjLst/>
+      </dgm:shape>
+      <dgm:presOf/>
+      <dgm:constrLst>
+        <dgm:constr type="w" for="ch" forName="compositeA" refType="w"/>
+        <dgm:constr type="h" for="ch" forName="compositeA" refType="h"/>
+        <dgm:constr type="w" for="ch" forName="compositeB" refType="w" refFor="ch" refForName="compositeA" op="equ"/>
+        <dgm:constr type="h" for="ch" forName="compositeB" refType="h" refFor="ch" refForName="compositeA" op="equ"/>
+        <dgm:constr type="primFontSz" for="des" ptType="node" op="equ" val="65"/>
+        <dgm:constr type="w" for="ch" forName="space" refType="w" refFor="ch" refForName="compositeA" op="equ" fact="0.05"/>
+      </dgm:constrLst>
+      <dgm:ruleLst/>
+      <dgm:forEach name="Name10" axis="ch" ptType="node">
+        <dgm:choose name="Name11">
+          <dgm:if name="Name12" axis="self" ptType="node" func="posOdd" op="equ" val="1">
+            <dgm:layoutNode name="compositeA">
+              <dgm:alg type="composite"/>
+              <dgm:shape xmlns:r="http://schemas.openxmlformats.org/officeDocument/2006/relationships" r:blip="">
+                <dgm:adjLst/>
+              </dgm:shape>
+              <dgm:presOf/>
+              <dgm:constrLst>
+                <dgm:constr type="w" for="ch" forName="textA" refType="w"/>
+                <dgm:constr type="h" for="ch" forName="textA" refType="h" fact="0.4"/>
+                <dgm:constr type="t" for="ch" forName="textA"/>
+                <dgm:constr type="l" for="ch" forName="textA"/>
+                <dgm:constr type="h" for="ch" forName="circleA" refType="h" fact="0.1"/>
+                <dgm:constr type="h" for="ch" forName="circleA" refType="w" op="lte"/>
+                <dgm:constr type="w" for="ch" forName="circleA" refType="h" refFor="ch" refForName="circleA" op="equ"/>
+                <dgm:constr type="ctrY" for="ch" forName="circleA" refType="h" fact="0.5"/>
+                <dgm:constr type="ctrX" for="ch" forName="circleA" refType="w" refFor="ch" refForName="textA" fact="0.5"/>
+                <dgm:constr type="w" for="ch" forName="spaceA" refType="w"/>
+                <dgm:constr type="h" for="ch" forName="spaceA" refType="h" fact="0.4"/>
+                <dgm:constr type="b" for="ch" forName="spaceA" refType="h"/>
+                <dgm:constr type="l" for="ch" forName="spaceA"/>
+              </dgm:constrLst>
+              <dgm:ruleLst/>
+              <dgm:layoutNode name="textA" styleLbl="revTx">
+                <dgm:varLst>
+                  <dgm:bulletEnabled val="1"/>
+                </dgm:varLst>
+                <dgm:alg type="tx">
+                  <dgm:param type="txAnchorVert" val="b"/>
+                  <dgm:param type="txAnchorVertCh" val="b"/>
+                  <dgm:param type="txAnchorHorzCh" val="ctr"/>
+                </dgm:alg>
+                <dgm:shape xmlns:r="http://schemas.openxmlformats.org/officeDocument/2006/relationships" type="rect" r:blip="">
+                  <dgm:adjLst/>
+                </dgm:shape>
+                <dgm:presOf axis="desOrSelf" ptType="node"/>
+                <dgm:constrLst/>
+                <dgm:ruleLst>
+                  <dgm:rule type="primFontSz" val="5" fact="NaN" max="NaN"/>
+                </dgm:ruleLst>
+              </dgm:layoutNode>
+              <dgm:layoutNode name="circleA">
+                <dgm:alg type="sp"/>
+                <dgm:shape xmlns:r="http://schemas.openxmlformats.org/officeDocument/2006/relationships" type="ellipse" r:blip="">
+                  <dgm:adjLst/>
+                </dgm:shape>
+                <dgm:presOf/>
+                <dgm:constrLst/>
+                <dgm:ruleLst/>
+              </dgm:layoutNode>
+              <dgm:layoutNode name="spaceA">
+                <dgm:alg type="sp"/>
+                <dgm:shape xmlns:r="http://schemas.openxmlformats.org/officeDocument/2006/relationships" r:blip="">
+                  <dgm:adjLst/>
+                </dgm:shape>
+                <dgm:presOf/>
+                <dgm:constrLst/>
+                <dgm:ruleLst/>
+              </dgm:layoutNode>
+            </dgm:layoutNode>
+          </dgm:if>
+          <dgm:else name="Name13">
+            <dgm:layoutNode name="compositeB">
+              <dgm:alg type="composite"/>
+              <dgm:shape xmlns:r="http://schemas.openxmlformats.org/officeDocument/2006/relationships" r:blip="">
+                <dgm:adjLst/>
+              </dgm:shape>
+              <dgm:presOf/>
+              <dgm:constrLst>
+                <dgm:constr type="w" for="ch" forName="textB" refType="w"/>
+                <dgm:constr type="h" for="ch" forName="textB" refType="h" fact="0.4"/>
+                <dgm:constr type="b" for="ch" forName="textB" refType="h"/>
+                <dgm:constr type="l" for="ch" forName="textB"/>
+                <dgm:constr type="h" for="ch" forName="circleB" refType="h" fact="0.1"/>
+                <dgm:constr type="w" for="ch" forName="circleB" refType="h" refFor="ch" refForName="circleB" op="equ"/>
+                <dgm:constr type="h" for="ch" forName="circleB" refType="w" op="lte"/>
+                <dgm:constr type="ctrY" for="ch" forName="circleB" refType="h" fact="0.5"/>
+                <dgm:constr type="ctrX" for="ch" forName="circleB" refType="w" refFor="ch" refForName="textB" fact="0.5"/>
+                <dgm:constr type="w" for="ch" forName="spaceB" refType="w"/>
+                <dgm:constr type="h" for="ch" forName="spaceB" refType="h" fact="0.4"/>
+                <dgm:constr type="t" for="ch" forName="spaceB"/>
+                <dgm:constr type="l" for="ch" forName="spaceB"/>
+              </dgm:constrLst>
+              <dgm:ruleLst/>
+              <dgm:layoutNode name="textB" styleLbl="revTx">
+                <dgm:varLst>
+                  <dgm:bulletEnabled val="1"/>
+                </dgm:varLst>
+                <dgm:alg type="tx">
+                  <dgm:param type="txAnchorVert" val="t"/>
+                  <dgm:param type="txAnchorVertCh" val="t"/>
+                  <dgm:param type="txAnchorHorzCh" val="ctr"/>
+                </dgm:alg>
+                <dgm:shape xmlns:r="http://schemas.openxmlformats.org/officeDocument/2006/relationships" type="rect" r:blip="">
+                  <dgm:adjLst/>
+                </dgm:shape>
+                <dgm:presOf axis="desOrSelf" ptType="node"/>
+                <dgm:constrLst/>
+                <dgm:ruleLst>
+                  <dgm:rule type="primFontSz" val="5" fact="NaN" max="NaN"/>
+                </dgm:ruleLst>
+              </dgm:layoutNode>
+              <dgm:layoutNode name="circleB">
+                <dgm:alg type="sp"/>
+                <dgm:shape xmlns:r="http://schemas.openxmlformats.org/officeDocument/2006/relationships" type="ellipse" r:blip="">
+                  <dgm:adjLst/>
+                </dgm:shape>
+                <dgm:presOf/>
+                <dgm:constrLst/>
+                <dgm:ruleLst/>
+              </dgm:layoutNode>
+              <dgm:layoutNode name="spaceB">
+                <dgm:alg type="sp"/>
+                <dgm:shape xmlns:r="http://schemas.openxmlformats.org/officeDocument/2006/relationships" r:blip="">
+                  <dgm:adjLst/>
+                </dgm:shape>
+                <dgm:presOf/>
+                <dgm:constrLst/>
+                <dgm:ruleLst/>
+              </dgm:layoutNode>
+            </dgm:layoutNode>
+          </dgm:else>
+        </dgm:choose>
+        <dgm:forEach name="Name14" axis="followSib" ptType="sibTrans" cnt="1">
+          <dgm:layoutNode name="space">
+            <dgm:alg type="sp"/>
+            <dgm:shape xmlns:r="http://schemas.openxmlformats.org/officeDocument/2006/relationships" r:blip="">
+              <dgm:adjLst/>
+            </dgm:shape>
+            <dgm:presOf/>
+            <dgm:constrLst/>
+            <dgm:ruleLst/>
+          </dgm:layoutNode>
+        </dgm:forEach>
+      </dgm:forEach>
+    </dgm:layoutNode>
+  </dgm:layoutNode>
+</dgm:layoutDef>
+</file>
+
 <file path=ppt/diagrams/quickStyle1.xml><?xml version="1.0" encoding="utf-8"?>
 <dgm:styleDef xmlns:dgm="http://schemas.openxmlformats.org/drawingml/2006/diagram" xmlns:a="http://schemas.openxmlformats.org/drawingml/2006/main" uniqueId="urn:microsoft.com/office/officeart/2005/8/quickstyle/simple1">
   <dgm:title val=""/>
@@ -11528,6 +13166,1040 @@
 </file>
 
 <file path=ppt/diagrams/quickStyle4.xml><?xml version="1.0" encoding="utf-8"?>
+<dgm:styleDef xmlns:dgm="http://schemas.openxmlformats.org/drawingml/2006/diagram" xmlns:a="http://schemas.openxmlformats.org/drawingml/2006/main" uniqueId="urn:microsoft.com/office/officeart/2005/8/quickstyle/simple1">
+  <dgm:title val=""/>
+  <dgm:desc val=""/>
+  <dgm:catLst>
+    <dgm:cat type="simple" pri="10100"/>
+  </dgm:catLst>
+  <dgm:scene3d>
+    <a:camera prst="orthographicFront"/>
+    <a:lightRig rig="threePt" dir="t"/>
+  </dgm:scene3d>
+  <dgm:styleLbl name="node0">
+    <dgm:scene3d>
+      <a:camera prst="orthographicFront"/>
+      <a:lightRig rig="threePt" dir="t"/>
+    </dgm:scene3d>
+    <dgm:sp3d/>
+    <dgm:txPr/>
+    <dgm:style>
+      <a:lnRef idx="2">
+        <a:scrgbClr r="0" g="0" b="0"/>
+      </a:lnRef>
+      <a:fillRef idx="1">
+        <a:scrgbClr r="0" g="0" b="0"/>
+      </a:fillRef>
+      <a:effectRef idx="0">
+        <a:scrgbClr r="0" g="0" b="0"/>
+      </a:effectRef>
+      <a:fontRef idx="minor">
+        <a:schemeClr val="lt1"/>
+      </a:fontRef>
+    </dgm:style>
+  </dgm:styleLbl>
+  <dgm:styleLbl name="lnNode1">
+    <dgm:scene3d>
+      <a:camera prst="orthographicFront"/>
+      <a:lightRig rig="threePt" dir="t"/>
+    </dgm:scene3d>
+    <dgm:sp3d/>
+    <dgm:txPr/>
+    <dgm:style>
+      <a:lnRef idx="2">
+        <a:scrgbClr r="0" g="0" b="0"/>
+      </a:lnRef>
+      <a:fillRef idx="1">
+        <a:scrgbClr r="0" g="0" b="0"/>
+      </a:fillRef>
+      <a:effectRef idx="0">
+        <a:scrgbClr r="0" g="0" b="0"/>
+      </a:effectRef>
+      <a:fontRef idx="minor">
+        <a:schemeClr val="lt1"/>
+      </a:fontRef>
+    </dgm:style>
+  </dgm:styleLbl>
+  <dgm:styleLbl name="vennNode1">
+    <dgm:scene3d>
+      <a:camera prst="orthographicFront"/>
+      <a:lightRig rig="threePt" dir="t"/>
+    </dgm:scene3d>
+    <dgm:sp3d/>
+    <dgm:txPr/>
+    <dgm:style>
+      <a:lnRef idx="2">
+        <a:scrgbClr r="0" g="0" b="0"/>
+      </a:lnRef>
+      <a:fillRef idx="1">
+        <a:scrgbClr r="0" g="0" b="0"/>
+      </a:fillRef>
+      <a:effectRef idx="0">
+        <a:scrgbClr r="0" g="0" b="0"/>
+      </a:effectRef>
+      <a:fontRef idx="minor">
+        <a:schemeClr val="tx1"/>
+      </a:fontRef>
+    </dgm:style>
+  </dgm:styleLbl>
+  <dgm:styleLbl name="alignNode1">
+    <dgm:scene3d>
+      <a:camera prst="orthographicFront"/>
+      <a:lightRig rig="threePt" dir="t"/>
+    </dgm:scene3d>
+    <dgm:sp3d/>
+    <dgm:txPr/>
+    <dgm:style>
+      <a:lnRef idx="2">
+        <a:scrgbClr r="0" g="0" b="0"/>
+      </a:lnRef>
+      <a:fillRef idx="1">
+        <a:scrgbClr r="0" g="0" b="0"/>
+      </a:fillRef>
+      <a:effectRef idx="0">
+        <a:scrgbClr r="0" g="0" b="0"/>
+      </a:effectRef>
+      <a:fontRef idx="minor">
+        <a:schemeClr val="lt1"/>
+      </a:fontRef>
+    </dgm:style>
+  </dgm:styleLbl>
+  <dgm:styleLbl name="node1">
+    <dgm:scene3d>
+      <a:camera prst="orthographicFront"/>
+      <a:lightRig rig="threePt" dir="t"/>
+    </dgm:scene3d>
+    <dgm:sp3d/>
+    <dgm:txPr/>
+    <dgm:style>
+      <a:lnRef idx="2">
+        <a:scrgbClr r="0" g="0" b="0"/>
+      </a:lnRef>
+      <a:fillRef idx="1">
+        <a:scrgbClr r="0" g="0" b="0"/>
+      </a:fillRef>
+      <a:effectRef idx="0">
+        <a:scrgbClr r="0" g="0" b="0"/>
+      </a:effectRef>
+      <a:fontRef idx="minor">
+        <a:schemeClr val="lt1"/>
+      </a:fontRef>
+    </dgm:style>
+  </dgm:styleLbl>
+  <dgm:styleLbl name="node2">
+    <dgm:scene3d>
+      <a:camera prst="orthographicFront"/>
+      <a:lightRig rig="threePt" dir="t"/>
+    </dgm:scene3d>
+    <dgm:sp3d/>
+    <dgm:txPr/>
+    <dgm:style>
+      <a:lnRef idx="2">
+        <a:scrgbClr r="0" g="0" b="0"/>
+      </a:lnRef>
+      <a:fillRef idx="1">
+        <a:scrgbClr r="0" g="0" b="0"/>
+      </a:fillRef>
+      <a:effectRef idx="0">
+        <a:scrgbClr r="0" g="0" b="0"/>
+      </a:effectRef>
+      <a:fontRef idx="minor">
+        <a:schemeClr val="lt1"/>
+      </a:fontRef>
+    </dgm:style>
+  </dgm:styleLbl>
+  <dgm:styleLbl name="node3">
+    <dgm:scene3d>
+      <a:camera prst="orthographicFront"/>
+      <a:lightRig rig="threePt" dir="t"/>
+    </dgm:scene3d>
+    <dgm:sp3d/>
+    <dgm:txPr/>
+    <dgm:style>
+      <a:lnRef idx="2">
+        <a:scrgbClr r="0" g="0" b="0"/>
+      </a:lnRef>
+      <a:fillRef idx="1">
+        <a:scrgbClr r="0" g="0" b="0"/>
+      </a:fillRef>
+      <a:effectRef idx="0">
+        <a:scrgbClr r="0" g="0" b="0"/>
+      </a:effectRef>
+      <a:fontRef idx="minor">
+        <a:schemeClr val="lt1"/>
+      </a:fontRef>
+    </dgm:style>
+  </dgm:styleLbl>
+  <dgm:styleLbl name="node4">
+    <dgm:scene3d>
+      <a:camera prst="orthographicFront"/>
+      <a:lightRig rig="threePt" dir="t"/>
+    </dgm:scene3d>
+    <dgm:sp3d/>
+    <dgm:txPr/>
+    <dgm:style>
+      <a:lnRef idx="2">
+        <a:scrgbClr r="0" g="0" b="0"/>
+      </a:lnRef>
+      <a:fillRef idx="1">
+        <a:scrgbClr r="0" g="0" b="0"/>
+      </a:fillRef>
+      <a:effectRef idx="0">
+        <a:scrgbClr r="0" g="0" b="0"/>
+      </a:effectRef>
+      <a:fontRef idx="minor">
+        <a:schemeClr val="lt1"/>
+      </a:fontRef>
+    </dgm:style>
+  </dgm:styleLbl>
+  <dgm:styleLbl name="fgImgPlace1">
+    <dgm:scene3d>
+      <a:camera prst="orthographicFront"/>
+      <a:lightRig rig="threePt" dir="t"/>
+    </dgm:scene3d>
+    <dgm:sp3d/>
+    <dgm:txPr/>
+    <dgm:style>
+      <a:lnRef idx="2">
+        <a:scrgbClr r="0" g="0" b="0"/>
+      </a:lnRef>
+      <a:fillRef idx="1">
+        <a:scrgbClr r="0" g="0" b="0"/>
+      </a:fillRef>
+      <a:effectRef idx="0">
+        <a:scrgbClr r="0" g="0" b="0"/>
+      </a:effectRef>
+      <a:fontRef idx="minor"/>
+    </dgm:style>
+  </dgm:styleLbl>
+  <dgm:styleLbl name="alignImgPlace1">
+    <dgm:scene3d>
+      <a:camera prst="orthographicFront"/>
+      <a:lightRig rig="threePt" dir="t"/>
+    </dgm:scene3d>
+    <dgm:sp3d/>
+    <dgm:txPr/>
+    <dgm:style>
+      <a:lnRef idx="2">
+        <a:scrgbClr r="0" g="0" b="0"/>
+      </a:lnRef>
+      <a:fillRef idx="1">
+        <a:scrgbClr r="0" g="0" b="0"/>
+      </a:fillRef>
+      <a:effectRef idx="0">
+        <a:scrgbClr r="0" g="0" b="0"/>
+      </a:effectRef>
+      <a:fontRef idx="minor"/>
+    </dgm:style>
+  </dgm:styleLbl>
+  <dgm:styleLbl name="bgImgPlace1">
+    <dgm:scene3d>
+      <a:camera prst="orthographicFront"/>
+      <a:lightRig rig="threePt" dir="t"/>
+    </dgm:scene3d>
+    <dgm:sp3d/>
+    <dgm:txPr/>
+    <dgm:style>
+      <a:lnRef idx="2">
+        <a:scrgbClr r="0" g="0" b="0"/>
+      </a:lnRef>
+      <a:fillRef idx="1">
+        <a:scrgbClr r="0" g="0" b="0"/>
+      </a:fillRef>
+      <a:effectRef idx="0">
+        <a:scrgbClr r="0" g="0" b="0"/>
+      </a:effectRef>
+      <a:fontRef idx="minor"/>
+    </dgm:style>
+  </dgm:styleLbl>
+  <dgm:styleLbl name="sibTrans2D1">
+    <dgm:scene3d>
+      <a:camera prst="orthographicFront"/>
+      <a:lightRig rig="threePt" dir="t"/>
+    </dgm:scene3d>
+    <dgm:sp3d/>
+    <dgm:txPr/>
+    <dgm:style>
+      <a:lnRef idx="0">
+        <a:scrgbClr r="0" g="0" b="0"/>
+      </a:lnRef>
+      <a:fillRef idx="1">
+        <a:scrgbClr r="0" g="0" b="0"/>
+      </a:fillRef>
+      <a:effectRef idx="0">
+        <a:scrgbClr r="0" g="0" b="0"/>
+      </a:effectRef>
+      <a:fontRef idx="minor">
+        <a:schemeClr val="lt1"/>
+      </a:fontRef>
+    </dgm:style>
+  </dgm:styleLbl>
+  <dgm:styleLbl name="fgSibTrans2D1">
+    <dgm:scene3d>
+      <a:camera prst="orthographicFront"/>
+      <a:lightRig rig="threePt" dir="t"/>
+    </dgm:scene3d>
+    <dgm:sp3d/>
+    <dgm:txPr/>
+    <dgm:style>
+      <a:lnRef idx="0">
+        <a:scrgbClr r="0" g="0" b="0"/>
+      </a:lnRef>
+      <a:fillRef idx="1">
+        <a:scrgbClr r="0" g="0" b="0"/>
+      </a:fillRef>
+      <a:effectRef idx="0">
+        <a:scrgbClr r="0" g="0" b="0"/>
+      </a:effectRef>
+      <a:fontRef idx="minor">
+        <a:schemeClr val="lt1"/>
+      </a:fontRef>
+    </dgm:style>
+  </dgm:styleLbl>
+  <dgm:styleLbl name="bgSibTrans2D1">
+    <dgm:scene3d>
+      <a:camera prst="orthographicFront"/>
+      <a:lightRig rig="threePt" dir="t"/>
+    </dgm:scene3d>
+    <dgm:sp3d/>
+    <dgm:txPr/>
+    <dgm:style>
+      <a:lnRef idx="0">
+        <a:scrgbClr r="0" g="0" b="0"/>
+      </a:lnRef>
+      <a:fillRef idx="1">
+        <a:scrgbClr r="0" g="0" b="0"/>
+      </a:fillRef>
+      <a:effectRef idx="0">
+        <a:scrgbClr r="0" g="0" b="0"/>
+      </a:effectRef>
+      <a:fontRef idx="minor">
+        <a:schemeClr val="lt1"/>
+      </a:fontRef>
+    </dgm:style>
+  </dgm:styleLbl>
+  <dgm:styleLbl name="sibTrans1D1">
+    <dgm:scene3d>
+      <a:camera prst="orthographicFront"/>
+      <a:lightRig rig="threePt" dir="t"/>
+    </dgm:scene3d>
+    <dgm:sp3d/>
+    <dgm:txPr/>
+    <dgm:style>
+      <a:lnRef idx="1">
+        <a:scrgbClr r="0" g="0" b="0"/>
+      </a:lnRef>
+      <a:fillRef idx="0">
+        <a:scrgbClr r="0" g="0" b="0"/>
+      </a:fillRef>
+      <a:effectRef idx="0">
+        <a:scrgbClr r="0" g="0" b="0"/>
+      </a:effectRef>
+      <a:fontRef idx="minor"/>
+    </dgm:style>
+  </dgm:styleLbl>
+  <dgm:styleLbl name="callout">
+    <dgm:scene3d>
+      <a:camera prst="orthographicFront"/>
+      <a:lightRig rig="threePt" dir="t"/>
+    </dgm:scene3d>
+    <dgm:sp3d/>
+    <dgm:txPr/>
+    <dgm:style>
+      <a:lnRef idx="2">
+        <a:scrgbClr r="0" g="0" b="0"/>
+      </a:lnRef>
+      <a:fillRef idx="1">
+        <a:scrgbClr r="0" g="0" b="0"/>
+      </a:fillRef>
+      <a:effectRef idx="0">
+        <a:scrgbClr r="0" g="0" b="0"/>
+      </a:effectRef>
+      <a:fontRef idx="minor"/>
+    </dgm:style>
+  </dgm:styleLbl>
+  <dgm:styleLbl name="asst0">
+    <dgm:scene3d>
+      <a:camera prst="orthographicFront"/>
+      <a:lightRig rig="threePt" dir="t"/>
+    </dgm:scene3d>
+    <dgm:sp3d/>
+    <dgm:txPr/>
+    <dgm:style>
+      <a:lnRef idx="2">
+        <a:scrgbClr r="0" g="0" b="0"/>
+      </a:lnRef>
+      <a:fillRef idx="1">
+        <a:scrgbClr r="0" g="0" b="0"/>
+      </a:fillRef>
+      <a:effectRef idx="0">
+        <a:scrgbClr r="0" g="0" b="0"/>
+      </a:effectRef>
+      <a:fontRef idx="minor">
+        <a:schemeClr val="lt1"/>
+      </a:fontRef>
+    </dgm:style>
+  </dgm:styleLbl>
+  <dgm:styleLbl name="asst1">
+    <dgm:scene3d>
+      <a:camera prst="orthographicFront"/>
+      <a:lightRig rig="threePt" dir="t"/>
+    </dgm:scene3d>
+    <dgm:sp3d/>
+    <dgm:txPr/>
+    <dgm:style>
+      <a:lnRef idx="2">
+        <a:scrgbClr r="0" g="0" b="0"/>
+      </a:lnRef>
+      <a:fillRef idx="1">
+        <a:scrgbClr r="0" g="0" b="0"/>
+      </a:fillRef>
+      <a:effectRef idx="0">
+        <a:scrgbClr r="0" g="0" b="0"/>
+      </a:effectRef>
+      <a:fontRef idx="minor">
+        <a:schemeClr val="lt1"/>
+      </a:fontRef>
+    </dgm:style>
+  </dgm:styleLbl>
+  <dgm:styleLbl name="asst2">
+    <dgm:scene3d>
+      <a:camera prst="orthographicFront"/>
+      <a:lightRig rig="threePt" dir="t"/>
+    </dgm:scene3d>
+    <dgm:sp3d/>
+    <dgm:txPr/>
+    <dgm:style>
+      <a:lnRef idx="2">
+        <a:scrgbClr r="0" g="0" b="0"/>
+      </a:lnRef>
+      <a:fillRef idx="1">
+        <a:scrgbClr r="0" g="0" b="0"/>
+      </a:fillRef>
+      <a:effectRef idx="0">
+        <a:scrgbClr r="0" g="0" b="0"/>
+      </a:effectRef>
+      <a:fontRef idx="minor">
+        <a:schemeClr val="lt1"/>
+      </a:fontRef>
+    </dgm:style>
+  </dgm:styleLbl>
+  <dgm:styleLbl name="asst3">
+    <dgm:scene3d>
+      <a:camera prst="orthographicFront"/>
+      <a:lightRig rig="threePt" dir="t"/>
+    </dgm:scene3d>
+    <dgm:sp3d/>
+    <dgm:txPr/>
+    <dgm:style>
+      <a:lnRef idx="2">
+        <a:scrgbClr r="0" g="0" b="0"/>
+      </a:lnRef>
+      <a:fillRef idx="1">
+        <a:scrgbClr r="0" g="0" b="0"/>
+      </a:fillRef>
+      <a:effectRef idx="0">
+        <a:scrgbClr r="0" g="0" b="0"/>
+      </a:effectRef>
+      <a:fontRef idx="minor">
+        <a:schemeClr val="lt1"/>
+      </a:fontRef>
+    </dgm:style>
+  </dgm:styleLbl>
+  <dgm:styleLbl name="asst4">
+    <dgm:scene3d>
+      <a:camera prst="orthographicFront"/>
+      <a:lightRig rig="threePt" dir="t"/>
+    </dgm:scene3d>
+    <dgm:sp3d/>
+    <dgm:txPr/>
+    <dgm:style>
+      <a:lnRef idx="2">
+        <a:scrgbClr r="0" g="0" b="0"/>
+      </a:lnRef>
+      <a:fillRef idx="1">
+        <a:scrgbClr r="0" g="0" b="0"/>
+      </a:fillRef>
+      <a:effectRef idx="0">
+        <a:scrgbClr r="0" g="0" b="0"/>
+      </a:effectRef>
+      <a:fontRef idx="minor">
+        <a:schemeClr val="lt1"/>
+      </a:fontRef>
+    </dgm:style>
+  </dgm:styleLbl>
+  <dgm:styleLbl name="parChTrans2D1">
+    <dgm:scene3d>
+      <a:camera prst="orthographicFront"/>
+      <a:lightRig rig="threePt" dir="t"/>
+    </dgm:scene3d>
+    <dgm:sp3d/>
+    <dgm:txPr/>
+    <dgm:style>
+      <a:lnRef idx="2">
+        <a:scrgbClr r="0" g="0" b="0"/>
+      </a:lnRef>
+      <a:fillRef idx="1">
+        <a:scrgbClr r="0" g="0" b="0"/>
+      </a:fillRef>
+      <a:effectRef idx="0">
+        <a:scrgbClr r="0" g="0" b="0"/>
+      </a:effectRef>
+      <a:fontRef idx="minor">
+        <a:schemeClr val="lt1"/>
+      </a:fontRef>
+    </dgm:style>
+  </dgm:styleLbl>
+  <dgm:styleLbl name="parChTrans2D2">
+    <dgm:scene3d>
+      <a:camera prst="orthographicFront"/>
+      <a:lightRig rig="threePt" dir="t"/>
+    </dgm:scene3d>
+    <dgm:sp3d/>
+    <dgm:txPr/>
+    <dgm:style>
+      <a:lnRef idx="2">
+        <a:scrgbClr r="0" g="0" b="0"/>
+      </a:lnRef>
+      <a:fillRef idx="1">
+        <a:scrgbClr r="0" g="0" b="0"/>
+      </a:fillRef>
+      <a:effectRef idx="0">
+        <a:scrgbClr r="0" g="0" b="0"/>
+      </a:effectRef>
+      <a:fontRef idx="minor">
+        <a:schemeClr val="lt1"/>
+      </a:fontRef>
+    </dgm:style>
+  </dgm:styleLbl>
+  <dgm:styleLbl name="parChTrans2D3">
+    <dgm:scene3d>
+      <a:camera prst="orthographicFront"/>
+      <a:lightRig rig="threePt" dir="t"/>
+    </dgm:scene3d>
+    <dgm:sp3d/>
+    <dgm:txPr/>
+    <dgm:style>
+      <a:lnRef idx="2">
+        <a:scrgbClr r="0" g="0" b="0"/>
+      </a:lnRef>
+      <a:fillRef idx="1">
+        <a:scrgbClr r="0" g="0" b="0"/>
+      </a:fillRef>
+      <a:effectRef idx="0">
+        <a:scrgbClr r="0" g="0" b="0"/>
+      </a:effectRef>
+      <a:fontRef idx="minor">
+        <a:schemeClr val="lt1"/>
+      </a:fontRef>
+    </dgm:style>
+  </dgm:styleLbl>
+  <dgm:styleLbl name="parChTrans2D4">
+    <dgm:scene3d>
+      <a:camera prst="orthographicFront"/>
+      <a:lightRig rig="threePt" dir="t"/>
+    </dgm:scene3d>
+    <dgm:sp3d/>
+    <dgm:txPr/>
+    <dgm:style>
+      <a:lnRef idx="2">
+        <a:scrgbClr r="0" g="0" b="0"/>
+      </a:lnRef>
+      <a:fillRef idx="1">
+        <a:scrgbClr r="0" g="0" b="0"/>
+      </a:fillRef>
+      <a:effectRef idx="0">
+        <a:scrgbClr r="0" g="0" b="0"/>
+      </a:effectRef>
+      <a:fontRef idx="minor">
+        <a:schemeClr val="lt1"/>
+      </a:fontRef>
+    </dgm:style>
+  </dgm:styleLbl>
+  <dgm:styleLbl name="parChTrans1D1">
+    <dgm:scene3d>
+      <a:camera prst="orthographicFront"/>
+      <a:lightRig rig="threePt" dir="t"/>
+    </dgm:scene3d>
+    <dgm:sp3d/>
+    <dgm:txPr/>
+    <dgm:style>
+      <a:lnRef idx="2">
+        <a:scrgbClr r="0" g="0" b="0"/>
+      </a:lnRef>
+      <a:fillRef idx="0">
+        <a:scrgbClr r="0" g="0" b="0"/>
+      </a:fillRef>
+      <a:effectRef idx="0">
+        <a:scrgbClr r="0" g="0" b="0"/>
+      </a:effectRef>
+      <a:fontRef idx="minor"/>
+    </dgm:style>
+  </dgm:styleLbl>
+  <dgm:styleLbl name="parChTrans1D2">
+    <dgm:scene3d>
+      <a:camera prst="orthographicFront"/>
+      <a:lightRig rig="threePt" dir="t"/>
+    </dgm:scene3d>
+    <dgm:sp3d/>
+    <dgm:txPr/>
+    <dgm:style>
+      <a:lnRef idx="2">
+        <a:scrgbClr r="0" g="0" b="0"/>
+      </a:lnRef>
+      <a:fillRef idx="0">
+        <a:scrgbClr r="0" g="0" b="0"/>
+      </a:fillRef>
+      <a:effectRef idx="0">
+        <a:scrgbClr r="0" g="0" b="0"/>
+      </a:effectRef>
+      <a:fontRef idx="minor"/>
+    </dgm:style>
+  </dgm:styleLbl>
+  <dgm:styleLbl name="parChTrans1D3">
+    <dgm:scene3d>
+      <a:camera prst="orthographicFront"/>
+      <a:lightRig rig="threePt" dir="t"/>
+    </dgm:scene3d>
+    <dgm:sp3d/>
+    <dgm:txPr/>
+    <dgm:style>
+      <a:lnRef idx="2">
+        <a:scrgbClr r="0" g="0" b="0"/>
+      </a:lnRef>
+      <a:fillRef idx="0">
+        <a:scrgbClr r="0" g="0" b="0"/>
+      </a:fillRef>
+      <a:effectRef idx="0">
+        <a:scrgbClr r="0" g="0" b="0"/>
+      </a:effectRef>
+      <a:fontRef idx="minor"/>
+    </dgm:style>
+  </dgm:styleLbl>
+  <dgm:styleLbl name="parChTrans1D4">
+    <dgm:scene3d>
+      <a:camera prst="orthographicFront"/>
+      <a:lightRig rig="threePt" dir="t"/>
+    </dgm:scene3d>
+    <dgm:sp3d/>
+    <dgm:txPr/>
+    <dgm:style>
+      <a:lnRef idx="2">
+        <a:scrgbClr r="0" g="0" b="0"/>
+      </a:lnRef>
+      <a:fillRef idx="0">
+        <a:scrgbClr r="0" g="0" b="0"/>
+      </a:fillRef>
+      <a:effectRef idx="0">
+        <a:scrgbClr r="0" g="0" b="0"/>
+      </a:effectRef>
+      <a:fontRef idx="minor"/>
+    </dgm:style>
+  </dgm:styleLbl>
+  <dgm:styleLbl name="fgAcc1">
+    <dgm:scene3d>
+      <a:camera prst="orthographicFront"/>
+      <a:lightRig rig="threePt" dir="t"/>
+    </dgm:scene3d>
+    <dgm:sp3d/>
+    <dgm:txPr/>
+    <dgm:style>
+      <a:lnRef idx="2">
+        <a:scrgbClr r="0" g="0" b="0"/>
+      </a:lnRef>
+      <a:fillRef idx="1">
+        <a:scrgbClr r="0" g="0" b="0"/>
+      </a:fillRef>
+      <a:effectRef idx="0">
+        <a:scrgbClr r="0" g="0" b="0"/>
+      </a:effectRef>
+      <a:fontRef idx="minor"/>
+    </dgm:style>
+  </dgm:styleLbl>
+  <dgm:styleLbl name="conFgAcc1">
+    <dgm:scene3d>
+      <a:camera prst="orthographicFront"/>
+      <a:lightRig rig="threePt" dir="t"/>
+    </dgm:scene3d>
+    <dgm:sp3d/>
+    <dgm:txPr/>
+    <dgm:style>
+      <a:lnRef idx="2">
+        <a:scrgbClr r="0" g="0" b="0"/>
+      </a:lnRef>
+      <a:fillRef idx="1">
+        <a:scrgbClr r="0" g="0" b="0"/>
+      </a:fillRef>
+      <a:effectRef idx="0">
+        <a:scrgbClr r="0" g="0" b="0"/>
+      </a:effectRef>
+      <a:fontRef idx="minor"/>
+    </dgm:style>
+  </dgm:styleLbl>
+  <dgm:styleLbl name="alignAcc1">
+    <dgm:scene3d>
+      <a:camera prst="orthographicFront"/>
+      <a:lightRig rig="threePt" dir="t"/>
+    </dgm:scene3d>
+    <dgm:sp3d/>
+    <dgm:txPr/>
+    <dgm:style>
+      <a:lnRef idx="2">
+        <a:scrgbClr r="0" g="0" b="0"/>
+      </a:lnRef>
+      <a:fillRef idx="1">
+        <a:scrgbClr r="0" g="0" b="0"/>
+      </a:fillRef>
+      <a:effectRef idx="0">
+        <a:scrgbClr r="0" g="0" b="0"/>
+      </a:effectRef>
+      <a:fontRef idx="minor"/>
+    </dgm:style>
+  </dgm:styleLbl>
+  <dgm:styleLbl name="trAlignAcc1">
+    <dgm:scene3d>
+      <a:camera prst="orthographicFront"/>
+      <a:lightRig rig="threePt" dir="t"/>
+    </dgm:scene3d>
+    <dgm:sp3d/>
+    <dgm:txPr/>
+    <dgm:style>
+      <a:lnRef idx="1">
+        <a:scrgbClr r="0" g="0" b="0"/>
+      </a:lnRef>
+      <a:fillRef idx="1">
+        <a:scrgbClr r="0" g="0" b="0"/>
+      </a:fillRef>
+      <a:effectRef idx="0">
+        <a:scrgbClr r="0" g="0" b="0"/>
+      </a:effectRef>
+      <a:fontRef idx="minor"/>
+    </dgm:style>
+  </dgm:styleLbl>
+  <dgm:styleLbl name="bgAcc1">
+    <dgm:scene3d>
+      <a:camera prst="orthographicFront"/>
+      <a:lightRig rig="threePt" dir="t"/>
+    </dgm:scene3d>
+    <dgm:sp3d/>
+    <dgm:txPr/>
+    <dgm:style>
+      <a:lnRef idx="2">
+        <a:scrgbClr r="0" g="0" b="0"/>
+      </a:lnRef>
+      <a:fillRef idx="1">
+        <a:scrgbClr r="0" g="0" b="0"/>
+      </a:fillRef>
+      <a:effectRef idx="0">
+        <a:scrgbClr r="0" g="0" b="0"/>
+      </a:effectRef>
+      <a:fontRef idx="minor"/>
+    </dgm:style>
+  </dgm:styleLbl>
+  <dgm:styleLbl name="solidFgAcc1">
+    <dgm:scene3d>
+      <a:camera prst="orthographicFront"/>
+      <a:lightRig rig="threePt" dir="t"/>
+    </dgm:scene3d>
+    <dgm:sp3d/>
+    <dgm:txPr/>
+    <dgm:style>
+      <a:lnRef idx="2">
+        <a:scrgbClr r="0" g="0" b="0"/>
+      </a:lnRef>
+      <a:fillRef idx="1">
+        <a:scrgbClr r="0" g="0" b="0"/>
+      </a:fillRef>
+      <a:effectRef idx="0">
+        <a:scrgbClr r="0" g="0" b="0"/>
+      </a:effectRef>
+      <a:fontRef idx="minor"/>
+    </dgm:style>
+  </dgm:styleLbl>
+  <dgm:styleLbl name="solidAlignAcc1">
+    <dgm:scene3d>
+      <a:camera prst="orthographicFront"/>
+      <a:lightRig rig="threePt" dir="t"/>
+    </dgm:scene3d>
+    <dgm:sp3d/>
+    <dgm:txPr/>
+    <dgm:style>
+      <a:lnRef idx="2">
+        <a:scrgbClr r="0" g="0" b="0"/>
+      </a:lnRef>
+      <a:fillRef idx="1">
+        <a:scrgbClr r="0" g="0" b="0"/>
+      </a:fillRef>
+      <a:effectRef idx="0">
+        <a:scrgbClr r="0" g="0" b="0"/>
+      </a:effectRef>
+      <a:fontRef idx="minor"/>
+    </dgm:style>
+  </dgm:styleLbl>
+  <dgm:styleLbl name="solidBgAcc1">
+    <dgm:scene3d>
+      <a:camera prst="orthographicFront"/>
+      <a:lightRig rig="threePt" dir="t"/>
+    </dgm:scene3d>
+    <dgm:sp3d/>
+    <dgm:txPr/>
+    <dgm:style>
+      <a:lnRef idx="2">
+        <a:scrgbClr r="0" g="0" b="0"/>
+      </a:lnRef>
+      <a:fillRef idx="1">
+        <a:scrgbClr r="0" g="0" b="0"/>
+      </a:fillRef>
+      <a:effectRef idx="0">
+        <a:scrgbClr r="0" g="0" b="0"/>
+      </a:effectRef>
+      <a:fontRef idx="minor"/>
+    </dgm:style>
+  </dgm:styleLbl>
+  <dgm:styleLbl name="fgAccFollowNode1">
+    <dgm:scene3d>
+      <a:camera prst="orthographicFront"/>
+      <a:lightRig rig="threePt" dir="t"/>
+    </dgm:scene3d>
+    <dgm:sp3d/>
+    <dgm:txPr/>
+    <dgm:style>
+      <a:lnRef idx="2">
+        <a:scrgbClr r="0" g="0" b="0"/>
+      </a:lnRef>
+      <a:fillRef idx="1">
+        <a:scrgbClr r="0" g="0" b="0"/>
+      </a:fillRef>
+      <a:effectRef idx="0">
+        <a:scrgbClr r="0" g="0" b="0"/>
+      </a:effectRef>
+      <a:fontRef idx="minor"/>
+    </dgm:style>
+  </dgm:styleLbl>
+  <dgm:styleLbl name="alignAccFollowNode1">
+    <dgm:scene3d>
+      <a:camera prst="orthographicFront"/>
+      <a:lightRig rig="threePt" dir="t"/>
+    </dgm:scene3d>
+    <dgm:sp3d/>
+    <dgm:txPr/>
+    <dgm:style>
+      <a:lnRef idx="2">
+        <a:scrgbClr r="0" g="0" b="0"/>
+      </a:lnRef>
+      <a:fillRef idx="1">
+        <a:scrgbClr r="0" g="0" b="0"/>
+      </a:fillRef>
+      <a:effectRef idx="0">
+        <a:scrgbClr r="0" g="0" b="0"/>
+      </a:effectRef>
+      <a:fontRef idx="minor"/>
+    </dgm:style>
+  </dgm:styleLbl>
+  <dgm:styleLbl name="bgAccFollowNode1">
+    <dgm:scene3d>
+      <a:camera prst="orthographicFront"/>
+      <a:lightRig rig="threePt" dir="t"/>
+    </dgm:scene3d>
+    <dgm:sp3d/>
+    <dgm:txPr/>
+    <dgm:style>
+      <a:lnRef idx="2">
+        <a:scrgbClr r="0" g="0" b="0"/>
+      </a:lnRef>
+      <a:fillRef idx="1">
+        <a:scrgbClr r="0" g="0" b="0"/>
+      </a:fillRef>
+      <a:effectRef idx="0">
+        <a:scrgbClr r="0" g="0" b="0"/>
+      </a:effectRef>
+      <a:fontRef idx="minor"/>
+    </dgm:style>
+  </dgm:styleLbl>
+  <dgm:styleLbl name="fgAcc0">
+    <dgm:scene3d>
+      <a:camera prst="orthographicFront"/>
+      <a:lightRig rig="threePt" dir="t"/>
+    </dgm:scene3d>
+    <dgm:sp3d/>
+    <dgm:txPr/>
+    <dgm:style>
+      <a:lnRef idx="2">
+        <a:scrgbClr r="0" g="0" b="0"/>
+      </a:lnRef>
+      <a:fillRef idx="1">
+        <a:scrgbClr r="0" g="0" b="0"/>
+      </a:fillRef>
+      <a:effectRef idx="0">
+        <a:scrgbClr r="0" g="0" b="0"/>
+      </a:effectRef>
+      <a:fontRef idx="minor"/>
+    </dgm:style>
+  </dgm:styleLbl>
+  <dgm:styleLbl name="fgAcc2">
+    <dgm:scene3d>
+      <a:camera prst="orthographicFront"/>
+      <a:lightRig rig="threePt" dir="t"/>
+    </dgm:scene3d>
+    <dgm:sp3d/>
+    <dgm:txPr/>
+    <dgm:style>
+      <a:lnRef idx="2">
+        <a:scrgbClr r="0" g="0" b="0"/>
+      </a:lnRef>
+      <a:fillRef idx="1">
+        <a:scrgbClr r="0" g="0" b="0"/>
+      </a:fillRef>
+      <a:effectRef idx="0">
+        <a:scrgbClr r="0" g="0" b="0"/>
+      </a:effectRef>
+      <a:fontRef idx="minor"/>
+    </dgm:style>
+  </dgm:styleLbl>
+  <dgm:styleLbl name="fgAcc3">
+    <dgm:scene3d>
+      <a:camera prst="orthographicFront"/>
+      <a:lightRig rig="threePt" dir="t"/>
+    </dgm:scene3d>
+    <dgm:sp3d/>
+    <dgm:txPr/>
+    <dgm:style>
+      <a:lnRef idx="2">
+        <a:scrgbClr r="0" g="0" b="0"/>
+      </a:lnRef>
+      <a:fillRef idx="1">
+        <a:scrgbClr r="0" g="0" b="0"/>
+      </a:fillRef>
+      <a:effectRef idx="0">
+        <a:scrgbClr r="0" g="0" b="0"/>
+      </a:effectRef>
+      <a:fontRef idx="minor"/>
+    </dgm:style>
+  </dgm:styleLbl>
+  <dgm:styleLbl name="fgAcc4">
+    <dgm:scene3d>
+      <a:camera prst="orthographicFront"/>
+      <a:lightRig rig="threePt" dir="t"/>
+    </dgm:scene3d>
+    <dgm:sp3d/>
+    <dgm:txPr/>
+    <dgm:style>
+      <a:lnRef idx="2">
+        <a:scrgbClr r="0" g="0" b="0"/>
+      </a:lnRef>
+      <a:fillRef idx="1">
+        <a:scrgbClr r="0" g="0" b="0"/>
+      </a:fillRef>
+      <a:effectRef idx="0">
+        <a:scrgbClr r="0" g="0" b="0"/>
+      </a:effectRef>
+      <a:fontRef idx="minor"/>
+    </dgm:style>
+  </dgm:styleLbl>
+  <dgm:styleLbl name="bgShp">
+    <dgm:scene3d>
+      <a:camera prst="orthographicFront"/>
+      <a:lightRig rig="threePt" dir="t"/>
+    </dgm:scene3d>
+    <dgm:sp3d/>
+    <dgm:txPr/>
+    <dgm:style>
+      <a:lnRef idx="0">
+        <a:scrgbClr r="0" g="0" b="0"/>
+      </a:lnRef>
+      <a:fillRef idx="1">
+        <a:scrgbClr r="0" g="0" b="0"/>
+      </a:fillRef>
+      <a:effectRef idx="0">
+        <a:scrgbClr r="0" g="0" b="0"/>
+      </a:effectRef>
+      <a:fontRef idx="minor"/>
+    </dgm:style>
+  </dgm:styleLbl>
+  <dgm:styleLbl name="dkBgShp">
+    <dgm:scene3d>
+      <a:camera prst="orthographicFront"/>
+      <a:lightRig rig="threePt" dir="t"/>
+    </dgm:scene3d>
+    <dgm:sp3d/>
+    <dgm:txPr/>
+    <dgm:style>
+      <a:lnRef idx="0">
+        <a:scrgbClr r="0" g="0" b="0"/>
+      </a:lnRef>
+      <a:fillRef idx="1">
+        <a:scrgbClr r="0" g="0" b="0"/>
+      </a:fillRef>
+      <a:effectRef idx="0">
+        <a:scrgbClr r="0" g="0" b="0"/>
+      </a:effectRef>
+      <a:fontRef idx="minor"/>
+    </dgm:style>
+  </dgm:styleLbl>
+  <dgm:styleLbl name="trBgShp">
+    <dgm:scene3d>
+      <a:camera prst="orthographicFront"/>
+      <a:lightRig rig="threePt" dir="t"/>
+    </dgm:scene3d>
+    <dgm:sp3d/>
+    <dgm:txPr/>
+    <dgm:style>
+      <a:lnRef idx="0">
+        <a:scrgbClr r="0" g="0" b="0"/>
+      </a:lnRef>
+      <a:fillRef idx="1">
+        <a:scrgbClr r="0" g="0" b="0"/>
+      </a:fillRef>
+      <a:effectRef idx="0">
+        <a:scrgbClr r="0" g="0" b="0"/>
+      </a:effectRef>
+      <a:fontRef idx="minor"/>
+    </dgm:style>
+  </dgm:styleLbl>
+  <dgm:styleLbl name="fgShp">
+    <dgm:scene3d>
+      <a:camera prst="orthographicFront"/>
+      <a:lightRig rig="threePt" dir="t"/>
+    </dgm:scene3d>
+    <dgm:sp3d/>
+    <dgm:txPr/>
+    <dgm:style>
+      <a:lnRef idx="2">
+        <a:scrgbClr r="0" g="0" b="0"/>
+      </a:lnRef>
+      <a:fillRef idx="1">
+        <a:scrgbClr r="0" g="0" b="0"/>
+      </a:fillRef>
+      <a:effectRef idx="0">
+        <a:scrgbClr r="0" g="0" b="0"/>
+      </a:effectRef>
+      <a:fontRef idx="minor"/>
+    </dgm:style>
+  </dgm:styleLbl>
+  <dgm:styleLbl name="revTx">
+    <dgm:scene3d>
+      <a:camera prst="orthographicFront"/>
+      <a:lightRig rig="threePt" dir="t"/>
+    </dgm:scene3d>
+    <dgm:sp3d/>
+    <dgm:txPr/>
+    <dgm:style>
+      <a:lnRef idx="0">
+        <a:scrgbClr r="0" g="0" b="0"/>
+      </a:lnRef>
+      <a:fillRef idx="0">
+        <a:scrgbClr r="0" g="0" b="0"/>
+      </a:fillRef>
+      <a:effectRef idx="0">
+        <a:scrgbClr r="0" g="0" b="0"/>
+      </a:effectRef>
+      <a:fontRef idx="minor"/>
+    </dgm:style>
+  </dgm:styleLbl>
+</dgm:styleDef>
+</file>
+
+<file path=ppt/diagrams/quickStyle5.xml><?xml version="1.0" encoding="utf-8"?>
 <dgm:styleDef xmlns:dgm="http://schemas.openxmlformats.org/drawingml/2006/diagram" xmlns:a="http://schemas.openxmlformats.org/drawingml/2006/main" uniqueId="urn:microsoft.com/office/officeart/2005/8/quickstyle/simple1">
   <dgm:title val=""/>
   <dgm:desc val=""/>
@@ -12753,7 +15425,7 @@
             <a:fld id="{B61BEF0D-F0BB-DE4B-95CE-6DB70DBA9567}" type="datetimeFigureOut">
               <a:rPr lang="en-US" dirty="0"/>
               <a:pPr/>
-              <a:t>5/10/2016</a:t>
+              <a:t>5/11/2016</a:t>
             </a:fld>
             <a:endParaRPr lang="en-US" dirty="0"/>
           </a:p>
@@ -13186,7 +15858,7 @@
             <a:fld id="{B61BEF0D-F0BB-DE4B-95CE-6DB70DBA9567}" type="datetimeFigureOut">
               <a:rPr lang="en-US" dirty="0"/>
               <a:pPr/>
-              <a:t>5/10/2016</a:t>
+              <a:t>5/11/2016</a:t>
             </a:fld>
             <a:endParaRPr lang="en-US" dirty="0"/>
           </a:p>
@@ -13433,7 +16105,7 @@
             <a:fld id="{B61BEF0D-F0BB-DE4B-95CE-6DB70DBA9567}" type="datetimeFigureOut">
               <a:rPr lang="en-US" dirty="0"/>
               <a:pPr/>
-              <a:t>5/10/2016</a:t>
+              <a:t>5/11/2016</a:t>
             </a:fld>
             <a:endParaRPr lang="en-US" dirty="0"/>
           </a:p>
@@ -13738,7 +16410,7 @@
             <a:fld id="{B61BEF0D-F0BB-DE4B-95CE-6DB70DBA9567}" type="datetimeFigureOut">
               <a:rPr lang="en-US" dirty="0"/>
               <a:pPr/>
-              <a:t>5/10/2016</a:t>
+              <a:t>5/11/2016</a:t>
             </a:fld>
             <a:endParaRPr lang="en-US" dirty="0"/>
           </a:p>
@@ -14053,7 +16725,7 @@
             <a:fld id="{B61BEF0D-F0BB-DE4B-95CE-6DB70DBA9567}" type="datetimeFigureOut">
               <a:rPr lang="en-US" dirty="0"/>
               <a:pPr/>
-              <a:t>5/10/2016</a:t>
+              <a:t>5/11/2016</a:t>
             </a:fld>
             <a:endParaRPr lang="en-US" dirty="0"/>
           </a:p>
@@ -14352,7 +17024,7 @@
             <a:fld id="{B61BEF0D-F0BB-DE4B-95CE-6DB70DBA9567}" type="datetimeFigureOut">
               <a:rPr lang="en-US" dirty="0"/>
               <a:pPr/>
-              <a:t>5/10/2016</a:t>
+              <a:t>5/11/2016</a:t>
             </a:fld>
             <a:endParaRPr lang="en-US" dirty="0"/>
           </a:p>
@@ -14716,7 +17388,7 @@
             <a:fld id="{B61BEF0D-F0BB-DE4B-95CE-6DB70DBA9567}" type="datetimeFigureOut">
               <a:rPr lang="en-US" dirty="0"/>
               <a:pPr/>
-              <a:t>5/10/2016</a:t>
+              <a:t>5/11/2016</a:t>
             </a:fld>
             <a:endParaRPr lang="en-US" dirty="0"/>
           </a:p>
@@ -14887,7 +17559,7 @@
             <a:fld id="{B61BEF0D-F0BB-DE4B-95CE-6DB70DBA9567}" type="datetimeFigureOut">
               <a:rPr lang="en-US" dirty="0"/>
               <a:pPr/>
-              <a:t>5/10/2016</a:t>
+              <a:t>5/11/2016</a:t>
             </a:fld>
             <a:endParaRPr lang="en-US" dirty="0"/>
           </a:p>
@@ -15064,7 +17736,7 @@
             <a:fld id="{B61BEF0D-F0BB-DE4B-95CE-6DB70DBA9567}" type="datetimeFigureOut">
               <a:rPr lang="en-US" dirty="0"/>
               <a:pPr/>
-              <a:t>5/10/2016</a:t>
+              <a:t>5/11/2016</a:t>
             </a:fld>
             <a:endParaRPr lang="en-US" dirty="0"/>
           </a:p>
@@ -15231,7 +17903,7 @@
             <a:fld id="{B61BEF0D-F0BB-DE4B-95CE-6DB70DBA9567}" type="datetimeFigureOut">
               <a:rPr lang="en-US" dirty="0"/>
               <a:pPr/>
-              <a:t>5/10/2016</a:t>
+              <a:t>5/11/2016</a:t>
             </a:fld>
             <a:endParaRPr lang="en-US" dirty="0"/>
           </a:p>
@@ -15478,7 +18150,7 @@
             <a:fld id="{B61BEF0D-F0BB-DE4B-95CE-6DB70DBA9567}" type="datetimeFigureOut">
               <a:rPr lang="en-US" dirty="0"/>
               <a:pPr/>
-              <a:t>5/10/2016</a:t>
+              <a:t>5/11/2016</a:t>
             </a:fld>
             <a:endParaRPr lang="en-US" dirty="0"/>
           </a:p>
@@ -15711,7 +18383,7 @@
             <a:fld id="{B61BEF0D-F0BB-DE4B-95CE-6DB70DBA9567}" type="datetimeFigureOut">
               <a:rPr lang="en-US" dirty="0"/>
               <a:pPr/>
-              <a:t>5/10/2016</a:t>
+              <a:t>5/11/2016</a:t>
             </a:fld>
             <a:endParaRPr lang="en-US" dirty="0"/>
           </a:p>
@@ -16090,7 +18762,7 @@
             <a:fld id="{B61BEF0D-F0BB-DE4B-95CE-6DB70DBA9567}" type="datetimeFigureOut">
               <a:rPr lang="en-US" dirty="0"/>
               <a:pPr/>
-              <a:t>5/10/2016</a:t>
+              <a:t>5/11/2016</a:t>
             </a:fld>
             <a:endParaRPr lang="en-US" dirty="0"/>
           </a:p>
@@ -16205,7 +18877,7 @@
             <a:fld id="{B61BEF0D-F0BB-DE4B-95CE-6DB70DBA9567}" type="datetimeFigureOut">
               <a:rPr lang="en-US" dirty="0"/>
               <a:pPr/>
-              <a:t>5/10/2016</a:t>
+              <a:t>5/11/2016</a:t>
             </a:fld>
             <a:endParaRPr lang="en-US" dirty="0"/>
           </a:p>
@@ -16297,7 +18969,7 @@
             <a:fld id="{B61BEF0D-F0BB-DE4B-95CE-6DB70DBA9567}" type="datetimeFigureOut">
               <a:rPr lang="en-US" dirty="0"/>
               <a:pPr/>
-              <a:t>5/10/2016</a:t>
+              <a:t>5/11/2016</a:t>
             </a:fld>
             <a:endParaRPr lang="en-US" dirty="0"/>
           </a:p>
@@ -16549,7 +19221,7 @@
             <a:fld id="{B61BEF0D-F0BB-DE4B-95CE-6DB70DBA9567}" type="datetimeFigureOut">
               <a:rPr lang="en-US" dirty="0"/>
               <a:pPr/>
-              <a:t>5/10/2016</a:t>
+              <a:t>5/11/2016</a:t>
             </a:fld>
             <a:endParaRPr lang="en-US" dirty="0"/>
           </a:p>
@@ -16829,7 +19501,7 @@
             <a:fld id="{B61BEF0D-F0BB-DE4B-95CE-6DB70DBA9567}" type="datetimeFigureOut">
               <a:rPr lang="en-US" dirty="0"/>
               <a:pPr/>
-              <a:t>5/10/2016</a:t>
+              <a:t>5/11/2016</a:t>
             </a:fld>
             <a:endParaRPr lang="en-US" dirty="0"/>
           </a:p>
@@ -17232,7 +19904,7 @@
             <a:fld id="{B61BEF0D-F0BB-DE4B-95CE-6DB70DBA9567}" type="datetimeFigureOut">
               <a:rPr lang="en-US" dirty="0"/>
               <a:pPr/>
-              <a:t>5/10/2016</a:t>
+              <a:t>5/11/2016</a:t>
             </a:fld>
             <a:endParaRPr lang="en-US" dirty="0"/>
           </a:p>
@@ -18049,6 +20721,61 @@
 </p:sld>
 </file>
 
+<file path=ppt/slides/slide4.xml><?xml version="1.0" encoding="utf-8"?>
+<p:sld xmlns:a="http://schemas.openxmlformats.org/drawingml/2006/main" xmlns:r="http://schemas.openxmlformats.org/officeDocument/2006/relationships" xmlns:p="http://schemas.openxmlformats.org/presentationml/2006/main">
+  <p:cSld>
+    <p:spTree>
+      <p:nvGrpSpPr>
+        <p:cNvPr id="1" name=""/>
+        <p:cNvGrpSpPr/>
+        <p:nvPr/>
+      </p:nvGrpSpPr>
+      <p:grpSpPr>
+        <a:xfrm>
+          <a:off x="0" y="0"/>
+          <a:ext cx="0" cy="0"/>
+          <a:chOff x="0" y="0"/>
+          <a:chExt cx="0" cy="0"/>
+        </a:xfrm>
+      </p:grpSpPr>
+      <p:graphicFrame>
+        <p:nvGraphicFramePr>
+          <p:cNvPr id="4" name="Content Placeholder 3"/>
+          <p:cNvGraphicFramePr>
+            <a:graphicFrameLocks noGrp="1"/>
+          </p:cNvGraphicFramePr>
+          <p:nvPr>
+            <p:ph idx="1"/>
+            <p:extLst>
+              <p:ext uri="{D42A27DB-BD31-4B8C-83A1-F6EECF244321}">
+                <p14:modId xmlns:p14="http://schemas.microsoft.com/office/powerpoint/2010/main" val="3723349286"/>
+              </p:ext>
+            </p:extLst>
+          </p:nvPr>
+        </p:nvGraphicFramePr>
+        <p:xfrm>
+          <a:off x="684212" y="685800"/>
+          <a:ext cx="10923587" cy="5588000"/>
+        </p:xfrm>
+        <a:graphic>
+          <a:graphicData uri="http://schemas.openxmlformats.org/drawingml/2006/diagram">
+            <dgm:relIds xmlns:dgm="http://schemas.openxmlformats.org/drawingml/2006/diagram" xmlns:r="http://schemas.openxmlformats.org/officeDocument/2006/relationships" r:dm="rId2" r:lo="rId3" r:qs="rId4" r:cs="rId5"/>
+          </a:graphicData>
+        </a:graphic>
+      </p:graphicFrame>
+    </p:spTree>
+    <p:extLst>
+      <p:ext uri="{BB962C8B-B14F-4D97-AF65-F5344CB8AC3E}">
+        <p14:creationId xmlns:p14="http://schemas.microsoft.com/office/powerpoint/2010/main" val="1307601535"/>
+      </p:ext>
+    </p:extLst>
+  </p:cSld>
+  <p:clrMapOvr>
+    <a:masterClrMapping/>
+  </p:clrMapOvr>
+</p:sld>
+</file>
+
 <file path=ppt/theme/theme1.xml><?xml version="1.0" encoding="utf-8"?>
 <a:theme xmlns:a="http://schemas.openxmlformats.org/drawingml/2006/main" name="Slice">
   <a:themeElements>

</xml_diff>